<commit_message>
Documented _setMode and _update
</commit_message>
<xml_diff>
--- a/docs/Tech-overview.pptx
+++ b/docs/Tech-overview.pptx
@@ -255,7 +255,7 @@
           <a:p>
             <a:fld id="{CA855E1B-8830-B64E-B102-DB2BBD0D9567}" type="datetimeFigureOut">
               <a:rPr lang="sv-SE" smtClean="0"/>
-              <a:t>2020-07-24</a:t>
+              <a:t>2020-07-25</a:t>
             </a:fld>
             <a:endParaRPr lang="sv-SE"/>
           </a:p>
@@ -425,7 +425,7 @@
           <a:p>
             <a:fld id="{CA855E1B-8830-B64E-B102-DB2BBD0D9567}" type="datetimeFigureOut">
               <a:rPr lang="sv-SE" smtClean="0"/>
-              <a:t>2020-07-24</a:t>
+              <a:t>2020-07-25</a:t>
             </a:fld>
             <a:endParaRPr lang="sv-SE"/>
           </a:p>
@@ -605,7 +605,7 @@
           <a:p>
             <a:fld id="{CA855E1B-8830-B64E-B102-DB2BBD0D9567}" type="datetimeFigureOut">
               <a:rPr lang="sv-SE" smtClean="0"/>
-              <a:t>2020-07-24</a:t>
+              <a:t>2020-07-25</a:t>
             </a:fld>
             <a:endParaRPr lang="sv-SE"/>
           </a:p>
@@ -775,7 +775,7 @@
           <a:p>
             <a:fld id="{CA855E1B-8830-B64E-B102-DB2BBD0D9567}" type="datetimeFigureOut">
               <a:rPr lang="sv-SE" smtClean="0"/>
-              <a:t>2020-07-24</a:t>
+              <a:t>2020-07-25</a:t>
             </a:fld>
             <a:endParaRPr lang="sv-SE"/>
           </a:p>
@@ -1019,7 +1019,7 @@
           <a:p>
             <a:fld id="{CA855E1B-8830-B64E-B102-DB2BBD0D9567}" type="datetimeFigureOut">
               <a:rPr lang="sv-SE" smtClean="0"/>
-              <a:t>2020-07-24</a:t>
+              <a:t>2020-07-25</a:t>
             </a:fld>
             <a:endParaRPr lang="sv-SE"/>
           </a:p>
@@ -1251,7 +1251,7 @@
           <a:p>
             <a:fld id="{CA855E1B-8830-B64E-B102-DB2BBD0D9567}" type="datetimeFigureOut">
               <a:rPr lang="sv-SE" smtClean="0"/>
-              <a:t>2020-07-24</a:t>
+              <a:t>2020-07-25</a:t>
             </a:fld>
             <a:endParaRPr lang="sv-SE"/>
           </a:p>
@@ -1618,7 +1618,7 @@
           <a:p>
             <a:fld id="{CA855E1B-8830-B64E-B102-DB2BBD0D9567}" type="datetimeFigureOut">
               <a:rPr lang="sv-SE" smtClean="0"/>
-              <a:t>2020-07-24</a:t>
+              <a:t>2020-07-25</a:t>
             </a:fld>
             <a:endParaRPr lang="sv-SE"/>
           </a:p>
@@ -1736,7 +1736,7 @@
           <a:p>
             <a:fld id="{CA855E1B-8830-B64E-B102-DB2BBD0D9567}" type="datetimeFigureOut">
               <a:rPr lang="sv-SE" smtClean="0"/>
-              <a:t>2020-07-24</a:t>
+              <a:t>2020-07-25</a:t>
             </a:fld>
             <a:endParaRPr lang="sv-SE"/>
           </a:p>
@@ -1831,7 +1831,7 @@
           <a:p>
             <a:fld id="{CA855E1B-8830-B64E-B102-DB2BBD0D9567}" type="datetimeFigureOut">
               <a:rPr lang="sv-SE" smtClean="0"/>
-              <a:t>2020-07-24</a:t>
+              <a:t>2020-07-25</a:t>
             </a:fld>
             <a:endParaRPr lang="sv-SE"/>
           </a:p>
@@ -2108,7 +2108,7 @@
           <a:p>
             <a:fld id="{CA855E1B-8830-B64E-B102-DB2BBD0D9567}" type="datetimeFigureOut">
               <a:rPr lang="sv-SE" smtClean="0"/>
-              <a:t>2020-07-24</a:t>
+              <a:t>2020-07-25</a:t>
             </a:fld>
             <a:endParaRPr lang="sv-SE"/>
           </a:p>
@@ -2365,7 +2365,7 @@
           <a:p>
             <a:fld id="{CA855E1B-8830-B64E-B102-DB2BBD0D9567}" type="datetimeFigureOut">
               <a:rPr lang="sv-SE" smtClean="0"/>
-              <a:t>2020-07-24</a:t>
+              <a:t>2020-07-25</a:t>
             </a:fld>
             <a:endParaRPr lang="sv-SE"/>
           </a:p>
@@ -2578,7 +2578,7 @@
           <a:p>
             <a:fld id="{CA855E1B-8830-B64E-B102-DB2BBD0D9567}" type="datetimeFigureOut">
               <a:rPr lang="sv-SE" smtClean="0"/>
-              <a:t>2020-07-24</a:t>
+              <a:t>2020-07-25</a:t>
             </a:fld>
             <a:endParaRPr lang="sv-SE"/>
           </a:p>
@@ -6071,8 +6071,8 @@
         </p:nvSpPr>
         <p:spPr>
           <a:xfrm>
-            <a:off x="169897" y="5868103"/>
-            <a:ext cx="3623536" cy="3693319"/>
+            <a:off x="169897" y="5748912"/>
+            <a:ext cx="3274288" cy="3416320"/>
           </a:xfrm>
           <a:prstGeom prst="rect">
             <a:avLst/>
@@ -6091,13 +6091,13 @@
           <a:lstStyle/>
           <a:p>
             <a:r>
-              <a:rPr lang="en-US" sz="900" b="1" noProof="1"/>
+              <a:rPr lang="en-US" sz="800" b="1" noProof="1"/>
               <a:t>GUI updated through these mechanisms:</a:t>
             </a:r>
             <a:br>
-              <a:rPr lang="en-US" sz="900" b="1" noProof="1"/>
+              <a:rPr lang="en-US" sz="800" b="1" noProof="1"/>
             </a:br>
-            <a:endParaRPr lang="en-US" sz="900" b="1" noProof="1"/>
+            <a:endParaRPr lang="en-US" sz="800" b="1" noProof="1"/>
           </a:p>
           <a:p>
             <a:pPr marL="171450" indent="-171450">
@@ -6105,7 +6105,7 @@
               <a:buChar char="o"/>
             </a:pPr>
             <a:r>
-              <a:rPr lang="en-US" sz="900" noProof="1">
+              <a:rPr lang="en-US" sz="800" noProof="1">
                 <a:solidFill>
                   <a:schemeClr val="accent1"/>
                 </a:solidFill>
@@ -6113,34 +6113,39 @@
               <a:t>_update </a:t>
             </a:r>
             <a:r>
-              <a:rPr lang="en-US" sz="900" noProof="1"/>
-              <a:t>loop looks for changes</a:t>
+              <a:rPr lang="en-US" sz="800" noProof="1"/>
+              <a:t>loop (displays output depending on mode; see </a:t>
+            </a:r>
+            <a:r>
+              <a:rPr lang="en-US" sz="800" noProof="1">
+                <a:solidFill>
+                  <a:schemeClr val="accent1"/>
+                </a:solidFill>
+              </a:rPr>
+              <a:t>_setMode</a:t>
+            </a:r>
+            <a:r>
+              <a:rPr lang="en-US" sz="800" noProof="1"/>
+              <a:t>):</a:t>
             </a:r>
             <a:br>
-              <a:rPr lang="en-US" sz="900" noProof="1"/>
+              <a:rPr lang="en-US" sz="800" noProof="1"/>
             </a:br>
             <a:r>
-              <a:rPr lang="en-US" sz="900" noProof="1"/>
-              <a:t>sets repo, branch </a:t>
+              <a:rPr lang="en-US" sz="800" noProof="1"/>
+              <a:t>sets titlebar, statusbar, icon visibility</a:t>
             </a:r>
             <a:br>
-              <a:rPr lang="en-US" sz="900" noProof="1"/>
+              <a:rPr lang="en-US" sz="800" noProof="1"/>
             </a:br>
             <a:r>
-              <a:rPr lang="en-US" sz="900" noProof="1"/>
-              <a:t>sets button visibility depending on mode</a:t>
+              <a:rPr lang="en-US" sz="800" noProof="1"/>
+              <a:t>saves settings when leaving settings mode</a:t>
             </a:r>
             <a:br>
-              <a:rPr lang="en-US" sz="900" noProof="1"/>
+              <a:rPr lang="en-US" sz="800" noProof="1"/>
             </a:br>
-            <a:r>
-              <a:rPr lang="en-US" sz="900" noProof="1"/>
-              <a:t>saves settings when leaving settings mode</a:t>
-            </a:r>
-            <a:br>
-              <a:rPr lang="en-US" sz="900" noProof="1"/>
-            </a:br>
-            <a:endParaRPr lang="en-US" sz="900" noProof="1"/>
+            <a:endParaRPr lang="en-US" sz="800" noProof="1"/>
           </a:p>
           <a:p>
             <a:pPr marL="171450" indent="-171450">
@@ -6148,7 +6153,7 @@
               <a:buChar char="o"/>
             </a:pPr>
             <a:r>
-              <a:rPr lang="en-US" sz="900" noProof="1">
+              <a:rPr lang="en-US" sz="800" noProof="1">
                 <a:solidFill>
                   <a:schemeClr val="accent1"/>
                 </a:solidFill>
@@ -6156,13 +6161,13 @@
               <a:t>fetchtimer</a:t>
             </a:r>
             <a:r>
-              <a:rPr lang="en-US" sz="900" noProof="1"/>
+              <a:rPr lang="en-US" sz="800" noProof="1"/>
               <a:t> - looks for remote changes</a:t>
             </a:r>
             <a:br>
-              <a:rPr lang="en-US" sz="900" noProof="1"/>
+              <a:rPr lang="en-US" sz="800" noProof="1"/>
             </a:br>
-            <a:endParaRPr lang="en-US" sz="900" noProof="1"/>
+            <a:endParaRPr lang="en-US" sz="800" noProof="1"/>
           </a:p>
           <a:p>
             <a:pPr marL="171450" indent="-171450">
@@ -6170,7 +6175,7 @@
               <a:buChar char="o"/>
             </a:pPr>
             <a:r>
-              <a:rPr lang="en-US" sz="900" noProof="1">
+              <a:rPr lang="en-US" sz="800" noProof="1">
                 <a:solidFill>
                   <a:schemeClr val="accent1"/>
                 </a:solidFill>
@@ -6178,20 +6183,20 @@
               <a:t>_callback </a:t>
             </a:r>
             <a:r>
-              <a:rPr lang="en-US" sz="900" noProof="1"/>
+              <a:rPr lang="en-US" sz="800" noProof="1"/>
               <a:t>- some callbacks update directly :</a:t>
             </a:r>
             <a:br>
-              <a:rPr lang="en-US" sz="900" noProof="1"/>
+              <a:rPr lang="en-US" sz="800" noProof="1"/>
             </a:br>
             <a:r>
-              <a:rPr lang="en-US" sz="900" noProof="1"/>
+              <a:rPr lang="en-US" sz="800" noProof="1"/>
               <a:t>(repo, branch, arrows)</a:t>
             </a:r>
             <a:br>
-              <a:rPr lang="en-US" sz="900" noProof="1"/>
+              <a:rPr lang="en-US" sz="800" noProof="1"/>
             </a:br>
-            <a:endParaRPr lang="en-US" sz="900" noProof="1"/>
+            <a:endParaRPr lang="en-US" sz="800" noProof="1"/>
           </a:p>
           <a:p>
             <a:pPr marL="171450" indent="-171450">
@@ -6199,16 +6204,37 @@
               <a:buChar char="o"/>
             </a:pPr>
             <a:r>
-              <a:rPr lang="en-US" sz="900" noProof="1">
+              <a:rPr lang="en-US" sz="800" noProof="1">
                 <a:solidFill>
                   <a:schemeClr val="accent1"/>
                 </a:solidFill>
               </a:rPr>
-              <a:t>_setMode </a:t>
-            </a:r>
-            <a:r>
-              <a:rPr lang="en-US" sz="900" noProof="1"/>
-              <a:t>updates mode-dependent GUI. Modes :</a:t>
+              <a:t>_setMode</a:t>
+            </a:r>
+            <a:r>
+              <a:rPr lang="en-US" sz="800" noProof="1"/>
+              <a:t> (prepares for program input; mode-dependent):</a:t>
+            </a:r>
+            <a:br>
+              <a:rPr lang="en-US" sz="800" noProof="1"/>
+            </a:br>
+            <a:r>
+              <a:rPr lang="en-US" sz="800" noProof="1"/>
+              <a:t>determines mode (if UNKNOWN)</a:t>
+            </a:r>
+            <a:br>
+              <a:rPr lang="en-US" sz="800" noProof="1"/>
+            </a:br>
+            <a:r>
+              <a:rPr lang="en-US" sz="800" noProof="1"/>
+              <a:t>sets button: Store/Checkout, enabled/disabled</a:t>
+            </a:r>
+            <a:br>
+              <a:rPr lang="en-US" sz="800" noProof="1"/>
+            </a:br>
+            <a:r>
+              <a:rPr lang="en-US" sz="800" noProof="1"/>
+              <a:t>sets message : placeholder-text/writeable,</a:t>
             </a:r>
           </a:p>
           <a:p>
@@ -6217,8 +6243,8 @@
               <a:buChar char="•"/>
             </a:pPr>
             <a:r>
-              <a:rPr lang="en-US" sz="900" noProof="1"/>
-              <a:t>DEFAULT (no repos)</a:t>
+              <a:rPr lang="en-US" sz="800" noProof="1"/>
+              <a:t>UNKNOWN (Identifies and sets mode)</a:t>
             </a:r>
           </a:p>
           <a:p>
@@ -6227,8 +6253,8 @@
               <a:buChar char="•"/>
             </a:pPr>
             <a:r>
-              <a:rPr lang="en-US" sz="900" noProof="1"/>
-              <a:t>NO_FILES_TO_COMMIT (no changes)</a:t>
+              <a:rPr lang="en-US" sz="800" noProof="1"/>
+              <a:t>DEFAULT (no repos)</a:t>
             </a:r>
           </a:p>
           <a:p>
@@ -6237,8 +6263,8 @@
               <a:buChar char="•"/>
             </a:pPr>
             <a:r>
-              <a:rPr lang="en-US" sz="900" noProof="1"/>
-              <a:t>CHANGED_FILES (changes)</a:t>
+              <a:rPr lang="en-US" sz="800" noProof="1"/>
+              <a:t>NO_FILES_TO_COMMIT (no changes)</a:t>
             </a:r>
           </a:p>
           <a:p>
@@ -6247,8 +6273,8 @@
               <a:buChar char="•"/>
             </a:pPr>
             <a:r>
-              <a:rPr lang="en-US" sz="900" noProof="1"/>
-              <a:t>CHANGED_FILES_TEXT_ENTERED (_callback/messageKeyUpEvent)</a:t>
+              <a:rPr lang="en-US" sz="800" noProof="1"/>
+              <a:t>CHANGED_FILES (changes)</a:t>
             </a:r>
           </a:p>
           <a:p>
@@ -6257,8 +6283,8 @@
               <a:buChar char="•"/>
             </a:pPr>
             <a:r>
-              <a:rPr lang="en-US" sz="900" noProof="1"/>
-              <a:t>SETTINGS (_callback/showSettings)</a:t>
+              <a:rPr lang="en-US" sz="800" noProof="1"/>
+              <a:t>CHANGED_FILES_TEXT_ENTERED (_callback/messageKeyUpEvent)</a:t>
             </a:r>
           </a:p>
           <a:p>
@@ -6267,8 +6293,8 @@
               <a:buChar char="•"/>
             </a:pPr>
             <a:r>
-              <a:rPr lang="en-US" sz="900" noProof="1"/>
-              <a:t>HISTORY (history browsing)</a:t>
+              <a:rPr lang="en-US" sz="800" noProof="1"/>
+              <a:t>SETTINGS (_callback/showSettings)</a:t>
             </a:r>
           </a:p>
           <a:p>
@@ -6277,8 +6303,8 @@
               <a:buChar char="•"/>
             </a:pPr>
             <a:r>
-              <a:rPr lang="en-US" sz="900" noProof="1"/>
-              <a:t>SETTINGS (settings window)</a:t>
+              <a:rPr lang="en-US" sz="800" noProof="1"/>
+              <a:t>HISTORY (history browsing)</a:t>
             </a:r>
           </a:p>
           <a:p>
@@ -6287,39 +6313,39 @@
               <a:buChar char="•"/>
             </a:pPr>
             <a:r>
-              <a:rPr lang="en-US" sz="900" noProof="1"/>
-              <a:t>UNKNOWN (Identifies and sets mode). </a:t>
+              <a:rPr lang="en-US" sz="800" noProof="1"/>
+              <a:t>SETTINGS (settings window)</a:t>
+            </a:r>
+          </a:p>
+          <a:p>
+            <a:pPr marL="152550" lvl="1"/>
+            <a:r>
+              <a:rPr lang="en-US" sz="800" u="sng" noProof="1"/>
+              <a:t>Called by </a:t>
+            </a:r>
+            <a:r>
+              <a:rPr lang="en-US" sz="800" noProof="1"/>
+              <a:t>: </a:t>
             </a:r>
             <a:br>
-              <a:rPr lang="en-US" sz="900" noProof="1"/>
+              <a:rPr lang="en-US" sz="800" noProof="1"/>
             </a:br>
             <a:r>
-              <a:rPr lang="en-US" sz="900" u="sng" noProof="1"/>
-              <a:t>Called by </a:t>
-            </a:r>
-            <a:r>
-              <a:rPr lang="en-US" sz="900" noProof="1"/>
-              <a:t>: </a:t>
+              <a:rPr lang="en-US" sz="800" noProof="1"/>
+              <a:t>gitAddCommitAndPush, gitPull, gitMerge, window.onload</a:t>
             </a:r>
             <a:br>
-              <a:rPr lang="en-US" sz="900" noProof="1"/>
+              <a:rPr lang="en-US" sz="800" noProof="1"/>
             </a:br>
             <a:r>
-              <a:rPr lang="en-US" sz="900" noProof="1"/>
-              <a:t>gitAddCommitAndPush, gitPull, gitMerge, window.onload</a:t>
+              <a:rPr lang="en-US" sz="800" noProof="1"/>
+              <a:t>_callback : repoClicked, branchClicked, upArrowClicked</a:t>
             </a:r>
             <a:br>
-              <a:rPr lang="en-US" sz="900" noProof="1"/>
+              <a:rPr lang="en-US" sz="800" noProof="1"/>
             </a:br>
             <a:r>
-              <a:rPr lang="en-US" sz="900" noProof="1"/>
-              <a:t>_callback : repoClicked, branchClicked, upArrowClicked</a:t>
-            </a:r>
-            <a:br>
-              <a:rPr lang="en-US" sz="900" noProof="1"/>
-            </a:br>
-            <a:r>
-              <a:rPr lang="en-US" sz="900" noProof="1"/>
+              <a:rPr lang="en-US" sz="800" noProof="1"/>
               <a:t>_update (when caught error)</a:t>
             </a:r>
           </a:p>
@@ -6339,8 +6365,8 @@
         </p:nvSpPr>
         <p:spPr>
           <a:xfrm>
-            <a:off x="161154" y="3637490"/>
-            <a:ext cx="3623537" cy="2169825"/>
+            <a:off x="169898" y="3556301"/>
+            <a:ext cx="3274288" cy="1938992"/>
           </a:xfrm>
           <a:prstGeom prst="rect">
             <a:avLst/>
@@ -6361,12 +6387,12 @@
           <a:lstStyle/>
           <a:p>
             <a:r>
-              <a:rPr lang="en-US" sz="900" b="1" noProof="1"/>
+              <a:rPr lang="en-US" sz="800" b="1" noProof="1"/>
               <a:t>Global storage</a:t>
             </a:r>
           </a:p>
           <a:p>
-            <a:endParaRPr lang="en-US" sz="900" noProof="1"/>
+            <a:endParaRPr lang="en-US" sz="800" noProof="1"/>
           </a:p>
           <a:p>
             <a:pPr marL="171450" indent="-171450">
@@ -6374,7 +6400,7 @@
               <a:buChar char="o"/>
             </a:pPr>
             <a:r>
-              <a:rPr lang="en-US" sz="900" noProof="1">
+              <a:rPr lang="en-US" sz="800" noProof="1">
                 <a:solidFill>
                   <a:schemeClr val="accent1"/>
                 </a:solidFill>
@@ -6382,7 +6408,7 @@
               <a:t>state</a:t>
             </a:r>
             <a:r>
-              <a:rPr lang="en-US" sz="900" noProof="1"/>
+              <a:rPr lang="en-US" sz="800" noProof="1"/>
               <a:t> (same as. saved settings) :</a:t>
             </a:r>
           </a:p>
@@ -6392,7 +6418,7 @@
               <a:buChar char="•"/>
             </a:pPr>
             <a:r>
-              <a:rPr lang="en-US" sz="900" noProof="1"/>
+              <a:rPr lang="en-US" sz="800" noProof="1"/>
               <a:t>.repos = array of repo info</a:t>
             </a:r>
           </a:p>
@@ -6402,7 +6428,7 @@
               <a:buChar char="•"/>
             </a:pPr>
             <a:r>
-              <a:rPr lang="en-US" sz="900" noProof="1"/>
+              <a:rPr lang="en-US" sz="800" noProof="1"/>
               <a:t>.repoNumber  = current repo in  state.repos</a:t>
             </a:r>
           </a:p>
@@ -6411,7 +6437,7 @@
               <a:buFont typeface="Arial" panose="020B0604020202020204" pitchFamily="34" charset="0"/>
               <a:buChar char="•"/>
             </a:pPr>
-            <a:endParaRPr lang="en-US" sz="900" noProof="1"/>
+            <a:endParaRPr lang="en-US" sz="800" noProof="1"/>
           </a:p>
           <a:p>
             <a:pPr marL="171450" indent="-171450">
@@ -6419,7 +6445,7 @@
               <a:buChar char="o"/>
             </a:pPr>
             <a:r>
-              <a:rPr lang="en-US" sz="900" noProof="1">
+              <a:rPr lang="en-US" sz="800" noProof="1">
                 <a:solidFill>
                   <a:schemeClr val="accent1"/>
                 </a:solidFill>
@@ -6427,7 +6453,7 @@
               <a:t>localState </a:t>
             </a:r>
             <a:r>
-              <a:rPr lang="en-US" sz="900" noProof="1"/>
+              <a:rPr lang="en-US" sz="800" noProof="1"/>
               <a:t>(transient info) :</a:t>
             </a:r>
           </a:p>
@@ -6437,7 +6463,7 @@
               <a:buChar char="•"/>
             </a:pPr>
             <a:r>
-              <a:rPr lang="en-US" sz="900" noProof="1"/>
+              <a:rPr lang="en-US" sz="800" noProof="1"/>
               <a:t>.branchNumber</a:t>
             </a:r>
           </a:p>
@@ -6447,7 +6473,7 @@
               <a:buChar char="•"/>
             </a:pPr>
             <a:r>
-              <a:rPr lang="en-US" sz="900" noProof="1"/>
+              <a:rPr lang="en-US" sz="800" noProof="1"/>
               <a:t>.mode (storage for _setMode(mode) )</a:t>
             </a:r>
           </a:p>
@@ -6457,7 +6483,7 @@
               <a:buChar char="•"/>
             </a:pPr>
             <a:r>
-              <a:rPr lang="en-US" sz="900" noProof="1"/>
+              <a:rPr lang="en-US" sz="800" noProof="1"/>
               <a:t>.settings (true if settings window open)</a:t>
             </a:r>
           </a:p>
@@ -6467,7 +6493,7 @@
               <a:buChar char="•"/>
             </a:pPr>
             <a:r>
-              <a:rPr lang="en-US" sz="900" noProof="1"/>
+              <a:rPr lang="en-US" sz="800" noProof="1"/>
               <a:t>.unstaged (stores the files de-selected from staging in file-list)</a:t>
             </a:r>
           </a:p>
@@ -6477,7 +6503,7 @@
               <a:buChar char="•"/>
             </a:pPr>
             <a:r>
-              <a:rPr lang="en-US" sz="900" noProof="1"/>
+              <a:rPr lang="en-US" sz="800" noProof="1"/>
               <a:t>.historyNumber (-1 if not browsing history)</a:t>
             </a:r>
           </a:p>
@@ -6487,7 +6513,7 @@
               <a:buChar char="•"/>
             </a:pPr>
             <a:r>
-              <a:rPr lang="en-US" sz="900" noProof="1"/>
+              <a:rPr lang="en-US" sz="800" noProof="1"/>
               <a:t>.historyHash (hash of commit)</a:t>
             </a:r>
           </a:p>
@@ -6497,7 +6523,7 @@
               <a:buChar char="•"/>
             </a:pPr>
             <a:r>
-              <a:rPr lang="en-US" sz="900" noProof="1"/>
+              <a:rPr lang="en-US" sz="800" noProof="1"/>
               <a:t>.historyString (descriptive text for messsage window)</a:t>
             </a:r>
           </a:p>
@@ -6507,7 +6533,7 @@
               <a:buChar char="•"/>
             </a:pPr>
             <a:r>
-              <a:rPr lang="en-US" sz="900" noProof="1"/>
+              <a:rPr lang="en-US" sz="800" noProof="1"/>
               <a:t>.history_status_data (used in listChanged.js – showing file list)</a:t>
             </a:r>
           </a:p>
@@ -6527,8 +6553,8 @@
         </p:nvSpPr>
         <p:spPr>
           <a:xfrm flipH="1">
-            <a:off x="3465170" y="5187589"/>
-            <a:ext cx="112623" cy="571304"/>
+            <a:off x="3145130" y="4965320"/>
+            <a:ext cx="108610" cy="479625"/>
           </a:xfrm>
           <a:prstGeom prst="leftBrace">
             <a:avLst/>
@@ -6571,8 +6597,8 @@
         </p:nvSpPr>
         <p:spPr>
           <a:xfrm rot="5400000">
-            <a:off x="3438800" y="5369464"/>
-            <a:ext cx="529972" cy="230832"/>
+            <a:off x="3071477" y="5097410"/>
+            <a:ext cx="529972" cy="215444"/>
           </a:xfrm>
           <a:prstGeom prst="rect">
             <a:avLst/>
@@ -6586,7 +6612,7 @@
           <a:lstStyle/>
           <a:p>
             <a:r>
-              <a:rPr lang="en-US" sz="900" noProof="1"/>
+              <a:rPr lang="en-US" sz="800" noProof="1"/>
               <a:t>history</a:t>
             </a:r>
           </a:p>

</xml_diff>

<commit_message>
Branch button in main window
TODO : hide it when branching can't be done
</commit_message>
<xml_diff>
--- a/docs/Tech-overview.pptx
+++ b/docs/Tech-overview.pptx
@@ -255,7 +255,7 @@
           <a:p>
             <a:fld id="{CA855E1B-8830-B64E-B102-DB2BBD0D9567}" type="datetimeFigureOut">
               <a:rPr lang="sv-SE" smtClean="0"/>
-              <a:t>2020-07-25</a:t>
+              <a:t>2020-07-28</a:t>
             </a:fld>
             <a:endParaRPr lang="sv-SE"/>
           </a:p>
@@ -425,7 +425,7 @@
           <a:p>
             <a:fld id="{CA855E1B-8830-B64E-B102-DB2BBD0D9567}" type="datetimeFigureOut">
               <a:rPr lang="sv-SE" smtClean="0"/>
-              <a:t>2020-07-25</a:t>
+              <a:t>2020-07-28</a:t>
             </a:fld>
             <a:endParaRPr lang="sv-SE"/>
           </a:p>
@@ -605,7 +605,7 @@
           <a:p>
             <a:fld id="{CA855E1B-8830-B64E-B102-DB2BBD0D9567}" type="datetimeFigureOut">
               <a:rPr lang="sv-SE" smtClean="0"/>
-              <a:t>2020-07-25</a:t>
+              <a:t>2020-07-28</a:t>
             </a:fld>
             <a:endParaRPr lang="sv-SE"/>
           </a:p>
@@ -775,7 +775,7 @@
           <a:p>
             <a:fld id="{CA855E1B-8830-B64E-B102-DB2BBD0D9567}" type="datetimeFigureOut">
               <a:rPr lang="sv-SE" smtClean="0"/>
-              <a:t>2020-07-25</a:t>
+              <a:t>2020-07-28</a:t>
             </a:fld>
             <a:endParaRPr lang="sv-SE"/>
           </a:p>
@@ -1019,7 +1019,7 @@
           <a:p>
             <a:fld id="{CA855E1B-8830-B64E-B102-DB2BBD0D9567}" type="datetimeFigureOut">
               <a:rPr lang="sv-SE" smtClean="0"/>
-              <a:t>2020-07-25</a:t>
+              <a:t>2020-07-28</a:t>
             </a:fld>
             <a:endParaRPr lang="sv-SE"/>
           </a:p>
@@ -1251,7 +1251,7 @@
           <a:p>
             <a:fld id="{CA855E1B-8830-B64E-B102-DB2BBD0D9567}" type="datetimeFigureOut">
               <a:rPr lang="sv-SE" smtClean="0"/>
-              <a:t>2020-07-25</a:t>
+              <a:t>2020-07-28</a:t>
             </a:fld>
             <a:endParaRPr lang="sv-SE"/>
           </a:p>
@@ -1618,7 +1618,7 @@
           <a:p>
             <a:fld id="{CA855E1B-8830-B64E-B102-DB2BBD0D9567}" type="datetimeFigureOut">
               <a:rPr lang="sv-SE" smtClean="0"/>
-              <a:t>2020-07-25</a:t>
+              <a:t>2020-07-28</a:t>
             </a:fld>
             <a:endParaRPr lang="sv-SE"/>
           </a:p>
@@ -1736,7 +1736,7 @@
           <a:p>
             <a:fld id="{CA855E1B-8830-B64E-B102-DB2BBD0D9567}" type="datetimeFigureOut">
               <a:rPr lang="sv-SE" smtClean="0"/>
-              <a:t>2020-07-25</a:t>
+              <a:t>2020-07-28</a:t>
             </a:fld>
             <a:endParaRPr lang="sv-SE"/>
           </a:p>
@@ -1831,7 +1831,7 @@
           <a:p>
             <a:fld id="{CA855E1B-8830-B64E-B102-DB2BBD0D9567}" type="datetimeFigureOut">
               <a:rPr lang="sv-SE" smtClean="0"/>
-              <a:t>2020-07-25</a:t>
+              <a:t>2020-07-28</a:t>
             </a:fld>
             <a:endParaRPr lang="sv-SE"/>
           </a:p>
@@ -2108,7 +2108,7 @@
           <a:p>
             <a:fld id="{CA855E1B-8830-B64E-B102-DB2BBD0D9567}" type="datetimeFigureOut">
               <a:rPr lang="sv-SE" smtClean="0"/>
-              <a:t>2020-07-25</a:t>
+              <a:t>2020-07-28</a:t>
             </a:fld>
             <a:endParaRPr lang="sv-SE"/>
           </a:p>
@@ -2365,7 +2365,7 @@
           <a:p>
             <a:fld id="{CA855E1B-8830-B64E-B102-DB2BBD0D9567}" type="datetimeFigureOut">
               <a:rPr lang="sv-SE" smtClean="0"/>
-              <a:t>2020-07-25</a:t>
+              <a:t>2020-07-28</a:t>
             </a:fld>
             <a:endParaRPr lang="sv-SE"/>
           </a:p>
@@ -2578,7 +2578,7 @@
           <a:p>
             <a:fld id="{CA855E1B-8830-B64E-B102-DB2BBD0D9567}" type="datetimeFigureOut">
               <a:rPr lang="sv-SE" smtClean="0"/>
-              <a:t>2020-07-25</a:t>
+              <a:t>2020-07-28</a:t>
             </a:fld>
             <a:endParaRPr lang="sv-SE"/>
           </a:p>
@@ -6765,6 +6765,159 @@
           </a:p>
         </p:txBody>
       </p:sp>
+      <p:sp>
+        <p:nvSpPr>
+          <p:cNvPr id="73" name="Rektangel 72">
+            <a:extLst>
+              <a:ext uri="{FF2B5EF4-FFF2-40B4-BE49-F238E27FC236}">
+                <a16:creationId xmlns:a16="http://schemas.microsoft.com/office/drawing/2014/main" id="{7E1FCB8D-6087-5645-AC64-612B773440DC}"/>
+              </a:ext>
+            </a:extLst>
+          </p:cNvPr>
+          <p:cNvSpPr/>
+          <p:nvPr/>
+        </p:nvSpPr>
+        <p:spPr>
+          <a:xfrm>
+            <a:off x="3593721" y="3564239"/>
+            <a:ext cx="2674464" cy="1200329"/>
+          </a:xfrm>
+          <a:prstGeom prst="rect">
+            <a:avLst/>
+          </a:prstGeom>
+          <a:solidFill>
+            <a:schemeClr val="bg1"/>
+          </a:solidFill>
+          <a:ln>
+            <a:solidFill>
+              <a:schemeClr val="accent1"/>
+            </a:solidFill>
+          </a:ln>
+        </p:spPr>
+        <p:txBody>
+          <a:bodyPr wrap="square">
+            <a:spAutoFit/>
+          </a:bodyPr>
+          <a:lstStyle/>
+          <a:p>
+            <a:r>
+              <a:rPr lang="en-US" sz="800" b="1" noProof="1"/>
+              <a:t>HTML dialogs</a:t>
+            </a:r>
+          </a:p>
+          <a:p>
+            <a:endParaRPr lang="en-US" sz="800" noProof="1"/>
+          </a:p>
+          <a:p>
+            <a:pPr marL="171450" indent="-171450">
+              <a:buFont typeface="Courier New" panose="02070309020205020404" pitchFamily="49" charset="0"/>
+              <a:buChar char="o"/>
+            </a:pPr>
+            <a:r>
+              <a:rPr lang="en-US" sz="800" noProof="1">
+                <a:solidFill>
+                  <a:schemeClr val="accent1"/>
+                </a:solidFill>
+              </a:rPr>
+              <a:t>color : </a:t>
+            </a:r>
+            <a:r>
+              <a:rPr lang="en-US" sz="800" noProof="1">
+                <a:solidFill>
+                  <a:srgbClr val="FF0000"/>
+                </a:solidFill>
+              </a:rPr>
+              <a:t>red</a:t>
+            </a:r>
+            <a:r>
+              <a:rPr lang="en-US" sz="800" noProof="1">
+                <a:solidFill>
+                  <a:schemeClr val="accent1"/>
+                </a:solidFill>
+              </a:rPr>
+              <a:t> error,</a:t>
+            </a:r>
+            <a:r>
+              <a:rPr lang="en-US" sz="800" noProof="1">
+                <a:solidFill>
+                  <a:schemeClr val="accent4"/>
+                </a:solidFill>
+              </a:rPr>
+              <a:t> yellow </a:t>
+            </a:r>
+            <a:r>
+              <a:rPr lang="en-US" sz="800" noProof="1">
+                <a:solidFill>
+                  <a:schemeClr val="accent1"/>
+                </a:solidFill>
+              </a:rPr>
+              <a:t>normal</a:t>
+            </a:r>
+          </a:p>
+          <a:p>
+            <a:pPr marL="171450" indent="-171450">
+              <a:buFont typeface="Courier New" panose="02070309020205020404" pitchFamily="49" charset="0"/>
+              <a:buChar char="o"/>
+            </a:pPr>
+            <a:r>
+              <a:rPr lang="en-US" sz="800" noProof="1">
+                <a:solidFill>
+                  <a:schemeClr val="accent1"/>
+                </a:solidFill>
+              </a:rPr>
+              <a:t>Use :</a:t>
+            </a:r>
+            <a:endParaRPr lang="en-US" sz="800" noProof="1"/>
+          </a:p>
+          <a:p>
+            <a:pPr marL="324000" lvl="1" indent="-171450">
+              <a:buFont typeface="Arial" panose="020B0604020202020204" pitchFamily="34" charset="0"/>
+              <a:buChar char="•"/>
+            </a:pPr>
+            <a:r>
+              <a:rPr lang="en-US" sz="800" noProof="1"/>
+              <a:t>show : document.getElementById(id).showModal();</a:t>
+            </a:r>
+          </a:p>
+          <a:p>
+            <a:pPr marL="324000" lvl="1" indent="-171450">
+              <a:buFont typeface="Arial" panose="020B0604020202020204" pitchFamily="34" charset="0"/>
+              <a:buChar char="•"/>
+            </a:pPr>
+            <a:r>
+              <a:rPr lang="en-US" sz="800" noProof="1"/>
+              <a:t>[Cancel] button just closes</a:t>
+            </a:r>
+          </a:p>
+          <a:p>
+            <a:pPr marL="324000" lvl="1" indent="-171450">
+              <a:buFont typeface="Arial" panose="020B0604020202020204" pitchFamily="34" charset="0"/>
+              <a:buChar char="•"/>
+            </a:pPr>
+            <a:r>
+              <a:rPr lang="en-US" sz="800" noProof="1"/>
+              <a:t>[Other buttons]  _callback(‘mycallbackname’,event) </a:t>
+            </a:r>
+            <a:br>
+              <a:rPr lang="en-US" sz="800" noProof="1"/>
+            </a:br>
+            <a:r>
+              <a:rPr lang="en-US" sz="800" noProof="1"/>
+              <a:t>event can be something useful</a:t>
+            </a:r>
+          </a:p>
+          <a:p>
+            <a:pPr marL="324000" lvl="1" indent="-171450">
+              <a:buFont typeface="Arial" panose="020B0604020202020204" pitchFamily="34" charset="0"/>
+              <a:buChar char="•"/>
+            </a:pPr>
+            <a:r>
+              <a:rPr lang="en-US" sz="800" noProof="1"/>
+              <a:t>_callback switch-statement : case ‘mycallbackname’</a:t>
+            </a:r>
+          </a:p>
+        </p:txBody>
+      </p:sp>
     </p:spTree>
     <p:extLst>
       <p:ext uri="{BB962C8B-B14F-4D97-AF65-F5344CB8AC3E}">

</xml_diff>

<commit_message>
Explored drop-down selection at notes footer
</commit_message>
<xml_diff>
--- a/docs/Tech-overview.pptx
+++ b/docs/Tech-overview.pptx
@@ -255,7 +255,7 @@
           <a:p>
             <a:fld id="{CA855E1B-8830-B64E-B102-DB2BBD0D9567}" type="datetimeFigureOut">
               <a:rPr lang="sv-SE" smtClean="0"/>
-              <a:t>2020-07-28</a:t>
+              <a:t>2020-08-13</a:t>
             </a:fld>
             <a:endParaRPr lang="sv-SE"/>
           </a:p>
@@ -425,7 +425,7 @@
           <a:p>
             <a:fld id="{CA855E1B-8830-B64E-B102-DB2BBD0D9567}" type="datetimeFigureOut">
               <a:rPr lang="sv-SE" smtClean="0"/>
-              <a:t>2020-07-28</a:t>
+              <a:t>2020-08-13</a:t>
             </a:fld>
             <a:endParaRPr lang="sv-SE"/>
           </a:p>
@@ -605,7 +605,7 @@
           <a:p>
             <a:fld id="{CA855E1B-8830-B64E-B102-DB2BBD0D9567}" type="datetimeFigureOut">
               <a:rPr lang="sv-SE" smtClean="0"/>
-              <a:t>2020-07-28</a:t>
+              <a:t>2020-08-13</a:t>
             </a:fld>
             <a:endParaRPr lang="sv-SE"/>
           </a:p>
@@ -775,7 +775,7 @@
           <a:p>
             <a:fld id="{CA855E1B-8830-B64E-B102-DB2BBD0D9567}" type="datetimeFigureOut">
               <a:rPr lang="sv-SE" smtClean="0"/>
-              <a:t>2020-07-28</a:t>
+              <a:t>2020-08-13</a:t>
             </a:fld>
             <a:endParaRPr lang="sv-SE"/>
           </a:p>
@@ -1019,7 +1019,7 @@
           <a:p>
             <a:fld id="{CA855E1B-8830-B64E-B102-DB2BBD0D9567}" type="datetimeFigureOut">
               <a:rPr lang="sv-SE" smtClean="0"/>
-              <a:t>2020-07-28</a:t>
+              <a:t>2020-08-13</a:t>
             </a:fld>
             <a:endParaRPr lang="sv-SE"/>
           </a:p>
@@ -1251,7 +1251,7 @@
           <a:p>
             <a:fld id="{CA855E1B-8830-B64E-B102-DB2BBD0D9567}" type="datetimeFigureOut">
               <a:rPr lang="sv-SE" smtClean="0"/>
-              <a:t>2020-07-28</a:t>
+              <a:t>2020-08-13</a:t>
             </a:fld>
             <a:endParaRPr lang="sv-SE"/>
           </a:p>
@@ -1618,7 +1618,7 @@
           <a:p>
             <a:fld id="{CA855E1B-8830-B64E-B102-DB2BBD0D9567}" type="datetimeFigureOut">
               <a:rPr lang="sv-SE" smtClean="0"/>
-              <a:t>2020-07-28</a:t>
+              <a:t>2020-08-13</a:t>
             </a:fld>
             <a:endParaRPr lang="sv-SE"/>
           </a:p>
@@ -1736,7 +1736,7 @@
           <a:p>
             <a:fld id="{CA855E1B-8830-B64E-B102-DB2BBD0D9567}" type="datetimeFigureOut">
               <a:rPr lang="sv-SE" smtClean="0"/>
-              <a:t>2020-07-28</a:t>
+              <a:t>2020-08-13</a:t>
             </a:fld>
             <a:endParaRPr lang="sv-SE"/>
           </a:p>
@@ -1831,7 +1831,7 @@
           <a:p>
             <a:fld id="{CA855E1B-8830-B64E-B102-DB2BBD0D9567}" type="datetimeFigureOut">
               <a:rPr lang="sv-SE" smtClean="0"/>
-              <a:t>2020-07-28</a:t>
+              <a:t>2020-08-13</a:t>
             </a:fld>
             <a:endParaRPr lang="sv-SE"/>
           </a:p>
@@ -2108,7 +2108,7 @@
           <a:p>
             <a:fld id="{CA855E1B-8830-B64E-B102-DB2BBD0D9567}" type="datetimeFigureOut">
               <a:rPr lang="sv-SE" smtClean="0"/>
-              <a:t>2020-07-28</a:t>
+              <a:t>2020-08-13</a:t>
             </a:fld>
             <a:endParaRPr lang="sv-SE"/>
           </a:p>
@@ -2365,7 +2365,7 @@
           <a:p>
             <a:fld id="{CA855E1B-8830-B64E-B102-DB2BBD0D9567}" type="datetimeFigureOut">
               <a:rPr lang="sv-SE" smtClean="0"/>
-              <a:t>2020-07-28</a:t>
+              <a:t>2020-08-13</a:t>
             </a:fld>
             <a:endParaRPr lang="sv-SE"/>
           </a:p>
@@ -2578,7 +2578,7 @@
           <a:p>
             <a:fld id="{CA855E1B-8830-B64E-B102-DB2BBD0D9567}" type="datetimeFigureOut">
               <a:rPr lang="sv-SE" smtClean="0"/>
-              <a:t>2020-07-28</a:t>
+              <a:t>2020-08-13</a:t>
             </a:fld>
             <a:endParaRPr lang="sv-SE"/>
           </a:p>
@@ -6023,7 +6023,7 @@
         <p:spPr>
           <a:xfrm>
             <a:off x="10042451" y="5418179"/>
-            <a:ext cx="2561920" cy="338554"/>
+            <a:ext cx="2723823" cy="338554"/>
           </a:xfrm>
           <a:prstGeom prst="rect">
             <a:avLst/>
@@ -6042,7 +6042,7 @@
                   <a:srgbClr val="FF0000"/>
                 </a:solidFill>
               </a:rPr>
-              <a:t>NOTE : Does not show staged files.</a:t>
+              <a:t>Unchecked are files that are skipped in next STORE</a:t>
             </a:r>
           </a:p>
           <a:p>
@@ -6052,7 +6052,7 @@
                   <a:srgbClr val="FF0000"/>
                 </a:solidFill>
               </a:rPr>
-              <a:t>Shows what files will not be staged when pressing STORE</a:t>
+              <a:t>NOTE : Different to showing staged files, as other clients do!!</a:t>
             </a:r>
           </a:p>
         </p:txBody>
@@ -6835,7 +6835,23 @@
                   <a:schemeClr val="accent1"/>
                 </a:solidFill>
               </a:rPr>
-              <a:t> error,</a:t>
+              <a:t> </a:t>
+            </a:r>
+            <a:r>
+              <a:rPr lang="en-US" sz="800" noProof="1">
+                <a:solidFill>
+                  <a:srgbClr val="FF0000"/>
+                </a:solidFill>
+              </a:rPr>
+              <a:t>error</a:t>
+            </a:r>
+            <a:r>
+              <a:rPr lang="en-US" sz="800" noProof="1">
+                <a:solidFill>
+                  <a:schemeClr val="accent1"/>
+                </a:solidFill>
+              </a:rPr>
+              <a:t>,</a:t>
             </a:r>
             <a:r>
               <a:rPr lang="en-US" sz="800" noProof="1">
@@ -6843,15 +6859,7 @@
                   <a:schemeClr val="accent4"/>
                 </a:solidFill>
               </a:rPr>
-              <a:t> yellow </a:t>
-            </a:r>
-            <a:r>
-              <a:rPr lang="en-US" sz="800" noProof="1">
-                <a:solidFill>
-                  <a:schemeClr val="accent1"/>
-                </a:solidFill>
-              </a:rPr>
-              <a:t>normal</a:t>
+              <a:t> yellow normal</a:t>
             </a:r>
           </a:p>
           <a:p>

</xml_diff>

<commit_message>
Document pragma-merge integration with Pragma-git
</commit_message>
<xml_diff>
--- a/docs/Tech-overview.pptx
+++ b/docs/Tech-overview.pptx
@@ -6,6 +6,7 @@
   </p:sldMasterIdLst>
   <p:sldIdLst>
     <p:sldId id="256" r:id="rId2"/>
+    <p:sldId id="257" r:id="rId3"/>
   </p:sldIdLst>
   <p:sldSz cx="12801600" cy="9601200" type="A3"/>
   <p:notesSz cx="6858000" cy="9144000"/>
@@ -255,7 +256,7 @@
           <a:p>
             <a:fld id="{CA855E1B-8830-B64E-B102-DB2BBD0D9567}" type="datetimeFigureOut">
               <a:rPr lang="sv-SE" smtClean="0"/>
-              <a:t>2020-08-13</a:t>
+              <a:t>2020-09-17</a:t>
             </a:fld>
             <a:endParaRPr lang="sv-SE"/>
           </a:p>
@@ -425,7 +426,7 @@
           <a:p>
             <a:fld id="{CA855E1B-8830-B64E-B102-DB2BBD0D9567}" type="datetimeFigureOut">
               <a:rPr lang="sv-SE" smtClean="0"/>
-              <a:t>2020-08-13</a:t>
+              <a:t>2020-09-17</a:t>
             </a:fld>
             <a:endParaRPr lang="sv-SE"/>
           </a:p>
@@ -605,7 +606,7 @@
           <a:p>
             <a:fld id="{CA855E1B-8830-B64E-B102-DB2BBD0D9567}" type="datetimeFigureOut">
               <a:rPr lang="sv-SE" smtClean="0"/>
-              <a:t>2020-08-13</a:t>
+              <a:t>2020-09-17</a:t>
             </a:fld>
             <a:endParaRPr lang="sv-SE"/>
           </a:p>
@@ -775,7 +776,7 @@
           <a:p>
             <a:fld id="{CA855E1B-8830-B64E-B102-DB2BBD0D9567}" type="datetimeFigureOut">
               <a:rPr lang="sv-SE" smtClean="0"/>
-              <a:t>2020-08-13</a:t>
+              <a:t>2020-09-17</a:t>
             </a:fld>
             <a:endParaRPr lang="sv-SE"/>
           </a:p>
@@ -1019,7 +1020,7 @@
           <a:p>
             <a:fld id="{CA855E1B-8830-B64E-B102-DB2BBD0D9567}" type="datetimeFigureOut">
               <a:rPr lang="sv-SE" smtClean="0"/>
-              <a:t>2020-08-13</a:t>
+              <a:t>2020-09-17</a:t>
             </a:fld>
             <a:endParaRPr lang="sv-SE"/>
           </a:p>
@@ -1251,7 +1252,7 @@
           <a:p>
             <a:fld id="{CA855E1B-8830-B64E-B102-DB2BBD0D9567}" type="datetimeFigureOut">
               <a:rPr lang="sv-SE" smtClean="0"/>
-              <a:t>2020-08-13</a:t>
+              <a:t>2020-09-17</a:t>
             </a:fld>
             <a:endParaRPr lang="sv-SE"/>
           </a:p>
@@ -1618,7 +1619,7 @@
           <a:p>
             <a:fld id="{CA855E1B-8830-B64E-B102-DB2BBD0D9567}" type="datetimeFigureOut">
               <a:rPr lang="sv-SE" smtClean="0"/>
-              <a:t>2020-08-13</a:t>
+              <a:t>2020-09-17</a:t>
             </a:fld>
             <a:endParaRPr lang="sv-SE"/>
           </a:p>
@@ -1736,7 +1737,7 @@
           <a:p>
             <a:fld id="{CA855E1B-8830-B64E-B102-DB2BBD0D9567}" type="datetimeFigureOut">
               <a:rPr lang="sv-SE" smtClean="0"/>
-              <a:t>2020-08-13</a:t>
+              <a:t>2020-09-17</a:t>
             </a:fld>
             <a:endParaRPr lang="sv-SE"/>
           </a:p>
@@ -1831,7 +1832,7 @@
           <a:p>
             <a:fld id="{CA855E1B-8830-B64E-B102-DB2BBD0D9567}" type="datetimeFigureOut">
               <a:rPr lang="sv-SE" smtClean="0"/>
-              <a:t>2020-08-13</a:t>
+              <a:t>2020-09-17</a:t>
             </a:fld>
             <a:endParaRPr lang="sv-SE"/>
           </a:p>
@@ -2108,7 +2109,7 @@
           <a:p>
             <a:fld id="{CA855E1B-8830-B64E-B102-DB2BBD0D9567}" type="datetimeFigureOut">
               <a:rPr lang="sv-SE" smtClean="0"/>
-              <a:t>2020-08-13</a:t>
+              <a:t>2020-09-17</a:t>
             </a:fld>
             <a:endParaRPr lang="sv-SE"/>
           </a:p>
@@ -2365,7 +2366,7 @@
           <a:p>
             <a:fld id="{CA855E1B-8830-B64E-B102-DB2BBD0D9567}" type="datetimeFigureOut">
               <a:rPr lang="sv-SE" smtClean="0"/>
-              <a:t>2020-08-13</a:t>
+              <a:t>2020-09-17</a:t>
             </a:fld>
             <a:endParaRPr lang="sv-SE"/>
           </a:p>
@@ -2578,7 +2579,7 @@
           <a:p>
             <a:fld id="{CA855E1B-8830-B64E-B102-DB2BBD0D9567}" type="datetimeFigureOut">
               <a:rPr lang="sv-SE" smtClean="0"/>
-              <a:t>2020-08-13</a:t>
+              <a:t>2020-09-17</a:t>
             </a:fld>
             <a:endParaRPr lang="sv-SE"/>
           </a:p>
@@ -6926,10 +6927,565 @@
           </a:p>
         </p:txBody>
       </p:sp>
+      <p:sp>
+        <p:nvSpPr>
+          <p:cNvPr id="81" name="textruta 80">
+            <a:extLst>
+              <a:ext uri="{FF2B5EF4-FFF2-40B4-BE49-F238E27FC236}">
+                <a16:creationId xmlns:a16="http://schemas.microsoft.com/office/drawing/2014/main" id="{9F4AFC71-1FF7-1F4C-91E0-7F8767FB7C09}"/>
+              </a:ext>
+            </a:extLst>
+          </p:cNvPr>
+          <p:cNvSpPr txBox="1"/>
+          <p:nvPr/>
+        </p:nvSpPr>
+        <p:spPr>
+          <a:xfrm>
+            <a:off x="10035298" y="5081059"/>
+            <a:ext cx="2036135" cy="215444"/>
+          </a:xfrm>
+          <a:prstGeom prst="rect">
+            <a:avLst/>
+          </a:prstGeom>
+          <a:noFill/>
+        </p:spPr>
+        <p:txBody>
+          <a:bodyPr wrap="none" rtlCol="0">
+            <a:spAutoFit/>
+          </a:bodyPr>
+          <a:lstStyle/>
+          <a:p>
+            <a:r>
+              <a:rPr lang="en-US" sz="800" noProof="1">
+                <a:solidFill>
+                  <a:srgbClr val="FF0000"/>
+                </a:solidFill>
+              </a:rPr>
+              <a:t>diff calls pragma-merge or external diff tool</a:t>
+            </a:r>
+          </a:p>
+        </p:txBody>
+      </p:sp>
+      <p:sp>
+        <p:nvSpPr>
+          <p:cNvPr id="82" name="textruta 81">
+            <a:extLst>
+              <a:ext uri="{FF2B5EF4-FFF2-40B4-BE49-F238E27FC236}">
+                <a16:creationId xmlns:a16="http://schemas.microsoft.com/office/drawing/2014/main" id="{5C63B67E-6BB1-D948-BC29-C9B881A89A96}"/>
+              </a:ext>
+            </a:extLst>
+          </p:cNvPr>
+          <p:cNvSpPr txBox="1"/>
+          <p:nvPr/>
+        </p:nvSpPr>
+        <p:spPr>
+          <a:xfrm>
+            <a:off x="9526514" y="6384887"/>
+            <a:ext cx="3065263" cy="215444"/>
+          </a:xfrm>
+          <a:prstGeom prst="rect">
+            <a:avLst/>
+          </a:prstGeom>
+          <a:noFill/>
+        </p:spPr>
+        <p:txBody>
+          <a:bodyPr wrap="none" rtlCol="0">
+            <a:spAutoFit/>
+          </a:bodyPr>
+          <a:lstStyle/>
+          <a:p>
+            <a:r>
+              <a:rPr lang="en-US" sz="800" noProof="1">
+                <a:solidFill>
+                  <a:srgbClr val="FF0000"/>
+                </a:solidFill>
+              </a:rPr>
+              <a:t>Resolve all calls pragma-merge or external diff tool) one file at a time</a:t>
+            </a:r>
+          </a:p>
+        </p:txBody>
+      </p:sp>
+      <p:sp>
+        <p:nvSpPr>
+          <p:cNvPr id="83" name="textruta 82">
+            <a:extLst>
+              <a:ext uri="{FF2B5EF4-FFF2-40B4-BE49-F238E27FC236}">
+                <a16:creationId xmlns:a16="http://schemas.microsoft.com/office/drawing/2014/main" id="{BE998503-4708-F646-A62B-994555D78A21}"/>
+              </a:ext>
+            </a:extLst>
+          </p:cNvPr>
+          <p:cNvSpPr txBox="1"/>
+          <p:nvPr/>
+        </p:nvSpPr>
+        <p:spPr>
+          <a:xfrm>
+            <a:off x="10175277" y="3367036"/>
+            <a:ext cx="2202847" cy="215444"/>
+          </a:xfrm>
+          <a:prstGeom prst="rect">
+            <a:avLst/>
+          </a:prstGeom>
+          <a:noFill/>
+        </p:spPr>
+        <p:txBody>
+          <a:bodyPr wrap="none" rtlCol="0">
+            <a:spAutoFit/>
+          </a:bodyPr>
+          <a:lstStyle/>
+          <a:p>
+            <a:r>
+              <a:rPr lang="en-US" sz="800" noProof="1">
+                <a:solidFill>
+                  <a:srgbClr val="FF0000"/>
+                </a:solidFill>
+              </a:rPr>
+              <a:t>external / internal diff/merge tools defined here</a:t>
+            </a:r>
+          </a:p>
+        </p:txBody>
+      </p:sp>
     </p:spTree>
     <p:extLst>
       <p:ext uri="{BB962C8B-B14F-4D97-AF65-F5344CB8AC3E}">
         <p14:creationId xmlns:p14="http://schemas.microsoft.com/office/powerpoint/2010/main" val="872459698"/>
+      </p:ext>
+    </p:extLst>
+  </p:cSld>
+  <p:clrMapOvr>
+    <a:masterClrMapping/>
+  </p:clrMapOvr>
+</p:sld>
+</file>
+
+<file path=ppt/slides/slide2.xml><?xml version="1.0" encoding="utf-8"?>
+<p:sld xmlns:a="http://schemas.openxmlformats.org/drawingml/2006/main" xmlns:r="http://schemas.openxmlformats.org/officeDocument/2006/relationships" xmlns:p="http://schemas.openxmlformats.org/presentationml/2006/main">
+  <p:cSld>
+    <p:spTree>
+      <p:nvGrpSpPr>
+        <p:cNvPr id="1" name=""/>
+        <p:cNvGrpSpPr/>
+        <p:nvPr/>
+      </p:nvGrpSpPr>
+      <p:grpSpPr>
+        <a:xfrm>
+          <a:off x="0" y="0"/>
+          <a:ext cx="0" cy="0"/>
+          <a:chOff x="0" y="0"/>
+          <a:chExt cx="0" cy="0"/>
+        </a:xfrm>
+      </p:grpSpPr>
+      <p:sp>
+        <p:nvSpPr>
+          <p:cNvPr id="4" name="textruta 3">
+            <a:extLst>
+              <a:ext uri="{FF2B5EF4-FFF2-40B4-BE49-F238E27FC236}">
+                <a16:creationId xmlns:a16="http://schemas.microsoft.com/office/drawing/2014/main" id="{8B784B0E-8C78-2B47-8EE8-76C10C231606}"/>
+              </a:ext>
+            </a:extLst>
+          </p:cNvPr>
+          <p:cNvSpPr txBox="1"/>
+          <p:nvPr/>
+        </p:nvSpPr>
+        <p:spPr>
+          <a:xfrm>
+            <a:off x="124203" y="60782"/>
+            <a:ext cx="5257530" cy="461665"/>
+          </a:xfrm>
+          <a:prstGeom prst="rect">
+            <a:avLst/>
+          </a:prstGeom>
+          <a:noFill/>
+        </p:spPr>
+        <p:txBody>
+          <a:bodyPr wrap="none" rtlCol="0">
+            <a:spAutoFit/>
+          </a:bodyPr>
+          <a:lstStyle/>
+          <a:p>
+            <a:r>
+              <a:rPr lang="en-US" sz="2400" b="1" noProof="1"/>
+              <a:t>Pragma-merge (built-in diff/merge tool)</a:t>
+            </a:r>
+          </a:p>
+        </p:txBody>
+      </p:sp>
+      <p:sp>
+        <p:nvSpPr>
+          <p:cNvPr id="5" name="Rektangel 4">
+            <a:extLst>
+              <a:ext uri="{FF2B5EF4-FFF2-40B4-BE49-F238E27FC236}">
+                <a16:creationId xmlns:a16="http://schemas.microsoft.com/office/drawing/2014/main" id="{F5E5BBA8-F6BB-244F-B228-74B12DFCAC00}"/>
+              </a:ext>
+            </a:extLst>
+          </p:cNvPr>
+          <p:cNvSpPr/>
+          <p:nvPr/>
+        </p:nvSpPr>
+        <p:spPr>
+          <a:xfrm>
+            <a:off x="450135" y="1150452"/>
+            <a:ext cx="5396401" cy="4647426"/>
+          </a:xfrm>
+          <a:prstGeom prst="rect">
+            <a:avLst/>
+          </a:prstGeom>
+          <a:solidFill>
+            <a:schemeClr val="bg1"/>
+          </a:solidFill>
+          <a:ln>
+            <a:solidFill>
+              <a:schemeClr val="accent1"/>
+            </a:solidFill>
+          </a:ln>
+        </p:spPr>
+        <p:txBody>
+          <a:bodyPr wrap="square">
+            <a:spAutoFit/>
+          </a:bodyPr>
+          <a:lstStyle/>
+          <a:p>
+            <a:r>
+              <a:rPr lang="en-US" sz="800" b="1" noProof="1"/>
+              <a:t>How it works </a:t>
+            </a:r>
+          </a:p>
+          <a:p>
+            <a:endParaRPr lang="en-US" sz="800" b="1" noProof="1"/>
+          </a:p>
+          <a:p>
+            <a:r>
+              <a:rPr lang="en-US" sz="800" b="1" noProof="1"/>
+              <a:t>complicated because :</a:t>
+            </a:r>
+          </a:p>
+          <a:p>
+            <a:pPr marL="171450" indent="-171450">
+              <a:buFontTx/>
+              <a:buChar char="-"/>
+            </a:pPr>
+            <a:r>
+              <a:rPr lang="en-US" sz="800" b="1" noProof="1"/>
+              <a:t>nwjs does not allow exit code handling</a:t>
+            </a:r>
+          </a:p>
+          <a:p>
+            <a:pPr marL="171450" indent="-171450">
+              <a:buFontTx/>
+              <a:buChar char="-"/>
+            </a:pPr>
+            <a:r>
+              <a:rPr lang="en-US" sz="800" b="1" noProof="1"/>
+              <a:t>I had to make two installation files for Mac otherwise, Pragma-git and Pragma-merge </a:t>
+            </a:r>
+            <a:br>
+              <a:rPr lang="en-US" sz="800" b="1" noProof="1"/>
+            </a:br>
+            <a:r>
+              <a:rPr lang="en-US" sz="800" b="1" noProof="1"/>
+              <a:t>(now Pragma-git handles the diff viewer itself)</a:t>
+            </a:r>
+          </a:p>
+          <a:p>
+            <a:endParaRPr lang="en-US" sz="800" noProof="1"/>
+          </a:p>
+          <a:p>
+            <a:r>
+              <a:rPr lang="en-US" sz="800" b="1" noProof="1"/>
+              <a:t>Setup :</a:t>
+            </a:r>
+          </a:p>
+          <a:p>
+            <a:pPr marL="171450" indent="-171450">
+              <a:buFont typeface="Courier New" panose="02070309020205020404" pitchFamily="49" charset="0"/>
+              <a:buChar char="o"/>
+            </a:pPr>
+            <a:r>
+              <a:rPr lang="en-US" sz="800" noProof="1">
+                <a:solidFill>
+                  <a:schemeClr val="accent1"/>
+                </a:solidFill>
+              </a:rPr>
+              <a:t>gitconfig  --global  include.path  is set when Pragma-git starts (different for Mac, Linux and Windows) </a:t>
+            </a:r>
+            <a:br>
+              <a:rPr lang="en-US" sz="800" noProof="1">
+                <a:solidFill>
+                  <a:schemeClr val="accent1"/>
+                </a:solidFill>
+              </a:rPr>
+            </a:br>
+            <a:r>
+              <a:rPr lang="en-US" sz="800" noProof="1"/>
+              <a:t>include.path=/Users/jan/Documents/Projects/Pragma-git/Pragma-git/gitconfigs/pragma-git-config_dev_mac</a:t>
+            </a:r>
+          </a:p>
+          <a:p>
+            <a:pPr marL="171450" indent="-171450">
+              <a:buFont typeface="Courier New" panose="02070309020205020404" pitchFamily="49" charset="0"/>
+              <a:buChar char="o"/>
+            </a:pPr>
+            <a:endParaRPr lang="en-US" sz="800" noProof="1"/>
+          </a:p>
+          <a:p>
+            <a:pPr marL="171450" indent="-171450">
+              <a:buFont typeface="Courier New" panose="02070309020205020404" pitchFamily="49" charset="0"/>
+              <a:buChar char="o"/>
+            </a:pPr>
+            <a:r>
+              <a:rPr lang="en-US" sz="800" noProof="1">
+                <a:solidFill>
+                  <a:schemeClr val="accent1"/>
+                </a:solidFill>
+              </a:rPr>
+              <a:t>include.path -- defines script, that starts pragma-merge when git calls this tool (diff or merge tool)</a:t>
+            </a:r>
+          </a:p>
+          <a:p>
+            <a:pPr marL="152550" lvl="1"/>
+            <a:r>
+              <a:rPr lang="en-US" sz="800" noProof="1"/>
+              <a:t>[mergetool "pragma-git"]</a:t>
+            </a:r>
+          </a:p>
+          <a:p>
+            <a:pPr marL="152550" lvl="1"/>
+            <a:r>
+              <a:rPr lang="en-US" sz="800" noProof="1"/>
+              <a:t>    cmd = "$ProgramW6432/Pragma-git/pragma-merge" "$BASE" "$LOCAL" "$REMOTE" "$MERGED"     </a:t>
+            </a:r>
+          </a:p>
+          <a:p>
+            <a:pPr marL="152550" lvl="1"/>
+            <a:r>
+              <a:rPr lang="en-US" sz="800" noProof="1"/>
+              <a:t>     trustExitCode = true  # Says that git can pick up signal if change was saved or not</a:t>
+            </a:r>
+          </a:p>
+          <a:p>
+            <a:pPr marL="152550" lvl="1"/>
+            <a:endParaRPr lang="en-US" sz="800" noProof="1"/>
+          </a:p>
+          <a:p>
+            <a:pPr indent="-304650"/>
+            <a:r>
+              <a:rPr lang="en-US" sz="800" b="1" noProof="1"/>
+              <a:t>Execution :</a:t>
+            </a:r>
+          </a:p>
+          <a:p>
+            <a:pPr marL="171450" indent="-171450">
+              <a:buFont typeface="Courier New" panose="02070309020205020404" pitchFamily="49" charset="0"/>
+              <a:buChar char="o"/>
+            </a:pPr>
+            <a:r>
+              <a:rPr lang="en-US" sz="800" noProof="1">
+                <a:solidFill>
+                  <a:schemeClr val="accent1"/>
+                </a:solidFill>
+              </a:rPr>
+              <a:t>Pragma-git makes git call external diff/merge tool called ‘pragma-git’ (see above)</a:t>
+            </a:r>
+          </a:p>
+          <a:p>
+            <a:pPr marL="171450" indent="-171450">
+              <a:buFont typeface="Courier New" panose="02070309020205020404" pitchFamily="49" charset="0"/>
+              <a:buChar char="o"/>
+            </a:pPr>
+            <a:r>
+              <a:rPr lang="en-US" sz="800" noProof="1">
+                <a:solidFill>
+                  <a:schemeClr val="accent1"/>
+                </a:solidFill>
+              </a:rPr>
+              <a:t>Git calls the bash script pragma-merge, defined above in ‘cmd =  … pragma-merge …’ </a:t>
+            </a:r>
+          </a:p>
+          <a:p>
+            <a:pPr marL="171450" indent="-171450">
+              <a:buFont typeface="Courier New" panose="02070309020205020404" pitchFamily="49" charset="0"/>
+              <a:buChar char="o"/>
+            </a:pPr>
+            <a:r>
+              <a:rPr lang="en-US" sz="800" noProof="1">
+                <a:solidFill>
+                  <a:schemeClr val="accent1"/>
+                </a:solidFill>
+              </a:rPr>
+              <a:t>script ‘pragma-merge’ sets the following variables in $HOME or $USERPROFILE (Windows)  /.Pragma-git/.tmp :</a:t>
+            </a:r>
+            <a:endParaRPr lang="en-US" sz="800" noProof="1"/>
+          </a:p>
+          <a:p>
+            <a:pPr marL="324000" lvl="1" indent="-171450">
+              <a:buFont typeface="Arial" panose="020B0604020202020204" pitchFamily="34" charset="0"/>
+              <a:buChar char="•"/>
+            </a:pPr>
+            <a:r>
+              <a:rPr lang="en-US" sz="800" noProof="1"/>
+              <a:t>first, second, third, fourth</a:t>
+            </a:r>
+          </a:p>
+          <a:p>
+            <a:pPr marL="324000" lvl="1" indent="-171450">
+              <a:buFont typeface="Arial" panose="020B0604020202020204" pitchFamily="34" charset="0"/>
+              <a:buChar char="•"/>
+            </a:pPr>
+            <a:r>
+              <a:rPr lang="en-US" sz="800" noProof="1"/>
+              <a:t>repo_path</a:t>
+            </a:r>
+          </a:p>
+          <a:p>
+            <a:pPr marL="324000" lvl="1" indent="-171450">
+              <a:buFont typeface="Arial" panose="020B0604020202020204" pitchFamily="34" charset="0"/>
+              <a:buChar char="•"/>
+            </a:pPr>
+            <a:r>
+              <a:rPr lang="en-US" sz="800" noProof="1"/>
+              <a:t>mergelog.txt</a:t>
+            </a:r>
+          </a:p>
+          <a:p>
+            <a:pPr marL="324000" lvl="1" indent="-171450">
+              <a:buFont typeface="Arial" panose="020B0604020202020204" pitchFamily="34" charset="0"/>
+              <a:buChar char="•"/>
+            </a:pPr>
+            <a:r>
+              <a:rPr lang="en-US" sz="800" noProof="1"/>
+              <a:t>pragma-merge-running # Flag to start pragma-merge.js. Polled by script ‘pragma-merge’ to know when finished</a:t>
+            </a:r>
+          </a:p>
+          <a:p>
+            <a:pPr marL="324000" lvl="1" indent="-171450">
+              <a:buFont typeface="Arial" panose="020B0604020202020204" pitchFamily="34" charset="0"/>
+              <a:buChar char="•"/>
+            </a:pPr>
+            <a:endParaRPr lang="en-US" sz="800" noProof="1"/>
+          </a:p>
+          <a:p>
+            <a:pPr marL="171450" indent="-171450">
+              <a:buFont typeface="Courier New" panose="02070309020205020404" pitchFamily="49" charset="0"/>
+              <a:buChar char="o"/>
+            </a:pPr>
+            <a:r>
+              <a:rPr lang="en-US" sz="800" noProof="1">
+                <a:solidFill>
+                  <a:schemeClr val="accent1"/>
+                </a:solidFill>
+              </a:rPr>
+              <a:t>Pragma-git listens to creation of file ‘pragma-merge-running’</a:t>
+            </a:r>
+            <a:endParaRPr lang="en-US" sz="800" noProof="1"/>
+          </a:p>
+          <a:p>
+            <a:pPr marL="324000" lvl="1" indent="-171450">
+              <a:buFont typeface="Arial" panose="020B0604020202020204" pitchFamily="34" charset="0"/>
+              <a:buChar char="•"/>
+            </a:pPr>
+            <a:r>
+              <a:rPr lang="en-US" sz="800" noProof="1"/>
+              <a:t>and opens pragma-merge.js with input transferred from git via files first, second, third, fourth, repo_path</a:t>
+            </a:r>
+          </a:p>
+          <a:p>
+            <a:pPr marL="324000" lvl="1" indent="-171450">
+              <a:buFont typeface="Arial" panose="020B0604020202020204" pitchFamily="34" charset="0"/>
+              <a:buChar char="•"/>
+            </a:pPr>
+            <a:r>
+              <a:rPr lang="en-US" sz="800" noProof="1"/>
+              <a:t>when finished, the user can save, or close diff window without save</a:t>
+            </a:r>
+          </a:p>
+          <a:p>
+            <a:pPr marL="324000" lvl="1" indent="-171450">
+              <a:buFont typeface="Arial" panose="020B0604020202020204" pitchFamily="34" charset="0"/>
+              <a:buChar char="•"/>
+            </a:pPr>
+            <a:r>
+              <a:rPr lang="en-US" sz="800" noProof="1"/>
+              <a:t>writes file ‘exit’ containing exit code 0 if saved, or 1 if not saved</a:t>
+            </a:r>
+          </a:p>
+          <a:p>
+            <a:pPr marL="324000" lvl="1" indent="-171450">
+              <a:buFont typeface="Arial" panose="020B0604020202020204" pitchFamily="34" charset="0"/>
+              <a:buChar char="•"/>
+            </a:pPr>
+            <a:r>
+              <a:rPr lang="en-US" sz="800" noProof="1"/>
+              <a:t>file ’pragma-merge-running’ is deleted to signal that ‘pragma-merge.js’ is closed</a:t>
+            </a:r>
+          </a:p>
+          <a:p>
+            <a:pPr marL="324000" lvl="1" indent="-171450">
+              <a:buFont typeface="Arial" panose="020B0604020202020204" pitchFamily="34" charset="0"/>
+              <a:buChar char="•"/>
+            </a:pPr>
+            <a:r>
+              <a:rPr lang="en-US" sz="800" noProof="1"/>
+              <a:t>window is closed</a:t>
+            </a:r>
+          </a:p>
+          <a:p>
+            <a:pPr marL="324000" lvl="1" indent="-171450">
+              <a:buFont typeface="Arial" panose="020B0604020202020204" pitchFamily="34" charset="0"/>
+              <a:buChar char="•"/>
+            </a:pPr>
+            <a:endParaRPr lang="en-US" sz="800" noProof="1"/>
+          </a:p>
+          <a:p>
+            <a:pPr marL="171450" indent="-171450">
+              <a:buFont typeface="Courier New" panose="02070309020205020404" pitchFamily="49" charset="0"/>
+              <a:buChar char="o"/>
+            </a:pPr>
+            <a:r>
+              <a:rPr lang="en-US" sz="800" noProof="1">
+                <a:solidFill>
+                  <a:schemeClr val="accent1"/>
+                </a:solidFill>
+              </a:rPr>
+              <a:t>script pragma-merge </a:t>
+            </a:r>
+            <a:endParaRPr lang="en-US" sz="800" noProof="1"/>
+          </a:p>
+          <a:p>
+            <a:pPr marL="324000" lvl="1" indent="-171450">
+              <a:buFont typeface="Arial" panose="020B0604020202020204" pitchFamily="34" charset="0"/>
+              <a:buChar char="•"/>
+            </a:pPr>
+            <a:r>
+              <a:rPr lang="en-US" sz="800" noProof="1"/>
+              <a:t>waits for deletion of file ‘pragma-merge-running’</a:t>
+            </a:r>
+          </a:p>
+          <a:p>
+            <a:pPr marL="324000" lvl="1" indent="-171450">
+              <a:buFont typeface="Arial" panose="020B0604020202020204" pitchFamily="34" charset="0"/>
+              <a:buChar char="•"/>
+            </a:pPr>
+            <a:r>
+              <a:rPr lang="en-US" sz="800" noProof="1"/>
+              <a:t>reads exit code from file ‘exit’, removes file ‘exit’, and returns the exit code</a:t>
+            </a:r>
+          </a:p>
+          <a:p>
+            <a:pPr marL="171450" indent="-171450">
+              <a:buFont typeface="Courier New" panose="02070309020205020404" pitchFamily="49" charset="0"/>
+              <a:buChar char="o"/>
+            </a:pPr>
+            <a:endParaRPr lang="en-US" sz="800" noProof="1">
+              <a:solidFill>
+                <a:schemeClr val="accent1"/>
+              </a:solidFill>
+            </a:endParaRPr>
+          </a:p>
+        </p:txBody>
+      </p:sp>
+    </p:spTree>
+    <p:extLst>
+      <p:ext uri="{BB962C8B-B14F-4D97-AF65-F5344CB8AC3E}">
+        <p14:creationId xmlns:p14="http://schemas.microsoft.com/office/powerpoint/2010/main" val="3882646827"/>
       </p:ext>
     </p:extLst>
   </p:cSld>

</xml_diff>

<commit_message>
Documented pinned, so far
</commit_message>
<xml_diff>
--- a/docs/Tech-overview.pptx
+++ b/docs/Tech-overview.pptx
@@ -6,7 +6,8 @@
   </p:sldMasterIdLst>
   <p:sldIdLst>
     <p:sldId id="256" r:id="rId2"/>
-    <p:sldId id="257" r:id="rId3"/>
+    <p:sldId id="258" r:id="rId3"/>
+    <p:sldId id="257" r:id="rId4"/>
   </p:sldIdLst>
   <p:sldSz cx="12801600" cy="9601200" type="A3"/>
   <p:notesSz cx="6858000" cy="9144000"/>
@@ -256,7 +257,7 @@
           <a:p>
             <a:fld id="{CA855E1B-8830-B64E-B102-DB2BBD0D9567}" type="datetimeFigureOut">
               <a:rPr lang="sv-SE" smtClean="0"/>
-              <a:t>2020-09-17</a:t>
+              <a:t>2020-10-15</a:t>
             </a:fld>
             <a:endParaRPr lang="sv-SE"/>
           </a:p>
@@ -426,7 +427,7 @@
           <a:p>
             <a:fld id="{CA855E1B-8830-B64E-B102-DB2BBD0D9567}" type="datetimeFigureOut">
               <a:rPr lang="sv-SE" smtClean="0"/>
-              <a:t>2020-09-17</a:t>
+              <a:t>2020-10-15</a:t>
             </a:fld>
             <a:endParaRPr lang="sv-SE"/>
           </a:p>
@@ -606,7 +607,7 @@
           <a:p>
             <a:fld id="{CA855E1B-8830-B64E-B102-DB2BBD0D9567}" type="datetimeFigureOut">
               <a:rPr lang="sv-SE" smtClean="0"/>
-              <a:t>2020-09-17</a:t>
+              <a:t>2020-10-15</a:t>
             </a:fld>
             <a:endParaRPr lang="sv-SE"/>
           </a:p>
@@ -776,7 +777,7 @@
           <a:p>
             <a:fld id="{CA855E1B-8830-B64E-B102-DB2BBD0D9567}" type="datetimeFigureOut">
               <a:rPr lang="sv-SE" smtClean="0"/>
-              <a:t>2020-09-17</a:t>
+              <a:t>2020-10-15</a:t>
             </a:fld>
             <a:endParaRPr lang="sv-SE"/>
           </a:p>
@@ -1020,7 +1021,7 @@
           <a:p>
             <a:fld id="{CA855E1B-8830-B64E-B102-DB2BBD0D9567}" type="datetimeFigureOut">
               <a:rPr lang="sv-SE" smtClean="0"/>
-              <a:t>2020-09-17</a:t>
+              <a:t>2020-10-15</a:t>
             </a:fld>
             <a:endParaRPr lang="sv-SE"/>
           </a:p>
@@ -1252,7 +1253,7 @@
           <a:p>
             <a:fld id="{CA855E1B-8830-B64E-B102-DB2BBD0D9567}" type="datetimeFigureOut">
               <a:rPr lang="sv-SE" smtClean="0"/>
-              <a:t>2020-09-17</a:t>
+              <a:t>2020-10-15</a:t>
             </a:fld>
             <a:endParaRPr lang="sv-SE"/>
           </a:p>
@@ -1619,7 +1620,7 @@
           <a:p>
             <a:fld id="{CA855E1B-8830-B64E-B102-DB2BBD0D9567}" type="datetimeFigureOut">
               <a:rPr lang="sv-SE" smtClean="0"/>
-              <a:t>2020-09-17</a:t>
+              <a:t>2020-10-15</a:t>
             </a:fld>
             <a:endParaRPr lang="sv-SE"/>
           </a:p>
@@ -1737,7 +1738,7 @@
           <a:p>
             <a:fld id="{CA855E1B-8830-B64E-B102-DB2BBD0D9567}" type="datetimeFigureOut">
               <a:rPr lang="sv-SE" smtClean="0"/>
-              <a:t>2020-09-17</a:t>
+              <a:t>2020-10-15</a:t>
             </a:fld>
             <a:endParaRPr lang="sv-SE"/>
           </a:p>
@@ -1832,7 +1833,7 @@
           <a:p>
             <a:fld id="{CA855E1B-8830-B64E-B102-DB2BBD0D9567}" type="datetimeFigureOut">
               <a:rPr lang="sv-SE" smtClean="0"/>
-              <a:t>2020-09-17</a:t>
+              <a:t>2020-10-15</a:t>
             </a:fld>
             <a:endParaRPr lang="sv-SE"/>
           </a:p>
@@ -2109,7 +2110,7 @@
           <a:p>
             <a:fld id="{CA855E1B-8830-B64E-B102-DB2BBD0D9567}" type="datetimeFigureOut">
               <a:rPr lang="sv-SE" smtClean="0"/>
-              <a:t>2020-09-17</a:t>
+              <a:t>2020-10-15</a:t>
             </a:fld>
             <a:endParaRPr lang="sv-SE"/>
           </a:p>
@@ -2366,7 +2367,7 @@
           <a:p>
             <a:fld id="{CA855E1B-8830-B64E-B102-DB2BBD0D9567}" type="datetimeFigureOut">
               <a:rPr lang="sv-SE" smtClean="0"/>
-              <a:t>2020-09-17</a:t>
+              <a:t>2020-10-15</a:t>
             </a:fld>
             <a:endParaRPr lang="sv-SE"/>
           </a:p>
@@ -2579,7 +2580,7 @@
           <a:p>
             <a:fld id="{CA855E1B-8830-B64E-B102-DB2BBD0D9567}" type="datetimeFigureOut">
               <a:rPr lang="sv-SE" smtClean="0"/>
-              <a:t>2020-09-17</a:t>
+              <a:t>2020-10-15</a:t>
             </a:fld>
             <a:endParaRPr lang="sv-SE"/>
           </a:p>
@@ -4473,8 +4474,8 @@
         </p:nvSpPr>
         <p:spPr>
           <a:xfrm>
-            <a:off x="2420784" y="1680440"/>
-            <a:ext cx="173617" cy="494843"/>
+            <a:off x="2445283" y="1680440"/>
+            <a:ext cx="149118" cy="912057"/>
           </a:xfrm>
           <a:prstGeom prst="leftBrace">
             <a:avLst/>
@@ -4517,7 +4518,7 @@
         </p:nvSpPr>
         <p:spPr>
           <a:xfrm>
-            <a:off x="1915311" y="1793370"/>
+            <a:off x="1915311" y="2012403"/>
             <a:ext cx="529972" cy="230832"/>
           </a:xfrm>
           <a:prstGeom prst="rect">
@@ -6367,7 +6368,7 @@
         <p:spPr>
           <a:xfrm>
             <a:off x="169898" y="3556301"/>
-            <a:ext cx="3274288" cy="1938992"/>
+            <a:ext cx="3274288" cy="2062103"/>
           </a:xfrm>
           <a:prstGeom prst="rect">
             <a:avLst/>
@@ -6538,8 +6539,556 @@
               <a:t>.history_status_data (used in listChanged.js – showing file list)</a:t>
             </a:r>
           </a:p>
-        </p:txBody>
-      </p:sp>
+          <a:p>
+            <a:pPr marL="324000" lvl="1" indent="-171450">
+              <a:buFont typeface="Arial" panose="020B0604020202020204" pitchFamily="34" charset="0"/>
+              <a:buChar char="•"/>
+            </a:pPr>
+            <a:r>
+              <a:rPr lang="en-US" sz="800" noProof="1"/>
+              <a:t>.pinnedCommit (history compare to pinned, instead of previous)</a:t>
+            </a:r>
+          </a:p>
+        </p:txBody>
+      </p:sp>
+      <p:sp>
+        <p:nvSpPr>
+          <p:cNvPr id="80" name="Rektangel 79">
+            <a:extLst>
+              <a:ext uri="{FF2B5EF4-FFF2-40B4-BE49-F238E27FC236}">
+                <a16:creationId xmlns:a16="http://schemas.microsoft.com/office/drawing/2014/main" id="{D0562D24-ACB3-F24B-A40F-5232B5654C8A}"/>
+              </a:ext>
+            </a:extLst>
+          </p:cNvPr>
+          <p:cNvSpPr/>
+          <p:nvPr/>
+        </p:nvSpPr>
+        <p:spPr>
+          <a:xfrm>
+            <a:off x="8442304" y="3928495"/>
+            <a:ext cx="4276038" cy="830997"/>
+          </a:xfrm>
+          <a:prstGeom prst="rect">
+            <a:avLst/>
+          </a:prstGeom>
+          <a:noFill/>
+          <a:ln>
+            <a:solidFill>
+              <a:schemeClr val="accent1"/>
+            </a:solidFill>
+          </a:ln>
+        </p:spPr>
+        <p:txBody>
+          <a:bodyPr wrap="square">
+            <a:spAutoFit/>
+          </a:bodyPr>
+          <a:lstStyle/>
+          <a:p>
+            <a:r>
+              <a:rPr lang="en-US" sz="800" b="1" dirty="0"/>
+              <a:t>SETTINGS : </a:t>
+            </a:r>
+          </a:p>
+          <a:p>
+            <a:r>
+              <a:rPr lang="en-US" sz="800" dirty="0"/>
+              <a:t>To implement a new setting that affects the </a:t>
+            </a:r>
+            <a:r>
+              <a:rPr lang="en-US" sz="800" dirty="0" err="1"/>
+              <a:t>gui</a:t>
+            </a:r>
+            <a:r>
+              <a:rPr lang="en-US" sz="800" dirty="0"/>
+              <a:t>, add code to these places :</a:t>
+            </a:r>
+          </a:p>
+          <a:p>
+            <a:pPr marL="171450" indent="-171450">
+              <a:buFont typeface="Arial" panose="020B0604020202020204" pitchFamily="34" charset="0"/>
+              <a:buChar char="•"/>
+            </a:pPr>
+            <a:r>
+              <a:rPr lang="en-US" sz="800" dirty="0" err="1"/>
+              <a:t>app.js</a:t>
+            </a:r>
+            <a:r>
+              <a:rPr lang="en-US" sz="800" dirty="0"/>
+              <a:t>/</a:t>
+            </a:r>
+            <a:r>
+              <a:rPr lang="en-US" sz="800" dirty="0" err="1"/>
+              <a:t>updateWithNewSettings</a:t>
+            </a:r>
+            <a:r>
+              <a:rPr lang="en-US" sz="800" dirty="0"/>
+              <a:t> (this function)   -- applies directly after settings window is left</a:t>
+            </a:r>
+          </a:p>
+          <a:p>
+            <a:pPr marL="171450" indent="-171450">
+              <a:buFont typeface="Arial" panose="020B0604020202020204" pitchFamily="34" charset="0"/>
+              <a:buChar char="•"/>
+            </a:pPr>
+            <a:r>
+              <a:rPr lang="en-US" sz="800" dirty="0" err="1"/>
+              <a:t>app.js</a:t>
+            </a:r>
+            <a:r>
+              <a:rPr lang="en-US" sz="800" dirty="0"/>
+              <a:t>/</a:t>
+            </a:r>
+            <a:r>
+              <a:rPr lang="en-US" sz="800" dirty="0" err="1"/>
+              <a:t>loadSettings</a:t>
+            </a:r>
+            <a:r>
+              <a:rPr lang="en-US" sz="800" dirty="0"/>
+              <a:t>                           -- applies when starting </a:t>
+            </a:r>
+            <a:r>
+              <a:rPr lang="en-US" sz="800" dirty="0" err="1"/>
+              <a:t>app.js</a:t>
+            </a:r>
+            <a:endParaRPr lang="en-US" sz="800" dirty="0"/>
+          </a:p>
+          <a:p>
+            <a:pPr marL="171450" indent="-171450">
+              <a:buFont typeface="Arial" panose="020B0604020202020204" pitchFamily="34" charset="0"/>
+              <a:buChar char="•"/>
+            </a:pPr>
+            <a:r>
+              <a:rPr lang="en-US" sz="800" dirty="0" err="1"/>
+              <a:t>settings.js</a:t>
+            </a:r>
+            <a:r>
+              <a:rPr lang="en-US" sz="800" dirty="0"/>
+              <a:t>/</a:t>
+            </a:r>
+            <a:r>
+              <a:rPr lang="en-US" sz="800" dirty="0" err="1"/>
+              <a:t>injectIntoSettingsJs</a:t>
+            </a:r>
+            <a:r>
+              <a:rPr lang="en-US" sz="800" dirty="0"/>
+              <a:t>       -- correctly sets the parameter in the </a:t>
+            </a:r>
+            <a:r>
+              <a:rPr lang="en-US" sz="800" dirty="0" err="1"/>
+              <a:t>settings.html</a:t>
+            </a:r>
+            <a:r>
+              <a:rPr lang="en-US" sz="800" dirty="0"/>
+              <a:t> form</a:t>
+            </a:r>
+          </a:p>
+          <a:p>
+            <a:pPr marL="171450" indent="-171450">
+              <a:buFont typeface="Arial" panose="020B0604020202020204" pitchFamily="34" charset="0"/>
+              <a:buChar char="•"/>
+            </a:pPr>
+            <a:r>
+              <a:rPr lang="en-US" sz="800" dirty="0" err="1"/>
+              <a:t>settings.html</a:t>
+            </a:r>
+            <a:r>
+              <a:rPr lang="en-US" sz="800" dirty="0"/>
+              <a:t>                                      -- where the form element for the setting is shown</a:t>
+            </a:r>
+          </a:p>
+        </p:txBody>
+      </p:sp>
+      <p:sp>
+        <p:nvSpPr>
+          <p:cNvPr id="73" name="Rektangel 72">
+            <a:extLst>
+              <a:ext uri="{FF2B5EF4-FFF2-40B4-BE49-F238E27FC236}">
+                <a16:creationId xmlns:a16="http://schemas.microsoft.com/office/drawing/2014/main" id="{7E1FCB8D-6087-5645-AC64-612B773440DC}"/>
+              </a:ext>
+            </a:extLst>
+          </p:cNvPr>
+          <p:cNvSpPr/>
+          <p:nvPr/>
+        </p:nvSpPr>
+        <p:spPr>
+          <a:xfrm>
+            <a:off x="3593721" y="3564239"/>
+            <a:ext cx="2674464" cy="1200329"/>
+          </a:xfrm>
+          <a:prstGeom prst="rect">
+            <a:avLst/>
+          </a:prstGeom>
+          <a:solidFill>
+            <a:schemeClr val="bg1"/>
+          </a:solidFill>
+          <a:ln>
+            <a:solidFill>
+              <a:schemeClr val="accent1"/>
+            </a:solidFill>
+          </a:ln>
+        </p:spPr>
+        <p:txBody>
+          <a:bodyPr wrap="square">
+            <a:spAutoFit/>
+          </a:bodyPr>
+          <a:lstStyle/>
+          <a:p>
+            <a:r>
+              <a:rPr lang="en-US" sz="800" b="1" noProof="1"/>
+              <a:t>HTML dialogs</a:t>
+            </a:r>
+          </a:p>
+          <a:p>
+            <a:endParaRPr lang="en-US" sz="800" noProof="1"/>
+          </a:p>
+          <a:p>
+            <a:pPr marL="171450" indent="-171450">
+              <a:buFont typeface="Courier New" panose="02070309020205020404" pitchFamily="49" charset="0"/>
+              <a:buChar char="o"/>
+            </a:pPr>
+            <a:r>
+              <a:rPr lang="en-US" sz="800" noProof="1">
+                <a:solidFill>
+                  <a:schemeClr val="accent1"/>
+                </a:solidFill>
+              </a:rPr>
+              <a:t>color : </a:t>
+            </a:r>
+            <a:r>
+              <a:rPr lang="en-US" sz="800" noProof="1">
+                <a:solidFill>
+                  <a:srgbClr val="FF0000"/>
+                </a:solidFill>
+              </a:rPr>
+              <a:t>red</a:t>
+            </a:r>
+            <a:r>
+              <a:rPr lang="en-US" sz="800" noProof="1">
+                <a:solidFill>
+                  <a:schemeClr val="accent1"/>
+                </a:solidFill>
+              </a:rPr>
+              <a:t> </a:t>
+            </a:r>
+            <a:r>
+              <a:rPr lang="en-US" sz="800" noProof="1">
+                <a:solidFill>
+                  <a:srgbClr val="FF0000"/>
+                </a:solidFill>
+              </a:rPr>
+              <a:t>error</a:t>
+            </a:r>
+            <a:r>
+              <a:rPr lang="en-US" sz="800" noProof="1">
+                <a:solidFill>
+                  <a:schemeClr val="accent1"/>
+                </a:solidFill>
+              </a:rPr>
+              <a:t>,</a:t>
+            </a:r>
+            <a:r>
+              <a:rPr lang="en-US" sz="800" noProof="1">
+                <a:solidFill>
+                  <a:schemeClr val="accent4"/>
+                </a:solidFill>
+              </a:rPr>
+              <a:t> yellow normal</a:t>
+            </a:r>
+          </a:p>
+          <a:p>
+            <a:pPr marL="171450" indent="-171450">
+              <a:buFont typeface="Courier New" panose="02070309020205020404" pitchFamily="49" charset="0"/>
+              <a:buChar char="o"/>
+            </a:pPr>
+            <a:r>
+              <a:rPr lang="en-US" sz="800" noProof="1">
+                <a:solidFill>
+                  <a:schemeClr val="accent1"/>
+                </a:solidFill>
+              </a:rPr>
+              <a:t>Use :</a:t>
+            </a:r>
+            <a:endParaRPr lang="en-US" sz="800" noProof="1"/>
+          </a:p>
+          <a:p>
+            <a:pPr marL="324000" lvl="1" indent="-171450">
+              <a:buFont typeface="Arial" panose="020B0604020202020204" pitchFamily="34" charset="0"/>
+              <a:buChar char="•"/>
+            </a:pPr>
+            <a:r>
+              <a:rPr lang="en-US" sz="800" noProof="1"/>
+              <a:t>show : document.getElementById(id).showModal();</a:t>
+            </a:r>
+          </a:p>
+          <a:p>
+            <a:pPr marL="324000" lvl="1" indent="-171450">
+              <a:buFont typeface="Arial" panose="020B0604020202020204" pitchFamily="34" charset="0"/>
+              <a:buChar char="•"/>
+            </a:pPr>
+            <a:r>
+              <a:rPr lang="en-US" sz="800" noProof="1"/>
+              <a:t>[Cancel] button just closes</a:t>
+            </a:r>
+          </a:p>
+          <a:p>
+            <a:pPr marL="324000" lvl="1" indent="-171450">
+              <a:buFont typeface="Arial" panose="020B0604020202020204" pitchFamily="34" charset="0"/>
+              <a:buChar char="•"/>
+            </a:pPr>
+            <a:r>
+              <a:rPr lang="en-US" sz="800" noProof="1"/>
+              <a:t>[Other buttons]  _callback(‘mycallbackname’,event) </a:t>
+            </a:r>
+            <a:br>
+              <a:rPr lang="en-US" sz="800" noProof="1"/>
+            </a:br>
+            <a:r>
+              <a:rPr lang="en-US" sz="800" noProof="1"/>
+              <a:t>event can be something useful</a:t>
+            </a:r>
+          </a:p>
+          <a:p>
+            <a:pPr marL="324000" lvl="1" indent="-171450">
+              <a:buFont typeface="Arial" panose="020B0604020202020204" pitchFamily="34" charset="0"/>
+              <a:buChar char="•"/>
+            </a:pPr>
+            <a:r>
+              <a:rPr lang="en-US" sz="800" noProof="1"/>
+              <a:t>_callback switch-statement : case ‘mycallbackname’</a:t>
+            </a:r>
+          </a:p>
+        </p:txBody>
+      </p:sp>
+      <p:sp>
+        <p:nvSpPr>
+          <p:cNvPr id="81" name="textruta 80">
+            <a:extLst>
+              <a:ext uri="{FF2B5EF4-FFF2-40B4-BE49-F238E27FC236}">
+                <a16:creationId xmlns:a16="http://schemas.microsoft.com/office/drawing/2014/main" id="{9F4AFC71-1FF7-1F4C-91E0-7F8767FB7C09}"/>
+              </a:ext>
+            </a:extLst>
+          </p:cNvPr>
+          <p:cNvSpPr txBox="1"/>
+          <p:nvPr/>
+        </p:nvSpPr>
+        <p:spPr>
+          <a:xfrm>
+            <a:off x="10035298" y="5081059"/>
+            <a:ext cx="2036135" cy="215444"/>
+          </a:xfrm>
+          <a:prstGeom prst="rect">
+            <a:avLst/>
+          </a:prstGeom>
+          <a:noFill/>
+        </p:spPr>
+        <p:txBody>
+          <a:bodyPr wrap="none" rtlCol="0">
+            <a:spAutoFit/>
+          </a:bodyPr>
+          <a:lstStyle/>
+          <a:p>
+            <a:r>
+              <a:rPr lang="en-US" sz="800" noProof="1">
+                <a:solidFill>
+                  <a:srgbClr val="FF0000"/>
+                </a:solidFill>
+              </a:rPr>
+              <a:t>diff calls pragma-merge or external diff tool</a:t>
+            </a:r>
+          </a:p>
+        </p:txBody>
+      </p:sp>
+      <p:sp>
+        <p:nvSpPr>
+          <p:cNvPr id="82" name="textruta 81">
+            <a:extLst>
+              <a:ext uri="{FF2B5EF4-FFF2-40B4-BE49-F238E27FC236}">
+                <a16:creationId xmlns:a16="http://schemas.microsoft.com/office/drawing/2014/main" id="{5C63B67E-6BB1-D948-BC29-C9B881A89A96}"/>
+              </a:ext>
+            </a:extLst>
+          </p:cNvPr>
+          <p:cNvSpPr txBox="1"/>
+          <p:nvPr/>
+        </p:nvSpPr>
+        <p:spPr>
+          <a:xfrm>
+            <a:off x="9526514" y="6384887"/>
+            <a:ext cx="3065263" cy="215444"/>
+          </a:xfrm>
+          <a:prstGeom prst="rect">
+            <a:avLst/>
+          </a:prstGeom>
+          <a:noFill/>
+        </p:spPr>
+        <p:txBody>
+          <a:bodyPr wrap="none" rtlCol="0">
+            <a:spAutoFit/>
+          </a:bodyPr>
+          <a:lstStyle/>
+          <a:p>
+            <a:r>
+              <a:rPr lang="en-US" sz="800" noProof="1">
+                <a:solidFill>
+                  <a:srgbClr val="FF0000"/>
+                </a:solidFill>
+              </a:rPr>
+              <a:t>Resolve all calls pragma-merge or external diff tool) one file at a time</a:t>
+            </a:r>
+          </a:p>
+        </p:txBody>
+      </p:sp>
+      <p:sp>
+        <p:nvSpPr>
+          <p:cNvPr id="83" name="textruta 82">
+            <a:extLst>
+              <a:ext uri="{FF2B5EF4-FFF2-40B4-BE49-F238E27FC236}">
+                <a16:creationId xmlns:a16="http://schemas.microsoft.com/office/drawing/2014/main" id="{BE998503-4708-F646-A62B-994555D78A21}"/>
+              </a:ext>
+            </a:extLst>
+          </p:cNvPr>
+          <p:cNvSpPr txBox="1"/>
+          <p:nvPr/>
+        </p:nvSpPr>
+        <p:spPr>
+          <a:xfrm>
+            <a:off x="10175277" y="3367036"/>
+            <a:ext cx="2202847" cy="215444"/>
+          </a:xfrm>
+          <a:prstGeom prst="rect">
+            <a:avLst/>
+          </a:prstGeom>
+          <a:noFill/>
+        </p:spPr>
+        <p:txBody>
+          <a:bodyPr wrap="none" rtlCol="0">
+            <a:spAutoFit/>
+          </a:bodyPr>
+          <a:lstStyle/>
+          <a:p>
+            <a:r>
+              <a:rPr lang="en-US" sz="800" noProof="1">
+                <a:solidFill>
+                  <a:srgbClr val="FF0000"/>
+                </a:solidFill>
+              </a:rPr>
+              <a:t>external / internal diff/merge tools defined here</a:t>
+            </a:r>
+          </a:p>
+        </p:txBody>
+      </p:sp>
+      <p:grpSp>
+        <p:nvGrpSpPr>
+          <p:cNvPr id="5" name="Grupp 4">
+            <a:extLst>
+              <a:ext uri="{FF2B5EF4-FFF2-40B4-BE49-F238E27FC236}">
+                <a16:creationId xmlns:a16="http://schemas.microsoft.com/office/drawing/2014/main" id="{8734FBB6-3367-3A46-891D-BBE465D200DF}"/>
+              </a:ext>
+            </a:extLst>
+          </p:cNvPr>
+          <p:cNvGrpSpPr/>
+          <p:nvPr/>
+        </p:nvGrpSpPr>
+        <p:grpSpPr>
+          <a:xfrm rot="1962301" flipH="1">
+            <a:off x="2717422" y="2339657"/>
+            <a:ext cx="180188" cy="266984"/>
+            <a:chOff x="2694364" y="2277289"/>
+            <a:chExt cx="203501" cy="373562"/>
+          </a:xfrm>
+        </p:grpSpPr>
+        <p:sp>
+          <p:nvSpPr>
+            <p:cNvPr id="4" name="Rektangel 3">
+              <a:extLst>
+                <a:ext uri="{FF2B5EF4-FFF2-40B4-BE49-F238E27FC236}">
+                  <a16:creationId xmlns:a16="http://schemas.microsoft.com/office/drawing/2014/main" id="{D1308872-C960-DA4B-93BD-9EFFAF41E261}"/>
+                </a:ext>
+              </a:extLst>
+            </p:cNvPr>
+            <p:cNvSpPr/>
+            <p:nvPr/>
+          </p:nvSpPr>
+          <p:spPr>
+            <a:xfrm>
+              <a:off x="2781443" y="2469296"/>
+              <a:ext cx="45719" cy="181555"/>
+            </a:xfrm>
+            <a:prstGeom prst="rect">
+              <a:avLst/>
+            </a:prstGeom>
+          </p:spPr>
+          <p:style>
+            <a:lnRef idx="2">
+              <a:schemeClr val="accent1">
+                <a:shade val="50000"/>
+              </a:schemeClr>
+            </a:lnRef>
+            <a:fillRef idx="1">
+              <a:schemeClr val="accent1"/>
+            </a:fillRef>
+            <a:effectRef idx="0">
+              <a:schemeClr val="accent1"/>
+            </a:effectRef>
+            <a:fontRef idx="minor">
+              <a:schemeClr val="lt1"/>
+            </a:fontRef>
+          </p:style>
+          <p:txBody>
+            <a:bodyPr rtlCol="0" anchor="ctr"/>
+            <a:lstStyle/>
+            <a:p>
+              <a:pPr algn="ctr"/>
+              <a:endParaRPr lang="sv-SE"/>
+            </a:p>
+          </p:txBody>
+        </p:sp>
+        <p:sp>
+          <p:nvSpPr>
+            <p:cNvPr id="2" name="Ellips 1">
+              <a:extLst>
+                <a:ext uri="{FF2B5EF4-FFF2-40B4-BE49-F238E27FC236}">
+                  <a16:creationId xmlns:a16="http://schemas.microsoft.com/office/drawing/2014/main" id="{E42EC357-EB15-CB4C-9A67-9BBB648C0A53}"/>
+                </a:ext>
+              </a:extLst>
+            </p:cNvPr>
+            <p:cNvSpPr/>
+            <p:nvPr/>
+          </p:nvSpPr>
+          <p:spPr>
+            <a:xfrm>
+              <a:off x="2694364" y="2277289"/>
+              <a:ext cx="203501" cy="239945"/>
+            </a:xfrm>
+            <a:prstGeom prst="ellipse">
+              <a:avLst/>
+            </a:prstGeom>
+          </p:spPr>
+          <p:style>
+            <a:lnRef idx="2">
+              <a:schemeClr val="accent1">
+                <a:shade val="50000"/>
+              </a:schemeClr>
+            </a:lnRef>
+            <a:fillRef idx="1">
+              <a:schemeClr val="accent1"/>
+            </a:fillRef>
+            <a:effectRef idx="0">
+              <a:schemeClr val="accent1"/>
+            </a:effectRef>
+            <a:fontRef idx="minor">
+              <a:schemeClr val="lt1"/>
+            </a:fontRef>
+          </p:style>
+          <p:txBody>
+            <a:bodyPr rtlCol="0" anchor="ctr"/>
+            <a:lstStyle/>
+            <a:p>
+              <a:pPr algn="ctr"/>
+              <a:endParaRPr lang="sv-SE"/>
+            </a:p>
+          </p:txBody>
+        </p:sp>
+      </p:grpSp>
       <p:sp>
         <p:nvSpPr>
           <p:cNvPr id="74" name="Vänster klammerparentes 73">
@@ -6554,8 +7103,8 @@
         </p:nvSpPr>
         <p:spPr>
           <a:xfrm flipH="1">
-            <a:off x="3145130" y="4965320"/>
-            <a:ext cx="108610" cy="479625"/>
+            <a:off x="3241905" y="4935984"/>
+            <a:ext cx="45719" cy="632190"/>
           </a:xfrm>
           <a:prstGeom prst="leftBrace">
             <a:avLst/>
@@ -6598,8 +7147,8 @@
         </p:nvSpPr>
         <p:spPr>
           <a:xfrm rot="5400000">
-            <a:off x="3071477" y="5097410"/>
-            <a:ext cx="529972" cy="215444"/>
+            <a:off x="3041025" y="5221468"/>
+            <a:ext cx="649593" cy="215444"/>
           </a:xfrm>
           <a:prstGeom prst="rect">
             <a:avLst/>
@@ -6615,431 +7164,6 @@
             <a:r>
               <a:rPr lang="en-US" sz="800" noProof="1"/>
               <a:t>history</a:t>
-            </a:r>
-          </a:p>
-        </p:txBody>
-      </p:sp>
-      <p:sp>
-        <p:nvSpPr>
-          <p:cNvPr id="80" name="Rektangel 79">
-            <a:extLst>
-              <a:ext uri="{FF2B5EF4-FFF2-40B4-BE49-F238E27FC236}">
-                <a16:creationId xmlns:a16="http://schemas.microsoft.com/office/drawing/2014/main" id="{D0562D24-ACB3-F24B-A40F-5232B5654C8A}"/>
-              </a:ext>
-            </a:extLst>
-          </p:cNvPr>
-          <p:cNvSpPr/>
-          <p:nvPr/>
-        </p:nvSpPr>
-        <p:spPr>
-          <a:xfrm>
-            <a:off x="8442304" y="3928495"/>
-            <a:ext cx="4276038" cy="830997"/>
-          </a:xfrm>
-          <a:prstGeom prst="rect">
-            <a:avLst/>
-          </a:prstGeom>
-          <a:noFill/>
-          <a:ln>
-            <a:solidFill>
-              <a:schemeClr val="accent1"/>
-            </a:solidFill>
-          </a:ln>
-        </p:spPr>
-        <p:txBody>
-          <a:bodyPr wrap="square">
-            <a:spAutoFit/>
-          </a:bodyPr>
-          <a:lstStyle/>
-          <a:p>
-            <a:r>
-              <a:rPr lang="en-US" sz="800" b="1" dirty="0"/>
-              <a:t>SETTINGS : </a:t>
-            </a:r>
-          </a:p>
-          <a:p>
-            <a:r>
-              <a:rPr lang="en-US" sz="800" dirty="0"/>
-              <a:t>To implement a new setting that affects the </a:t>
-            </a:r>
-            <a:r>
-              <a:rPr lang="en-US" sz="800" dirty="0" err="1"/>
-              <a:t>gui</a:t>
-            </a:r>
-            <a:r>
-              <a:rPr lang="en-US" sz="800" dirty="0"/>
-              <a:t>, add code to these places :</a:t>
-            </a:r>
-          </a:p>
-          <a:p>
-            <a:pPr marL="171450" indent="-171450">
-              <a:buFont typeface="Arial" panose="020B0604020202020204" pitchFamily="34" charset="0"/>
-              <a:buChar char="•"/>
-            </a:pPr>
-            <a:r>
-              <a:rPr lang="en-US" sz="800" dirty="0" err="1"/>
-              <a:t>app.js</a:t>
-            </a:r>
-            <a:r>
-              <a:rPr lang="en-US" sz="800" dirty="0"/>
-              <a:t>/</a:t>
-            </a:r>
-            <a:r>
-              <a:rPr lang="en-US" sz="800" dirty="0" err="1"/>
-              <a:t>updateWithNewSettings</a:t>
-            </a:r>
-            <a:r>
-              <a:rPr lang="en-US" sz="800" dirty="0"/>
-              <a:t> (this function)   -- applies directly after settings window is left</a:t>
-            </a:r>
-          </a:p>
-          <a:p>
-            <a:pPr marL="171450" indent="-171450">
-              <a:buFont typeface="Arial" panose="020B0604020202020204" pitchFamily="34" charset="0"/>
-              <a:buChar char="•"/>
-            </a:pPr>
-            <a:r>
-              <a:rPr lang="en-US" sz="800" dirty="0" err="1"/>
-              <a:t>app.js</a:t>
-            </a:r>
-            <a:r>
-              <a:rPr lang="en-US" sz="800" dirty="0"/>
-              <a:t>/</a:t>
-            </a:r>
-            <a:r>
-              <a:rPr lang="en-US" sz="800" dirty="0" err="1"/>
-              <a:t>loadSettings</a:t>
-            </a:r>
-            <a:r>
-              <a:rPr lang="en-US" sz="800" dirty="0"/>
-              <a:t>                           -- applies when starting </a:t>
-            </a:r>
-            <a:r>
-              <a:rPr lang="en-US" sz="800" dirty="0" err="1"/>
-              <a:t>app.js</a:t>
-            </a:r>
-            <a:endParaRPr lang="en-US" sz="800" dirty="0"/>
-          </a:p>
-          <a:p>
-            <a:pPr marL="171450" indent="-171450">
-              <a:buFont typeface="Arial" panose="020B0604020202020204" pitchFamily="34" charset="0"/>
-              <a:buChar char="•"/>
-            </a:pPr>
-            <a:r>
-              <a:rPr lang="en-US" sz="800" dirty="0" err="1"/>
-              <a:t>settings.js</a:t>
-            </a:r>
-            <a:r>
-              <a:rPr lang="en-US" sz="800" dirty="0"/>
-              <a:t>/</a:t>
-            </a:r>
-            <a:r>
-              <a:rPr lang="en-US" sz="800" dirty="0" err="1"/>
-              <a:t>injectIntoSettingsJs</a:t>
-            </a:r>
-            <a:r>
-              <a:rPr lang="en-US" sz="800" dirty="0"/>
-              <a:t>       -- correctly sets the parameter in the </a:t>
-            </a:r>
-            <a:r>
-              <a:rPr lang="en-US" sz="800" dirty="0" err="1"/>
-              <a:t>settings.html</a:t>
-            </a:r>
-            <a:r>
-              <a:rPr lang="en-US" sz="800" dirty="0"/>
-              <a:t> form</a:t>
-            </a:r>
-          </a:p>
-          <a:p>
-            <a:pPr marL="171450" indent="-171450">
-              <a:buFont typeface="Arial" panose="020B0604020202020204" pitchFamily="34" charset="0"/>
-              <a:buChar char="•"/>
-            </a:pPr>
-            <a:r>
-              <a:rPr lang="en-US" sz="800" dirty="0" err="1"/>
-              <a:t>settings.html</a:t>
-            </a:r>
-            <a:r>
-              <a:rPr lang="en-US" sz="800" dirty="0"/>
-              <a:t>                                      -- where the form element for the setting is shown</a:t>
-            </a:r>
-          </a:p>
-        </p:txBody>
-      </p:sp>
-      <p:sp>
-        <p:nvSpPr>
-          <p:cNvPr id="73" name="Rektangel 72">
-            <a:extLst>
-              <a:ext uri="{FF2B5EF4-FFF2-40B4-BE49-F238E27FC236}">
-                <a16:creationId xmlns:a16="http://schemas.microsoft.com/office/drawing/2014/main" id="{7E1FCB8D-6087-5645-AC64-612B773440DC}"/>
-              </a:ext>
-            </a:extLst>
-          </p:cNvPr>
-          <p:cNvSpPr/>
-          <p:nvPr/>
-        </p:nvSpPr>
-        <p:spPr>
-          <a:xfrm>
-            <a:off x="3593721" y="3564239"/>
-            <a:ext cx="2674464" cy="1200329"/>
-          </a:xfrm>
-          <a:prstGeom prst="rect">
-            <a:avLst/>
-          </a:prstGeom>
-          <a:solidFill>
-            <a:schemeClr val="bg1"/>
-          </a:solidFill>
-          <a:ln>
-            <a:solidFill>
-              <a:schemeClr val="accent1"/>
-            </a:solidFill>
-          </a:ln>
-        </p:spPr>
-        <p:txBody>
-          <a:bodyPr wrap="square">
-            <a:spAutoFit/>
-          </a:bodyPr>
-          <a:lstStyle/>
-          <a:p>
-            <a:r>
-              <a:rPr lang="en-US" sz="800" b="1" noProof="1"/>
-              <a:t>HTML dialogs</a:t>
-            </a:r>
-          </a:p>
-          <a:p>
-            <a:endParaRPr lang="en-US" sz="800" noProof="1"/>
-          </a:p>
-          <a:p>
-            <a:pPr marL="171450" indent="-171450">
-              <a:buFont typeface="Courier New" panose="02070309020205020404" pitchFamily="49" charset="0"/>
-              <a:buChar char="o"/>
-            </a:pPr>
-            <a:r>
-              <a:rPr lang="en-US" sz="800" noProof="1">
-                <a:solidFill>
-                  <a:schemeClr val="accent1"/>
-                </a:solidFill>
-              </a:rPr>
-              <a:t>color : </a:t>
-            </a:r>
-            <a:r>
-              <a:rPr lang="en-US" sz="800" noProof="1">
-                <a:solidFill>
-                  <a:srgbClr val="FF0000"/>
-                </a:solidFill>
-              </a:rPr>
-              <a:t>red</a:t>
-            </a:r>
-            <a:r>
-              <a:rPr lang="en-US" sz="800" noProof="1">
-                <a:solidFill>
-                  <a:schemeClr val="accent1"/>
-                </a:solidFill>
-              </a:rPr>
-              <a:t> </a:t>
-            </a:r>
-            <a:r>
-              <a:rPr lang="en-US" sz="800" noProof="1">
-                <a:solidFill>
-                  <a:srgbClr val="FF0000"/>
-                </a:solidFill>
-              </a:rPr>
-              <a:t>error</a:t>
-            </a:r>
-            <a:r>
-              <a:rPr lang="en-US" sz="800" noProof="1">
-                <a:solidFill>
-                  <a:schemeClr val="accent1"/>
-                </a:solidFill>
-              </a:rPr>
-              <a:t>,</a:t>
-            </a:r>
-            <a:r>
-              <a:rPr lang="en-US" sz="800" noProof="1">
-                <a:solidFill>
-                  <a:schemeClr val="accent4"/>
-                </a:solidFill>
-              </a:rPr>
-              <a:t> yellow normal</a:t>
-            </a:r>
-          </a:p>
-          <a:p>
-            <a:pPr marL="171450" indent="-171450">
-              <a:buFont typeface="Courier New" panose="02070309020205020404" pitchFamily="49" charset="0"/>
-              <a:buChar char="o"/>
-            </a:pPr>
-            <a:r>
-              <a:rPr lang="en-US" sz="800" noProof="1">
-                <a:solidFill>
-                  <a:schemeClr val="accent1"/>
-                </a:solidFill>
-              </a:rPr>
-              <a:t>Use :</a:t>
-            </a:r>
-            <a:endParaRPr lang="en-US" sz="800" noProof="1"/>
-          </a:p>
-          <a:p>
-            <a:pPr marL="324000" lvl="1" indent="-171450">
-              <a:buFont typeface="Arial" panose="020B0604020202020204" pitchFamily="34" charset="0"/>
-              <a:buChar char="•"/>
-            </a:pPr>
-            <a:r>
-              <a:rPr lang="en-US" sz="800" noProof="1"/>
-              <a:t>show : document.getElementById(id).showModal();</a:t>
-            </a:r>
-          </a:p>
-          <a:p>
-            <a:pPr marL="324000" lvl="1" indent="-171450">
-              <a:buFont typeface="Arial" panose="020B0604020202020204" pitchFamily="34" charset="0"/>
-              <a:buChar char="•"/>
-            </a:pPr>
-            <a:r>
-              <a:rPr lang="en-US" sz="800" noProof="1"/>
-              <a:t>[Cancel] button just closes</a:t>
-            </a:r>
-          </a:p>
-          <a:p>
-            <a:pPr marL="324000" lvl="1" indent="-171450">
-              <a:buFont typeface="Arial" panose="020B0604020202020204" pitchFamily="34" charset="0"/>
-              <a:buChar char="•"/>
-            </a:pPr>
-            <a:r>
-              <a:rPr lang="en-US" sz="800" noProof="1"/>
-              <a:t>[Other buttons]  _callback(‘mycallbackname’,event) </a:t>
-            </a:r>
-            <a:br>
-              <a:rPr lang="en-US" sz="800" noProof="1"/>
-            </a:br>
-            <a:r>
-              <a:rPr lang="en-US" sz="800" noProof="1"/>
-              <a:t>event can be something useful</a:t>
-            </a:r>
-          </a:p>
-          <a:p>
-            <a:pPr marL="324000" lvl="1" indent="-171450">
-              <a:buFont typeface="Arial" panose="020B0604020202020204" pitchFamily="34" charset="0"/>
-              <a:buChar char="•"/>
-            </a:pPr>
-            <a:r>
-              <a:rPr lang="en-US" sz="800" noProof="1"/>
-              <a:t>_callback switch-statement : case ‘mycallbackname’</a:t>
-            </a:r>
-          </a:p>
-        </p:txBody>
-      </p:sp>
-      <p:sp>
-        <p:nvSpPr>
-          <p:cNvPr id="81" name="textruta 80">
-            <a:extLst>
-              <a:ext uri="{FF2B5EF4-FFF2-40B4-BE49-F238E27FC236}">
-                <a16:creationId xmlns:a16="http://schemas.microsoft.com/office/drawing/2014/main" id="{9F4AFC71-1FF7-1F4C-91E0-7F8767FB7C09}"/>
-              </a:ext>
-            </a:extLst>
-          </p:cNvPr>
-          <p:cNvSpPr txBox="1"/>
-          <p:nvPr/>
-        </p:nvSpPr>
-        <p:spPr>
-          <a:xfrm>
-            <a:off x="10035298" y="5081059"/>
-            <a:ext cx="2036135" cy="215444"/>
-          </a:xfrm>
-          <a:prstGeom prst="rect">
-            <a:avLst/>
-          </a:prstGeom>
-          <a:noFill/>
-        </p:spPr>
-        <p:txBody>
-          <a:bodyPr wrap="none" rtlCol="0">
-            <a:spAutoFit/>
-          </a:bodyPr>
-          <a:lstStyle/>
-          <a:p>
-            <a:r>
-              <a:rPr lang="en-US" sz="800" noProof="1">
-                <a:solidFill>
-                  <a:srgbClr val="FF0000"/>
-                </a:solidFill>
-              </a:rPr>
-              <a:t>diff calls pragma-merge or external diff tool</a:t>
-            </a:r>
-          </a:p>
-        </p:txBody>
-      </p:sp>
-      <p:sp>
-        <p:nvSpPr>
-          <p:cNvPr id="82" name="textruta 81">
-            <a:extLst>
-              <a:ext uri="{FF2B5EF4-FFF2-40B4-BE49-F238E27FC236}">
-                <a16:creationId xmlns:a16="http://schemas.microsoft.com/office/drawing/2014/main" id="{5C63B67E-6BB1-D948-BC29-C9B881A89A96}"/>
-              </a:ext>
-            </a:extLst>
-          </p:cNvPr>
-          <p:cNvSpPr txBox="1"/>
-          <p:nvPr/>
-        </p:nvSpPr>
-        <p:spPr>
-          <a:xfrm>
-            <a:off x="9526514" y="6384887"/>
-            <a:ext cx="3065263" cy="215444"/>
-          </a:xfrm>
-          <a:prstGeom prst="rect">
-            <a:avLst/>
-          </a:prstGeom>
-          <a:noFill/>
-        </p:spPr>
-        <p:txBody>
-          <a:bodyPr wrap="none" rtlCol="0">
-            <a:spAutoFit/>
-          </a:bodyPr>
-          <a:lstStyle/>
-          <a:p>
-            <a:r>
-              <a:rPr lang="en-US" sz="800" noProof="1">
-                <a:solidFill>
-                  <a:srgbClr val="FF0000"/>
-                </a:solidFill>
-              </a:rPr>
-              <a:t>Resolve all calls pragma-merge or external diff tool) one file at a time</a:t>
-            </a:r>
-          </a:p>
-        </p:txBody>
-      </p:sp>
-      <p:sp>
-        <p:nvSpPr>
-          <p:cNvPr id="83" name="textruta 82">
-            <a:extLst>
-              <a:ext uri="{FF2B5EF4-FFF2-40B4-BE49-F238E27FC236}">
-                <a16:creationId xmlns:a16="http://schemas.microsoft.com/office/drawing/2014/main" id="{BE998503-4708-F646-A62B-994555D78A21}"/>
-              </a:ext>
-            </a:extLst>
-          </p:cNvPr>
-          <p:cNvSpPr txBox="1"/>
-          <p:nvPr/>
-        </p:nvSpPr>
-        <p:spPr>
-          <a:xfrm>
-            <a:off x="10175277" y="3367036"/>
-            <a:ext cx="2202847" cy="215444"/>
-          </a:xfrm>
-          <a:prstGeom prst="rect">
-            <a:avLst/>
-          </a:prstGeom>
-          <a:noFill/>
-        </p:spPr>
-        <p:txBody>
-          <a:bodyPr wrap="none" rtlCol="0">
-            <a:spAutoFit/>
-          </a:bodyPr>
-          <a:lstStyle/>
-          <a:p>
-            <a:r>
-              <a:rPr lang="en-US" sz="800" noProof="1">
-                <a:solidFill>
-                  <a:srgbClr val="FF0000"/>
-                </a:solidFill>
-              </a:rPr>
-              <a:t>external / internal diff/merge tools defined here</a:t>
             </a:r>
           </a:p>
         </p:txBody>
@@ -7079,7 +7203,7 @@
           <p:cNvPr id="4" name="textruta 3">
             <a:extLst>
               <a:ext uri="{FF2B5EF4-FFF2-40B4-BE49-F238E27FC236}">
-                <a16:creationId xmlns:a16="http://schemas.microsoft.com/office/drawing/2014/main" id="{8B784B0E-8C78-2B47-8EE8-76C10C231606}"/>
+                <a16:creationId xmlns:a16="http://schemas.microsoft.com/office/drawing/2014/main" id="{4AD88DAB-01A9-A441-A11C-9B4000367464}"/>
               </a:ext>
             </a:extLst>
           </p:cNvPr>
@@ -7089,7 +7213,7 @@
         <p:spPr>
           <a:xfrm>
             <a:off x="124203" y="60782"/>
-            <a:ext cx="5257530" cy="461665"/>
+            <a:ext cx="1099660" cy="461665"/>
           </a:xfrm>
           <a:prstGeom prst="rect">
             <a:avLst/>
@@ -7104,7 +7228,7 @@
           <a:p>
             <a:r>
               <a:rPr lang="en-US" sz="2400" b="1" noProof="1"/>
-              <a:t>Pragma-merge (built-in diff/merge tool)</a:t>
+              <a:t>History</a:t>
             </a:r>
           </a:p>
         </p:txBody>
@@ -7114,7 +7238,7 @@
           <p:cNvPr id="5" name="Rektangel 4">
             <a:extLst>
               <a:ext uri="{FF2B5EF4-FFF2-40B4-BE49-F238E27FC236}">
-                <a16:creationId xmlns:a16="http://schemas.microsoft.com/office/drawing/2014/main" id="{F5E5BBA8-F6BB-244F-B228-74B12DFCAC00}"/>
+                <a16:creationId xmlns:a16="http://schemas.microsoft.com/office/drawing/2014/main" id="{6298B066-77DC-F744-A641-81AB722329F0}"/>
               </a:ext>
             </a:extLst>
           </p:cNvPr>
@@ -7123,8 +7247,8 @@
         </p:nvSpPr>
         <p:spPr>
           <a:xfrm>
-            <a:off x="450135" y="1150452"/>
-            <a:ext cx="5396401" cy="4647426"/>
+            <a:off x="489494" y="786468"/>
+            <a:ext cx="3372291" cy="4031873"/>
           </a:xfrm>
           <a:prstGeom prst="rect">
             <a:avLst/>
@@ -7146,6 +7270,399 @@
           <a:p>
             <a:r>
               <a:rPr lang="en-US" sz="800" b="1" noProof="1"/>
+              <a:t>History is browsed with arrow buttons</a:t>
+            </a:r>
+          </a:p>
+          <a:p>
+            <a:endParaRPr lang="en-US" sz="800" noProof="1"/>
+          </a:p>
+          <a:p>
+            <a:pPr marL="171450" indent="-171450">
+              <a:buFont typeface="Courier New" panose="02070309020205020404" pitchFamily="49" charset="0"/>
+              <a:buChar char="o"/>
+            </a:pPr>
+            <a:r>
+              <a:rPr lang="en-US" sz="800" noProof="1"/>
+              <a:t>History signaled by getMode() == “HISTORY”</a:t>
+            </a:r>
+          </a:p>
+          <a:p>
+            <a:pPr marL="171450" indent="-171450">
+              <a:buFont typeface="Courier New" panose="02070309020205020404" pitchFamily="49" charset="0"/>
+              <a:buChar char="o"/>
+            </a:pPr>
+            <a:r>
+              <a:rPr lang="en-US" sz="800" noProof="1"/>
+              <a:t>History list can be shorted by Search</a:t>
+            </a:r>
+          </a:p>
+          <a:p>
+            <a:pPr marL="171450" indent="-171450">
+              <a:buFont typeface="Courier New" panose="02070309020205020404" pitchFamily="49" charset="0"/>
+              <a:buChar char="o"/>
+            </a:pPr>
+            <a:r>
+              <a:rPr lang="en-US" sz="800" noProof="1"/>
+              <a:t>History is compared with previous commit</a:t>
+            </a:r>
+          </a:p>
+          <a:p>
+            <a:pPr marL="171450" indent="-171450">
+              <a:buFont typeface="Courier New" panose="02070309020205020404" pitchFamily="49" charset="0"/>
+              <a:buChar char="o"/>
+            </a:pPr>
+            <a:r>
+              <a:rPr lang="en-US" sz="800" noProof="1"/>
+              <a:t>History can compare with “pinned” commit (=fixed commit)</a:t>
+            </a:r>
+          </a:p>
+          <a:p>
+            <a:pPr marL="324000" lvl="1" indent="-171450">
+              <a:buFont typeface="Arial" panose="020B0604020202020204" pitchFamily="34" charset="0"/>
+              <a:buChar char="•"/>
+            </a:pPr>
+            <a:endParaRPr lang="en-US" sz="800" noProof="1"/>
+          </a:p>
+          <a:p>
+            <a:pPr marL="171450" indent="-171450">
+              <a:buFont typeface="Courier New" panose="02070309020205020404" pitchFamily="49" charset="0"/>
+              <a:buChar char="o"/>
+            </a:pPr>
+            <a:r>
+              <a:rPr lang="en-US" sz="800" noProof="1">
+                <a:solidFill>
+                  <a:schemeClr val="accent1"/>
+                </a:solidFill>
+              </a:rPr>
+              <a:t>gitHistory() </a:t>
+            </a:r>
+            <a:endParaRPr lang="en-US" sz="800" noProof="1"/>
+          </a:p>
+          <a:p>
+            <a:pPr marL="324000" lvl="1" indent="-171450">
+              <a:buFont typeface="Arial" panose="020B0604020202020204" pitchFamily="34" charset="0"/>
+              <a:buChar char="•"/>
+            </a:pPr>
+            <a:r>
+              <a:rPr lang="en-US" sz="800" noProof="1"/>
+              <a:t>returns history, both with and without search</a:t>
+            </a:r>
+          </a:p>
+          <a:p>
+            <a:endParaRPr lang="en-US" sz="800" noProof="1">
+              <a:solidFill>
+                <a:schemeClr val="accent1"/>
+              </a:solidFill>
+            </a:endParaRPr>
+          </a:p>
+          <a:p>
+            <a:pPr marL="171450" indent="-171450">
+              <a:buFont typeface="Courier New" panose="02070309020205020404" pitchFamily="49" charset="0"/>
+              <a:buChar char="o"/>
+            </a:pPr>
+            <a:r>
+              <a:rPr lang="en-US" sz="800" noProof="1">
+                <a:solidFill>
+                  <a:schemeClr val="accent1"/>
+                </a:solidFill>
+              </a:rPr>
+              <a:t>localState keeps track of where you are in history</a:t>
+            </a:r>
+            <a:r>
+              <a:rPr lang="en-US" sz="800" noProof="1"/>
+              <a:t>:</a:t>
+            </a:r>
+          </a:p>
+          <a:p>
+            <a:pPr marL="324000" lvl="1" indent="-171450">
+              <a:buFont typeface="Arial" panose="020B0604020202020204" pitchFamily="34" charset="0"/>
+              <a:buChar char="•"/>
+            </a:pPr>
+            <a:r>
+              <a:rPr lang="en-US" sz="800" noProof="1"/>
+              <a:t>.historyNumber (-1 if not browsing history, index to )</a:t>
+            </a:r>
+          </a:p>
+          <a:p>
+            <a:pPr marL="324000" lvl="1" indent="-171450">
+              <a:buFont typeface="Arial" panose="020B0604020202020204" pitchFamily="34" charset="0"/>
+              <a:buChar char="•"/>
+            </a:pPr>
+            <a:r>
+              <a:rPr lang="en-US" sz="800" noProof="1"/>
+              <a:t>.historyHash (hash of commit)</a:t>
+            </a:r>
+          </a:p>
+          <a:p>
+            <a:pPr marL="324000" lvl="1" indent="-171450">
+              <a:buFont typeface="Arial" panose="020B0604020202020204" pitchFamily="34" charset="0"/>
+              <a:buChar char="•"/>
+            </a:pPr>
+            <a:r>
+              <a:rPr lang="en-US" sz="800" noProof="1"/>
+              <a:t>.historyString (descriptive text for messsage window)</a:t>
+            </a:r>
+            <a:br>
+              <a:rPr lang="en-US" sz="800" noProof="1"/>
+            </a:br>
+            <a:endParaRPr lang="en-US" sz="800" noProof="1"/>
+          </a:p>
+          <a:p>
+            <a:pPr marL="324000" lvl="1" indent="-171450">
+              <a:buFont typeface="Arial" panose="020B0604020202020204" pitchFamily="34" charset="0"/>
+              <a:buChar char="•"/>
+            </a:pPr>
+            <a:r>
+              <a:rPr lang="en-US" sz="800" noProof="1"/>
+              <a:t>.pinnedCommit=”” (means ordinary history)</a:t>
+            </a:r>
+          </a:p>
+          <a:p>
+            <a:pPr marL="324000" lvl="1" indent="-171450">
+              <a:buFont typeface="Arial" panose="020B0604020202020204" pitchFamily="34" charset="0"/>
+              <a:buChar char="•"/>
+            </a:pPr>
+            <a:r>
+              <a:rPr lang="en-US" sz="800" noProof="1"/>
+              <a:t>.pinnedCommit=hash (means pinned history)</a:t>
+            </a:r>
+            <a:br>
+              <a:rPr lang="en-US" sz="800" noProof="1"/>
+            </a:br>
+            <a:endParaRPr lang="en-US" sz="800" noProof="1"/>
+          </a:p>
+          <a:p>
+            <a:pPr marL="324000" lvl="1" indent="-171450">
+              <a:buFont typeface="Arial" panose="020B0604020202020204" pitchFamily="34" charset="0"/>
+              <a:buChar char="•"/>
+            </a:pPr>
+            <a:r>
+              <a:rPr lang="en-US" sz="800" noProof="1"/>
+              <a:t>.history_status_data (</a:t>
+            </a:r>
+            <a:r>
+              <a:rPr lang="en-US" sz="800" noProof="1">
+                <a:solidFill>
+                  <a:schemeClr val="accent1"/>
+                </a:solidFill>
+              </a:rPr>
+              <a:t>gitShowHistorical </a:t>
+            </a:r>
+            <a:r>
+              <a:rPr lang="en-US" sz="800" noProof="1"/>
+              <a:t>communicates with </a:t>
+            </a:r>
+            <a:r>
+              <a:rPr lang="en-US" sz="800" noProof="1">
+                <a:solidFill>
+                  <a:schemeClr val="accent1"/>
+                </a:solidFill>
+              </a:rPr>
+              <a:t>listChanged.js </a:t>
+            </a:r>
+            <a:r>
+              <a:rPr lang="en-US" sz="800" noProof="1"/>
+              <a:t>via this variable, which contains correct status regardless of history or pinned history modes)</a:t>
+            </a:r>
+          </a:p>
+          <a:p>
+            <a:pPr marL="152550" lvl="1"/>
+            <a:endParaRPr lang="en-US" sz="800" noProof="1"/>
+          </a:p>
+          <a:p>
+            <a:pPr marL="171450" indent="-171450">
+              <a:buFont typeface="Courier New" panose="02070309020205020404" pitchFamily="49" charset="0"/>
+              <a:buChar char="o"/>
+            </a:pPr>
+            <a:r>
+              <a:rPr lang="en-US" sz="800" noProof="1">
+                <a:solidFill>
+                  <a:schemeClr val="accent1"/>
+                </a:solidFill>
+              </a:rPr>
+              <a:t>gitShowHistorical(commit) </a:t>
+            </a:r>
+            <a:endParaRPr lang="en-US" sz="800" noProof="1"/>
+          </a:p>
+          <a:p>
+            <a:pPr marL="324000" lvl="1" indent="-171450">
+              <a:buFont typeface="Arial" panose="020B0604020202020204" pitchFamily="34" charset="0"/>
+              <a:buChar char="•"/>
+            </a:pPr>
+            <a:r>
+              <a:rPr lang="en-US" sz="800" noProof="1"/>
+              <a:t>returns status_data with changed file info</a:t>
+            </a:r>
+          </a:p>
+          <a:p>
+            <a:pPr marL="324000" lvl="1" indent="-171450">
+              <a:buFont typeface="Arial" panose="020B0604020202020204" pitchFamily="34" charset="0"/>
+              <a:buChar char="•"/>
+            </a:pPr>
+            <a:r>
+              <a:rPr lang="en-US" sz="800" noProof="1"/>
+              <a:t>if pinned, the status_data is relative pinned</a:t>
+            </a:r>
+          </a:p>
+          <a:p>
+            <a:pPr marL="324000" lvl="1" indent="-171450">
+              <a:buFont typeface="Arial" panose="020B0604020202020204" pitchFamily="34" charset="0"/>
+              <a:buChar char="•"/>
+            </a:pPr>
+            <a:r>
+              <a:rPr lang="en-US" sz="800" noProof="1"/>
+              <a:t>The status_data will always be comparison between newest and oldest of the two commits (showing change going forward in time)</a:t>
+            </a:r>
+          </a:p>
+          <a:p>
+            <a:pPr marL="324000" lvl="1" indent="-171450">
+              <a:buFont typeface="Arial" panose="020B0604020202020204" pitchFamily="34" charset="0"/>
+              <a:buChar char="•"/>
+            </a:pPr>
+            <a:r>
+              <a:rPr lang="en-US" sz="800" noProof="1"/>
+              <a:t>if not-pinned, status_data is relative previous commit</a:t>
+            </a:r>
+          </a:p>
+          <a:p>
+            <a:pPr marL="324000" lvl="1" indent="-171450">
+              <a:buFont typeface="Arial" panose="020B0604020202020204" pitchFamily="34" charset="0"/>
+              <a:buChar char="•"/>
+            </a:pPr>
+            <a:r>
+              <a:rPr lang="en-US" sz="800" noProof="1"/>
+              <a:t>localState.history_status_data</a:t>
+            </a:r>
+          </a:p>
+          <a:p>
+            <a:pPr marL="171450" indent="-171450">
+              <a:buFont typeface="Courier New" panose="02070309020205020404" pitchFamily="49" charset="0"/>
+              <a:buChar char="o"/>
+            </a:pPr>
+            <a:endParaRPr lang="en-US" sz="800" noProof="1">
+              <a:solidFill>
+                <a:schemeClr val="accent1"/>
+              </a:solidFill>
+            </a:endParaRPr>
+          </a:p>
+          <a:p>
+            <a:pPr marL="324000" lvl="1" indent="-171450">
+              <a:buFont typeface="Arial" panose="020B0604020202020204" pitchFamily="34" charset="0"/>
+              <a:buChar char="•"/>
+            </a:pPr>
+            <a:endParaRPr lang="en-US" sz="800" noProof="1"/>
+          </a:p>
+          <a:p>
+            <a:pPr marL="324000" lvl="1" indent="-171450">
+              <a:buFont typeface="Arial" panose="020B0604020202020204" pitchFamily="34" charset="0"/>
+              <a:buChar char="•"/>
+            </a:pPr>
+            <a:endParaRPr lang="en-US" sz="800" noProof="1"/>
+          </a:p>
+        </p:txBody>
+      </p:sp>
+    </p:spTree>
+    <p:extLst>
+      <p:ext uri="{BB962C8B-B14F-4D97-AF65-F5344CB8AC3E}">
+        <p14:creationId xmlns:p14="http://schemas.microsoft.com/office/powerpoint/2010/main" val="748310116"/>
+      </p:ext>
+    </p:extLst>
+  </p:cSld>
+  <p:clrMapOvr>
+    <a:masterClrMapping/>
+  </p:clrMapOvr>
+</p:sld>
+</file>
+
+<file path=ppt/slides/slide3.xml><?xml version="1.0" encoding="utf-8"?>
+<p:sld xmlns:a="http://schemas.openxmlformats.org/drawingml/2006/main" xmlns:r="http://schemas.openxmlformats.org/officeDocument/2006/relationships" xmlns:p="http://schemas.openxmlformats.org/presentationml/2006/main">
+  <p:cSld>
+    <p:spTree>
+      <p:nvGrpSpPr>
+        <p:cNvPr id="1" name=""/>
+        <p:cNvGrpSpPr/>
+        <p:nvPr/>
+      </p:nvGrpSpPr>
+      <p:grpSpPr>
+        <a:xfrm>
+          <a:off x="0" y="0"/>
+          <a:ext cx="0" cy="0"/>
+          <a:chOff x="0" y="0"/>
+          <a:chExt cx="0" cy="0"/>
+        </a:xfrm>
+      </p:grpSpPr>
+      <p:sp>
+        <p:nvSpPr>
+          <p:cNvPr id="4" name="textruta 3">
+            <a:extLst>
+              <a:ext uri="{FF2B5EF4-FFF2-40B4-BE49-F238E27FC236}">
+                <a16:creationId xmlns:a16="http://schemas.microsoft.com/office/drawing/2014/main" id="{8B784B0E-8C78-2B47-8EE8-76C10C231606}"/>
+              </a:ext>
+            </a:extLst>
+          </p:cNvPr>
+          <p:cNvSpPr txBox="1"/>
+          <p:nvPr/>
+        </p:nvSpPr>
+        <p:spPr>
+          <a:xfrm>
+            <a:off x="124203" y="60782"/>
+            <a:ext cx="5257530" cy="461665"/>
+          </a:xfrm>
+          <a:prstGeom prst="rect">
+            <a:avLst/>
+          </a:prstGeom>
+          <a:noFill/>
+        </p:spPr>
+        <p:txBody>
+          <a:bodyPr wrap="none" rtlCol="0">
+            <a:spAutoFit/>
+          </a:bodyPr>
+          <a:lstStyle/>
+          <a:p>
+            <a:r>
+              <a:rPr lang="en-US" sz="2400" b="1" noProof="1"/>
+              <a:t>Pragma-merge (built-in diff/merge tool)</a:t>
+            </a:r>
+          </a:p>
+        </p:txBody>
+      </p:sp>
+      <p:sp>
+        <p:nvSpPr>
+          <p:cNvPr id="5" name="Rektangel 4">
+            <a:extLst>
+              <a:ext uri="{FF2B5EF4-FFF2-40B4-BE49-F238E27FC236}">
+                <a16:creationId xmlns:a16="http://schemas.microsoft.com/office/drawing/2014/main" id="{F5E5BBA8-F6BB-244F-B228-74B12DFCAC00}"/>
+              </a:ext>
+            </a:extLst>
+          </p:cNvPr>
+          <p:cNvSpPr/>
+          <p:nvPr/>
+        </p:nvSpPr>
+        <p:spPr>
+          <a:xfrm>
+            <a:off x="450135" y="1150452"/>
+            <a:ext cx="5396401" cy="4647426"/>
+          </a:xfrm>
+          <a:prstGeom prst="rect">
+            <a:avLst/>
+          </a:prstGeom>
+          <a:solidFill>
+            <a:schemeClr val="bg1"/>
+          </a:solidFill>
+          <a:ln>
+            <a:solidFill>
+              <a:schemeClr val="accent1"/>
+            </a:solidFill>
+          </a:ln>
+        </p:spPr>
+        <p:txBody>
+          <a:bodyPr wrap="square">
+            <a:spAutoFit/>
+          </a:bodyPr>
+          <a:lstStyle/>
+          <a:p>
+            <a:r>
+              <a:rPr lang="en-US" sz="800" b="1" noProof="1"/>
               <a:t>How it works </a:t>
             </a:r>
           </a:p>
@@ -7466,7 +7983,14 @@
             </a:pPr>
             <a:r>
               <a:rPr lang="en-US" sz="800" noProof="1"/>
-              <a:t>reads exit code from file ‘exit’, removes file ‘exit’, and returns the exit code</a:t>
+              <a:t>reads exit code from file ‘exit’, removes file ‘exit’, and returns the exit code </a:t>
+            </a:r>
+            <a:br>
+              <a:rPr lang="en-US" sz="800" noProof="1"/>
+            </a:br>
+            <a:r>
+              <a:rPr lang="en-US" sz="800" noProof="1"/>
+              <a:t>(=&gt; git, which started this script gets the exit code)</a:t>
             </a:r>
           </a:p>
           <a:p>

</xml_diff>

<commit_message>
Put localState.reverseOrder within status_data
- thus avoid sharing of variable between "app.js" and "listChanged.js"
</commit_message>
<xml_diff>
--- a/docs/Tech-overview.pptx
+++ b/docs/Tech-overview.pptx
@@ -257,7 +257,7 @@
           <a:p>
             <a:fld id="{CA855E1B-8830-B64E-B102-DB2BBD0D9567}" type="datetimeFigureOut">
               <a:rPr lang="sv-SE" smtClean="0"/>
-              <a:t>2020-10-16</a:t>
+              <a:t>2020-10-20</a:t>
             </a:fld>
             <a:endParaRPr lang="sv-SE"/>
           </a:p>
@@ -427,7 +427,7 @@
           <a:p>
             <a:fld id="{CA855E1B-8830-B64E-B102-DB2BBD0D9567}" type="datetimeFigureOut">
               <a:rPr lang="sv-SE" smtClean="0"/>
-              <a:t>2020-10-16</a:t>
+              <a:t>2020-10-20</a:t>
             </a:fld>
             <a:endParaRPr lang="sv-SE"/>
           </a:p>
@@ -607,7 +607,7 @@
           <a:p>
             <a:fld id="{CA855E1B-8830-B64E-B102-DB2BBD0D9567}" type="datetimeFigureOut">
               <a:rPr lang="sv-SE" smtClean="0"/>
-              <a:t>2020-10-16</a:t>
+              <a:t>2020-10-20</a:t>
             </a:fld>
             <a:endParaRPr lang="sv-SE"/>
           </a:p>
@@ -777,7 +777,7 @@
           <a:p>
             <a:fld id="{CA855E1B-8830-B64E-B102-DB2BBD0D9567}" type="datetimeFigureOut">
               <a:rPr lang="sv-SE" smtClean="0"/>
-              <a:t>2020-10-16</a:t>
+              <a:t>2020-10-20</a:t>
             </a:fld>
             <a:endParaRPr lang="sv-SE"/>
           </a:p>
@@ -1021,7 +1021,7 @@
           <a:p>
             <a:fld id="{CA855E1B-8830-B64E-B102-DB2BBD0D9567}" type="datetimeFigureOut">
               <a:rPr lang="sv-SE" smtClean="0"/>
-              <a:t>2020-10-16</a:t>
+              <a:t>2020-10-20</a:t>
             </a:fld>
             <a:endParaRPr lang="sv-SE"/>
           </a:p>
@@ -1253,7 +1253,7 @@
           <a:p>
             <a:fld id="{CA855E1B-8830-B64E-B102-DB2BBD0D9567}" type="datetimeFigureOut">
               <a:rPr lang="sv-SE" smtClean="0"/>
-              <a:t>2020-10-16</a:t>
+              <a:t>2020-10-20</a:t>
             </a:fld>
             <a:endParaRPr lang="sv-SE"/>
           </a:p>
@@ -1620,7 +1620,7 @@
           <a:p>
             <a:fld id="{CA855E1B-8830-B64E-B102-DB2BBD0D9567}" type="datetimeFigureOut">
               <a:rPr lang="sv-SE" smtClean="0"/>
-              <a:t>2020-10-16</a:t>
+              <a:t>2020-10-20</a:t>
             </a:fld>
             <a:endParaRPr lang="sv-SE"/>
           </a:p>
@@ -1738,7 +1738,7 @@
           <a:p>
             <a:fld id="{CA855E1B-8830-B64E-B102-DB2BBD0D9567}" type="datetimeFigureOut">
               <a:rPr lang="sv-SE" smtClean="0"/>
-              <a:t>2020-10-16</a:t>
+              <a:t>2020-10-20</a:t>
             </a:fld>
             <a:endParaRPr lang="sv-SE"/>
           </a:p>
@@ -1833,7 +1833,7 @@
           <a:p>
             <a:fld id="{CA855E1B-8830-B64E-B102-DB2BBD0D9567}" type="datetimeFigureOut">
               <a:rPr lang="sv-SE" smtClean="0"/>
-              <a:t>2020-10-16</a:t>
+              <a:t>2020-10-20</a:t>
             </a:fld>
             <a:endParaRPr lang="sv-SE"/>
           </a:p>
@@ -2110,7 +2110,7 @@
           <a:p>
             <a:fld id="{CA855E1B-8830-B64E-B102-DB2BBD0D9567}" type="datetimeFigureOut">
               <a:rPr lang="sv-SE" smtClean="0"/>
-              <a:t>2020-10-16</a:t>
+              <a:t>2020-10-20</a:t>
             </a:fld>
             <a:endParaRPr lang="sv-SE"/>
           </a:p>
@@ -2367,7 +2367,7 @@
           <a:p>
             <a:fld id="{CA855E1B-8830-B64E-B102-DB2BBD0D9567}" type="datetimeFigureOut">
               <a:rPr lang="sv-SE" smtClean="0"/>
-              <a:t>2020-10-16</a:t>
+              <a:t>2020-10-20</a:t>
             </a:fld>
             <a:endParaRPr lang="sv-SE"/>
           </a:p>
@@ -2580,7 +2580,7 @@
           <a:p>
             <a:fld id="{CA855E1B-8830-B64E-B102-DB2BBD0D9567}" type="datetimeFigureOut">
               <a:rPr lang="sv-SE" smtClean="0"/>
-              <a:t>2020-10-16</a:t>
+              <a:t>2020-10-20</a:t>
             </a:fld>
             <a:endParaRPr lang="sv-SE"/>
           </a:p>
@@ -7248,7 +7248,7 @@
         <p:spPr>
           <a:xfrm>
             <a:off x="489494" y="786468"/>
-            <a:ext cx="3372291" cy="4031873"/>
+            <a:ext cx="3372291" cy="3662541"/>
           </a:xfrm>
           <a:prstGeom prst="rect">
             <a:avLst/>
@@ -7440,37 +7440,6 @@
               <a:buFont typeface="Arial" panose="020B0604020202020204" pitchFamily="34" charset="0"/>
               <a:buChar char="•"/>
             </a:pPr>
-            <a:r>
-              <a:rPr lang="en-US" sz="800" noProof="1"/>
-              <a:t>.history_status_data (</a:t>
-            </a:r>
-            <a:r>
-              <a:rPr lang="en-US" sz="800" noProof="1">
-                <a:solidFill>
-                  <a:schemeClr val="accent1"/>
-                </a:solidFill>
-              </a:rPr>
-              <a:t>gitShowHistorical </a:t>
-            </a:r>
-            <a:r>
-              <a:rPr lang="en-US" sz="800" noProof="1"/>
-              <a:t>communicates with </a:t>
-            </a:r>
-            <a:r>
-              <a:rPr lang="en-US" sz="800" noProof="1">
-                <a:solidFill>
-                  <a:schemeClr val="accent1"/>
-                </a:solidFill>
-              </a:rPr>
-              <a:t>listChanged.js </a:t>
-            </a:r>
-            <a:r>
-              <a:rPr lang="en-US" sz="800" noProof="1"/>
-              <a:t>via this variable, which contains correct status regardless of history or pinned history modes)</a:t>
-            </a:r>
-          </a:p>
-          <a:p>
-            <a:pPr marL="152550" lvl="1"/>
             <a:endParaRPr lang="en-US" sz="800" noProof="1"/>
           </a:p>
           <a:p>
@@ -7537,6 +7506,198 @@
               <a:rPr lang="en-US" sz="800" noProof="1"/>
               <a:t>localState.history_status_data</a:t>
             </a:r>
+          </a:p>
+          <a:p>
+            <a:pPr marL="171450" indent="-171450">
+              <a:buFont typeface="Courier New" panose="02070309020205020404" pitchFamily="49" charset="0"/>
+              <a:buChar char="o"/>
+            </a:pPr>
+            <a:endParaRPr lang="en-US" sz="800" noProof="1">
+              <a:solidFill>
+                <a:schemeClr val="accent1"/>
+              </a:solidFill>
+            </a:endParaRPr>
+          </a:p>
+          <a:p>
+            <a:pPr marL="324000" lvl="1" indent="-171450">
+              <a:buFont typeface="Arial" panose="020B0604020202020204" pitchFamily="34" charset="0"/>
+              <a:buChar char="•"/>
+            </a:pPr>
+            <a:endParaRPr lang="en-US" sz="800" noProof="1"/>
+          </a:p>
+          <a:p>
+            <a:pPr marL="324000" lvl="1" indent="-171450">
+              <a:buFont typeface="Arial" panose="020B0604020202020204" pitchFamily="34" charset="0"/>
+              <a:buChar char="•"/>
+            </a:pPr>
+            <a:endParaRPr lang="en-US" sz="800" noProof="1"/>
+          </a:p>
+        </p:txBody>
+      </p:sp>
+      <p:sp>
+        <p:nvSpPr>
+          <p:cNvPr id="6" name="textruta 5">
+            <a:extLst>
+              <a:ext uri="{FF2B5EF4-FFF2-40B4-BE49-F238E27FC236}">
+                <a16:creationId xmlns:a16="http://schemas.microsoft.com/office/drawing/2014/main" id="{CB0A7310-007B-034F-888B-3E729DF011D6}"/>
+              </a:ext>
+            </a:extLst>
+          </p:cNvPr>
+          <p:cNvSpPr txBox="1"/>
+          <p:nvPr/>
+        </p:nvSpPr>
+        <p:spPr>
+          <a:xfrm>
+            <a:off x="5779628" y="60782"/>
+            <a:ext cx="1679434" cy="461665"/>
+          </a:xfrm>
+          <a:prstGeom prst="rect">
+            <a:avLst/>
+          </a:prstGeom>
+          <a:noFill/>
+        </p:spPr>
+        <p:txBody>
+          <a:bodyPr wrap="none" rtlCol="0">
+            <a:spAutoFit/>
+          </a:bodyPr>
+          <a:lstStyle/>
+          <a:p>
+            <a:r>
+              <a:rPr lang="en-US" sz="2400" b="1" noProof="1"/>
+              <a:t>status_data</a:t>
+            </a:r>
+          </a:p>
+        </p:txBody>
+      </p:sp>
+      <p:sp>
+        <p:nvSpPr>
+          <p:cNvPr id="7" name="Rektangel 6">
+            <a:extLst>
+              <a:ext uri="{FF2B5EF4-FFF2-40B4-BE49-F238E27FC236}">
+                <a16:creationId xmlns:a16="http://schemas.microsoft.com/office/drawing/2014/main" id="{3244EB7A-6EC2-884B-A6CA-58A938EBF5D3}"/>
+              </a:ext>
+            </a:extLst>
+          </p:cNvPr>
+          <p:cNvSpPr/>
+          <p:nvPr/>
+        </p:nvSpPr>
+        <p:spPr>
+          <a:xfrm>
+            <a:off x="5155705" y="786468"/>
+            <a:ext cx="3372291" cy="2062103"/>
+          </a:xfrm>
+          <a:prstGeom prst="rect">
+            <a:avLst/>
+          </a:prstGeom>
+          <a:solidFill>
+            <a:schemeClr val="bg1"/>
+          </a:solidFill>
+          <a:ln>
+            <a:solidFill>
+              <a:schemeClr val="accent1"/>
+            </a:solidFill>
+          </a:ln>
+        </p:spPr>
+        <p:txBody>
+          <a:bodyPr wrap="square">
+            <a:spAutoFit/>
+          </a:bodyPr>
+          <a:lstStyle/>
+          <a:p>
+            <a:r>
+              <a:rPr lang="en-US" sz="800" b="1" noProof="1"/>
+              <a:t>status_data from Simple-git</a:t>
+            </a:r>
+          </a:p>
+          <a:p>
+            <a:endParaRPr lang="en-US" sz="800" noProof="1">
+              <a:solidFill>
+                <a:schemeClr val="accent1"/>
+              </a:solidFill>
+            </a:endParaRPr>
+          </a:p>
+          <a:p>
+            <a:r>
+              <a:rPr lang="en-US" sz="800" noProof="1">
+                <a:solidFill>
+                  <a:schemeClr val="accent1"/>
+                </a:solidFill>
+              </a:rPr>
+              <a:t>Standard fields from  gitStatus</a:t>
+            </a:r>
+            <a:endParaRPr lang="en-US" sz="800" noProof="1"/>
+          </a:p>
+          <a:p>
+            <a:pPr marL="171450" indent="-171450">
+              <a:buFont typeface="Courier New" panose="02070309020205020404" pitchFamily="49" charset="0"/>
+              <a:buChar char="o"/>
+            </a:pPr>
+            <a:r>
+              <a:rPr lang="en-US" sz="800" noProof="1"/>
+              <a:t>showing change, add, delete, rename etc </a:t>
+            </a:r>
+          </a:p>
+          <a:p>
+            <a:endParaRPr lang="en-US" sz="800" noProof="1">
+              <a:solidFill>
+                <a:schemeClr val="accent1"/>
+              </a:solidFill>
+            </a:endParaRPr>
+          </a:p>
+          <a:p>
+            <a:r>
+              <a:rPr lang="en-US" sz="800" noProof="1">
+                <a:solidFill>
+                  <a:schemeClr val="accent1"/>
+                </a:solidFill>
+              </a:rPr>
+              <a:t>Some fields are emulated gitShowHistorical</a:t>
+            </a:r>
+            <a:endParaRPr lang="en-US" sz="800" noProof="1"/>
+          </a:p>
+          <a:p>
+            <a:pPr marL="171450" indent="-171450">
+              <a:buFont typeface="Courier New" panose="02070309020205020404" pitchFamily="49" charset="0"/>
+              <a:buChar char="o"/>
+            </a:pPr>
+            <a:r>
+              <a:rPr lang="en-US" sz="800" noProof="1"/>
+              <a:t>additionally, the order of the commmits may be reversed when pinnedCommit is compared to current commit. This is stored in status_data. :</a:t>
+            </a:r>
+          </a:p>
+          <a:p>
+            <a:pPr marL="324000" lvl="1" indent="-171450">
+              <a:buFont typeface="Arial" panose="020B0604020202020204" pitchFamily="34" charset="0"/>
+              <a:buChar char="•"/>
+            </a:pPr>
+            <a:r>
+              <a:rPr lang="en-US" sz="800" noProof="1"/>
+              <a:t>.reversedOrder  = false;   if commit1 is earlier than commit2</a:t>
+            </a:r>
+          </a:p>
+          <a:p>
+            <a:pPr marL="324000" lvl="1" indent="-171450">
+              <a:buFont typeface="Arial" panose="020B0604020202020204" pitchFamily="34" charset="0"/>
+              <a:buChar char="•"/>
+            </a:pPr>
+            <a:r>
+              <a:rPr lang="en-US" sz="800" noProof="1"/>
+              <a:t>.reversedOrder  = true;   if commit1 is later than commit2</a:t>
+            </a:r>
+          </a:p>
+          <a:p>
+            <a:pPr marL="171450" indent="-171450">
+              <a:buFont typeface="Courier New" panose="02070309020205020404" pitchFamily="49" charset="0"/>
+              <a:buChar char="o"/>
+            </a:pPr>
+            <a:endParaRPr lang="en-US" sz="800" noProof="1"/>
+          </a:p>
+          <a:p>
+            <a:pPr marL="171450" indent="-171450">
+              <a:buFont typeface="Courier New" panose="02070309020205020404" pitchFamily="49" charset="0"/>
+              <a:buChar char="o"/>
+            </a:pPr>
+            <a:endParaRPr lang="en-US" sz="800" noProof="1"/>
           </a:p>
           <a:p>
             <a:pPr marL="171450" indent="-171450">

</xml_diff>

<commit_message>
Document remote branches & delete some removed code
</commit_message>
<xml_diff>
--- a/docs/Tech-overview.pptx
+++ b/docs/Tech-overview.pptx
@@ -258,7 +258,7 @@
           <a:p>
             <a:fld id="{CA855E1B-8830-B64E-B102-DB2BBD0D9567}" type="datetimeFigureOut">
               <a:rPr lang="sv-SE" smtClean="0"/>
-              <a:t>2020-11-24</a:t>
+              <a:t>2020-12-07</a:t>
             </a:fld>
             <a:endParaRPr lang="sv-SE"/>
           </a:p>
@@ -428,7 +428,7 @@
           <a:p>
             <a:fld id="{CA855E1B-8830-B64E-B102-DB2BBD0D9567}" type="datetimeFigureOut">
               <a:rPr lang="sv-SE" smtClean="0"/>
-              <a:t>2020-11-24</a:t>
+              <a:t>2020-12-07</a:t>
             </a:fld>
             <a:endParaRPr lang="sv-SE"/>
           </a:p>
@@ -608,7 +608,7 @@
           <a:p>
             <a:fld id="{CA855E1B-8830-B64E-B102-DB2BBD0D9567}" type="datetimeFigureOut">
               <a:rPr lang="sv-SE" smtClean="0"/>
-              <a:t>2020-11-24</a:t>
+              <a:t>2020-12-07</a:t>
             </a:fld>
             <a:endParaRPr lang="sv-SE"/>
           </a:p>
@@ -778,7 +778,7 @@
           <a:p>
             <a:fld id="{CA855E1B-8830-B64E-B102-DB2BBD0D9567}" type="datetimeFigureOut">
               <a:rPr lang="sv-SE" smtClean="0"/>
-              <a:t>2020-11-24</a:t>
+              <a:t>2020-12-07</a:t>
             </a:fld>
             <a:endParaRPr lang="sv-SE"/>
           </a:p>
@@ -1022,7 +1022,7 @@
           <a:p>
             <a:fld id="{CA855E1B-8830-B64E-B102-DB2BBD0D9567}" type="datetimeFigureOut">
               <a:rPr lang="sv-SE" smtClean="0"/>
-              <a:t>2020-11-24</a:t>
+              <a:t>2020-12-07</a:t>
             </a:fld>
             <a:endParaRPr lang="sv-SE"/>
           </a:p>
@@ -1254,7 +1254,7 @@
           <a:p>
             <a:fld id="{CA855E1B-8830-B64E-B102-DB2BBD0D9567}" type="datetimeFigureOut">
               <a:rPr lang="sv-SE" smtClean="0"/>
-              <a:t>2020-11-24</a:t>
+              <a:t>2020-12-07</a:t>
             </a:fld>
             <a:endParaRPr lang="sv-SE"/>
           </a:p>
@@ -1621,7 +1621,7 @@
           <a:p>
             <a:fld id="{CA855E1B-8830-B64E-B102-DB2BBD0D9567}" type="datetimeFigureOut">
               <a:rPr lang="sv-SE" smtClean="0"/>
-              <a:t>2020-11-24</a:t>
+              <a:t>2020-12-07</a:t>
             </a:fld>
             <a:endParaRPr lang="sv-SE"/>
           </a:p>
@@ -1739,7 +1739,7 @@
           <a:p>
             <a:fld id="{CA855E1B-8830-B64E-B102-DB2BBD0D9567}" type="datetimeFigureOut">
               <a:rPr lang="sv-SE" smtClean="0"/>
-              <a:t>2020-11-24</a:t>
+              <a:t>2020-12-07</a:t>
             </a:fld>
             <a:endParaRPr lang="sv-SE"/>
           </a:p>
@@ -1834,7 +1834,7 @@
           <a:p>
             <a:fld id="{CA855E1B-8830-B64E-B102-DB2BBD0D9567}" type="datetimeFigureOut">
               <a:rPr lang="sv-SE" smtClean="0"/>
-              <a:t>2020-11-24</a:t>
+              <a:t>2020-12-07</a:t>
             </a:fld>
             <a:endParaRPr lang="sv-SE"/>
           </a:p>
@@ -2111,7 +2111,7 @@
           <a:p>
             <a:fld id="{CA855E1B-8830-B64E-B102-DB2BBD0D9567}" type="datetimeFigureOut">
               <a:rPr lang="sv-SE" smtClean="0"/>
-              <a:t>2020-11-24</a:t>
+              <a:t>2020-12-07</a:t>
             </a:fld>
             <a:endParaRPr lang="sv-SE"/>
           </a:p>
@@ -2368,7 +2368,7 @@
           <a:p>
             <a:fld id="{CA855E1B-8830-B64E-B102-DB2BBD0D9567}" type="datetimeFigureOut">
               <a:rPr lang="sv-SE" smtClean="0"/>
-              <a:t>2020-11-24</a:t>
+              <a:t>2020-12-07</a:t>
             </a:fld>
             <a:endParaRPr lang="sv-SE"/>
           </a:p>
@@ -2581,7 +2581,7 @@
           <a:p>
             <a:fld id="{CA855E1B-8830-B64E-B102-DB2BBD0D9567}" type="datetimeFigureOut">
               <a:rPr lang="sv-SE" smtClean="0"/>
-              <a:t>2020-11-24</a:t>
+              <a:t>2020-12-07</a:t>
             </a:fld>
             <a:endParaRPr lang="sv-SE"/>
           </a:p>
@@ -6599,7 +6599,7 @@
         <p:spPr>
           <a:xfrm>
             <a:off x="169898" y="3556301"/>
-            <a:ext cx="3274288" cy="2185214"/>
+            <a:ext cx="3274288" cy="2308324"/>
           </a:xfrm>
           <a:prstGeom prst="rect">
             <a:avLst/>
@@ -6788,6 +6788,16 @@
             <a:r>
               <a:rPr lang="en-US" sz="800" noProof="1"/>
               <a:t>selectedDiv, pinnedDiv (for graph window state)</a:t>
+            </a:r>
+          </a:p>
+          <a:p>
+            <a:pPr marL="324000" lvl="1" indent="-171450">
+              <a:buFont typeface="Arial" panose="020B0604020202020204" pitchFamily="34" charset="0"/>
+              <a:buChar char="•"/>
+            </a:pPr>
+            <a:r>
+              <a:rPr lang="en-US" sz="800" noProof="1"/>
+              <a:t>.cached (stores stuff that is costly to get – see branches list)</a:t>
             </a:r>
           </a:p>
         </p:txBody>
@@ -7453,7 +7463,7 @@
         </p:nvSpPr>
         <p:spPr>
           <a:xfrm>
-            <a:off x="138058" y="60782"/>
+            <a:off x="138058" y="170498"/>
             <a:ext cx="1099660" cy="461665"/>
           </a:xfrm>
           <a:prstGeom prst="rect">
@@ -7789,7 +7799,7 @@
         </p:nvSpPr>
         <p:spPr>
           <a:xfrm>
-            <a:off x="5779628" y="60782"/>
+            <a:off x="4884478" y="170498"/>
             <a:ext cx="1679434" cy="461665"/>
           </a:xfrm>
           <a:prstGeom prst="rect">
@@ -7824,8 +7834,8 @@
         </p:nvSpPr>
         <p:spPr>
           <a:xfrm>
-            <a:off x="5155705" y="786468"/>
-            <a:ext cx="3372291" cy="2062103"/>
+            <a:off x="4231679" y="786466"/>
+            <a:ext cx="3372291" cy="1692771"/>
           </a:xfrm>
           <a:prstGeom prst="rect">
             <a:avLst/>
@@ -7927,35 +7937,7 @@
             </a:r>
           </a:p>
           <a:p>
-            <a:pPr marL="171450" indent="-171450">
-              <a:buFont typeface="Courier New" panose="02070309020205020404" pitchFamily="49" charset="0"/>
-              <a:buChar char="o"/>
-            </a:pPr>
-            <a:endParaRPr lang="en-US" sz="800" noProof="1"/>
-          </a:p>
-          <a:p>
-            <a:pPr marL="171450" indent="-171450">
-              <a:buFont typeface="Courier New" panose="02070309020205020404" pitchFamily="49" charset="0"/>
-              <a:buChar char="o"/>
-            </a:pPr>
-            <a:endParaRPr lang="en-US" sz="800" noProof="1"/>
-          </a:p>
-          <a:p>
-            <a:pPr marL="171450" indent="-171450">
-              <a:buFont typeface="Courier New" panose="02070309020205020404" pitchFamily="49" charset="0"/>
-              <a:buChar char="o"/>
-            </a:pPr>
-            <a:endParaRPr lang="en-US" sz="800" noProof="1">
-              <a:solidFill>
-                <a:schemeClr val="accent1"/>
-              </a:solidFill>
-            </a:endParaRPr>
-          </a:p>
-          <a:p>
-            <a:pPr marL="324000" lvl="1" indent="-171450">
-              <a:buFont typeface="Arial" panose="020B0604020202020204" pitchFamily="34" charset="0"/>
-              <a:buChar char="•"/>
-            </a:pPr>
+            <a:pPr marL="152550" lvl="1"/>
             <a:endParaRPr lang="en-US" sz="800" noProof="1"/>
           </a:p>
           <a:p>
@@ -8016,7 +7998,7 @@
         </p:nvSpPr>
         <p:spPr>
           <a:xfrm>
-            <a:off x="489494" y="5438716"/>
+            <a:off x="489494" y="5265461"/>
             <a:ext cx="3372291" cy="2431435"/>
           </a:xfrm>
           <a:prstGeom prst="rect">
@@ -8212,6 +8194,321 @@
               <a:buChar char="•"/>
             </a:pPr>
             <a:endParaRPr lang="en-US" sz="800" noProof="1"/>
+          </a:p>
+        </p:txBody>
+      </p:sp>
+      <p:sp>
+        <p:nvSpPr>
+          <p:cNvPr id="10" name="Rektangel 9">
+            <a:extLst>
+              <a:ext uri="{FF2B5EF4-FFF2-40B4-BE49-F238E27FC236}">
+                <a16:creationId xmlns:a16="http://schemas.microsoft.com/office/drawing/2014/main" id="{DE22DB71-C232-1040-B545-2D5FD570EA89}"/>
+              </a:ext>
+            </a:extLst>
+          </p:cNvPr>
+          <p:cNvSpPr/>
+          <p:nvPr/>
+        </p:nvSpPr>
+        <p:spPr>
+          <a:xfrm>
+            <a:off x="8044665" y="774036"/>
+            <a:ext cx="4535554" cy="1692771"/>
+          </a:xfrm>
+          <a:prstGeom prst="rect">
+            <a:avLst/>
+          </a:prstGeom>
+          <a:solidFill>
+            <a:schemeClr val="bg1"/>
+          </a:solidFill>
+          <a:ln>
+            <a:solidFill>
+              <a:schemeClr val="accent1"/>
+            </a:solidFill>
+          </a:ln>
+        </p:spPr>
+        <p:txBody>
+          <a:bodyPr wrap="square">
+            <a:spAutoFit/>
+          </a:bodyPr>
+          <a:lstStyle/>
+          <a:p>
+            <a:r>
+              <a:rPr lang="en-US" sz="800" b="1" noProof="1"/>
+              <a:t>extending BranchSummaryResult from Simple-git</a:t>
+            </a:r>
+          </a:p>
+          <a:p>
+            <a:endParaRPr lang="en-US" sz="800" noProof="1">
+              <a:solidFill>
+                <a:schemeClr val="accent1"/>
+              </a:solidFill>
+            </a:endParaRPr>
+          </a:p>
+          <a:p>
+            <a:r>
+              <a:rPr lang="en-US" sz="800" noProof="1">
+                <a:solidFill>
+                  <a:schemeClr val="accent1"/>
+                </a:solidFill>
+              </a:rPr>
+              <a:t>Standard fields from  BranchSummaryResult</a:t>
+            </a:r>
+            <a:endParaRPr lang="en-US" sz="800" noProof="1"/>
+          </a:p>
+          <a:p>
+            <a:pPr marL="171450" indent="-171450">
+              <a:buFont typeface="Courier New" panose="02070309020205020404" pitchFamily="49" charset="0"/>
+              <a:buChar char="o"/>
+            </a:pPr>
+            <a:r>
+              <a:rPr lang="en-US" sz="800" noProof="1"/>
+              <a:t>showing change, add, delete, rename etc </a:t>
+            </a:r>
+            <a:endParaRPr lang="en-US" sz="800" b="1" noProof="1"/>
+          </a:p>
+          <a:p>
+            <a:endParaRPr lang="en-US" sz="800" noProof="1">
+              <a:solidFill>
+                <a:schemeClr val="accent1"/>
+              </a:solidFill>
+            </a:endParaRPr>
+          </a:p>
+          <a:p>
+            <a:r>
+              <a:rPr lang="en-US" sz="800" noProof="1">
+                <a:solidFill>
+                  <a:schemeClr val="accent1"/>
+                </a:solidFill>
+              </a:rPr>
+              <a:t>New fields to extended  BranchSummaryResult.branches</a:t>
+            </a:r>
+            <a:endParaRPr lang="en-US" sz="800" noProof="1"/>
+          </a:p>
+          <a:p>
+            <a:pPr marL="171450" indent="-171450">
+              <a:buFont typeface="Courier New" panose="02070309020205020404" pitchFamily="49" charset="0"/>
+              <a:buChar char="o"/>
+            </a:pPr>
+            <a:r>
+              <a:rPr lang="en-US" sz="800" noProof="1"/>
+              <a:t>BranchSummaryResult.branches.show (tells which branch to show, local or remotes/origin)</a:t>
+            </a:r>
+          </a:p>
+          <a:p>
+            <a:pPr marL="171450" indent="-171450">
+              <a:buFont typeface="Courier New" panose="02070309020205020404" pitchFamily="49" charset="0"/>
+              <a:buChar char="o"/>
+            </a:pPr>
+            <a:r>
+              <a:rPr lang="en-US" sz="800" noProof="1"/>
+              <a:t>BranchSummaryResult.branches .existsOnRemote (if remote exists on server)</a:t>
+            </a:r>
+          </a:p>
+          <a:p>
+            <a:pPr marL="171450" indent="-171450">
+              <a:buFont typeface="Courier New" panose="02070309020205020404" pitchFamily="49" charset="0"/>
+              <a:buChar char="o"/>
+            </a:pPr>
+            <a:r>
+              <a:rPr lang="en-US" sz="800" noProof="1"/>
+              <a:t>BranchSummaryResult.local (local branches)</a:t>
+            </a:r>
+            <a:endParaRPr lang="en-US" sz="800" b="1" noProof="1"/>
+          </a:p>
+          <a:p>
+            <a:endParaRPr lang="en-US" sz="800" noProof="1">
+              <a:solidFill>
+                <a:schemeClr val="accent1"/>
+              </a:solidFill>
+            </a:endParaRPr>
+          </a:p>
+          <a:p>
+            <a:r>
+              <a:rPr lang="en-US" sz="800" noProof="1">
+                <a:solidFill>
+                  <a:schemeClr val="accent1"/>
+                </a:solidFill>
+              </a:rPr>
+              <a:t>Remote branches are determined with ls-remote when calling gitFetch(). They are cached</a:t>
+            </a:r>
+            <a:endParaRPr lang="en-US" sz="800" noProof="1"/>
+          </a:p>
+          <a:p>
+            <a:pPr marL="171450" indent="-171450">
+              <a:buFont typeface="Courier New" panose="02070309020205020404" pitchFamily="49" charset="0"/>
+              <a:buChar char="o"/>
+            </a:pPr>
+            <a:r>
+              <a:rPr lang="en-US" sz="800" noProof="1"/>
+              <a:t>localState.cached.branches[branchName].existsOnRemote (true if remotes/… exists on server)</a:t>
+            </a:r>
+          </a:p>
+          <a:p>
+            <a:endParaRPr lang="en-US" sz="800" noProof="1"/>
+          </a:p>
+        </p:txBody>
+      </p:sp>
+      <p:sp>
+        <p:nvSpPr>
+          <p:cNvPr id="11" name="textruta 10">
+            <a:extLst>
+              <a:ext uri="{FF2B5EF4-FFF2-40B4-BE49-F238E27FC236}">
+                <a16:creationId xmlns:a16="http://schemas.microsoft.com/office/drawing/2014/main" id="{09D57132-FE6E-A142-8346-D2842756F1E0}"/>
+              </a:ext>
+            </a:extLst>
+          </p:cNvPr>
+          <p:cNvSpPr txBox="1"/>
+          <p:nvPr/>
+        </p:nvSpPr>
+        <p:spPr>
+          <a:xfrm>
+            <a:off x="8761727" y="170497"/>
+            <a:ext cx="1788695" cy="461665"/>
+          </a:xfrm>
+          <a:prstGeom prst="rect">
+            <a:avLst/>
+          </a:prstGeom>
+          <a:noFill/>
+        </p:spPr>
+        <p:txBody>
+          <a:bodyPr wrap="none" rtlCol="0">
+            <a:spAutoFit/>
+          </a:bodyPr>
+          <a:lstStyle/>
+          <a:p>
+            <a:r>
+              <a:rPr lang="en-US" sz="2400" b="1" noProof="1"/>
+              <a:t>branches list</a:t>
+            </a:r>
+          </a:p>
+        </p:txBody>
+      </p:sp>
+      <p:sp>
+        <p:nvSpPr>
+          <p:cNvPr id="12" name="Rektangel 11">
+            <a:extLst>
+              <a:ext uri="{FF2B5EF4-FFF2-40B4-BE49-F238E27FC236}">
+                <a16:creationId xmlns:a16="http://schemas.microsoft.com/office/drawing/2014/main" id="{81027EB8-8DA5-4345-85C6-1B3F368FE9BF}"/>
+              </a:ext>
+            </a:extLst>
+          </p:cNvPr>
+          <p:cNvSpPr/>
+          <p:nvPr/>
+        </p:nvSpPr>
+        <p:spPr>
+          <a:xfrm>
+            <a:off x="8084300" y="3503581"/>
+            <a:ext cx="4535554" cy="1077218"/>
+          </a:xfrm>
+          <a:prstGeom prst="rect">
+            <a:avLst/>
+          </a:prstGeom>
+          <a:solidFill>
+            <a:schemeClr val="bg1"/>
+          </a:solidFill>
+          <a:ln>
+            <a:solidFill>
+              <a:schemeClr val="accent1"/>
+            </a:solidFill>
+          </a:ln>
+        </p:spPr>
+        <p:txBody>
+          <a:bodyPr wrap="square">
+            <a:spAutoFit/>
+          </a:bodyPr>
+          <a:lstStyle/>
+          <a:p>
+            <a:r>
+              <a:rPr lang="en-US" sz="800" b="1" noProof="1"/>
+              <a:t>localState.cached</a:t>
+            </a:r>
+          </a:p>
+          <a:p>
+            <a:endParaRPr lang="en-US" sz="800" noProof="1">
+              <a:solidFill>
+                <a:schemeClr val="accent1"/>
+              </a:solidFill>
+            </a:endParaRPr>
+          </a:p>
+          <a:p>
+            <a:r>
+              <a:rPr lang="en-US" sz="800" noProof="1">
+                <a:solidFill>
+                  <a:schemeClr val="accent1"/>
+                </a:solidFill>
+              </a:rPr>
+              <a:t>Storage for remote (updated with gitFetch )</a:t>
+            </a:r>
+            <a:endParaRPr lang="en-US" sz="800" noProof="1"/>
+          </a:p>
+          <a:p>
+            <a:pPr marL="171450" indent="-171450">
+              <a:buFont typeface="Courier New" panose="02070309020205020404" pitchFamily="49" charset="0"/>
+              <a:buChar char="o"/>
+            </a:pPr>
+            <a:r>
+              <a:rPr lang="en-US" sz="800" noProof="1"/>
+              <a:t>localState.cached.branches[branchName].existsOnRemote </a:t>
+            </a:r>
+            <a:br>
+              <a:rPr lang="en-US" sz="800" noProof="1"/>
+            </a:br>
+            <a:r>
+              <a:rPr lang="en-US" sz="800" noProof="1"/>
+              <a:t>(true if tracked remotes/… exists on server)</a:t>
+            </a:r>
+          </a:p>
+          <a:p>
+            <a:pPr marL="171450" indent="-171450">
+              <a:buFont typeface="Courier New" panose="02070309020205020404" pitchFamily="49" charset="0"/>
+              <a:buChar char="o"/>
+            </a:pPr>
+            <a:endParaRPr lang="en-US" sz="800" noProof="1"/>
+          </a:p>
+          <a:p>
+            <a:endParaRPr lang="en-US" sz="800" noProof="1">
+              <a:solidFill>
+                <a:schemeClr val="accent1"/>
+              </a:solidFill>
+            </a:endParaRPr>
+          </a:p>
+          <a:p>
+            <a:endParaRPr lang="en-US" sz="800" noProof="1"/>
+          </a:p>
+        </p:txBody>
+      </p:sp>
+      <p:sp>
+        <p:nvSpPr>
+          <p:cNvPr id="13" name="textruta 12">
+            <a:extLst>
+              <a:ext uri="{FF2B5EF4-FFF2-40B4-BE49-F238E27FC236}">
+                <a16:creationId xmlns:a16="http://schemas.microsoft.com/office/drawing/2014/main" id="{5A9DDEE4-AAD3-6D4F-A391-62094E243645}"/>
+              </a:ext>
+            </a:extLst>
+          </p:cNvPr>
+          <p:cNvSpPr txBox="1"/>
+          <p:nvPr/>
+        </p:nvSpPr>
+        <p:spPr>
+          <a:xfrm>
+            <a:off x="8761727" y="2887737"/>
+            <a:ext cx="1923219" cy="461665"/>
+          </a:xfrm>
+          <a:prstGeom prst="rect">
+            <a:avLst/>
+          </a:prstGeom>
+          <a:noFill/>
+        </p:spPr>
+        <p:txBody>
+          <a:bodyPr wrap="none" rtlCol="0">
+            <a:spAutoFit/>
+          </a:bodyPr>
+          <a:lstStyle/>
+          <a:p>
+            <a:r>
+              <a:rPr lang="en-US" sz="2400" b="1" noProof="1"/>
+              <a:t>cache storage</a:t>
+            </a:r>
           </a:p>
         </p:txBody>
       </p:sp>

</xml_diff>

<commit_message>
Documented dark-mode, setting mechanism
</commit_message>
<xml_diff>
--- a/docs/Tech-overview.pptx
+++ b/docs/Tech-overview.pptx
@@ -258,7 +258,7 @@
           <a:p>
             <a:fld id="{CA855E1B-8830-B64E-B102-DB2BBD0D9567}" type="datetimeFigureOut">
               <a:rPr lang="sv-SE" smtClean="0"/>
-              <a:t>2020-12-07</a:t>
+              <a:t>2020-12-16</a:t>
             </a:fld>
             <a:endParaRPr lang="sv-SE"/>
           </a:p>
@@ -428,7 +428,7 @@
           <a:p>
             <a:fld id="{CA855E1B-8830-B64E-B102-DB2BBD0D9567}" type="datetimeFigureOut">
               <a:rPr lang="sv-SE" smtClean="0"/>
-              <a:t>2020-12-07</a:t>
+              <a:t>2020-12-16</a:t>
             </a:fld>
             <a:endParaRPr lang="sv-SE"/>
           </a:p>
@@ -608,7 +608,7 @@
           <a:p>
             <a:fld id="{CA855E1B-8830-B64E-B102-DB2BBD0D9567}" type="datetimeFigureOut">
               <a:rPr lang="sv-SE" smtClean="0"/>
-              <a:t>2020-12-07</a:t>
+              <a:t>2020-12-16</a:t>
             </a:fld>
             <a:endParaRPr lang="sv-SE"/>
           </a:p>
@@ -778,7 +778,7 @@
           <a:p>
             <a:fld id="{CA855E1B-8830-B64E-B102-DB2BBD0D9567}" type="datetimeFigureOut">
               <a:rPr lang="sv-SE" smtClean="0"/>
-              <a:t>2020-12-07</a:t>
+              <a:t>2020-12-16</a:t>
             </a:fld>
             <a:endParaRPr lang="sv-SE"/>
           </a:p>
@@ -1022,7 +1022,7 @@
           <a:p>
             <a:fld id="{CA855E1B-8830-B64E-B102-DB2BBD0D9567}" type="datetimeFigureOut">
               <a:rPr lang="sv-SE" smtClean="0"/>
-              <a:t>2020-12-07</a:t>
+              <a:t>2020-12-16</a:t>
             </a:fld>
             <a:endParaRPr lang="sv-SE"/>
           </a:p>
@@ -1254,7 +1254,7 @@
           <a:p>
             <a:fld id="{CA855E1B-8830-B64E-B102-DB2BBD0D9567}" type="datetimeFigureOut">
               <a:rPr lang="sv-SE" smtClean="0"/>
-              <a:t>2020-12-07</a:t>
+              <a:t>2020-12-16</a:t>
             </a:fld>
             <a:endParaRPr lang="sv-SE"/>
           </a:p>
@@ -1621,7 +1621,7 @@
           <a:p>
             <a:fld id="{CA855E1B-8830-B64E-B102-DB2BBD0D9567}" type="datetimeFigureOut">
               <a:rPr lang="sv-SE" smtClean="0"/>
-              <a:t>2020-12-07</a:t>
+              <a:t>2020-12-16</a:t>
             </a:fld>
             <a:endParaRPr lang="sv-SE"/>
           </a:p>
@@ -1739,7 +1739,7 @@
           <a:p>
             <a:fld id="{CA855E1B-8830-B64E-B102-DB2BBD0D9567}" type="datetimeFigureOut">
               <a:rPr lang="sv-SE" smtClean="0"/>
-              <a:t>2020-12-07</a:t>
+              <a:t>2020-12-16</a:t>
             </a:fld>
             <a:endParaRPr lang="sv-SE"/>
           </a:p>
@@ -1834,7 +1834,7 @@
           <a:p>
             <a:fld id="{CA855E1B-8830-B64E-B102-DB2BBD0D9567}" type="datetimeFigureOut">
               <a:rPr lang="sv-SE" smtClean="0"/>
-              <a:t>2020-12-07</a:t>
+              <a:t>2020-12-16</a:t>
             </a:fld>
             <a:endParaRPr lang="sv-SE"/>
           </a:p>
@@ -2111,7 +2111,7 @@
           <a:p>
             <a:fld id="{CA855E1B-8830-B64E-B102-DB2BBD0D9567}" type="datetimeFigureOut">
               <a:rPr lang="sv-SE" smtClean="0"/>
-              <a:t>2020-12-07</a:t>
+              <a:t>2020-12-16</a:t>
             </a:fld>
             <a:endParaRPr lang="sv-SE"/>
           </a:p>
@@ -2368,7 +2368,7 @@
           <a:p>
             <a:fld id="{CA855E1B-8830-B64E-B102-DB2BBD0D9567}" type="datetimeFigureOut">
               <a:rPr lang="sv-SE" smtClean="0"/>
-              <a:t>2020-12-07</a:t>
+              <a:t>2020-12-16</a:t>
             </a:fld>
             <a:endParaRPr lang="sv-SE"/>
           </a:p>
@@ -2581,7 +2581,7 @@
           <a:p>
             <a:fld id="{CA855E1B-8830-B64E-B102-DB2BBD0D9567}" type="datetimeFigureOut">
               <a:rPr lang="sv-SE" smtClean="0"/>
-              <a:t>2020-12-07</a:t>
+              <a:t>2020-12-16</a:t>
             </a:fld>
             <a:endParaRPr lang="sv-SE"/>
           </a:p>
@@ -4626,7 +4626,7 @@
         </p:nvSpPr>
         <p:spPr>
           <a:xfrm>
-            <a:off x="4633229" y="349277"/>
+            <a:off x="4865207" y="357899"/>
             <a:ext cx="1294262" cy="230832"/>
           </a:xfrm>
           <a:prstGeom prst="rect">
@@ -4661,8 +4661,8 @@
         </p:nvSpPr>
         <p:spPr>
           <a:xfrm rot="5400000">
-            <a:off x="5174869" y="34472"/>
-            <a:ext cx="105580" cy="1111325"/>
+            <a:off x="5494081" y="-263796"/>
+            <a:ext cx="84636" cy="1728805"/>
           </a:xfrm>
           <a:prstGeom prst="leftBrace">
             <a:avLst/>
@@ -6304,7 +6304,7 @@
         </p:nvSpPr>
         <p:spPr>
           <a:xfrm>
-            <a:off x="169898" y="5971025"/>
+            <a:off x="3654738" y="3560996"/>
             <a:ext cx="3274288" cy="3416320"/>
           </a:xfrm>
           <a:prstGeom prst="rect">
@@ -6599,7 +6599,7 @@
         <p:spPr>
           <a:xfrm>
             <a:off x="169898" y="3556301"/>
-            <a:ext cx="3274288" cy="2308324"/>
+            <a:ext cx="3274288" cy="2923877"/>
           </a:xfrm>
           <a:prstGeom prst="rect">
             <a:avLst/>
@@ -6642,7 +6642,7 @@
             </a:r>
             <a:r>
               <a:rPr lang="en-US" sz="800" noProof="1"/>
-              <a:t> (same as. saved settings) :</a:t>
+              <a:t> (same as saved settings) :</a:t>
             </a:r>
           </a:p>
           <a:p>
@@ -6663,6 +6663,16 @@
             <a:r>
               <a:rPr lang="en-US" sz="800" noProof="1"/>
               <a:t>.repoNumber  = current repo in  state.repos</a:t>
+            </a:r>
+          </a:p>
+          <a:p>
+            <a:pPr marL="324000" lvl="1" indent="-171450">
+              <a:buFont typeface="Arial" panose="020B0604020202020204" pitchFamily="34" charset="0"/>
+              <a:buChar char="•"/>
+            </a:pPr>
+            <a:r>
+              <a:rPr lang="en-US" sz="800" noProof="1"/>
+              <a:t>settings from settings menu</a:t>
             </a:r>
           </a:p>
           <a:p>
@@ -6717,7 +6727,21 @@
             </a:pPr>
             <a:r>
               <a:rPr lang="en-US" sz="800" noProof="1"/>
-              <a:t>.settings (true if settings window open)</a:t>
+              <a:t>flags to show if other windows are open (true for open) :</a:t>
+            </a:r>
+            <a:br>
+              <a:rPr lang="en-US" sz="800" noProof="1"/>
+            </a:br>
+            <a:r>
+              <a:rPr lang="en-US" sz="800" noProof="1"/>
+              <a:t>.settings .conflictsWindow .fileListWindow .aboutWindow .notesWindow .graphWindow .helpWindow</a:t>
+            </a:r>
+            <a:br>
+              <a:rPr lang="en-US" sz="800" noProof="1"/>
+            </a:br>
+            <a:r>
+              <a:rPr lang="en-US" sz="800" noProof="1"/>
+              <a:t>(true if settings window open)</a:t>
             </a:r>
           </a:p>
           <a:p>
@@ -6798,6 +6822,16 @@
             <a:r>
               <a:rPr lang="en-US" sz="800" noProof="1"/>
               <a:t>.cached (stores stuff that is costly to get – see branches list)</a:t>
+            </a:r>
+          </a:p>
+          <a:p>
+            <a:pPr marL="324000" lvl="1" indent="-171450">
+              <a:buFont typeface="Arial" panose="020B0604020202020204" pitchFamily="34" charset="0"/>
+              <a:buChar char="•"/>
+            </a:pPr>
+            <a:r>
+              <a:rPr lang="en-US" sz="800" noProof="1"/>
+              <a:t>.dark (true if dark mode, false if light mode)</a:t>
             </a:r>
           </a:p>
         </p:txBody>
@@ -6963,8 +6997,8 @@
         </p:nvSpPr>
         <p:spPr>
           <a:xfrm>
-            <a:off x="3593721" y="3564239"/>
-            <a:ext cx="2674464" cy="1200329"/>
+            <a:off x="191906" y="8315161"/>
+            <a:ext cx="3252279" cy="1200329"/>
           </a:xfrm>
           <a:prstGeom prst="rect">
             <a:avLst/>
@@ -7799,7 +7833,7 @@
         </p:nvSpPr>
         <p:spPr>
           <a:xfrm>
-            <a:off x="4884478" y="170498"/>
+            <a:off x="4162583" y="209379"/>
             <a:ext cx="1679434" cy="461665"/>
           </a:xfrm>
           <a:prstGeom prst="rect">
@@ -8362,7 +8396,7 @@
         </p:nvSpPr>
         <p:spPr>
           <a:xfrm>
-            <a:off x="8761727" y="170497"/>
+            <a:off x="8039832" y="209378"/>
             <a:ext cx="1788695" cy="461665"/>
           </a:xfrm>
           <a:prstGeom prst="rect">
@@ -8397,8 +8431,8 @@
         </p:nvSpPr>
         <p:spPr>
           <a:xfrm>
-            <a:off x="8084300" y="3503581"/>
-            <a:ext cx="4535554" cy="1077218"/>
+            <a:off x="8138127" y="3250294"/>
+            <a:ext cx="4535554" cy="830997"/>
           </a:xfrm>
           <a:prstGeom prst="rect">
             <a:avLst/>
@@ -8457,15 +8491,6 @@
               <a:rPr lang="en-US" sz="800" noProof="1"/>
               <a:t>(true if tracked remotes/… exists on server)</a:t>
             </a:r>
-          </a:p>
-          <a:p>
-            <a:pPr marL="171450" indent="-171450">
-              <a:buFont typeface="Courier New" panose="02070309020205020404" pitchFamily="49" charset="0"/>
-              <a:buChar char="o"/>
-            </a:pPr>
-            <a:endParaRPr lang="en-US" sz="800" noProof="1"/>
-          </a:p>
-          <a:p>
             <a:endParaRPr lang="en-US" sz="800" noProof="1">
               <a:solidFill>
                 <a:schemeClr val="accent1"/>
@@ -8491,7 +8516,7 @@
         </p:nvSpPr>
         <p:spPr>
           <a:xfrm>
-            <a:off x="8761727" y="2887737"/>
+            <a:off x="8093659" y="2673331"/>
             <a:ext cx="1923219" cy="461665"/>
           </a:xfrm>
           <a:prstGeom prst="rect">
@@ -8508,6 +8533,476 @@
             <a:r>
               <a:rPr lang="en-US" sz="2400" b="1" noProof="1"/>
               <a:t>cache storage</a:t>
+            </a:r>
+          </a:p>
+        </p:txBody>
+      </p:sp>
+      <p:sp>
+        <p:nvSpPr>
+          <p:cNvPr id="14" name="Rektangel 13">
+            <a:extLst>
+              <a:ext uri="{FF2B5EF4-FFF2-40B4-BE49-F238E27FC236}">
+                <a16:creationId xmlns:a16="http://schemas.microsoft.com/office/drawing/2014/main" id="{C15FF9A1-43E2-7348-9382-D2ADB3B355C8}"/>
+              </a:ext>
+            </a:extLst>
+          </p:cNvPr>
+          <p:cNvSpPr/>
+          <p:nvPr/>
+        </p:nvSpPr>
+        <p:spPr>
+          <a:xfrm>
+            <a:off x="4285505" y="3228637"/>
+            <a:ext cx="3372291" cy="2062103"/>
+          </a:xfrm>
+          <a:prstGeom prst="rect">
+            <a:avLst/>
+          </a:prstGeom>
+          <a:solidFill>
+            <a:schemeClr val="bg1"/>
+          </a:solidFill>
+          <a:ln>
+            <a:solidFill>
+              <a:schemeClr val="accent1"/>
+            </a:solidFill>
+          </a:ln>
+        </p:spPr>
+        <p:txBody>
+          <a:bodyPr wrap="square">
+            <a:spAutoFit/>
+          </a:bodyPr>
+          <a:lstStyle/>
+          <a:p>
+            <a:r>
+              <a:rPr lang="en-US" sz="800" b="1" noProof="1"/>
+              <a:t>Settings are loaded at Pragma-git start, and updated from Settings window</a:t>
+            </a:r>
+          </a:p>
+          <a:p>
+            <a:endParaRPr lang="en-US" sz="800" noProof="1">
+              <a:solidFill>
+                <a:schemeClr val="accent1"/>
+              </a:solidFill>
+            </a:endParaRPr>
+          </a:p>
+          <a:p>
+            <a:r>
+              <a:rPr lang="en-US" sz="800" noProof="1">
+                <a:solidFill>
+                  <a:schemeClr val="accent1"/>
+                </a:solidFill>
+              </a:rPr>
+              <a:t>Handling of settings in app.js</a:t>
+            </a:r>
+            <a:endParaRPr lang="en-US" sz="800" noProof="1"/>
+          </a:p>
+          <a:p>
+            <a:pPr marL="171450" indent="-171450">
+              <a:buFont typeface="Courier New" panose="02070309020205020404" pitchFamily="49" charset="0"/>
+              <a:buChar char="o"/>
+            </a:pPr>
+            <a:r>
+              <a:rPr lang="en-US" sz="800" noProof="1"/>
+              <a:t>loadSettings is called on Pragma-git start</a:t>
+            </a:r>
+          </a:p>
+          <a:p>
+            <a:pPr marL="324000" lvl="1" indent="-171450">
+              <a:buFont typeface="Arial" panose="020B0604020202020204" pitchFamily="34" charset="0"/>
+              <a:buChar char="•"/>
+            </a:pPr>
+            <a:r>
+              <a:rPr lang="en-US" sz="800" noProof="1"/>
+              <a:t>reads settings from settings.json</a:t>
+            </a:r>
+          </a:p>
+          <a:p>
+            <a:pPr marL="324000" lvl="1" indent="-171450">
+              <a:buFont typeface="Arial" panose="020B0604020202020204" pitchFamily="34" charset="0"/>
+              <a:buChar char="•"/>
+            </a:pPr>
+            <a:r>
+              <a:rPr lang="en-US" sz="800" noProof="1"/>
+              <a:t>stores settings in global.state in predefined order</a:t>
+            </a:r>
+          </a:p>
+          <a:p>
+            <a:pPr marL="171450" indent="-171450">
+              <a:buFont typeface="Courier New" panose="02070309020205020404" pitchFamily="49" charset="0"/>
+              <a:buChar char="o"/>
+            </a:pPr>
+            <a:r>
+              <a:rPr lang="en-US" sz="800" noProof="1"/>
+              <a:t>updateWithNewSettings is called :</a:t>
+            </a:r>
+          </a:p>
+          <a:p>
+            <a:pPr marL="324000" lvl="1" indent="-171450">
+              <a:buFont typeface="Arial" panose="020B0604020202020204" pitchFamily="34" charset="0"/>
+              <a:buChar char="•"/>
+            </a:pPr>
+            <a:r>
+              <a:rPr lang="en-US" sz="800" noProof="1"/>
+              <a:t>from loadSettings</a:t>
+            </a:r>
+          </a:p>
+          <a:p>
+            <a:pPr marL="324000" lvl="1" indent="-171450">
+              <a:buFont typeface="Arial" panose="020B0604020202020204" pitchFamily="34" charset="0"/>
+              <a:buChar char="•"/>
+            </a:pPr>
+            <a:r>
+              <a:rPr lang="en-US" sz="800" noProof="1"/>
+              <a:t>when leaving Settings window</a:t>
+            </a:r>
+          </a:p>
+          <a:p>
+            <a:pPr marL="171450" indent="-171450">
+              <a:buFont typeface="Courier New" panose="02070309020205020404" pitchFamily="49" charset="0"/>
+              <a:buChar char="o"/>
+            </a:pPr>
+            <a:r>
+              <a:rPr lang="en-US" sz="800" noProof="1"/>
+              <a:t>settings are saved when closing Pragma-git</a:t>
+            </a:r>
+          </a:p>
+          <a:p>
+            <a:endParaRPr lang="en-US" sz="800" noProof="1">
+              <a:solidFill>
+                <a:schemeClr val="accent1"/>
+              </a:solidFill>
+            </a:endParaRPr>
+          </a:p>
+          <a:p>
+            <a:r>
+              <a:rPr lang="en-US" sz="800" noProof="1">
+                <a:solidFill>
+                  <a:schemeClr val="accent1"/>
+                </a:solidFill>
+              </a:rPr>
+              <a:t>Settings window  settings.html :</a:t>
+            </a:r>
+            <a:endParaRPr lang="en-US" sz="800" noProof="1"/>
+          </a:p>
+          <a:p>
+            <a:pPr marL="171450" indent="-171450">
+              <a:buFont typeface="Courier New" panose="02070309020205020404" pitchFamily="49" charset="0"/>
+              <a:buChar char="o"/>
+            </a:pPr>
+            <a:r>
+              <a:rPr lang="en-US" sz="800" noProof="1"/>
+              <a:t>is populated from global.state </a:t>
+            </a:r>
+            <a:br>
+              <a:rPr lang="en-US" sz="800" noProof="1"/>
+            </a:br>
+            <a:r>
+              <a:rPr lang="en-US" sz="800" noProof="1"/>
+              <a:t>when   settings.js/injectIntoSettingsJs is called from settings.html</a:t>
+            </a:r>
+          </a:p>
+          <a:p>
+            <a:pPr marL="171450" indent="-171450">
+              <a:buFont typeface="Courier New" panose="02070309020205020404" pitchFamily="49" charset="0"/>
+              <a:buChar char="o"/>
+            </a:pPr>
+            <a:r>
+              <a:rPr lang="en-US" sz="800" noProof="1"/>
+              <a:t>closeWindow stores data in global.state before closing</a:t>
+            </a:r>
+          </a:p>
+          <a:p>
+            <a:pPr marL="324000" lvl="1" indent="-171450">
+              <a:buFont typeface="Arial" panose="020B0604020202020204" pitchFamily="34" charset="0"/>
+              <a:buChar char="•"/>
+            </a:pPr>
+            <a:endParaRPr lang="en-US" sz="800" noProof="1"/>
+          </a:p>
+        </p:txBody>
+      </p:sp>
+      <p:sp>
+        <p:nvSpPr>
+          <p:cNvPr id="15" name="textruta 14">
+            <a:extLst>
+              <a:ext uri="{FF2B5EF4-FFF2-40B4-BE49-F238E27FC236}">
+                <a16:creationId xmlns:a16="http://schemas.microsoft.com/office/drawing/2014/main" id="{9D47FF24-DA49-8046-9CB0-28C71CB63318}"/>
+              </a:ext>
+            </a:extLst>
+          </p:cNvPr>
+          <p:cNvSpPr txBox="1"/>
+          <p:nvPr/>
+        </p:nvSpPr>
+        <p:spPr>
+          <a:xfrm>
+            <a:off x="4231679" y="2673330"/>
+            <a:ext cx="1204882" cy="461665"/>
+          </a:xfrm>
+          <a:prstGeom prst="rect">
+            <a:avLst/>
+          </a:prstGeom>
+          <a:noFill/>
+        </p:spPr>
+        <p:txBody>
+          <a:bodyPr wrap="none" rtlCol="0">
+            <a:spAutoFit/>
+          </a:bodyPr>
+          <a:lstStyle/>
+          <a:p>
+            <a:r>
+              <a:rPr lang="en-US" sz="2400" b="1" noProof="1"/>
+              <a:t>Settings</a:t>
+            </a:r>
+          </a:p>
+        </p:txBody>
+      </p:sp>
+      <p:sp>
+        <p:nvSpPr>
+          <p:cNvPr id="16" name="textruta 15">
+            <a:extLst>
+              <a:ext uri="{FF2B5EF4-FFF2-40B4-BE49-F238E27FC236}">
+                <a16:creationId xmlns:a16="http://schemas.microsoft.com/office/drawing/2014/main" id="{9192722C-8F33-C74E-A8DA-E92B802175F0}"/>
+              </a:ext>
+            </a:extLst>
+          </p:cNvPr>
+          <p:cNvSpPr txBox="1"/>
+          <p:nvPr/>
+        </p:nvSpPr>
+        <p:spPr>
+          <a:xfrm>
+            <a:off x="8147486" y="4337579"/>
+            <a:ext cx="1592103" cy="461665"/>
+          </a:xfrm>
+          <a:prstGeom prst="rect">
+            <a:avLst/>
+          </a:prstGeom>
+          <a:noFill/>
+        </p:spPr>
+        <p:txBody>
+          <a:bodyPr wrap="none" rtlCol="0">
+            <a:spAutoFit/>
+          </a:bodyPr>
+          <a:lstStyle/>
+          <a:p>
+            <a:r>
+              <a:rPr lang="en-US" sz="2400" b="1" noProof="1"/>
+              <a:t>Dark mode</a:t>
+            </a:r>
+          </a:p>
+        </p:txBody>
+      </p:sp>
+      <p:sp>
+        <p:nvSpPr>
+          <p:cNvPr id="17" name="Rektangel 16">
+            <a:extLst>
+              <a:ext uri="{FF2B5EF4-FFF2-40B4-BE49-F238E27FC236}">
+                <a16:creationId xmlns:a16="http://schemas.microsoft.com/office/drawing/2014/main" id="{0C6FE680-6AF2-4545-AE31-D52F0731E861}"/>
+              </a:ext>
+            </a:extLst>
+          </p:cNvPr>
+          <p:cNvSpPr/>
+          <p:nvPr/>
+        </p:nvSpPr>
+        <p:spPr>
+          <a:xfrm>
+            <a:off x="8093659" y="4774590"/>
+            <a:ext cx="4535554" cy="2554545"/>
+          </a:xfrm>
+          <a:prstGeom prst="rect">
+            <a:avLst/>
+          </a:prstGeom>
+          <a:solidFill>
+            <a:schemeClr val="bg1"/>
+          </a:solidFill>
+          <a:ln>
+            <a:solidFill>
+              <a:schemeClr val="accent1"/>
+            </a:solidFill>
+          </a:ln>
+        </p:spPr>
+        <p:txBody>
+          <a:bodyPr wrap="square">
+            <a:spAutoFit/>
+          </a:bodyPr>
+          <a:lstStyle/>
+          <a:p>
+            <a:r>
+              <a:rPr lang="en-US" sz="800" b="1" noProof="1"/>
+              <a:t>Dark / light mode is defined from color_styles.css using css variables</a:t>
+            </a:r>
+          </a:p>
+          <a:p>
+            <a:endParaRPr lang="en-US" sz="800" noProof="1">
+              <a:solidFill>
+                <a:schemeClr val="accent1"/>
+              </a:solidFill>
+            </a:endParaRPr>
+          </a:p>
+          <a:p>
+            <a:r>
+              <a:rPr lang="en-US" sz="800" noProof="1">
+                <a:solidFill>
+                  <a:schemeClr val="accent1"/>
+                </a:solidFill>
+              </a:rPr>
+              <a:t>The mechanism</a:t>
+            </a:r>
+            <a:endParaRPr lang="en-US" sz="800" noProof="1"/>
+          </a:p>
+          <a:p>
+            <a:pPr marL="171450" indent="-171450">
+              <a:buFont typeface="Courier New" panose="02070309020205020404" pitchFamily="49" charset="0"/>
+              <a:buChar char="o"/>
+            </a:pPr>
+            <a:r>
+              <a:rPr lang="en-US" sz="800" noProof="1"/>
+              <a:t>&lt;body&gt; of each document is predefined with class=“light”</a:t>
+            </a:r>
+          </a:p>
+          <a:p>
+            <a:pPr marL="171450" indent="-171450">
+              <a:buFont typeface="Courier New" panose="02070309020205020404" pitchFamily="49" charset="0"/>
+              <a:buChar char="o"/>
+            </a:pPr>
+            <a:r>
+              <a:rPr lang="en-US" sz="800" noProof="1"/>
+              <a:t>script after &lt;body&gt;  adds a class=”dark” if dark mode</a:t>
+            </a:r>
+          </a:p>
+          <a:p>
+            <a:pPr marL="171450" indent="-171450">
+              <a:buFont typeface="Courier New" panose="02070309020205020404" pitchFamily="49" charset="0"/>
+              <a:buChar char="o"/>
+            </a:pPr>
+            <a:r>
+              <a:rPr lang="en-US" sz="800" noProof="1"/>
+              <a:t>darkmode is defined by localState.dark (true if darkmode, false if light)</a:t>
+            </a:r>
+          </a:p>
+          <a:p>
+            <a:pPr marL="171450" indent="-171450">
+              <a:buFont typeface="Courier New" panose="02070309020205020404" pitchFamily="49" charset="0"/>
+              <a:buChar char="o"/>
+            </a:pPr>
+            <a:r>
+              <a:rPr lang="en-US" sz="800" noProof="1"/>
+              <a:t> localState.dark is set from value of state.darkmode setting</a:t>
+            </a:r>
+          </a:p>
+          <a:p>
+            <a:pPr marL="171450" indent="-171450">
+              <a:buFont typeface="Courier New" panose="02070309020205020404" pitchFamily="49" charset="0"/>
+              <a:buChar char="o"/>
+            </a:pPr>
+            <a:endParaRPr lang="en-US" sz="800" noProof="1"/>
+          </a:p>
+          <a:p>
+            <a:r>
+              <a:rPr lang="en-US" sz="800" noProof="1">
+                <a:solidFill>
+                  <a:schemeClr val="accent1"/>
+                </a:solidFill>
+              </a:rPr>
+              <a:t>Main app :</a:t>
+            </a:r>
+            <a:endParaRPr lang="en-US" sz="800" noProof="1"/>
+          </a:p>
+          <a:p>
+            <a:pPr marL="171450" indent="-171450">
+              <a:buFont typeface="Courier New" panose="02070309020205020404" pitchFamily="49" charset="0"/>
+              <a:buChar char="o"/>
+            </a:pPr>
+            <a:r>
+              <a:rPr lang="en-US" sz="800" noProof="1"/>
+              <a:t>Main. window is mostly constant (except for text-fields and input texts)</a:t>
+            </a:r>
+            <a:br>
+              <a:rPr lang="en-US" sz="800" noProof="1"/>
+            </a:br>
+            <a:endParaRPr lang="en-US" sz="800" noProof="1"/>
+          </a:p>
+          <a:p>
+            <a:r>
+              <a:rPr lang="en-US" sz="800" noProof="1">
+                <a:solidFill>
+                  <a:schemeClr val="accent1"/>
+                </a:solidFill>
+              </a:rPr>
+              <a:t>Other windows behaves differently :</a:t>
+            </a:r>
+            <a:endParaRPr lang="en-US" sz="800" noProof="1"/>
+          </a:p>
+          <a:p>
+            <a:pPr marL="171450" indent="-171450">
+              <a:buFont typeface="Courier New" panose="02070309020205020404" pitchFamily="49" charset="0"/>
+              <a:buChar char="o"/>
+            </a:pPr>
+            <a:r>
+              <a:rPr lang="en-US" sz="800" noProof="1"/>
+              <a:t>Have styles reading css variables from color_styles.css</a:t>
+            </a:r>
+          </a:p>
+          <a:p>
+            <a:pPr marL="171450" indent="-171450">
+              <a:buFont typeface="Courier New" panose="02070309020205020404" pitchFamily="49" charset="0"/>
+              <a:buChar char="o"/>
+            </a:pPr>
+            <a:r>
+              <a:rPr lang="en-US" sz="800" noProof="1"/>
+              <a:t>A general img invert filter is applied which transforms black icons to white </a:t>
+            </a:r>
+            <a:br>
+              <a:rPr lang="en-US" sz="800" noProof="1"/>
+            </a:br>
+            <a:r>
+              <a:rPr lang="en-US" sz="800" noProof="1"/>
+              <a:t>(exceptions for color icons are defined in each document’s style section)</a:t>
+            </a:r>
+          </a:p>
+          <a:p>
+            <a:pPr marL="171450" indent="-171450">
+              <a:buFont typeface="Courier New" panose="02070309020205020404" pitchFamily="49" charset="0"/>
+              <a:buChar char="o"/>
+            </a:pPr>
+            <a:endParaRPr lang="en-US" sz="800" noProof="1"/>
+          </a:p>
+          <a:p>
+            <a:r>
+              <a:rPr lang="en-US" sz="800" noProof="1">
+                <a:solidFill>
+                  <a:schemeClr val="accent1"/>
+                </a:solidFill>
+              </a:rPr>
+              <a:t>Merge and Notes windows :</a:t>
+            </a:r>
+            <a:endParaRPr lang="en-US" sz="800" noProof="1"/>
+          </a:p>
+          <a:p>
+            <a:pPr marL="171450" indent="-171450">
+              <a:buFont typeface="Courier New" panose="02070309020205020404" pitchFamily="49" charset="0"/>
+              <a:buChar char="o"/>
+            </a:pPr>
+            <a:r>
+              <a:rPr lang="en-US" sz="800" noProof="1"/>
+              <a:t>Merge: hacked the CodeMirror css in pragma-merge.html</a:t>
+            </a:r>
+          </a:p>
+          <a:p>
+            <a:pPr marL="171450" indent="-171450">
+              <a:buFont typeface="Courier New" panose="02070309020205020404" pitchFamily="49" charset="0"/>
+              <a:buChar char="o"/>
+            </a:pPr>
+            <a:r>
+              <a:rPr lang="en-US" sz="800" noProof="1"/>
+              <a:t>Notes: hacked ToastUI editor css in notes.html</a:t>
+            </a:r>
+          </a:p>
+          <a:p>
+            <a:pPr marL="171450" indent="-171450">
+              <a:buFont typeface="Courier New" panose="02070309020205020404" pitchFamily="49" charset="0"/>
+              <a:buChar char="o"/>
+            </a:pPr>
+            <a:r>
+              <a:rPr lang="en-US" sz="800" noProof="1"/>
+              <a:t>Both have special css for icons and text-based buttons</a:t>
             </a:r>
           </a:p>
         </p:txBody>

</xml_diff>

<commit_message>
0.8.0 Dark mode introduced
</commit_message>
<xml_diff>
--- a/docs/Tech-overview.pptx
+++ b/docs/Tech-overview.pptx
@@ -258,7 +258,7 @@
           <a:p>
             <a:fld id="{CA855E1B-8830-B64E-B102-DB2BBD0D9567}" type="datetimeFigureOut">
               <a:rPr lang="sv-SE" smtClean="0"/>
-              <a:t>2020-12-16</a:t>
+              <a:t>2020-12-19</a:t>
             </a:fld>
             <a:endParaRPr lang="sv-SE"/>
           </a:p>
@@ -428,7 +428,7 @@
           <a:p>
             <a:fld id="{CA855E1B-8830-B64E-B102-DB2BBD0D9567}" type="datetimeFigureOut">
               <a:rPr lang="sv-SE" smtClean="0"/>
-              <a:t>2020-12-16</a:t>
+              <a:t>2020-12-19</a:t>
             </a:fld>
             <a:endParaRPr lang="sv-SE"/>
           </a:p>
@@ -608,7 +608,7 @@
           <a:p>
             <a:fld id="{CA855E1B-8830-B64E-B102-DB2BBD0D9567}" type="datetimeFigureOut">
               <a:rPr lang="sv-SE" smtClean="0"/>
-              <a:t>2020-12-16</a:t>
+              <a:t>2020-12-19</a:t>
             </a:fld>
             <a:endParaRPr lang="sv-SE"/>
           </a:p>
@@ -778,7 +778,7 @@
           <a:p>
             <a:fld id="{CA855E1B-8830-B64E-B102-DB2BBD0D9567}" type="datetimeFigureOut">
               <a:rPr lang="sv-SE" smtClean="0"/>
-              <a:t>2020-12-16</a:t>
+              <a:t>2020-12-19</a:t>
             </a:fld>
             <a:endParaRPr lang="sv-SE"/>
           </a:p>
@@ -1022,7 +1022,7 @@
           <a:p>
             <a:fld id="{CA855E1B-8830-B64E-B102-DB2BBD0D9567}" type="datetimeFigureOut">
               <a:rPr lang="sv-SE" smtClean="0"/>
-              <a:t>2020-12-16</a:t>
+              <a:t>2020-12-19</a:t>
             </a:fld>
             <a:endParaRPr lang="sv-SE"/>
           </a:p>
@@ -1254,7 +1254,7 @@
           <a:p>
             <a:fld id="{CA855E1B-8830-B64E-B102-DB2BBD0D9567}" type="datetimeFigureOut">
               <a:rPr lang="sv-SE" smtClean="0"/>
-              <a:t>2020-12-16</a:t>
+              <a:t>2020-12-19</a:t>
             </a:fld>
             <a:endParaRPr lang="sv-SE"/>
           </a:p>
@@ -1621,7 +1621,7 @@
           <a:p>
             <a:fld id="{CA855E1B-8830-B64E-B102-DB2BBD0D9567}" type="datetimeFigureOut">
               <a:rPr lang="sv-SE" smtClean="0"/>
-              <a:t>2020-12-16</a:t>
+              <a:t>2020-12-19</a:t>
             </a:fld>
             <a:endParaRPr lang="sv-SE"/>
           </a:p>
@@ -1739,7 +1739,7 @@
           <a:p>
             <a:fld id="{CA855E1B-8830-B64E-B102-DB2BBD0D9567}" type="datetimeFigureOut">
               <a:rPr lang="sv-SE" smtClean="0"/>
-              <a:t>2020-12-16</a:t>
+              <a:t>2020-12-19</a:t>
             </a:fld>
             <a:endParaRPr lang="sv-SE"/>
           </a:p>
@@ -1834,7 +1834,7 @@
           <a:p>
             <a:fld id="{CA855E1B-8830-B64E-B102-DB2BBD0D9567}" type="datetimeFigureOut">
               <a:rPr lang="sv-SE" smtClean="0"/>
-              <a:t>2020-12-16</a:t>
+              <a:t>2020-12-19</a:t>
             </a:fld>
             <a:endParaRPr lang="sv-SE"/>
           </a:p>
@@ -2111,7 +2111,7 @@
           <a:p>
             <a:fld id="{CA855E1B-8830-B64E-B102-DB2BBD0D9567}" type="datetimeFigureOut">
               <a:rPr lang="sv-SE" smtClean="0"/>
-              <a:t>2020-12-16</a:t>
+              <a:t>2020-12-19</a:t>
             </a:fld>
             <a:endParaRPr lang="sv-SE"/>
           </a:p>
@@ -2368,7 +2368,7 @@
           <a:p>
             <a:fld id="{CA855E1B-8830-B64E-B102-DB2BBD0D9567}" type="datetimeFigureOut">
               <a:rPr lang="sv-SE" smtClean="0"/>
-              <a:t>2020-12-16</a:t>
+              <a:t>2020-12-19</a:t>
             </a:fld>
             <a:endParaRPr lang="sv-SE"/>
           </a:p>
@@ -2581,7 +2581,7 @@
           <a:p>
             <a:fld id="{CA855E1B-8830-B64E-B102-DB2BBD0D9567}" type="datetimeFigureOut">
               <a:rPr lang="sv-SE" smtClean="0"/>
-              <a:t>2020-12-16</a:t>
+              <a:t>2020-12-19</a:t>
             </a:fld>
             <a:endParaRPr lang="sv-SE"/>
           </a:p>
@@ -3036,7 +3036,7 @@
         <p:spPr>
           <a:xfrm>
             <a:off x="420154" y="678347"/>
-            <a:ext cx="5114372" cy="1569660"/>
+            <a:ext cx="5114372" cy="2185214"/>
           </a:xfrm>
           <a:prstGeom prst="rect">
             <a:avLst/>
@@ -3139,6 +3139,23 @@
             </a:pPr>
             <a:r>
               <a:rPr lang="en-US" sz="800" noProof="1"/>
+              <a:t>edit X.Y.Z and Release text in :</a:t>
+            </a:r>
+            <a:br>
+              <a:rPr lang="en-US" sz="800" noProof="1"/>
+            </a:br>
+            <a:r>
+              <a:rPr lang="en-US" sz="800" noProof="1"/>
+              <a:t>/Users/jan/Documents/Projects/Pragma-git/Pragma-git/make_binaries/release_to_github.command </a:t>
+            </a:r>
+          </a:p>
+          <a:p>
+            <a:pPr marL="324000" lvl="1" indent="-171450">
+              <a:buFont typeface="Arial" panose="020B0604020202020204" pitchFamily="34" charset="0"/>
+              <a:buChar char="•"/>
+            </a:pPr>
+            <a:r>
+              <a:rPr lang="en-US" sz="800" noProof="1"/>
               <a:t>commit with name (X,Y,Z)</a:t>
             </a:r>
             <a:br>
@@ -3157,7 +3174,7 @@
                   <a:schemeClr val="accent1"/>
                 </a:solidFill>
               </a:rPr>
-              <a:t>create install files</a:t>
+              <a:t>create Install files and Release</a:t>
             </a:r>
             <a:r>
               <a:rPr lang="en-US" sz="800" noProof="1"/>
@@ -3173,6 +3190,27 @@
               <a:rPr lang="en-US" sz="800" noProof="1"/>
               <a:t>run /Users/jan/Documents/Projects/Pragma-git/Pragma-git/make_binaries/build.command</a:t>
             </a:r>
+          </a:p>
+          <a:p>
+            <a:pPr marL="171450" indent="-171450">
+              <a:buFont typeface="Courier New" panose="02070309020205020404" pitchFamily="49" charset="0"/>
+              <a:buChar char="o"/>
+            </a:pPr>
+            <a:endParaRPr lang="en-US" sz="800" noProof="1"/>
+          </a:p>
+          <a:p>
+            <a:pPr marL="324000" lvl="1" indent="-171450">
+              <a:buFont typeface="Arial" panose="020B0604020202020204" pitchFamily="34" charset="0"/>
+              <a:buChar char="•"/>
+            </a:pPr>
+            <a:r>
+              <a:rPr lang="en-US" sz="800" noProof="1"/>
+              <a:t>run /Users/jan/Documents/Projects/Pragma-git/Pragma-git/make_binaries/release_to_github.command</a:t>
+            </a:r>
+            <a:br>
+              <a:rPr lang="en-US" sz="800" noProof="1"/>
+            </a:br>
+            <a:endParaRPr lang="en-US" sz="800" noProof="1"/>
           </a:p>
           <a:p>
             <a:pPr marL="324000" lvl="1" indent="-171450">

</xml_diff>

<commit_message>
Make search in open-graph browsable
- before an open graph, did not update correctly when search was applied
</commit_message>
<xml_diff>
--- a/docs/Tech-overview.pptx
+++ b/docs/Tech-overview.pptx
@@ -7618,7 +7618,7 @@
         <p:spPr>
           <a:xfrm>
             <a:off x="489494" y="786468"/>
-            <a:ext cx="3372291" cy="3662541"/>
+            <a:ext cx="3372291" cy="3293209"/>
           </a:xfrm>
           <a:prstGeom prst="rect">
             <a:avLst/>
@@ -7806,13 +7806,6 @@
             <a:endParaRPr lang="en-US" sz="800" noProof="1"/>
           </a:p>
           <a:p>
-            <a:pPr marL="324000" lvl="1" indent="-171450">
-              <a:buFont typeface="Arial" panose="020B0604020202020204" pitchFamily="34" charset="0"/>
-              <a:buChar char="•"/>
-            </a:pPr>
-            <a:endParaRPr lang="en-US" sz="800" noProof="1"/>
-          </a:p>
-          <a:p>
             <a:pPr marL="171450" indent="-171450">
               <a:buFont typeface="Courier New" panose="02070309020205020404" pitchFamily="49" charset="0"/>
               <a:buChar char="o"/>
@@ -7876,24 +7869,6 @@
               <a:rPr lang="en-US" sz="800" noProof="1"/>
               <a:t>localState.history_status_data</a:t>
             </a:r>
-          </a:p>
-          <a:p>
-            <a:pPr marL="171450" indent="-171450">
-              <a:buFont typeface="Courier New" panose="02070309020205020404" pitchFamily="49" charset="0"/>
-              <a:buChar char="o"/>
-            </a:pPr>
-            <a:endParaRPr lang="en-US" sz="800" noProof="1">
-              <a:solidFill>
-                <a:schemeClr val="accent1"/>
-              </a:solidFill>
-            </a:endParaRPr>
-          </a:p>
-          <a:p>
-            <a:pPr marL="324000" lvl="1" indent="-171450">
-              <a:buFont typeface="Arial" panose="020B0604020202020204" pitchFamily="34" charset="0"/>
-              <a:buChar char="•"/>
-            </a:pPr>
-            <a:endParaRPr lang="en-US" sz="800" noProof="1"/>
           </a:p>
           <a:p>
             <a:pPr marL="324000" lvl="1" indent="-171450">
@@ -8082,7 +8057,7 @@
         </p:nvSpPr>
         <p:spPr>
           <a:xfrm>
-            <a:off x="262749" y="4713030"/>
+            <a:off x="250606" y="4222159"/>
             <a:ext cx="2062488" cy="461665"/>
           </a:xfrm>
           <a:prstGeom prst="rect">
@@ -8117,7 +8092,7 @@
         </p:nvSpPr>
         <p:spPr>
           <a:xfrm>
-            <a:off x="489494" y="5265461"/>
+            <a:off x="477351" y="4774590"/>
             <a:ext cx="3372291" cy="2431435"/>
           </a:xfrm>
           <a:prstGeom prst="rect">

</xml_diff>

<commit_message>
Open/close find -- update search history in graph window
- previously, graph window was not updated
</commit_message>
<xml_diff>
--- a/docs/Tech-overview.pptx
+++ b/docs/Tech-overview.pptx
@@ -258,7 +258,7 @@
           <a:p>
             <a:fld id="{CA855E1B-8830-B64E-B102-DB2BBD0D9567}" type="datetimeFigureOut">
               <a:rPr lang="sv-SE" smtClean="0"/>
-              <a:t>2020-12-19</a:t>
+              <a:t>2020-12-21</a:t>
             </a:fld>
             <a:endParaRPr lang="sv-SE"/>
           </a:p>
@@ -428,7 +428,7 @@
           <a:p>
             <a:fld id="{CA855E1B-8830-B64E-B102-DB2BBD0D9567}" type="datetimeFigureOut">
               <a:rPr lang="sv-SE" smtClean="0"/>
-              <a:t>2020-12-19</a:t>
+              <a:t>2020-12-21</a:t>
             </a:fld>
             <a:endParaRPr lang="sv-SE"/>
           </a:p>
@@ -608,7 +608,7 @@
           <a:p>
             <a:fld id="{CA855E1B-8830-B64E-B102-DB2BBD0D9567}" type="datetimeFigureOut">
               <a:rPr lang="sv-SE" smtClean="0"/>
-              <a:t>2020-12-19</a:t>
+              <a:t>2020-12-21</a:t>
             </a:fld>
             <a:endParaRPr lang="sv-SE"/>
           </a:p>
@@ -778,7 +778,7 @@
           <a:p>
             <a:fld id="{CA855E1B-8830-B64E-B102-DB2BBD0D9567}" type="datetimeFigureOut">
               <a:rPr lang="sv-SE" smtClean="0"/>
-              <a:t>2020-12-19</a:t>
+              <a:t>2020-12-21</a:t>
             </a:fld>
             <a:endParaRPr lang="sv-SE"/>
           </a:p>
@@ -1022,7 +1022,7 @@
           <a:p>
             <a:fld id="{CA855E1B-8830-B64E-B102-DB2BBD0D9567}" type="datetimeFigureOut">
               <a:rPr lang="sv-SE" smtClean="0"/>
-              <a:t>2020-12-19</a:t>
+              <a:t>2020-12-21</a:t>
             </a:fld>
             <a:endParaRPr lang="sv-SE"/>
           </a:p>
@@ -1254,7 +1254,7 @@
           <a:p>
             <a:fld id="{CA855E1B-8830-B64E-B102-DB2BBD0D9567}" type="datetimeFigureOut">
               <a:rPr lang="sv-SE" smtClean="0"/>
-              <a:t>2020-12-19</a:t>
+              <a:t>2020-12-21</a:t>
             </a:fld>
             <a:endParaRPr lang="sv-SE"/>
           </a:p>
@@ -1621,7 +1621,7 @@
           <a:p>
             <a:fld id="{CA855E1B-8830-B64E-B102-DB2BBD0D9567}" type="datetimeFigureOut">
               <a:rPr lang="sv-SE" smtClean="0"/>
-              <a:t>2020-12-19</a:t>
+              <a:t>2020-12-21</a:t>
             </a:fld>
             <a:endParaRPr lang="sv-SE"/>
           </a:p>
@@ -1739,7 +1739,7 @@
           <a:p>
             <a:fld id="{CA855E1B-8830-B64E-B102-DB2BBD0D9567}" type="datetimeFigureOut">
               <a:rPr lang="sv-SE" smtClean="0"/>
-              <a:t>2020-12-19</a:t>
+              <a:t>2020-12-21</a:t>
             </a:fld>
             <a:endParaRPr lang="sv-SE"/>
           </a:p>
@@ -1834,7 +1834,7 @@
           <a:p>
             <a:fld id="{CA855E1B-8830-B64E-B102-DB2BBD0D9567}" type="datetimeFigureOut">
               <a:rPr lang="sv-SE" smtClean="0"/>
-              <a:t>2020-12-19</a:t>
+              <a:t>2020-12-21</a:t>
             </a:fld>
             <a:endParaRPr lang="sv-SE"/>
           </a:p>
@@ -2111,7 +2111,7 @@
           <a:p>
             <a:fld id="{CA855E1B-8830-B64E-B102-DB2BBD0D9567}" type="datetimeFigureOut">
               <a:rPr lang="sv-SE" smtClean="0"/>
-              <a:t>2020-12-19</a:t>
+              <a:t>2020-12-21</a:t>
             </a:fld>
             <a:endParaRPr lang="sv-SE"/>
           </a:p>
@@ -2368,7 +2368,7 @@
           <a:p>
             <a:fld id="{CA855E1B-8830-B64E-B102-DB2BBD0D9567}" type="datetimeFigureOut">
               <a:rPr lang="sv-SE" smtClean="0"/>
-              <a:t>2020-12-19</a:t>
+              <a:t>2020-12-21</a:t>
             </a:fld>
             <a:endParaRPr lang="sv-SE"/>
           </a:p>
@@ -2581,7 +2581,7 @@
           <a:p>
             <a:fld id="{CA855E1B-8830-B64E-B102-DB2BBD0D9567}" type="datetimeFigureOut">
               <a:rPr lang="sv-SE" smtClean="0"/>
-              <a:t>2020-12-19</a:t>
+              <a:t>2020-12-21</a:t>
             </a:fld>
             <a:endParaRPr lang="sv-SE"/>
           </a:p>
@@ -8093,7 +8093,7 @@
         <p:spPr>
           <a:xfrm>
             <a:off x="477351" y="4774590"/>
-            <a:ext cx="3372291" cy="2431435"/>
+            <a:ext cx="3372291" cy="3293209"/>
           </a:xfrm>
           <a:prstGeom prst="rect">
             <a:avLst/>
@@ -8151,6 +8151,16 @@
               <a:rPr lang="en-US" sz="800" noProof="1"/>
               <a:t>selected in graph window moves with main window history arrows</a:t>
             </a:r>
+          </a:p>
+          <a:p>
+            <a:pPr marL="171450" indent="-171450">
+              <a:buFont typeface="Courier New" panose="02070309020205020404" pitchFamily="49" charset="0"/>
+              <a:buChar char="o"/>
+            </a:pPr>
+            <a:r>
+              <a:rPr lang="en-US" sz="800" noProof="1"/>
+              <a:t>graph window uses the filtered history from main window</a:t>
+            </a:r>
             <a:br>
               <a:rPr lang="en-US" sz="800" noProof="1"/>
             </a:br>
@@ -8244,7 +8254,22 @@
                   <a:schemeClr val="accent1"/>
                 </a:solidFill>
               </a:rPr>
-              <a:t>app.js  selectInGraph(hash) </a:t>
+              <a:t>CLICK in Main :</a:t>
+            </a:r>
+            <a:br>
+              <a:rPr lang="en-US" sz="800" noProof="1">
+                <a:solidFill>
+                  <a:schemeClr val="accent1"/>
+                </a:solidFill>
+              </a:rPr>
+            </a:br>
+            <a:r>
+              <a:rPr lang="en-US" sz="800" noProof="1">
+                <a:solidFill>
+                  <a:schemeClr val="accent1"/>
+                </a:solidFill>
+              </a:rPr>
+              <a:t> app.js  selectInGraph(hash) </a:t>
             </a:r>
             <a:endParaRPr lang="en-US" sz="800" noProof="1"/>
           </a:p>
@@ -8255,7 +8280,7 @@
             </a:pPr>
             <a:r>
               <a:rPr lang="en-US" sz="800" noProof="1"/>
-              <a:t>makes main window go to this commit</a:t>
+              <a:t>performs a click action in graph window</a:t>
             </a:r>
             <a:endParaRPr lang="en-US" sz="800" noProof="1">
               <a:solidFill>
@@ -8278,8 +8303,65 @@
                   <a:schemeClr val="accent1"/>
                 </a:solidFill>
               </a:rPr>
-              <a:t>app.html has all the logics for displaying clicked select and pin actions</a:t>
-            </a:r>
+              <a:t>CLICK in GRAPH : </a:t>
+            </a:r>
+            <a:br>
+              <a:rPr lang="en-US" sz="800" noProof="1">
+                <a:solidFill>
+                  <a:schemeClr val="accent1"/>
+                </a:solidFill>
+              </a:rPr>
+            </a:br>
+            <a:r>
+              <a:rPr lang="en-US" sz="800" noProof="1">
+                <a:solidFill>
+                  <a:schemeClr val="accent1"/>
+                </a:solidFill>
+              </a:rPr>
+              <a:t>graph.html has all the logics for displaying clicked select and pin actions</a:t>
+            </a:r>
+            <a:endParaRPr lang="en-US" sz="800" noProof="1"/>
+          </a:p>
+          <a:p>
+            <a:pPr marL="324000" lvl="1" indent="-171450">
+              <a:buFont typeface="Arial" panose="020B0604020202020204" pitchFamily="34" charset="0"/>
+              <a:buChar char="•"/>
+            </a:pPr>
+            <a:r>
+              <a:rPr lang="en-US" sz="800" noProof="1"/>
+              <a:t>it also calls setHistoricalCommit, </a:t>
+            </a:r>
+          </a:p>
+          <a:p>
+            <a:pPr marL="324000" lvl="1" indent="-171450">
+              <a:buFont typeface="Arial" panose="020B0604020202020204" pitchFamily="34" charset="0"/>
+              <a:buChar char="•"/>
+            </a:pPr>
+            <a:r>
+              <a:rPr lang="en-US" sz="800" noProof="1"/>
+              <a:t>which sets localState.historyHash,  …,</a:t>
+            </a:r>
+          </a:p>
+          <a:p>
+            <a:pPr marL="324000" lvl="1" indent="-171450">
+              <a:buFont typeface="Arial" panose="020B0604020202020204" pitchFamily="34" charset="0"/>
+              <a:buChar char="•"/>
+            </a:pPr>
+            <a:r>
+              <a:rPr lang="en-US" sz="800" noProof="1"/>
+              <a:t>and calls opener._update to show correct commit in main window</a:t>
+            </a:r>
+            <a:endParaRPr lang="en-US" sz="800" noProof="1">
+              <a:solidFill>
+                <a:schemeClr val="accent1"/>
+              </a:solidFill>
+            </a:endParaRPr>
+          </a:p>
+          <a:p>
+            <a:pPr marL="171450" indent="-171450">
+              <a:buFont typeface="Courier New" panose="02070309020205020404" pitchFamily="49" charset="0"/>
+              <a:buChar char="o"/>
+            </a:pPr>
             <a:endParaRPr lang="en-US" sz="800" noProof="1"/>
           </a:p>
           <a:p>
@@ -8531,7 +8613,7 @@
                   <a:schemeClr val="accent1"/>
                 </a:solidFill>
               </a:rPr>
-              <a:t>Storage for remote (updated with gitFetch )</a:t>
+              <a:t>Storage for remote (updated with gitFetch ) – stores a cache from ls-remote</a:t>
             </a:r>
             <a:endParaRPr lang="en-US" sz="800" noProof="1"/>
           </a:p>

</xml_diff>

<commit_message>
Update tech documentation about graph and search
</commit_message>
<xml_diff>
--- a/docs/Tech-overview.pptx
+++ b/docs/Tech-overview.pptx
@@ -7582,7 +7582,7 @@
         </p:nvSpPr>
         <p:spPr>
           <a:xfrm>
-            <a:off x="138058" y="170498"/>
+            <a:off x="424554" y="209378"/>
             <a:ext cx="1099660" cy="461665"/>
           </a:xfrm>
           <a:prstGeom prst="rect">
@@ -7618,7 +7618,7 @@
         <p:spPr>
           <a:xfrm>
             <a:off x="489494" y="786468"/>
-            <a:ext cx="3372291" cy="3293209"/>
+            <a:ext cx="3685232" cy="3293209"/>
           </a:xfrm>
           <a:prstGeom prst="rect">
             <a:avLst/>
@@ -7893,7 +7893,7 @@
         </p:nvSpPr>
         <p:spPr>
           <a:xfrm>
-            <a:off x="4162583" y="209379"/>
+            <a:off x="4316934" y="209378"/>
             <a:ext cx="1679434" cy="461665"/>
           </a:xfrm>
           <a:prstGeom prst="rect">
@@ -7928,7 +7928,7 @@
         </p:nvSpPr>
         <p:spPr>
           <a:xfrm>
-            <a:off x="4231679" y="786466"/>
+            <a:off x="4408991" y="790642"/>
             <a:ext cx="3372291" cy="1692771"/>
           </a:xfrm>
           <a:prstGeom prst="rect">
@@ -8057,7 +8057,7 @@
         </p:nvSpPr>
         <p:spPr>
           <a:xfrm>
-            <a:off x="250606" y="4222159"/>
+            <a:off x="409086" y="4261039"/>
             <a:ext cx="2062488" cy="461665"/>
           </a:xfrm>
           <a:prstGeom prst="rect">
@@ -8093,7 +8093,7 @@
         <p:spPr>
           <a:xfrm>
             <a:off x="477351" y="4774590"/>
-            <a:ext cx="3372291" cy="3293209"/>
+            <a:ext cx="3685232" cy="4031873"/>
           </a:xfrm>
           <a:prstGeom prst="rect">
             <a:avLst/>
@@ -8177,7 +8177,53 @@
                   <a:schemeClr val="accent1"/>
                 </a:solidFill>
               </a:rPr>
-              <a:t>setPinned(hash, isPinned)(</a:t>
+              <a:t>injectIntoJs(document)</a:t>
+            </a:r>
+            <a:endParaRPr lang="en-US" sz="800" noProof="1"/>
+          </a:p>
+          <a:p>
+            <a:pPr marL="324000" lvl="1" indent="-171450">
+              <a:buFont typeface="Arial" panose="020B0604020202020204" pitchFamily="34" charset="0"/>
+              <a:buChar char="•"/>
+            </a:pPr>
+            <a:r>
+              <a:rPr lang="en-US" sz="800" noProof="1"/>
+              <a:t>gets the search history (full history if not searched) form opener.gitHistory().</a:t>
+            </a:r>
+            <a:br>
+              <a:rPr lang="en-US" sz="800" noProof="1"/>
+            </a:br>
+            <a:r>
+              <a:rPr lang="en-US" sz="800" noProof="1"/>
+              <a:t>This is not updated automatically, so if search is changed, injectIntoJs has to be called again (search does that)</a:t>
+            </a:r>
+          </a:p>
+          <a:p>
+            <a:pPr marL="324000" lvl="1" indent="-171450">
+              <a:buFont typeface="Arial" panose="020B0604020202020204" pitchFamily="34" charset="0"/>
+              <a:buChar char="•"/>
+            </a:pPr>
+            <a:r>
+              <a:rPr lang="en-US" sz="800" noProof="1"/>
+              <a:t>draws the complete graph using git log –first-parent</a:t>
+            </a:r>
+            <a:br>
+              <a:rPr lang="en-US" sz="800" noProof="1"/>
+            </a:br>
+            <a:endParaRPr lang="en-US" sz="800" noProof="1"/>
+          </a:p>
+          <a:p>
+            <a:pPr marL="171450" indent="-171450">
+              <a:buFont typeface="Courier New" panose="02070309020205020404" pitchFamily="49" charset="0"/>
+              <a:buChar char="o"/>
+            </a:pPr>
+            <a:r>
+              <a:rPr lang="en-US" sz="800" noProof="1">
+                <a:solidFill>
+                  <a:schemeClr val="accent1"/>
+                </a:solidFill>
+              </a:rPr>
+              <a:t>setPinned(hash, isPinned)</a:t>
             </a:r>
             <a:endParaRPr lang="en-US" sz="800" noProof="1"/>
           </a:p>
@@ -8538,7 +8584,7 @@
         </p:nvSpPr>
         <p:spPr>
           <a:xfrm>
-            <a:off x="8039832" y="209378"/>
+            <a:off x="7984968" y="209378"/>
             <a:ext cx="1788695" cy="461665"/>
           </a:xfrm>
           <a:prstGeom prst="rect">
@@ -8658,7 +8704,7 @@
         </p:nvSpPr>
         <p:spPr>
           <a:xfrm>
-            <a:off x="8093659" y="2673331"/>
+            <a:off x="8066227" y="2673331"/>
             <a:ext cx="1923219" cy="461665"/>
           </a:xfrm>
           <a:prstGeom prst="rect">
@@ -8693,7 +8739,7 @@
         </p:nvSpPr>
         <p:spPr>
           <a:xfrm>
-            <a:off x="4285505" y="3228637"/>
+            <a:off x="4462817" y="3232813"/>
             <a:ext cx="3372291" cy="2062103"/>
           </a:xfrm>
           <a:prstGeom prst="rect">
@@ -8875,7 +8921,7 @@
         </p:nvSpPr>
         <p:spPr>
           <a:xfrm>
-            <a:off x="4231679" y="2673330"/>
+            <a:off x="4386030" y="2673329"/>
             <a:ext cx="1204882" cy="461665"/>
           </a:xfrm>
           <a:prstGeom prst="rect">
@@ -8910,7 +8956,7 @@
         </p:nvSpPr>
         <p:spPr>
           <a:xfrm>
-            <a:off x="8147486" y="4337579"/>
+            <a:off x="8028614" y="4337579"/>
             <a:ext cx="1592103" cy="461665"/>
           </a:xfrm>
           <a:prstGeom prst="rect">

</xml_diff>

<commit_message>
Document Find in Notes and Graph
</commit_message>
<xml_diff>
--- a/docs/Tech-overview.pptx
+++ b/docs/Tech-overview.pptx
@@ -9195,6 +9195,164 @@
           </a:p>
         </p:txBody>
       </p:sp>
+      <p:sp>
+        <p:nvSpPr>
+          <p:cNvPr id="18" name="Rektangel 17">
+            <a:extLst>
+              <a:ext uri="{FF2B5EF4-FFF2-40B4-BE49-F238E27FC236}">
+                <a16:creationId xmlns:a16="http://schemas.microsoft.com/office/drawing/2014/main" id="{1DB0E46F-C9CA-A948-A22C-D89EEA13217F}"/>
+              </a:ext>
+            </a:extLst>
+          </p:cNvPr>
+          <p:cNvSpPr/>
+          <p:nvPr/>
+        </p:nvSpPr>
+        <p:spPr>
+          <a:xfrm>
+            <a:off x="4470128" y="5820287"/>
+            <a:ext cx="3364980" cy="1077218"/>
+          </a:xfrm>
+          <a:prstGeom prst="rect">
+            <a:avLst/>
+          </a:prstGeom>
+          <a:solidFill>
+            <a:schemeClr val="bg1"/>
+          </a:solidFill>
+          <a:ln>
+            <a:solidFill>
+              <a:schemeClr val="accent1"/>
+            </a:solidFill>
+          </a:ln>
+        </p:spPr>
+        <p:txBody>
+          <a:bodyPr wrap="square">
+            <a:spAutoFit/>
+          </a:bodyPr>
+          <a:lstStyle/>
+          <a:p>
+            <a:pPr marL="171450" indent="-171450">
+              <a:buFont typeface="Courier New" panose="02070309020205020404" pitchFamily="49" charset="0"/>
+              <a:buChar char="o"/>
+            </a:pPr>
+            <a:r>
+              <a:rPr lang="en-US" sz="800" noProof="1">
+                <a:solidFill>
+                  <a:schemeClr val="accent1"/>
+                </a:solidFill>
+              </a:rPr>
+              <a:t>Pragma-merge has the CodeMirror search plugin</a:t>
+            </a:r>
+          </a:p>
+          <a:p>
+            <a:pPr marL="324000" lvl="1" indent="-171450">
+              <a:buFont typeface="Arial" panose="020B0604020202020204" pitchFamily="34" charset="0"/>
+              <a:buChar char="•"/>
+            </a:pPr>
+            <a:r>
+              <a:rPr lang="en-US" sz="800" noProof="1"/>
+              <a:t>Use CodeMirror search addon</a:t>
+            </a:r>
+            <a:endParaRPr lang="en-US" sz="800" noProof="1">
+              <a:solidFill>
+                <a:schemeClr val="accent1"/>
+              </a:solidFill>
+            </a:endParaRPr>
+          </a:p>
+          <a:p>
+            <a:pPr marL="324000" lvl="1" indent="-171450">
+              <a:buFont typeface="Arial" panose="020B0604020202020204" pitchFamily="34" charset="0"/>
+              <a:buChar char="•"/>
+            </a:pPr>
+            <a:endParaRPr lang="en-US" sz="800" noProof="1"/>
+          </a:p>
+          <a:p>
+            <a:pPr marL="171450" indent="-171450">
+              <a:buFont typeface="Courier New" panose="02070309020205020404" pitchFamily="49" charset="0"/>
+              <a:buChar char="o"/>
+            </a:pPr>
+            <a:r>
+              <a:rPr lang="en-US" sz="800" noProof="1">
+                <a:solidFill>
+                  <a:schemeClr val="accent1"/>
+                </a:solidFill>
+              </a:rPr>
+              <a:t>Notes and Graph window </a:t>
+            </a:r>
+          </a:p>
+          <a:p>
+            <a:pPr marL="324000" lvl="1" indent="-171450">
+              <a:buFont typeface="Arial" panose="020B0604020202020204" pitchFamily="34" charset="0"/>
+              <a:buChar char="•"/>
+            </a:pPr>
+            <a:r>
+              <a:rPr lang="en-US" sz="800" noProof="1"/>
+              <a:t>Based on npm find-in-nw</a:t>
+            </a:r>
+          </a:p>
+          <a:p>
+            <a:pPr marL="324000" lvl="1" indent="-171450">
+              <a:buFont typeface="Arial" panose="020B0604020202020204" pitchFamily="34" charset="0"/>
+              <a:buChar char="•"/>
+            </a:pPr>
+            <a:r>
+              <a:rPr lang="en-US" sz="800" noProof="1"/>
+              <a:t>Extend npm find-in-nw on the fly, with “extend_find-in-nw.js”</a:t>
+            </a:r>
+          </a:p>
+          <a:p>
+            <a:pPr marL="324000" lvl="1" indent="-171450">
+              <a:buFont typeface="Arial" panose="020B0604020202020204" pitchFamily="34" charset="0"/>
+              <a:buChar char="•"/>
+            </a:pPr>
+            <a:r>
+              <a:rPr lang="en-US" sz="800" noProof="1"/>
+              <a:t>Code added at end of Notes.html and graph.html</a:t>
+            </a:r>
+          </a:p>
+          <a:p>
+            <a:pPr marL="324000" lvl="1" indent="-171450">
+              <a:buFont typeface="Arial" panose="020B0604020202020204" pitchFamily="34" charset="0"/>
+              <a:buChar char="•"/>
+            </a:pPr>
+            <a:endParaRPr lang="en-US" sz="800" noProof="1"/>
+          </a:p>
+        </p:txBody>
+      </p:sp>
+      <p:sp>
+        <p:nvSpPr>
+          <p:cNvPr id="19" name="textruta 18">
+            <a:extLst>
+              <a:ext uri="{FF2B5EF4-FFF2-40B4-BE49-F238E27FC236}">
+                <a16:creationId xmlns:a16="http://schemas.microsoft.com/office/drawing/2014/main" id="{A7C2C043-D2F7-C944-B558-2BA54F5E7D29}"/>
+              </a:ext>
+            </a:extLst>
+          </p:cNvPr>
+          <p:cNvSpPr txBox="1"/>
+          <p:nvPr/>
+        </p:nvSpPr>
+        <p:spPr>
+          <a:xfrm>
+            <a:off x="4421134" y="5375597"/>
+            <a:ext cx="1612364" cy="461665"/>
+          </a:xfrm>
+          <a:prstGeom prst="rect">
+            <a:avLst/>
+          </a:prstGeom>
+          <a:noFill/>
+        </p:spPr>
+        <p:txBody>
+          <a:bodyPr wrap="none" rtlCol="0">
+            <a:spAutoFit/>
+          </a:bodyPr>
+          <a:lstStyle/>
+          <a:p>
+            <a:r>
+              <a:rPr lang="en-US" sz="2400" b="1" noProof="1"/>
+              <a:t>Find in text</a:t>
+            </a:r>
+          </a:p>
+        </p:txBody>
+      </p:sp>
     </p:spTree>
     <p:extLst>
       <p:ext uri="{BB962C8B-B14F-4D97-AF65-F5344CB8AC3E}">

</xml_diff>

<commit_message>
Improve search in Notes. Make sure <marks> are removed before saving.
- search only in wysiwyg editor and wysiwyg preview (in markdown mode)
</commit_message>
<xml_diff>
--- a/docs/Tech-overview.pptx
+++ b/docs/Tech-overview.pptx
@@ -258,7 +258,7 @@
           <a:p>
             <a:fld id="{CA855E1B-8830-B64E-B102-DB2BBD0D9567}" type="datetimeFigureOut">
               <a:rPr lang="sv-SE" smtClean="0"/>
-              <a:t>2020-12-21</a:t>
+              <a:t>2020-12-22</a:t>
             </a:fld>
             <a:endParaRPr lang="sv-SE"/>
           </a:p>
@@ -428,7 +428,7 @@
           <a:p>
             <a:fld id="{CA855E1B-8830-B64E-B102-DB2BBD0D9567}" type="datetimeFigureOut">
               <a:rPr lang="sv-SE" smtClean="0"/>
-              <a:t>2020-12-21</a:t>
+              <a:t>2020-12-22</a:t>
             </a:fld>
             <a:endParaRPr lang="sv-SE"/>
           </a:p>
@@ -608,7 +608,7 @@
           <a:p>
             <a:fld id="{CA855E1B-8830-B64E-B102-DB2BBD0D9567}" type="datetimeFigureOut">
               <a:rPr lang="sv-SE" smtClean="0"/>
-              <a:t>2020-12-21</a:t>
+              <a:t>2020-12-22</a:t>
             </a:fld>
             <a:endParaRPr lang="sv-SE"/>
           </a:p>
@@ -778,7 +778,7 @@
           <a:p>
             <a:fld id="{CA855E1B-8830-B64E-B102-DB2BBD0D9567}" type="datetimeFigureOut">
               <a:rPr lang="sv-SE" smtClean="0"/>
-              <a:t>2020-12-21</a:t>
+              <a:t>2020-12-22</a:t>
             </a:fld>
             <a:endParaRPr lang="sv-SE"/>
           </a:p>
@@ -1022,7 +1022,7 @@
           <a:p>
             <a:fld id="{CA855E1B-8830-B64E-B102-DB2BBD0D9567}" type="datetimeFigureOut">
               <a:rPr lang="sv-SE" smtClean="0"/>
-              <a:t>2020-12-21</a:t>
+              <a:t>2020-12-22</a:t>
             </a:fld>
             <a:endParaRPr lang="sv-SE"/>
           </a:p>
@@ -1254,7 +1254,7 @@
           <a:p>
             <a:fld id="{CA855E1B-8830-B64E-B102-DB2BBD0D9567}" type="datetimeFigureOut">
               <a:rPr lang="sv-SE" smtClean="0"/>
-              <a:t>2020-12-21</a:t>
+              <a:t>2020-12-22</a:t>
             </a:fld>
             <a:endParaRPr lang="sv-SE"/>
           </a:p>
@@ -1621,7 +1621,7 @@
           <a:p>
             <a:fld id="{CA855E1B-8830-B64E-B102-DB2BBD0D9567}" type="datetimeFigureOut">
               <a:rPr lang="sv-SE" smtClean="0"/>
-              <a:t>2020-12-21</a:t>
+              <a:t>2020-12-22</a:t>
             </a:fld>
             <a:endParaRPr lang="sv-SE"/>
           </a:p>
@@ -1739,7 +1739,7 @@
           <a:p>
             <a:fld id="{CA855E1B-8830-B64E-B102-DB2BBD0D9567}" type="datetimeFigureOut">
               <a:rPr lang="sv-SE" smtClean="0"/>
-              <a:t>2020-12-21</a:t>
+              <a:t>2020-12-22</a:t>
             </a:fld>
             <a:endParaRPr lang="sv-SE"/>
           </a:p>
@@ -1834,7 +1834,7 @@
           <a:p>
             <a:fld id="{CA855E1B-8830-B64E-B102-DB2BBD0D9567}" type="datetimeFigureOut">
               <a:rPr lang="sv-SE" smtClean="0"/>
-              <a:t>2020-12-21</a:t>
+              <a:t>2020-12-22</a:t>
             </a:fld>
             <a:endParaRPr lang="sv-SE"/>
           </a:p>
@@ -2111,7 +2111,7 @@
           <a:p>
             <a:fld id="{CA855E1B-8830-B64E-B102-DB2BBD0D9567}" type="datetimeFigureOut">
               <a:rPr lang="sv-SE" smtClean="0"/>
-              <a:t>2020-12-21</a:t>
+              <a:t>2020-12-22</a:t>
             </a:fld>
             <a:endParaRPr lang="sv-SE"/>
           </a:p>
@@ -2368,7 +2368,7 @@
           <a:p>
             <a:fld id="{CA855E1B-8830-B64E-B102-DB2BBD0D9567}" type="datetimeFigureOut">
               <a:rPr lang="sv-SE" smtClean="0"/>
-              <a:t>2020-12-21</a:t>
+              <a:t>2020-12-22</a:t>
             </a:fld>
             <a:endParaRPr lang="sv-SE"/>
           </a:p>
@@ -2581,7 +2581,7 @@
           <a:p>
             <a:fld id="{CA855E1B-8830-B64E-B102-DB2BBD0D9567}" type="datetimeFigureOut">
               <a:rPr lang="sv-SE" smtClean="0"/>
-              <a:t>2020-12-21</a:t>
+              <a:t>2020-12-22</a:t>
             </a:fld>
             <a:endParaRPr lang="sv-SE"/>
           </a:p>
@@ -9210,7 +9210,7 @@
         <p:spPr>
           <a:xfrm>
             <a:off x="4470128" y="5820287"/>
-            <a:ext cx="3364980" cy="1077218"/>
+            <a:ext cx="3364980" cy="2185214"/>
           </a:xfrm>
           <a:prstGeom prst="rect">
             <a:avLst/>
@@ -9298,6 +9298,20 @@
               <a:rPr lang="en-US" sz="800" noProof="1"/>
               <a:t>Extend npm find-in-nw on the fly, with “extend_find-in-nw.js”</a:t>
             </a:r>
+            <a:br>
+              <a:rPr lang="en-US" sz="800" noProof="1"/>
+            </a:br>
+            <a:r>
+              <a:rPr lang="en-US" sz="800" noProof="1"/>
+              <a:t>- in graph : searches document.body</a:t>
+            </a:r>
+            <a:br>
+              <a:rPr lang="en-US" sz="800" noProof="1"/>
+            </a:br>
+            <a:r>
+              <a:rPr lang="en-US" sz="800" noProof="1"/>
+              <a:t>- in Notes : search depends on wysiwyg / markdown modes</a:t>
+            </a:r>
           </a:p>
           <a:p>
             <a:pPr marL="324000" lvl="1" indent="-171450">
@@ -9308,6 +9322,68 @@
               <a:rPr lang="en-US" sz="800" noProof="1"/>
               <a:t>Code added at end of Notes.html and graph.html</a:t>
             </a:r>
+          </a:p>
+          <a:p>
+            <a:pPr marL="324000" lvl="1" indent="-171450">
+              <a:buFont typeface="Arial" panose="020B0604020202020204" pitchFamily="34" charset="0"/>
+              <a:buChar char="•"/>
+            </a:pPr>
+            <a:endParaRPr lang="en-US" sz="800" noProof="1"/>
+          </a:p>
+          <a:p>
+            <a:pPr marL="171450" indent="-171450">
+              <a:buFont typeface="Courier New" panose="02070309020205020404" pitchFamily="49" charset="0"/>
+              <a:buChar char="o"/>
+            </a:pPr>
+            <a:r>
+              <a:rPr lang="en-US" sz="800" noProof="1">
+                <a:solidFill>
+                  <a:schemeClr val="accent1"/>
+                </a:solidFill>
+              </a:rPr>
+              <a:t>Notes window extra</a:t>
+            </a:r>
+          </a:p>
+          <a:p>
+            <a:pPr marL="324000" lvl="1" indent="-171450">
+              <a:buFont typeface="Arial" panose="020B0604020202020204" pitchFamily="34" charset="0"/>
+              <a:buChar char="•"/>
+            </a:pPr>
+            <a:r>
+              <a:rPr lang="en-US" sz="800" noProof="1"/>
+              <a:t>“Notes.html” : Listen to mouseover on markdown/wysiwyg switches</a:t>
+            </a:r>
+            <a:br>
+              <a:rPr lang="en-US" sz="800" noProof="1"/>
+            </a:br>
+            <a:r>
+              <a:rPr lang="en-US" sz="800" noProof="1"/>
+              <a:t>and clear marked finds (“tokens”), before switching.</a:t>
+            </a:r>
+            <a:br>
+              <a:rPr lang="en-US" sz="800" noProof="1"/>
+            </a:br>
+            <a:r>
+              <a:rPr lang="en-US" sz="800" noProof="1"/>
+              <a:t>Then close search box.</a:t>
+            </a:r>
+          </a:p>
+          <a:p>
+            <a:pPr marL="324000" lvl="1" indent="-171450">
+              <a:buFont typeface="Arial" panose="020B0604020202020204" pitchFamily="34" charset="0"/>
+              <a:buChar char="•"/>
+            </a:pPr>
+            <a:r>
+              <a:rPr lang="en-US" sz="800" noProof="1"/>
+              <a:t>“Notes.js” : Stop save from happening if find is active</a:t>
+            </a:r>
+          </a:p>
+          <a:p>
+            <a:pPr marL="324000" lvl="1" indent="-171450">
+              <a:buFont typeface="Arial" panose="020B0604020202020204" pitchFamily="34" charset="0"/>
+              <a:buChar char="•"/>
+            </a:pPr>
+            <a:endParaRPr lang="en-US" sz="800" noProof="1"/>
           </a:p>
           <a:p>
             <a:pPr marL="324000" lvl="1" indent="-171450">

</xml_diff>

<commit_message>
Case insensitive search in Graph and Notes
</commit_message>
<xml_diff>
--- a/docs/Tech-overview.pptx
+++ b/docs/Tech-overview.pptx
@@ -258,7 +258,7 @@
           <a:p>
             <a:fld id="{CA855E1B-8830-B64E-B102-DB2BBD0D9567}" type="datetimeFigureOut">
               <a:rPr lang="sv-SE" smtClean="0"/>
-              <a:t>2020-12-22</a:t>
+              <a:t>2020-12-23</a:t>
             </a:fld>
             <a:endParaRPr lang="sv-SE"/>
           </a:p>
@@ -428,7 +428,7 @@
           <a:p>
             <a:fld id="{CA855E1B-8830-B64E-B102-DB2BBD0D9567}" type="datetimeFigureOut">
               <a:rPr lang="sv-SE" smtClean="0"/>
-              <a:t>2020-12-22</a:t>
+              <a:t>2020-12-23</a:t>
             </a:fld>
             <a:endParaRPr lang="sv-SE"/>
           </a:p>
@@ -608,7 +608,7 @@
           <a:p>
             <a:fld id="{CA855E1B-8830-B64E-B102-DB2BBD0D9567}" type="datetimeFigureOut">
               <a:rPr lang="sv-SE" smtClean="0"/>
-              <a:t>2020-12-22</a:t>
+              <a:t>2020-12-23</a:t>
             </a:fld>
             <a:endParaRPr lang="sv-SE"/>
           </a:p>
@@ -778,7 +778,7 @@
           <a:p>
             <a:fld id="{CA855E1B-8830-B64E-B102-DB2BBD0D9567}" type="datetimeFigureOut">
               <a:rPr lang="sv-SE" smtClean="0"/>
-              <a:t>2020-12-22</a:t>
+              <a:t>2020-12-23</a:t>
             </a:fld>
             <a:endParaRPr lang="sv-SE"/>
           </a:p>
@@ -1022,7 +1022,7 @@
           <a:p>
             <a:fld id="{CA855E1B-8830-B64E-B102-DB2BBD0D9567}" type="datetimeFigureOut">
               <a:rPr lang="sv-SE" smtClean="0"/>
-              <a:t>2020-12-22</a:t>
+              <a:t>2020-12-23</a:t>
             </a:fld>
             <a:endParaRPr lang="sv-SE"/>
           </a:p>
@@ -1254,7 +1254,7 @@
           <a:p>
             <a:fld id="{CA855E1B-8830-B64E-B102-DB2BBD0D9567}" type="datetimeFigureOut">
               <a:rPr lang="sv-SE" smtClean="0"/>
-              <a:t>2020-12-22</a:t>
+              <a:t>2020-12-23</a:t>
             </a:fld>
             <a:endParaRPr lang="sv-SE"/>
           </a:p>
@@ -1621,7 +1621,7 @@
           <a:p>
             <a:fld id="{CA855E1B-8830-B64E-B102-DB2BBD0D9567}" type="datetimeFigureOut">
               <a:rPr lang="sv-SE" smtClean="0"/>
-              <a:t>2020-12-22</a:t>
+              <a:t>2020-12-23</a:t>
             </a:fld>
             <a:endParaRPr lang="sv-SE"/>
           </a:p>
@@ -1739,7 +1739,7 @@
           <a:p>
             <a:fld id="{CA855E1B-8830-B64E-B102-DB2BBD0D9567}" type="datetimeFigureOut">
               <a:rPr lang="sv-SE" smtClean="0"/>
-              <a:t>2020-12-22</a:t>
+              <a:t>2020-12-23</a:t>
             </a:fld>
             <a:endParaRPr lang="sv-SE"/>
           </a:p>
@@ -1834,7 +1834,7 @@
           <a:p>
             <a:fld id="{CA855E1B-8830-B64E-B102-DB2BBD0D9567}" type="datetimeFigureOut">
               <a:rPr lang="sv-SE" smtClean="0"/>
-              <a:t>2020-12-22</a:t>
+              <a:t>2020-12-23</a:t>
             </a:fld>
             <a:endParaRPr lang="sv-SE"/>
           </a:p>
@@ -2111,7 +2111,7 @@
           <a:p>
             <a:fld id="{CA855E1B-8830-B64E-B102-DB2BBD0D9567}" type="datetimeFigureOut">
               <a:rPr lang="sv-SE" smtClean="0"/>
-              <a:t>2020-12-22</a:t>
+              <a:t>2020-12-23</a:t>
             </a:fld>
             <a:endParaRPr lang="sv-SE"/>
           </a:p>
@@ -2368,7 +2368,7 @@
           <a:p>
             <a:fld id="{CA855E1B-8830-B64E-B102-DB2BBD0D9567}" type="datetimeFigureOut">
               <a:rPr lang="sv-SE" smtClean="0"/>
-              <a:t>2020-12-22</a:t>
+              <a:t>2020-12-23</a:t>
             </a:fld>
             <a:endParaRPr lang="sv-SE"/>
           </a:p>
@@ -2581,7 +2581,7 @@
           <a:p>
             <a:fld id="{CA855E1B-8830-B64E-B102-DB2BBD0D9567}" type="datetimeFigureOut">
               <a:rPr lang="sv-SE" smtClean="0"/>
-              <a:t>2020-12-22</a:t>
+              <a:t>2020-12-23</a:t>
             </a:fld>
             <a:endParaRPr lang="sv-SE"/>
           </a:p>
@@ -9210,7 +9210,7 @@
         <p:spPr>
           <a:xfrm>
             <a:off x="4470128" y="5820287"/>
-            <a:ext cx="3364980" cy="2185214"/>
+            <a:ext cx="3364980" cy="2308324"/>
           </a:xfrm>
           <a:prstGeom prst="rect">
             <a:avLst/>
@@ -9297,6 +9297,13 @@
             <a:r>
               <a:rPr lang="en-US" sz="800" noProof="1"/>
               <a:t>Extend npm find-in-nw on the fly, with “extend_find-in-nw.js”</a:t>
+            </a:r>
+            <a:br>
+              <a:rPr lang="en-US" sz="800" noProof="1"/>
+            </a:br>
+            <a:r>
+              <a:rPr lang="en-US" sz="800" noProof="1"/>
+              <a:t>- make search case insensitive, add navigation CTRL-G, ↑,↓</a:t>
             </a:r>
             <a:br>
               <a:rPr lang="en-US" sz="800" noProof="1"/>

</xml_diff>

<commit_message>
Add find in help texts
</commit_message>
<xml_diff>
--- a/docs/Tech-overview.pptx
+++ b/docs/Tech-overview.pptx
@@ -9416,7 +9416,7 @@
         <p:spPr>
           <a:xfrm>
             <a:off x="4421134" y="5375597"/>
-            <a:ext cx="1612364" cy="461665"/>
+            <a:ext cx="1704634" cy="461665"/>
           </a:xfrm>
           <a:prstGeom prst="rect">
             <a:avLst/>
@@ -9431,7 +9431,161 @@
           <a:p>
             <a:r>
               <a:rPr lang="en-US" sz="2400" b="1" noProof="1"/>
-              <a:t>Find in text</a:t>
+              <a:t>Find in html</a:t>
+            </a:r>
+          </a:p>
+        </p:txBody>
+      </p:sp>
+      <p:sp>
+        <p:nvSpPr>
+          <p:cNvPr id="20" name="Rektangel 19">
+            <a:extLst>
+              <a:ext uri="{FF2B5EF4-FFF2-40B4-BE49-F238E27FC236}">
+                <a16:creationId xmlns:a16="http://schemas.microsoft.com/office/drawing/2014/main" id="{116B39BA-29B4-7748-8FA3-5994271F75AA}"/>
+              </a:ext>
+            </a:extLst>
+          </p:cNvPr>
+          <p:cNvSpPr/>
+          <p:nvPr/>
+        </p:nvSpPr>
+        <p:spPr>
+          <a:xfrm>
+            <a:off x="8093659" y="7988726"/>
+            <a:ext cx="4535554" cy="954107"/>
+          </a:xfrm>
+          <a:prstGeom prst="rect">
+            <a:avLst/>
+          </a:prstGeom>
+          <a:solidFill>
+            <a:schemeClr val="bg1"/>
+          </a:solidFill>
+          <a:ln>
+            <a:solidFill>
+              <a:schemeClr val="accent1"/>
+            </a:solidFill>
+          </a:ln>
+        </p:spPr>
+        <p:txBody>
+          <a:bodyPr wrap="square">
+            <a:spAutoFit/>
+          </a:bodyPr>
+          <a:lstStyle/>
+          <a:p>
+            <a:r>
+              <a:rPr lang="en-US" sz="800" noProof="1">
+                <a:solidFill>
+                  <a:schemeClr val="accent1"/>
+                </a:solidFill>
+              </a:rPr>
+              <a:t>About.html</a:t>
+            </a:r>
+            <a:endParaRPr lang="en-US" sz="800" noProof="1"/>
+          </a:p>
+          <a:p>
+            <a:pPr marL="171450" indent="-171450">
+              <a:buFont typeface="Courier New" panose="02070309020205020404" pitchFamily="49" charset="0"/>
+              <a:buChar char="o"/>
+            </a:pPr>
+            <a:r>
+              <a:rPr lang="en-US" sz="800" noProof="1"/>
+              <a:t>is self-contained</a:t>
+            </a:r>
+          </a:p>
+          <a:p>
+            <a:pPr marL="171450" indent="-171450">
+              <a:buFont typeface="Courier New" panose="02070309020205020404" pitchFamily="49" charset="0"/>
+              <a:buChar char="o"/>
+            </a:pPr>
+            <a:r>
+              <a:rPr lang="en-US" sz="800" noProof="1"/>
+              <a:t>inserts “about_search.html” in div, to have same text here as in help for history search.</a:t>
+            </a:r>
+            <a:endParaRPr lang="en-US" sz="800" noProof="1">
+              <a:solidFill>
+                <a:schemeClr val="accent1"/>
+              </a:solidFill>
+            </a:endParaRPr>
+          </a:p>
+          <a:p>
+            <a:r>
+              <a:rPr lang="en-US" sz="800" noProof="1">
+                <a:solidFill>
+                  <a:schemeClr val="accent1"/>
+                </a:solidFill>
+              </a:rPr>
+              <a:t>about_search.html</a:t>
+            </a:r>
+            <a:endParaRPr lang="en-US" sz="800" noProof="1"/>
+          </a:p>
+          <a:p>
+            <a:pPr marL="171450" indent="-171450">
+              <a:buFont typeface="Courier New" panose="02070309020205020404" pitchFamily="49" charset="0"/>
+              <a:buChar char="o"/>
+            </a:pPr>
+            <a:r>
+              <a:rPr lang="en-US" sz="800" noProof="1"/>
+              <a:t>is self-contained</a:t>
+            </a:r>
+            <a:endParaRPr lang="en-US" sz="800" noProof="1">
+              <a:solidFill>
+                <a:schemeClr val="accent1"/>
+              </a:solidFill>
+            </a:endParaRPr>
+          </a:p>
+          <a:p>
+            <a:r>
+              <a:rPr lang="en-US" sz="800" noProof="1">
+                <a:solidFill>
+                  <a:schemeClr val="accent1"/>
+                </a:solidFill>
+              </a:rPr>
+              <a:t>Other help texts</a:t>
+            </a:r>
+            <a:endParaRPr lang="en-US" sz="800" noProof="1"/>
+          </a:p>
+          <a:p>
+            <a:pPr marL="171450" indent="-171450">
+              <a:buFont typeface="Courier New" panose="02070309020205020404" pitchFamily="49" charset="0"/>
+              <a:buChar char="o"/>
+            </a:pPr>
+            <a:r>
+              <a:rPr lang="en-US" sz="800" noProof="1"/>
+              <a:t>HELP/TEMPLATE_help.html &lt;div id="inner-content"&gt;, is replaced with text from HELP/ by app.js</a:t>
+            </a:r>
+          </a:p>
+        </p:txBody>
+      </p:sp>
+      <p:sp>
+        <p:nvSpPr>
+          <p:cNvPr id="21" name="textruta 20">
+            <a:extLst>
+              <a:ext uri="{FF2B5EF4-FFF2-40B4-BE49-F238E27FC236}">
+                <a16:creationId xmlns:a16="http://schemas.microsoft.com/office/drawing/2014/main" id="{7DE9AEB1-C5B0-C249-BF18-9D6FEFA03971}"/>
+              </a:ext>
+            </a:extLst>
+          </p:cNvPr>
+          <p:cNvSpPr txBox="1"/>
+          <p:nvPr/>
+        </p:nvSpPr>
+        <p:spPr>
+          <a:xfrm>
+            <a:off x="8044665" y="7516994"/>
+            <a:ext cx="745717" cy="461665"/>
+          </a:xfrm>
+          <a:prstGeom prst="rect">
+            <a:avLst/>
+          </a:prstGeom>
+          <a:noFill/>
+        </p:spPr>
+        <p:txBody>
+          <a:bodyPr wrap="none" rtlCol="0">
+            <a:spAutoFit/>
+          </a:bodyPr>
+          <a:lstStyle/>
+          <a:p>
+            <a:r>
+              <a:rPr lang="en-US" sz="2400" b="1" noProof="1"/>
+              <a:t>help</a:t>
             </a:r>
           </a:p>
         </p:txBody>

</xml_diff>

<commit_message>
Moved repository to pragma-git. Improved build script.
</commit_message>
<xml_diff>
--- a/docs/Tech-overview.pptx
+++ b/docs/Tech-overview.pptx
@@ -258,7 +258,7 @@
           <a:p>
             <a:fld id="{CA855E1B-8830-B64E-B102-DB2BBD0D9567}" type="datetimeFigureOut">
               <a:rPr lang="sv-SE" smtClean="0"/>
-              <a:t>2020-12-23</a:t>
+              <a:t>2021-01-24</a:t>
             </a:fld>
             <a:endParaRPr lang="sv-SE"/>
           </a:p>
@@ -428,7 +428,7 @@
           <a:p>
             <a:fld id="{CA855E1B-8830-B64E-B102-DB2BBD0D9567}" type="datetimeFigureOut">
               <a:rPr lang="sv-SE" smtClean="0"/>
-              <a:t>2020-12-23</a:t>
+              <a:t>2021-01-24</a:t>
             </a:fld>
             <a:endParaRPr lang="sv-SE"/>
           </a:p>
@@ -608,7 +608,7 @@
           <a:p>
             <a:fld id="{CA855E1B-8830-B64E-B102-DB2BBD0D9567}" type="datetimeFigureOut">
               <a:rPr lang="sv-SE" smtClean="0"/>
-              <a:t>2020-12-23</a:t>
+              <a:t>2021-01-24</a:t>
             </a:fld>
             <a:endParaRPr lang="sv-SE"/>
           </a:p>
@@ -778,7 +778,7 @@
           <a:p>
             <a:fld id="{CA855E1B-8830-B64E-B102-DB2BBD0D9567}" type="datetimeFigureOut">
               <a:rPr lang="sv-SE" smtClean="0"/>
-              <a:t>2020-12-23</a:t>
+              <a:t>2021-01-24</a:t>
             </a:fld>
             <a:endParaRPr lang="sv-SE"/>
           </a:p>
@@ -1022,7 +1022,7 @@
           <a:p>
             <a:fld id="{CA855E1B-8830-B64E-B102-DB2BBD0D9567}" type="datetimeFigureOut">
               <a:rPr lang="sv-SE" smtClean="0"/>
-              <a:t>2020-12-23</a:t>
+              <a:t>2021-01-24</a:t>
             </a:fld>
             <a:endParaRPr lang="sv-SE"/>
           </a:p>
@@ -1254,7 +1254,7 @@
           <a:p>
             <a:fld id="{CA855E1B-8830-B64E-B102-DB2BBD0D9567}" type="datetimeFigureOut">
               <a:rPr lang="sv-SE" smtClean="0"/>
-              <a:t>2020-12-23</a:t>
+              <a:t>2021-01-24</a:t>
             </a:fld>
             <a:endParaRPr lang="sv-SE"/>
           </a:p>
@@ -1621,7 +1621,7 @@
           <a:p>
             <a:fld id="{CA855E1B-8830-B64E-B102-DB2BBD0D9567}" type="datetimeFigureOut">
               <a:rPr lang="sv-SE" smtClean="0"/>
-              <a:t>2020-12-23</a:t>
+              <a:t>2021-01-24</a:t>
             </a:fld>
             <a:endParaRPr lang="sv-SE"/>
           </a:p>
@@ -1739,7 +1739,7 @@
           <a:p>
             <a:fld id="{CA855E1B-8830-B64E-B102-DB2BBD0D9567}" type="datetimeFigureOut">
               <a:rPr lang="sv-SE" smtClean="0"/>
-              <a:t>2020-12-23</a:t>
+              <a:t>2021-01-24</a:t>
             </a:fld>
             <a:endParaRPr lang="sv-SE"/>
           </a:p>
@@ -1834,7 +1834,7 @@
           <a:p>
             <a:fld id="{CA855E1B-8830-B64E-B102-DB2BBD0D9567}" type="datetimeFigureOut">
               <a:rPr lang="sv-SE" smtClean="0"/>
-              <a:t>2020-12-23</a:t>
+              <a:t>2021-01-24</a:t>
             </a:fld>
             <a:endParaRPr lang="sv-SE"/>
           </a:p>
@@ -2111,7 +2111,7 @@
           <a:p>
             <a:fld id="{CA855E1B-8830-B64E-B102-DB2BBD0D9567}" type="datetimeFigureOut">
               <a:rPr lang="sv-SE" smtClean="0"/>
-              <a:t>2020-12-23</a:t>
+              <a:t>2021-01-24</a:t>
             </a:fld>
             <a:endParaRPr lang="sv-SE"/>
           </a:p>
@@ -2368,7 +2368,7 @@
           <a:p>
             <a:fld id="{CA855E1B-8830-B64E-B102-DB2BBD0D9567}" type="datetimeFigureOut">
               <a:rPr lang="sv-SE" smtClean="0"/>
-              <a:t>2020-12-23</a:t>
+              <a:t>2021-01-24</a:t>
             </a:fld>
             <a:endParaRPr lang="sv-SE"/>
           </a:p>
@@ -2581,7 +2581,7 @@
           <a:p>
             <a:fld id="{CA855E1B-8830-B64E-B102-DB2BBD0D9567}" type="datetimeFigureOut">
               <a:rPr lang="sv-SE" smtClean="0"/>
-              <a:t>2020-12-23</a:t>
+              <a:t>2021-01-24</a:t>
             </a:fld>
             <a:endParaRPr lang="sv-SE"/>
           </a:p>
@@ -10035,6 +10035,72 @@
           </a:p>
         </p:txBody>
       </p:sp>
+      <p:sp>
+        <p:nvSpPr>
+          <p:cNvPr id="6" name="Rektangel 5">
+            <a:extLst>
+              <a:ext uri="{FF2B5EF4-FFF2-40B4-BE49-F238E27FC236}">
+                <a16:creationId xmlns:a16="http://schemas.microsoft.com/office/drawing/2014/main" id="{BFF3040E-0B07-4743-8C2E-DEB02A9AC67D}"/>
+              </a:ext>
+            </a:extLst>
+          </p:cNvPr>
+          <p:cNvSpPr/>
+          <p:nvPr/>
+        </p:nvSpPr>
+        <p:spPr>
+          <a:xfrm>
+            <a:off x="6258868" y="1150452"/>
+            <a:ext cx="5396401" cy="584775"/>
+          </a:xfrm>
+          <a:prstGeom prst="rect">
+            <a:avLst/>
+          </a:prstGeom>
+          <a:solidFill>
+            <a:schemeClr val="bg1"/>
+          </a:solidFill>
+          <a:ln>
+            <a:solidFill>
+              <a:schemeClr val="accent1"/>
+            </a:solidFill>
+          </a:ln>
+        </p:spPr>
+        <p:txBody>
+          <a:bodyPr wrap="square">
+            <a:spAutoFit/>
+          </a:bodyPr>
+          <a:lstStyle/>
+          <a:p>
+            <a:r>
+              <a:rPr lang="en-US" sz="800" b="1" noProof="1"/>
+              <a:t>Note</a:t>
+            </a:r>
+          </a:p>
+          <a:p>
+            <a:endParaRPr lang="en-US" sz="800" b="1" noProof="1"/>
+          </a:p>
+          <a:p>
+            <a:r>
+              <a:rPr lang="en-US" sz="800" b="1" noProof="1"/>
+              <a:t>merge folder has its own package.json :</a:t>
+            </a:r>
+          </a:p>
+          <a:p>
+            <a:pPr marL="171450" indent="-171450">
+              <a:buFontTx/>
+              <a:buChar char="-"/>
+            </a:pPr>
+            <a:r>
+              <a:rPr lang="en-US" sz="800" noProof="1"/>
+              <a:t>npm install has to be performed in “merge” folder as well as in Pragma-git</a:t>
+            </a:r>
+            <a:endParaRPr lang="en-US" sz="800" noProof="1">
+              <a:solidFill>
+                <a:schemeClr val="accent1"/>
+              </a:solidFill>
+            </a:endParaRPr>
+          </a:p>
+        </p:txBody>
+      </p:sp>
     </p:spTree>
     <p:extLst>
       <p:ext uri="{BB962C8B-B14F-4D97-AF65-F5344CB8AC3E}">

</xml_diff>

<commit_message>
Tech doc graph color branches
</commit_message>
<xml_diff>
--- a/docs/Tech-overview.pptx
+++ b/docs/Tech-overview.pptx
@@ -260,7 +260,7 @@
           <a:p>
             <a:fld id="{CA855E1B-8830-B64E-B102-DB2BBD0D9567}" type="datetimeFigureOut">
               <a:rPr lang="sv-SE" smtClean="0"/>
-              <a:t>2021-04-09</a:t>
+              <a:t>2021-04-19</a:t>
             </a:fld>
             <a:endParaRPr lang="sv-SE"/>
           </a:p>
@@ -430,7 +430,7 @@
           <a:p>
             <a:fld id="{CA855E1B-8830-B64E-B102-DB2BBD0D9567}" type="datetimeFigureOut">
               <a:rPr lang="sv-SE" smtClean="0"/>
-              <a:t>2021-04-09</a:t>
+              <a:t>2021-04-19</a:t>
             </a:fld>
             <a:endParaRPr lang="sv-SE"/>
           </a:p>
@@ -610,7 +610,7 @@
           <a:p>
             <a:fld id="{CA855E1B-8830-B64E-B102-DB2BBD0D9567}" type="datetimeFigureOut">
               <a:rPr lang="sv-SE" smtClean="0"/>
-              <a:t>2021-04-09</a:t>
+              <a:t>2021-04-19</a:t>
             </a:fld>
             <a:endParaRPr lang="sv-SE"/>
           </a:p>
@@ -780,7 +780,7 @@
           <a:p>
             <a:fld id="{CA855E1B-8830-B64E-B102-DB2BBD0D9567}" type="datetimeFigureOut">
               <a:rPr lang="sv-SE" smtClean="0"/>
-              <a:t>2021-04-09</a:t>
+              <a:t>2021-04-19</a:t>
             </a:fld>
             <a:endParaRPr lang="sv-SE"/>
           </a:p>
@@ -1024,7 +1024,7 @@
           <a:p>
             <a:fld id="{CA855E1B-8830-B64E-B102-DB2BBD0D9567}" type="datetimeFigureOut">
               <a:rPr lang="sv-SE" smtClean="0"/>
-              <a:t>2021-04-09</a:t>
+              <a:t>2021-04-19</a:t>
             </a:fld>
             <a:endParaRPr lang="sv-SE"/>
           </a:p>
@@ -1256,7 +1256,7 @@
           <a:p>
             <a:fld id="{CA855E1B-8830-B64E-B102-DB2BBD0D9567}" type="datetimeFigureOut">
               <a:rPr lang="sv-SE" smtClean="0"/>
-              <a:t>2021-04-09</a:t>
+              <a:t>2021-04-19</a:t>
             </a:fld>
             <a:endParaRPr lang="sv-SE"/>
           </a:p>
@@ -1623,7 +1623,7 @@
           <a:p>
             <a:fld id="{CA855E1B-8830-B64E-B102-DB2BBD0D9567}" type="datetimeFigureOut">
               <a:rPr lang="sv-SE" smtClean="0"/>
-              <a:t>2021-04-09</a:t>
+              <a:t>2021-04-19</a:t>
             </a:fld>
             <a:endParaRPr lang="sv-SE"/>
           </a:p>
@@ -1741,7 +1741,7 @@
           <a:p>
             <a:fld id="{CA855E1B-8830-B64E-B102-DB2BBD0D9567}" type="datetimeFigureOut">
               <a:rPr lang="sv-SE" smtClean="0"/>
-              <a:t>2021-04-09</a:t>
+              <a:t>2021-04-19</a:t>
             </a:fld>
             <a:endParaRPr lang="sv-SE"/>
           </a:p>
@@ -1836,7 +1836,7 @@
           <a:p>
             <a:fld id="{CA855E1B-8830-B64E-B102-DB2BBD0D9567}" type="datetimeFigureOut">
               <a:rPr lang="sv-SE" smtClean="0"/>
-              <a:t>2021-04-09</a:t>
+              <a:t>2021-04-19</a:t>
             </a:fld>
             <a:endParaRPr lang="sv-SE"/>
           </a:p>
@@ -2113,7 +2113,7 @@
           <a:p>
             <a:fld id="{CA855E1B-8830-B64E-B102-DB2BBD0D9567}" type="datetimeFigureOut">
               <a:rPr lang="sv-SE" smtClean="0"/>
-              <a:t>2021-04-09</a:t>
+              <a:t>2021-04-19</a:t>
             </a:fld>
             <a:endParaRPr lang="sv-SE"/>
           </a:p>
@@ -2370,7 +2370,7 @@
           <a:p>
             <a:fld id="{CA855E1B-8830-B64E-B102-DB2BBD0D9567}" type="datetimeFigureOut">
               <a:rPr lang="sv-SE" smtClean="0"/>
-              <a:t>2021-04-09</a:t>
+              <a:t>2021-04-19</a:t>
             </a:fld>
             <a:endParaRPr lang="sv-SE"/>
           </a:p>
@@ -2583,7 +2583,7 @@
           <a:p>
             <a:fld id="{CA855E1B-8830-B64E-B102-DB2BBD0D9567}" type="datetimeFigureOut">
               <a:rPr lang="sv-SE" smtClean="0"/>
-              <a:t>2021-04-09</a:t>
+              <a:t>2021-04-19</a:t>
             </a:fld>
             <a:endParaRPr lang="sv-SE"/>
           </a:p>
@@ -6919,85 +6919,6 @@
           </p:txBody>
         </p:sp>
       </p:grpSp>
-      <p:sp>
-        <p:nvSpPr>
-          <p:cNvPr id="74" name="Vänster klammerparentes 73">
-            <a:extLst>
-              <a:ext uri="{FF2B5EF4-FFF2-40B4-BE49-F238E27FC236}">
-                <a16:creationId xmlns:a16="http://schemas.microsoft.com/office/drawing/2014/main" id="{DB09E8DC-4D0D-EA4C-BF0C-C7D4090F5BEC}"/>
-              </a:ext>
-            </a:extLst>
-          </p:cNvPr>
-          <p:cNvSpPr/>
-          <p:nvPr/>
-        </p:nvSpPr>
-        <p:spPr>
-          <a:xfrm flipH="1">
-            <a:off x="3241905" y="4935984"/>
-            <a:ext cx="45719" cy="632190"/>
-          </a:xfrm>
-          <a:prstGeom prst="leftBrace">
-            <a:avLst/>
-          </a:prstGeom>
-        </p:spPr>
-        <p:style>
-          <a:lnRef idx="1">
-            <a:schemeClr val="accent1"/>
-          </a:lnRef>
-          <a:fillRef idx="0">
-            <a:schemeClr val="accent1"/>
-          </a:fillRef>
-          <a:effectRef idx="0">
-            <a:schemeClr val="accent1"/>
-          </a:effectRef>
-          <a:fontRef idx="minor">
-            <a:schemeClr val="tx1"/>
-          </a:fontRef>
-        </p:style>
-        <p:txBody>
-          <a:bodyPr rtlCol="0" anchor="ctr"/>
-          <a:lstStyle/>
-          <a:p>
-            <a:pPr algn="ctr"/>
-            <a:endParaRPr lang="en-US" noProof="1"/>
-          </a:p>
-        </p:txBody>
-      </p:sp>
-      <p:sp>
-        <p:nvSpPr>
-          <p:cNvPr id="77" name="textruta 76">
-            <a:extLst>
-              <a:ext uri="{FF2B5EF4-FFF2-40B4-BE49-F238E27FC236}">
-                <a16:creationId xmlns:a16="http://schemas.microsoft.com/office/drawing/2014/main" id="{DC830232-D560-3140-BC4D-D2BB7AC52E3F}"/>
-              </a:ext>
-            </a:extLst>
-          </p:cNvPr>
-          <p:cNvSpPr txBox="1"/>
-          <p:nvPr/>
-        </p:nvSpPr>
-        <p:spPr>
-          <a:xfrm rot="5400000">
-            <a:off x="3041025" y="5221468"/>
-            <a:ext cx="649593" cy="215444"/>
-          </a:xfrm>
-          <a:prstGeom prst="rect">
-            <a:avLst/>
-          </a:prstGeom>
-          <a:noFill/>
-        </p:spPr>
-        <p:txBody>
-          <a:bodyPr wrap="square" rtlCol="0">
-            <a:spAutoFit/>
-          </a:bodyPr>
-          <a:lstStyle/>
-          <a:p>
-            <a:r>
-              <a:rPr lang="en-US" sz="800" noProof="1"/>
-              <a:t>history</a:t>
-            </a:r>
-          </a:p>
-        </p:txBody>
-      </p:sp>
     </p:spTree>
     <p:extLst>
       <p:ext uri="{BB962C8B-B14F-4D97-AF65-F5344CB8AC3E}">
@@ -7662,7 +7583,7 @@
           <a:p>
             <a:r>
               <a:rPr lang="en-US" sz="800" b="1" noProof="1"/>
-              <a:t>Using git Notes to store the branch name. The name space branchname is used.</a:t>
+              <a:t>Using git Notes to store the branch name. The name space “branchname” is used.</a:t>
             </a:r>
           </a:p>
           <a:p>
@@ -8444,7 +8365,7 @@
         </p:nvSpPr>
         <p:spPr>
           <a:xfrm>
-            <a:off x="432370" y="701747"/>
+            <a:off x="497310" y="689373"/>
             <a:ext cx="1099660" cy="461665"/>
           </a:xfrm>
           <a:prstGeom prst="rect">
@@ -8919,7 +8840,7 @@
         </p:nvSpPr>
         <p:spPr>
           <a:xfrm>
-            <a:off x="416902" y="4753408"/>
+            <a:off x="8018067" y="689372"/>
             <a:ext cx="2062488" cy="461665"/>
           </a:xfrm>
           <a:prstGeom prst="rect">
@@ -8954,8 +8875,8 @@
         </p:nvSpPr>
         <p:spPr>
           <a:xfrm>
-            <a:off x="485167" y="5266959"/>
-            <a:ext cx="3685232" cy="4031873"/>
+            <a:off x="8077189" y="1278837"/>
+            <a:ext cx="3685232" cy="5509200"/>
           </a:xfrm>
           <a:prstGeom prst="rect">
             <a:avLst/>
@@ -9266,16 +9187,87 @@
             </a:endParaRPr>
           </a:p>
           <a:p>
+            <a:pPr indent="-304650"/>
+            <a:endParaRPr lang="en-US" sz="800" noProof="1"/>
+          </a:p>
+          <a:p>
+            <a:r>
+              <a:rPr lang="en-US" sz="800" b="1" noProof="1"/>
+              <a:t>Colored nodes</a:t>
+            </a:r>
+            <a:endParaRPr lang="en-US" sz="800" noProof="1"/>
+          </a:p>
+          <a:p>
             <a:pPr marL="171450" indent="-171450">
               <a:buFont typeface="Courier New" panose="02070309020205020404" pitchFamily="49" charset="0"/>
               <a:buChar char="o"/>
             </a:pPr>
-            <a:endParaRPr lang="en-US" sz="800" noProof="1"/>
+            <a:r>
+              <a:rPr lang="en-US" sz="800" noProof="1"/>
+              <a:t>Nodes are color-coded according to branch-name stored (see Internals / branchname for every commit)</a:t>
+            </a:r>
           </a:p>
           <a:p>
             <a:pPr marL="324000" lvl="1" indent="-171450">
               <a:buFont typeface="Arial" panose="020B0604020202020204" pitchFamily="34" charset="0"/>
               <a:buChar char="•"/>
+            </a:pPr>
+            <a:r>
+              <a:rPr lang="en-US" sz="800" noProof="1"/>
+              <a:t>black for unknown</a:t>
+            </a:r>
+          </a:p>
+          <a:p>
+            <a:pPr marL="324000" lvl="1" indent="-171450">
+              <a:buFont typeface="Arial" panose="020B0604020202020204" pitchFamily="34" charset="0"/>
+              <a:buChar char="•"/>
+            </a:pPr>
+            <a:r>
+              <a:rPr lang="en-US" sz="800" noProof="1"/>
+              <a:t>green for unknown on first-parent branch</a:t>
+            </a:r>
+          </a:p>
+          <a:p>
+            <a:pPr marL="324000" lvl="1" indent="-171450">
+              <a:buFont typeface="Arial" panose="020B0604020202020204" pitchFamily="34" charset="0"/>
+              <a:buChar char="•"/>
+            </a:pPr>
+            <a:r>
+              <a:rPr lang="en-US" sz="800" noProof="1"/>
+              <a:t>colored when branch is known from git-note storage</a:t>
+            </a:r>
+          </a:p>
+          <a:p>
+            <a:pPr marL="171450" indent="-171450">
+              <a:buFont typeface="Courier New" panose="02070309020205020404" pitchFamily="49" charset="0"/>
+              <a:buChar char="o"/>
+            </a:pPr>
+            <a:r>
+              <a:rPr lang="en-US" sz="800" noProof="1"/>
+              <a:t>There is an edit mechanism, that allows edit of branch-name to commits. Edit range of commits by selecting oldest commit, and shift-select a later commit (higher up In graph)</a:t>
+            </a:r>
+          </a:p>
+          <a:p>
+            <a:pPr marL="171450" indent="-171450">
+              <a:buFont typeface="Courier New" panose="02070309020205020404" pitchFamily="49" charset="0"/>
+              <a:buChar char="o"/>
+            </a:pPr>
+            <a:r>
+              <a:rPr lang="en-US" sz="800" noProof="1"/>
+              <a:t>Colors are stored in graph.js variable “colorImageNameDefinitions”.  Color images are generated once using bash script colorize.bash</a:t>
+            </a:r>
+          </a:p>
+          <a:p>
+            <a:pPr marL="171450" indent="-171450">
+              <a:buFont typeface="Courier New" panose="02070309020205020404" pitchFamily="49" charset="0"/>
+              <a:buChar char="o"/>
+            </a:pPr>
+            <a:endParaRPr lang="en-US" sz="800" noProof="1"/>
+          </a:p>
+          <a:p>
+            <a:pPr marL="171450" indent="-171450">
+              <a:buFont typeface="Courier New" panose="02070309020205020404" pitchFamily="49" charset="0"/>
+              <a:buChar char="o"/>
             </a:pPr>
             <a:endParaRPr lang="en-US" sz="800" noProof="1"/>
           </a:p>
@@ -9512,7 +9504,7 @@
         </p:nvSpPr>
         <p:spPr>
           <a:xfrm>
-            <a:off x="7896098" y="723242"/>
+            <a:off x="497310" y="4721811"/>
             <a:ext cx="1592103" cy="461665"/>
           </a:xfrm>
           <a:prstGeom prst="rect">
@@ -9547,8 +9539,8 @@
         </p:nvSpPr>
         <p:spPr>
           <a:xfrm>
-            <a:off x="7995427" y="1278837"/>
-            <a:ext cx="4535554" cy="2554545"/>
+            <a:off x="497310" y="5161728"/>
+            <a:ext cx="3685232" cy="2554545"/>
           </a:xfrm>
           <a:prstGeom prst="rect">
             <a:avLst/>
@@ -10006,8 +9998,8 @@
         </p:nvSpPr>
         <p:spPr>
           <a:xfrm>
-            <a:off x="7995427" y="4492973"/>
-            <a:ext cx="4535554" cy="954107"/>
+            <a:off x="473213" y="8318189"/>
+            <a:ext cx="3685232" cy="1200329"/>
           </a:xfrm>
           <a:prstGeom prst="rect">
             <a:avLst/>
@@ -10125,8 +10117,8 @@
         </p:nvSpPr>
         <p:spPr>
           <a:xfrm>
-            <a:off x="7946433" y="4021241"/>
-            <a:ext cx="745717" cy="461665"/>
+            <a:off x="424219" y="7846457"/>
+            <a:ext cx="885388" cy="461665"/>
           </a:xfrm>
           <a:prstGeom prst="rect">
             <a:avLst/>
@@ -10134,7 +10126,7 @@
           <a:noFill/>
         </p:spPr>
         <p:txBody>
-          <a:bodyPr wrap="none" rtlCol="0">
+          <a:bodyPr wrap="square" rtlCol="0">
             <a:spAutoFit/>
           </a:bodyPr>
           <a:lstStyle/>

</xml_diff>

<commit_message>
Doc for graph layout
</commit_message>
<xml_diff>
--- a/docs/Tech-overview.pptx
+++ b/docs/Tech-overview.pptx
@@ -12,6 +12,7 @@
     <p:sldId id="262" r:id="rId6"/>
     <p:sldId id="257" r:id="rId7"/>
     <p:sldId id="258" r:id="rId8"/>
+    <p:sldId id="263" r:id="rId9"/>
   </p:sldIdLst>
   <p:sldSz cx="12801600" cy="9601200" type="A3"/>
   <p:notesSz cx="6858000" cy="9144000"/>
@@ -261,7 +262,7 @@
           <a:p>
             <a:fld id="{CA855E1B-8830-B64E-B102-DB2BBD0D9567}" type="datetimeFigureOut">
               <a:rPr lang="sv-SE" smtClean="0"/>
-              <a:t>2021-09-02</a:t>
+              <a:t>2021-09-11</a:t>
             </a:fld>
             <a:endParaRPr lang="sv-SE"/>
           </a:p>
@@ -431,7 +432,7 @@
           <a:p>
             <a:fld id="{CA855E1B-8830-B64E-B102-DB2BBD0D9567}" type="datetimeFigureOut">
               <a:rPr lang="sv-SE" smtClean="0"/>
-              <a:t>2021-09-02</a:t>
+              <a:t>2021-09-11</a:t>
             </a:fld>
             <a:endParaRPr lang="sv-SE"/>
           </a:p>
@@ -611,7 +612,7 @@
           <a:p>
             <a:fld id="{CA855E1B-8830-B64E-B102-DB2BBD0D9567}" type="datetimeFigureOut">
               <a:rPr lang="sv-SE" smtClean="0"/>
-              <a:t>2021-09-02</a:t>
+              <a:t>2021-09-11</a:t>
             </a:fld>
             <a:endParaRPr lang="sv-SE"/>
           </a:p>
@@ -781,7 +782,7 @@
           <a:p>
             <a:fld id="{CA855E1B-8830-B64E-B102-DB2BBD0D9567}" type="datetimeFigureOut">
               <a:rPr lang="sv-SE" smtClean="0"/>
-              <a:t>2021-09-02</a:t>
+              <a:t>2021-09-11</a:t>
             </a:fld>
             <a:endParaRPr lang="sv-SE"/>
           </a:p>
@@ -1025,7 +1026,7 @@
           <a:p>
             <a:fld id="{CA855E1B-8830-B64E-B102-DB2BBD0D9567}" type="datetimeFigureOut">
               <a:rPr lang="sv-SE" smtClean="0"/>
-              <a:t>2021-09-02</a:t>
+              <a:t>2021-09-11</a:t>
             </a:fld>
             <a:endParaRPr lang="sv-SE"/>
           </a:p>
@@ -1257,7 +1258,7 @@
           <a:p>
             <a:fld id="{CA855E1B-8830-B64E-B102-DB2BBD0D9567}" type="datetimeFigureOut">
               <a:rPr lang="sv-SE" smtClean="0"/>
-              <a:t>2021-09-02</a:t>
+              <a:t>2021-09-11</a:t>
             </a:fld>
             <a:endParaRPr lang="sv-SE"/>
           </a:p>
@@ -1624,7 +1625,7 @@
           <a:p>
             <a:fld id="{CA855E1B-8830-B64E-B102-DB2BBD0D9567}" type="datetimeFigureOut">
               <a:rPr lang="sv-SE" smtClean="0"/>
-              <a:t>2021-09-02</a:t>
+              <a:t>2021-09-11</a:t>
             </a:fld>
             <a:endParaRPr lang="sv-SE"/>
           </a:p>
@@ -1742,7 +1743,7 @@
           <a:p>
             <a:fld id="{CA855E1B-8830-B64E-B102-DB2BBD0D9567}" type="datetimeFigureOut">
               <a:rPr lang="sv-SE" smtClean="0"/>
-              <a:t>2021-09-02</a:t>
+              <a:t>2021-09-11</a:t>
             </a:fld>
             <a:endParaRPr lang="sv-SE"/>
           </a:p>
@@ -1837,7 +1838,7 @@
           <a:p>
             <a:fld id="{CA855E1B-8830-B64E-B102-DB2BBD0D9567}" type="datetimeFigureOut">
               <a:rPr lang="sv-SE" smtClean="0"/>
-              <a:t>2021-09-02</a:t>
+              <a:t>2021-09-11</a:t>
             </a:fld>
             <a:endParaRPr lang="sv-SE"/>
           </a:p>
@@ -2114,7 +2115,7 @@
           <a:p>
             <a:fld id="{CA855E1B-8830-B64E-B102-DB2BBD0D9567}" type="datetimeFigureOut">
               <a:rPr lang="sv-SE" smtClean="0"/>
-              <a:t>2021-09-02</a:t>
+              <a:t>2021-09-11</a:t>
             </a:fld>
             <a:endParaRPr lang="sv-SE"/>
           </a:p>
@@ -2371,7 +2372,7 @@
           <a:p>
             <a:fld id="{CA855E1B-8830-B64E-B102-DB2BBD0D9567}" type="datetimeFigureOut">
               <a:rPr lang="sv-SE" smtClean="0"/>
-              <a:t>2021-09-02</a:t>
+              <a:t>2021-09-11</a:t>
             </a:fld>
             <a:endParaRPr lang="sv-SE"/>
           </a:p>
@@ -2584,7 +2585,7 @@
           <a:p>
             <a:fld id="{CA855E1B-8830-B64E-B102-DB2BBD0D9567}" type="datetimeFigureOut">
               <a:rPr lang="sv-SE" smtClean="0"/>
-              <a:t>2021-09-02</a:t>
+              <a:t>2021-09-11</a:t>
             </a:fld>
             <a:endParaRPr lang="sv-SE"/>
           </a:p>
@@ -3003,8 +3004,8 @@
         </p:nvSpPr>
         <p:spPr>
           <a:xfrm>
-            <a:off x="124203" y="60782"/>
-            <a:ext cx="2009717" cy="461665"/>
+            <a:off x="133080" y="73672"/>
+            <a:ext cx="3826881" cy="830997"/>
           </a:xfrm>
           <a:prstGeom prst="rect">
             <a:avLst/>
@@ -3018,7 +3019,11 @@
           <a:lstStyle/>
           <a:p>
             <a:r>
-              <a:rPr lang="en-US" sz="2400" b="1" noProof="1"/>
+              <a:rPr lang="en-US" sz="4800" b="1" noProof="1">
+                <a:solidFill>
+                  <a:schemeClr val="accent1"/>
+                </a:solidFill>
+              </a:rPr>
               <a:t>Create release</a:t>
             </a:r>
           </a:p>
@@ -3038,7 +3043,7 @@
         </p:nvSpPr>
         <p:spPr>
           <a:xfrm>
-            <a:off x="420154" y="678347"/>
+            <a:off x="429032" y="1033821"/>
             <a:ext cx="5114372" cy="2923877"/>
           </a:xfrm>
           <a:prstGeom prst="rect">
@@ -3318,7 +3323,7 @@
         </p:nvSpPr>
         <p:spPr>
           <a:xfrm>
-            <a:off x="2559317" y="960067"/>
+            <a:off x="2577395" y="1403545"/>
             <a:ext cx="4370113" cy="1818370"/>
           </a:xfrm>
           <a:prstGeom prst="rect">
@@ -3384,7 +3389,7 @@
         <p:spPr>
           <a:xfrm>
             <a:off x="124203" y="60782"/>
-            <a:ext cx="1993879" cy="461665"/>
+            <a:ext cx="2904065" cy="646331"/>
           </a:xfrm>
           <a:prstGeom prst="rect">
             <a:avLst/>
@@ -3398,7 +3403,7 @@
           <a:lstStyle/>
           <a:p>
             <a:r>
-              <a:rPr lang="en-US" sz="2400" b="1" noProof="1">
+              <a:rPr lang="en-US" sz="3600" b="1" noProof="1">
                 <a:solidFill>
                   <a:schemeClr val="accent1"/>
                 </a:solidFill>
@@ -3422,7 +3427,7 @@
         </p:nvSpPr>
         <p:spPr>
           <a:xfrm>
-            <a:off x="6175535" y="1443882"/>
+            <a:off x="6193613" y="1887360"/>
             <a:ext cx="592660" cy="276999"/>
           </a:xfrm>
           <a:prstGeom prst="rect">
@@ -3465,7 +3470,7 @@
         </p:nvSpPr>
         <p:spPr>
           <a:xfrm>
-            <a:off x="3002809" y="1150817"/>
+            <a:off x="3020887" y="1594295"/>
             <a:ext cx="3030436" cy="830997"/>
           </a:xfrm>
           <a:prstGeom prst="rect">
@@ -3522,7 +3527,7 @@
         </p:nvSpPr>
         <p:spPr>
           <a:xfrm>
-            <a:off x="2559317" y="685874"/>
+            <a:off x="2577395" y="1129352"/>
             <a:ext cx="4370113" cy="276999"/>
           </a:xfrm>
           <a:prstGeom prst="rect">
@@ -3598,7 +3603,7 @@
         </p:nvSpPr>
         <p:spPr>
           <a:xfrm>
-            <a:off x="2559317" y="2778438"/>
+            <a:off x="2577395" y="3221916"/>
             <a:ext cx="4370113" cy="276999"/>
           </a:xfrm>
           <a:prstGeom prst="rect">
@@ -3658,7 +3663,7 @@
         </p:nvSpPr>
         <p:spPr>
           <a:xfrm>
-            <a:off x="3020630" y="2076697"/>
+            <a:off x="3038708" y="2520175"/>
             <a:ext cx="3012616" cy="461665"/>
           </a:xfrm>
           <a:prstGeom prst="rect">
@@ -4472,7 +4477,7 @@
         </p:nvSpPr>
         <p:spPr>
           <a:xfrm>
-            <a:off x="2236576" y="213855"/>
+            <a:off x="2254654" y="657333"/>
             <a:ext cx="2415218" cy="461665"/>
           </a:xfrm>
           <a:prstGeom prst="rect">
@@ -4531,7 +4536,7 @@
         </p:nvSpPr>
         <p:spPr>
           <a:xfrm>
-            <a:off x="7052195" y="274395"/>
+            <a:off x="7070273" y="717873"/>
             <a:ext cx="1111325" cy="784830"/>
           </a:xfrm>
           <a:prstGeom prst="rect">
@@ -4603,8 +4608,8 @@
         </p:nvCxnSpPr>
         <p:spPr>
           <a:xfrm flipV="1">
-            <a:off x="6791120" y="2284874"/>
-            <a:ext cx="1410064" cy="643079"/>
+            <a:off x="6806351" y="2728354"/>
+            <a:ext cx="1412911" cy="664896"/>
           </a:xfrm>
           <a:prstGeom prst="straightConnector1">
             <a:avLst/>
@@ -4644,7 +4649,7 @@
         </p:nvCxnSpPr>
         <p:spPr>
           <a:xfrm flipV="1">
-            <a:off x="6268185" y="444689"/>
+            <a:off x="6286263" y="888167"/>
             <a:ext cx="784010" cy="355182"/>
           </a:xfrm>
           <a:prstGeom prst="straightConnector1">
@@ -4683,7 +4688,7 @@
         </p:nvSpPr>
         <p:spPr>
           <a:xfrm>
-            <a:off x="4865207" y="357899"/>
+            <a:off x="4883285" y="801377"/>
             <a:ext cx="1294262" cy="230832"/>
           </a:xfrm>
           <a:prstGeom prst="rect">
@@ -4718,7 +4723,7 @@
         </p:nvSpPr>
         <p:spPr>
           <a:xfrm rot="5400000">
-            <a:off x="5494081" y="-263796"/>
+            <a:off x="5512159" y="179682"/>
             <a:ext cx="84636" cy="1728805"/>
           </a:xfrm>
           <a:prstGeom prst="leftBrace">
@@ -4762,7 +4767,7 @@
         </p:nvSpPr>
         <p:spPr>
           <a:xfrm>
-            <a:off x="2445283" y="1680440"/>
+            <a:off x="2463361" y="2123918"/>
             <a:ext cx="149118" cy="912057"/>
           </a:xfrm>
           <a:prstGeom prst="leftBrace">
@@ -4806,7 +4811,7 @@
         </p:nvSpPr>
         <p:spPr>
           <a:xfrm>
-            <a:off x="1915311" y="2012403"/>
+            <a:off x="1933389" y="2455881"/>
             <a:ext cx="529972" cy="230832"/>
           </a:xfrm>
           <a:prstGeom prst="rect">
@@ -4841,7 +4846,7 @@
         </p:nvSpPr>
         <p:spPr>
           <a:xfrm>
-            <a:off x="2566351" y="3173300"/>
+            <a:off x="2584429" y="3616778"/>
             <a:ext cx="4370113" cy="276999"/>
           </a:xfrm>
           <a:prstGeom prst="rect">
@@ -4901,7 +4906,7 @@
         </p:nvSpPr>
         <p:spPr>
           <a:xfrm>
-            <a:off x="1562487" y="3183024"/>
+            <a:off x="1580565" y="3626502"/>
             <a:ext cx="1072799" cy="230832"/>
           </a:xfrm>
           <a:prstGeom prst="rect">
@@ -4938,8 +4943,8 @@
         </p:nvCxnSpPr>
         <p:spPr>
           <a:xfrm>
-            <a:off x="5487438" y="3337458"/>
-            <a:ext cx="2758444" cy="2766112"/>
+            <a:off x="5512780" y="3802755"/>
+            <a:ext cx="2733102" cy="2300815"/>
           </a:xfrm>
           <a:prstGeom prst="straightConnector1">
             <a:avLst/>
@@ -4977,7 +4982,7 @@
         </p:nvSpPr>
         <p:spPr>
           <a:xfrm>
-            <a:off x="2732760" y="1711048"/>
+            <a:off x="2750838" y="2154526"/>
             <a:ext cx="134342" cy="133297"/>
           </a:xfrm>
           <a:prstGeom prst="triangle">
@@ -5023,7 +5028,7 @@
         </p:nvSpPr>
         <p:spPr>
           <a:xfrm rot="10800000">
-            <a:off x="2732029" y="1988047"/>
+            <a:off x="2750107" y="2431525"/>
             <a:ext cx="134342" cy="133297"/>
           </a:xfrm>
           <a:prstGeom prst="triangle">
@@ -5378,7 +5383,7 @@
         </p:nvSpPr>
         <p:spPr>
           <a:xfrm>
-            <a:off x="1915311" y="2809747"/>
+            <a:off x="1933389" y="3253225"/>
             <a:ext cx="601839" cy="230832"/>
           </a:xfrm>
           <a:prstGeom prst="rect">
@@ -6273,8 +6278,8 @@
         </p:nvCxnSpPr>
         <p:spPr>
           <a:xfrm>
-            <a:off x="5512780" y="2994192"/>
-            <a:ext cx="2703419" cy="1898110"/>
+            <a:off x="5512780" y="3367036"/>
+            <a:ext cx="2703419" cy="1525266"/>
           </a:xfrm>
           <a:prstGeom prst="straightConnector1">
             <a:avLst/>
@@ -6786,7 +6791,7 @@
         </p:nvGrpSpPr>
         <p:grpSpPr>
           <a:xfrm rot="1962301" flipH="1">
-            <a:off x="2717422" y="2339657"/>
+            <a:off x="2735500" y="2783135"/>
             <a:ext cx="180188" cy="266984"/>
             <a:chOff x="2694364" y="2277289"/>
             <a:chExt cx="203501" cy="373562"/>
@@ -6930,7 +6935,7 @@
         <p:spPr>
           <a:xfrm>
             <a:off x="124203" y="60782"/>
-            <a:ext cx="1381853" cy="461665"/>
+            <a:ext cx="2577565" cy="830997"/>
           </a:xfrm>
           <a:prstGeom prst="rect">
             <a:avLst/>
@@ -6944,7 +6949,7 @@
           <a:lstStyle/>
           <a:p>
             <a:r>
-              <a:rPr lang="en-US" sz="2400" b="1" noProof="1">
+              <a:rPr lang="en-US" sz="4800" b="1" noProof="1">
                 <a:solidFill>
                   <a:schemeClr val="accent1"/>
                 </a:solidFill>
@@ -6968,7 +6973,7 @@
         </p:nvSpPr>
         <p:spPr>
           <a:xfrm>
-            <a:off x="3847806" y="1031943"/>
+            <a:off x="3927705" y="1456437"/>
             <a:ext cx="4303640" cy="2185214"/>
           </a:xfrm>
           <a:prstGeom prst="rect">
@@ -7141,7 +7146,7 @@
         </p:nvSpPr>
         <p:spPr>
           <a:xfrm>
-            <a:off x="3788109" y="467285"/>
+            <a:off x="3868008" y="891779"/>
             <a:ext cx="1788695" cy="461665"/>
           </a:xfrm>
           <a:prstGeom prst="rect">
@@ -7176,7 +7181,7 @@
         </p:nvSpPr>
         <p:spPr>
           <a:xfrm>
-            <a:off x="232421" y="1031943"/>
+            <a:off x="312320" y="1456437"/>
             <a:ext cx="3274288" cy="2800767"/>
           </a:xfrm>
           <a:prstGeom prst="rect">
@@ -7418,7 +7423,7 @@
         </p:nvSpPr>
         <p:spPr>
           <a:xfrm>
-            <a:off x="124203" y="517277"/>
+            <a:off x="204102" y="941771"/>
             <a:ext cx="1854418" cy="461665"/>
           </a:xfrm>
           <a:prstGeom prst="rect">
@@ -7453,7 +7458,7 @@
         </p:nvSpPr>
         <p:spPr>
           <a:xfrm>
-            <a:off x="3847806" y="3909327"/>
+            <a:off x="3927705" y="4333821"/>
             <a:ext cx="4303640" cy="1938992"/>
           </a:xfrm>
           <a:prstGeom prst="rect">
@@ -7632,7 +7637,7 @@
         </p:nvSpPr>
         <p:spPr>
           <a:xfrm>
-            <a:off x="3788109" y="3344669"/>
+            <a:off x="3868008" y="3769163"/>
             <a:ext cx="4208781" cy="461665"/>
           </a:xfrm>
           <a:prstGeom prst="rect">
@@ -7698,7 +7703,7 @@
         <p:spPr>
           <a:xfrm>
             <a:off x="416902" y="122259"/>
-            <a:ext cx="1993879" cy="461665"/>
+            <a:ext cx="3804631" cy="830997"/>
           </a:xfrm>
           <a:prstGeom prst="rect">
             <a:avLst/>
@@ -7712,7 +7717,7 @@
           <a:lstStyle/>
           <a:p>
             <a:r>
-              <a:rPr lang="en-US" sz="2400" b="1" noProof="1">
+              <a:rPr lang="en-US" sz="4800" b="1" noProof="1">
                 <a:solidFill>
                   <a:schemeClr val="accent1"/>
                 </a:solidFill>
@@ -7736,7 +7741,7 @@
         </p:nvSpPr>
         <p:spPr>
           <a:xfrm>
-            <a:off x="428537" y="1315896"/>
+            <a:off x="419659" y="1545040"/>
             <a:ext cx="3274288" cy="3416320"/>
           </a:xfrm>
           <a:prstGeom prst="rect">
@@ -8030,7 +8035,7 @@
         </p:nvSpPr>
         <p:spPr>
           <a:xfrm>
-            <a:off x="345431" y="724112"/>
+            <a:off x="336553" y="953256"/>
             <a:ext cx="3169201" cy="461665"/>
           </a:xfrm>
           <a:prstGeom prst="rect">
@@ -8065,7 +8070,7 @@
         </p:nvSpPr>
         <p:spPr>
           <a:xfrm>
-            <a:off x="4090044" y="1315896"/>
+            <a:off x="4081166" y="1545040"/>
             <a:ext cx="3274288" cy="2062103"/>
           </a:xfrm>
           <a:prstGeom prst="rect">
@@ -8193,7 +8198,7 @@
         </p:nvSpPr>
         <p:spPr>
           <a:xfrm>
-            <a:off x="4006938" y="724112"/>
+            <a:off x="3998060" y="953256"/>
             <a:ext cx="3974871" cy="461665"/>
           </a:xfrm>
           <a:prstGeom prst="rect">
@@ -8246,6 +8251,120 @@
       </p:grpSpPr>
       <p:sp>
         <p:nvSpPr>
+          <p:cNvPr id="71" name="textruta 70">
+            <a:extLst>
+              <a:ext uri="{FF2B5EF4-FFF2-40B4-BE49-F238E27FC236}">
+                <a16:creationId xmlns:a16="http://schemas.microsoft.com/office/drawing/2014/main" id="{E382ED10-75F7-0342-8D5C-723205A13871}"/>
+              </a:ext>
+            </a:extLst>
+          </p:cNvPr>
+          <p:cNvSpPr txBox="1"/>
+          <p:nvPr/>
+        </p:nvSpPr>
+        <p:spPr>
+          <a:xfrm>
+            <a:off x="8218319" y="1544189"/>
+            <a:ext cx="4271871" cy="3456946"/>
+          </a:xfrm>
+          <a:prstGeom prst="rect">
+            <a:avLst/>
+          </a:prstGeom>
+          <a:noFill/>
+          <a:ln>
+            <a:solidFill>
+              <a:schemeClr val="accent1"/>
+            </a:solidFill>
+          </a:ln>
+        </p:spPr>
+        <p:txBody>
+          <a:bodyPr wrap="square" rtlCol="0">
+            <a:spAutoFit/>
+          </a:bodyPr>
+          <a:lstStyle/>
+          <a:p>
+            <a:endParaRPr lang="en-US" dirty="0"/>
+          </a:p>
+        </p:txBody>
+      </p:sp>
+      <p:sp>
+        <p:nvSpPr>
+          <p:cNvPr id="36" name="textruta 35">
+            <a:extLst>
+              <a:ext uri="{FF2B5EF4-FFF2-40B4-BE49-F238E27FC236}">
+                <a16:creationId xmlns:a16="http://schemas.microsoft.com/office/drawing/2014/main" id="{940C46E8-1898-1749-9B0B-374E4B00BCC1}"/>
+              </a:ext>
+            </a:extLst>
+          </p:cNvPr>
+          <p:cNvSpPr txBox="1"/>
+          <p:nvPr/>
+        </p:nvSpPr>
+        <p:spPr>
+          <a:xfrm>
+            <a:off x="10097181" y="2402783"/>
+            <a:ext cx="2456122" cy="230832"/>
+          </a:xfrm>
+          <a:prstGeom prst="rect">
+            <a:avLst/>
+          </a:prstGeom>
+          <a:noFill/>
+        </p:spPr>
+        <p:txBody>
+          <a:bodyPr wrap="none" rtlCol="0">
+            <a:spAutoFit/>
+          </a:bodyPr>
+          <a:lstStyle/>
+          <a:p>
+            <a:r>
+              <a:rPr lang="en-US" sz="900" b="1" dirty="0" err="1"/>
+              <a:t>startOfSegment</a:t>
+            </a:r>
+            <a:r>
+              <a:rPr lang="en-US" sz="900" dirty="0"/>
+              <a:t>       (need to determine column)</a:t>
+            </a:r>
+          </a:p>
+        </p:txBody>
+      </p:sp>
+      <p:cxnSp>
+        <p:nvCxnSpPr>
+          <p:cNvPr id="28" name="Rak 27">
+            <a:extLst>
+              <a:ext uri="{FF2B5EF4-FFF2-40B4-BE49-F238E27FC236}">
+                <a16:creationId xmlns:a16="http://schemas.microsoft.com/office/drawing/2014/main" id="{A5506E4C-1A44-594A-9378-970577141BEC}"/>
+              </a:ext>
+            </a:extLst>
+          </p:cNvPr>
+          <p:cNvCxnSpPr>
+            <a:cxnSpLocks/>
+          </p:cNvCxnSpPr>
+          <p:nvPr/>
+        </p:nvCxnSpPr>
+        <p:spPr>
+          <a:xfrm>
+            <a:off x="10098187" y="2530950"/>
+            <a:ext cx="8327" cy="645111"/>
+          </a:xfrm>
+          <a:prstGeom prst="line">
+            <a:avLst/>
+          </a:prstGeom>
+        </p:spPr>
+        <p:style>
+          <a:lnRef idx="1">
+            <a:schemeClr val="accent1"/>
+          </a:lnRef>
+          <a:fillRef idx="0">
+            <a:schemeClr val="accent1"/>
+          </a:fillRef>
+          <a:effectRef idx="0">
+            <a:schemeClr val="accent1"/>
+          </a:effectRef>
+          <a:fontRef idx="minor">
+            <a:schemeClr val="tx1"/>
+          </a:fontRef>
+        </p:style>
+      </p:cxnSp>
+      <p:sp>
+        <p:nvSpPr>
           <p:cNvPr id="4" name="textruta 3">
             <a:extLst>
               <a:ext uri="{FF2B5EF4-FFF2-40B4-BE49-F238E27FC236}">
@@ -8259,7 +8378,7 @@
         <p:spPr>
           <a:xfrm>
             <a:off x="416902" y="122259"/>
-            <a:ext cx="2112181" cy="461665"/>
+            <a:ext cx="4044377" cy="830997"/>
           </a:xfrm>
           <a:prstGeom prst="rect">
             <a:avLst/>
@@ -8273,7 +8392,7 @@
           <a:lstStyle/>
           <a:p>
             <a:r>
-              <a:rPr lang="en-US" sz="2400" b="1" noProof="1">
+              <a:rPr lang="en-US" sz="4800" b="1" noProof="1">
                 <a:solidFill>
                   <a:schemeClr val="accent1"/>
                 </a:solidFill>
@@ -8297,7 +8416,7 @@
         </p:nvSpPr>
         <p:spPr>
           <a:xfrm>
-            <a:off x="320288" y="1302085"/>
+            <a:off x="311410" y="1555930"/>
             <a:ext cx="3685232" cy="6001643"/>
           </a:xfrm>
           <a:prstGeom prst="rect">
@@ -8733,7 +8852,7 @@
         </p:nvSpPr>
         <p:spPr>
           <a:xfrm>
-            <a:off x="253223" y="699411"/>
+            <a:off x="244345" y="953256"/>
             <a:ext cx="1186222" cy="461665"/>
           </a:xfrm>
           <a:prstGeom prst="rect">
@@ -8768,7 +8887,7 @@
         </p:nvSpPr>
         <p:spPr>
           <a:xfrm>
-            <a:off x="4463595" y="762472"/>
+            <a:off x="4258770" y="1016317"/>
             <a:ext cx="2045881" cy="461665"/>
           </a:xfrm>
           <a:prstGeom prst="rect">
@@ -8803,8 +8922,8 @@
         </p:nvSpPr>
         <p:spPr>
           <a:xfrm>
-            <a:off x="4463595" y="1302085"/>
-            <a:ext cx="3685232" cy="2800767"/>
+            <a:off x="4258770" y="1555930"/>
+            <a:ext cx="3685232" cy="3170099"/>
           </a:xfrm>
           <a:prstGeom prst="rect">
             <a:avLst/>
@@ -8826,14 +8945,22 @@
           <a:p>
             <a:r>
               <a:rPr lang="en-US" sz="800" b="1" noProof="1"/>
-              <a:t>Commit history is traversed multiple times</a:t>
-            </a:r>
+              <a:t>Commit history is traversed multiple times (see figure)</a:t>
+            </a:r>
+            <a:br>
+              <a:rPr lang="en-US" sz="800" b="1" noProof="1"/>
+            </a:br>
+            <a:endParaRPr lang="en-US" sz="800" b="1" noProof="1"/>
           </a:p>
           <a:p>
             <a:r>
               <a:rPr lang="en-US" sz="800" noProof="1"/>
               <a:t>Pass 1, 2, 3 iterates over all commits from git-log:</a:t>
             </a:r>
+            <a:br>
+              <a:rPr lang="en-US" sz="800" noProof="1"/>
+            </a:br>
+            <a:endParaRPr lang="en-US" sz="800" noProof="1"/>
           </a:p>
           <a:p>
             <a:r>
@@ -8914,6 +9041,10 @@
               <a:rPr lang="en-US" sz="800" noProof="1"/>
               <a:t>NUMBER_OF_KNOWN_BRANCHES = found branchNames</a:t>
             </a:r>
+            <a:br>
+              <a:rPr lang="en-US" sz="800" noProof="1"/>
+            </a:br>
+            <a:endParaRPr lang="en-US" sz="800" noProof="1"/>
           </a:p>
           <a:p>
             <a:r>
@@ -9016,6 +9147,1444 @@
               <a:buChar char="o"/>
             </a:pPr>
             <a:endParaRPr lang="en-US" sz="800" noProof="1"/>
+          </a:p>
+        </p:txBody>
+      </p:sp>
+      <p:grpSp>
+        <p:nvGrpSpPr>
+          <p:cNvPr id="3" name="Grupp 2">
+            <a:extLst>
+              <a:ext uri="{FF2B5EF4-FFF2-40B4-BE49-F238E27FC236}">
+                <a16:creationId xmlns:a16="http://schemas.microsoft.com/office/drawing/2014/main" id="{4DBBCAFB-9484-9149-83F8-7754ECE3045B}"/>
+              </a:ext>
+            </a:extLst>
+          </p:cNvPr>
+          <p:cNvGrpSpPr/>
+          <p:nvPr/>
+        </p:nvGrpSpPr>
+        <p:grpSpPr>
+          <a:xfrm>
+            <a:off x="9845356" y="3266367"/>
+            <a:ext cx="71021" cy="223421"/>
+            <a:chOff x="9152400" y="2571565"/>
+            <a:chExt cx="71021" cy="223421"/>
+          </a:xfrm>
+        </p:grpSpPr>
+        <p:sp>
+          <p:nvSpPr>
+            <p:cNvPr id="19" name="Ellips 18">
+              <a:extLst>
+                <a:ext uri="{FF2B5EF4-FFF2-40B4-BE49-F238E27FC236}">
+                  <a16:creationId xmlns:a16="http://schemas.microsoft.com/office/drawing/2014/main" id="{EE8E1707-91F7-584B-B3B2-B756B90832CE}"/>
+                </a:ext>
+              </a:extLst>
+            </p:cNvPr>
+            <p:cNvSpPr/>
+            <p:nvPr/>
+          </p:nvSpPr>
+          <p:spPr>
+            <a:xfrm>
+              <a:off x="9152400" y="2571565"/>
+              <a:ext cx="71021" cy="71021"/>
+            </a:xfrm>
+            <a:prstGeom prst="ellipse">
+              <a:avLst/>
+            </a:prstGeom>
+            <a:ln>
+              <a:noFill/>
+            </a:ln>
+          </p:spPr>
+          <p:style>
+            <a:lnRef idx="2">
+              <a:schemeClr val="accent1">
+                <a:shade val="50000"/>
+              </a:schemeClr>
+            </a:lnRef>
+            <a:fillRef idx="1">
+              <a:schemeClr val="accent1"/>
+            </a:fillRef>
+            <a:effectRef idx="0">
+              <a:schemeClr val="accent1"/>
+            </a:effectRef>
+            <a:fontRef idx="minor">
+              <a:schemeClr val="lt1"/>
+            </a:fontRef>
+          </p:style>
+          <p:txBody>
+            <a:bodyPr rtlCol="0" anchor="ctr"/>
+            <a:lstStyle/>
+            <a:p>
+              <a:pPr algn="ctr"/>
+              <a:endParaRPr lang="en-US"/>
+            </a:p>
+          </p:txBody>
+        </p:sp>
+        <p:sp>
+          <p:nvSpPr>
+            <p:cNvPr id="20" name="Ellips 19">
+              <a:extLst>
+                <a:ext uri="{FF2B5EF4-FFF2-40B4-BE49-F238E27FC236}">
+                  <a16:creationId xmlns:a16="http://schemas.microsoft.com/office/drawing/2014/main" id="{C8F33110-E0D8-774B-AB38-A8CB64B70AF2}"/>
+                </a:ext>
+              </a:extLst>
+            </p:cNvPr>
+            <p:cNvSpPr/>
+            <p:nvPr/>
+          </p:nvSpPr>
+          <p:spPr>
+            <a:xfrm>
+              <a:off x="9152400" y="2723965"/>
+              <a:ext cx="71021" cy="71021"/>
+            </a:xfrm>
+            <a:prstGeom prst="ellipse">
+              <a:avLst/>
+            </a:prstGeom>
+            <a:ln>
+              <a:noFill/>
+            </a:ln>
+          </p:spPr>
+          <p:style>
+            <a:lnRef idx="2">
+              <a:schemeClr val="accent1">
+                <a:shade val="50000"/>
+              </a:schemeClr>
+            </a:lnRef>
+            <a:fillRef idx="1">
+              <a:schemeClr val="accent1"/>
+            </a:fillRef>
+            <a:effectRef idx="0">
+              <a:schemeClr val="accent1"/>
+            </a:effectRef>
+            <a:fontRef idx="minor">
+              <a:schemeClr val="lt1"/>
+            </a:fontRef>
+          </p:style>
+          <p:txBody>
+            <a:bodyPr rtlCol="0" anchor="ctr"/>
+            <a:lstStyle/>
+            <a:p>
+              <a:pPr algn="ctr"/>
+              <a:endParaRPr lang="en-US"/>
+            </a:p>
+          </p:txBody>
+        </p:sp>
+      </p:grpSp>
+      <p:grpSp>
+        <p:nvGrpSpPr>
+          <p:cNvPr id="23" name="Grupp 22">
+            <a:extLst>
+              <a:ext uri="{FF2B5EF4-FFF2-40B4-BE49-F238E27FC236}">
+                <a16:creationId xmlns:a16="http://schemas.microsoft.com/office/drawing/2014/main" id="{D4914115-22D1-034D-A46E-16C5155A7647}"/>
+              </a:ext>
+            </a:extLst>
+          </p:cNvPr>
+          <p:cNvGrpSpPr/>
+          <p:nvPr/>
+        </p:nvGrpSpPr>
+        <p:grpSpPr>
+          <a:xfrm>
+            <a:off x="9817160" y="2189764"/>
+            <a:ext cx="71021" cy="223421"/>
+            <a:chOff x="9152400" y="2571565"/>
+            <a:chExt cx="71021" cy="223421"/>
+          </a:xfrm>
+        </p:grpSpPr>
+        <p:sp>
+          <p:nvSpPr>
+            <p:cNvPr id="24" name="Ellips 23">
+              <a:extLst>
+                <a:ext uri="{FF2B5EF4-FFF2-40B4-BE49-F238E27FC236}">
+                  <a16:creationId xmlns:a16="http://schemas.microsoft.com/office/drawing/2014/main" id="{7BA119BC-5C84-704C-82BF-ACFC30738C56}"/>
+                </a:ext>
+              </a:extLst>
+            </p:cNvPr>
+            <p:cNvSpPr/>
+            <p:nvPr/>
+          </p:nvSpPr>
+          <p:spPr>
+            <a:xfrm>
+              <a:off x="9152400" y="2571565"/>
+              <a:ext cx="71021" cy="71021"/>
+            </a:xfrm>
+            <a:prstGeom prst="ellipse">
+              <a:avLst/>
+            </a:prstGeom>
+            <a:ln>
+              <a:noFill/>
+            </a:ln>
+          </p:spPr>
+          <p:style>
+            <a:lnRef idx="2">
+              <a:schemeClr val="accent1">
+                <a:shade val="50000"/>
+              </a:schemeClr>
+            </a:lnRef>
+            <a:fillRef idx="1">
+              <a:schemeClr val="accent1"/>
+            </a:fillRef>
+            <a:effectRef idx="0">
+              <a:schemeClr val="accent1"/>
+            </a:effectRef>
+            <a:fontRef idx="minor">
+              <a:schemeClr val="lt1"/>
+            </a:fontRef>
+          </p:style>
+          <p:txBody>
+            <a:bodyPr rtlCol="0" anchor="ctr"/>
+            <a:lstStyle/>
+            <a:p>
+              <a:pPr algn="ctr"/>
+              <a:endParaRPr lang="en-US"/>
+            </a:p>
+          </p:txBody>
+        </p:sp>
+        <p:sp>
+          <p:nvSpPr>
+            <p:cNvPr id="25" name="Ellips 24">
+              <a:extLst>
+                <a:ext uri="{FF2B5EF4-FFF2-40B4-BE49-F238E27FC236}">
+                  <a16:creationId xmlns:a16="http://schemas.microsoft.com/office/drawing/2014/main" id="{20F5E0C6-4E04-0749-AB90-FA6F299E25C6}"/>
+                </a:ext>
+              </a:extLst>
+            </p:cNvPr>
+            <p:cNvSpPr/>
+            <p:nvPr/>
+          </p:nvSpPr>
+          <p:spPr>
+            <a:xfrm>
+              <a:off x="9152400" y="2723965"/>
+              <a:ext cx="71021" cy="71021"/>
+            </a:xfrm>
+            <a:prstGeom prst="ellipse">
+              <a:avLst/>
+            </a:prstGeom>
+            <a:ln>
+              <a:noFill/>
+            </a:ln>
+          </p:spPr>
+          <p:style>
+            <a:lnRef idx="2">
+              <a:schemeClr val="accent1">
+                <a:shade val="50000"/>
+              </a:schemeClr>
+            </a:lnRef>
+            <a:fillRef idx="1">
+              <a:schemeClr val="accent1"/>
+            </a:fillRef>
+            <a:effectRef idx="0">
+              <a:schemeClr val="accent1"/>
+            </a:effectRef>
+            <a:fontRef idx="minor">
+              <a:schemeClr val="lt1"/>
+            </a:fontRef>
+          </p:style>
+          <p:txBody>
+            <a:bodyPr rtlCol="0" anchor="ctr"/>
+            <a:lstStyle/>
+            <a:p>
+              <a:pPr algn="ctr"/>
+              <a:endParaRPr lang="en-US"/>
+            </a:p>
+          </p:txBody>
+        </p:sp>
+      </p:grpSp>
+      <p:cxnSp>
+        <p:nvCxnSpPr>
+          <p:cNvPr id="6" name="Rak 5">
+            <a:extLst>
+              <a:ext uri="{FF2B5EF4-FFF2-40B4-BE49-F238E27FC236}">
+                <a16:creationId xmlns:a16="http://schemas.microsoft.com/office/drawing/2014/main" id="{476FC58B-F192-2944-91C6-8887A8B4FCD4}"/>
+              </a:ext>
+            </a:extLst>
+          </p:cNvPr>
+          <p:cNvCxnSpPr/>
+          <p:nvPr/>
+        </p:nvCxnSpPr>
+        <p:spPr>
+          <a:xfrm>
+            <a:off x="9852670" y="2089405"/>
+            <a:ext cx="35511" cy="1670073"/>
+          </a:xfrm>
+          <a:prstGeom prst="line">
+            <a:avLst/>
+          </a:prstGeom>
+        </p:spPr>
+        <p:style>
+          <a:lnRef idx="1">
+            <a:schemeClr val="accent1"/>
+          </a:lnRef>
+          <a:fillRef idx="0">
+            <a:schemeClr val="accent1"/>
+          </a:fillRef>
+          <a:effectRef idx="0">
+            <a:schemeClr val="accent1"/>
+          </a:effectRef>
+          <a:fontRef idx="minor">
+            <a:schemeClr val="tx1"/>
+          </a:fontRef>
+        </p:style>
+      </p:cxnSp>
+      <p:cxnSp>
+        <p:nvCxnSpPr>
+          <p:cNvPr id="26" name="Rak 25">
+            <a:extLst>
+              <a:ext uri="{FF2B5EF4-FFF2-40B4-BE49-F238E27FC236}">
+                <a16:creationId xmlns:a16="http://schemas.microsoft.com/office/drawing/2014/main" id="{481346A7-8F80-D644-98D8-0157ACE8604A}"/>
+              </a:ext>
+            </a:extLst>
+          </p:cNvPr>
+          <p:cNvCxnSpPr>
+            <a:cxnSpLocks/>
+            <a:stCxn id="25" idx="5"/>
+            <a:endCxn id="2" idx="5"/>
+          </p:cNvCxnSpPr>
+          <p:nvPr/>
+        </p:nvCxnSpPr>
+        <p:spPr>
+          <a:xfrm>
+            <a:off x="9877780" y="2402784"/>
+            <a:ext cx="246528" cy="153276"/>
+          </a:xfrm>
+          <a:prstGeom prst="line">
+            <a:avLst/>
+          </a:prstGeom>
+        </p:spPr>
+        <p:style>
+          <a:lnRef idx="1">
+            <a:schemeClr val="accent1"/>
+          </a:lnRef>
+          <a:fillRef idx="0">
+            <a:schemeClr val="accent1"/>
+          </a:fillRef>
+          <a:effectRef idx="0">
+            <a:schemeClr val="accent1"/>
+          </a:effectRef>
+          <a:fontRef idx="minor">
+            <a:schemeClr val="tx1"/>
+          </a:fontRef>
+        </p:style>
+      </p:cxnSp>
+      <p:cxnSp>
+        <p:nvCxnSpPr>
+          <p:cNvPr id="30" name="Rak 29">
+            <a:extLst>
+              <a:ext uri="{FF2B5EF4-FFF2-40B4-BE49-F238E27FC236}">
+                <a16:creationId xmlns:a16="http://schemas.microsoft.com/office/drawing/2014/main" id="{8C3F144F-C7DF-1B49-8CE1-59F52A5EECE2}"/>
+              </a:ext>
+            </a:extLst>
+          </p:cNvPr>
+          <p:cNvCxnSpPr>
+            <a:cxnSpLocks/>
+          </p:cNvCxnSpPr>
+          <p:nvPr/>
+        </p:nvCxnSpPr>
+        <p:spPr>
+          <a:xfrm flipV="1">
+            <a:off x="9905976" y="3155181"/>
+            <a:ext cx="157712" cy="136217"/>
+          </a:xfrm>
+          <a:prstGeom prst="line">
+            <a:avLst/>
+          </a:prstGeom>
+        </p:spPr>
+        <p:style>
+          <a:lnRef idx="1">
+            <a:schemeClr val="accent1"/>
+          </a:lnRef>
+          <a:fillRef idx="0">
+            <a:schemeClr val="accent1"/>
+          </a:fillRef>
+          <a:effectRef idx="0">
+            <a:schemeClr val="accent1"/>
+          </a:effectRef>
+          <a:fontRef idx="minor">
+            <a:schemeClr val="tx1"/>
+          </a:fontRef>
+        </p:style>
+      </p:cxnSp>
+      <p:sp>
+        <p:nvSpPr>
+          <p:cNvPr id="2" name="Ellips 1">
+            <a:extLst>
+              <a:ext uri="{FF2B5EF4-FFF2-40B4-BE49-F238E27FC236}">
+                <a16:creationId xmlns:a16="http://schemas.microsoft.com/office/drawing/2014/main" id="{0689C363-AB69-CA4D-9587-601C5D9D6B20}"/>
+              </a:ext>
+            </a:extLst>
+          </p:cNvPr>
+          <p:cNvSpPr/>
+          <p:nvPr/>
+        </p:nvSpPr>
+        <p:spPr>
+          <a:xfrm>
+            <a:off x="10063688" y="2495440"/>
+            <a:ext cx="71021" cy="71021"/>
+          </a:xfrm>
+          <a:prstGeom prst="ellipse">
+            <a:avLst/>
+          </a:prstGeom>
+          <a:solidFill>
+            <a:srgbClr val="7030A0"/>
+          </a:solidFill>
+          <a:ln>
+            <a:noFill/>
+          </a:ln>
+        </p:spPr>
+        <p:style>
+          <a:lnRef idx="2">
+            <a:schemeClr val="accent1">
+              <a:shade val="50000"/>
+            </a:schemeClr>
+          </a:lnRef>
+          <a:fillRef idx="1">
+            <a:schemeClr val="accent1"/>
+          </a:fillRef>
+          <a:effectRef idx="0">
+            <a:schemeClr val="accent1"/>
+          </a:effectRef>
+          <a:fontRef idx="minor">
+            <a:schemeClr val="lt1"/>
+          </a:fontRef>
+        </p:style>
+        <p:txBody>
+          <a:bodyPr rtlCol="0" anchor="ctr"/>
+          <a:lstStyle/>
+          <a:p>
+            <a:pPr algn="ctr"/>
+            <a:endParaRPr lang="en-US">
+              <a:solidFill>
+                <a:srgbClr val="7030A0"/>
+              </a:solidFill>
+            </a:endParaRPr>
+          </a:p>
+        </p:txBody>
+      </p:sp>
+      <p:sp>
+        <p:nvSpPr>
+          <p:cNvPr id="8" name="Ellips 7">
+            <a:extLst>
+              <a:ext uri="{FF2B5EF4-FFF2-40B4-BE49-F238E27FC236}">
+                <a16:creationId xmlns:a16="http://schemas.microsoft.com/office/drawing/2014/main" id="{A24C19B5-943D-F94D-9CEB-0B40554E1E2F}"/>
+              </a:ext>
+            </a:extLst>
+          </p:cNvPr>
+          <p:cNvSpPr/>
+          <p:nvPr/>
+        </p:nvSpPr>
+        <p:spPr>
+          <a:xfrm>
+            <a:off x="10063688" y="2647840"/>
+            <a:ext cx="71021" cy="71021"/>
+          </a:xfrm>
+          <a:prstGeom prst="ellipse">
+            <a:avLst/>
+          </a:prstGeom>
+          <a:solidFill>
+            <a:srgbClr val="7030A0"/>
+          </a:solidFill>
+          <a:ln>
+            <a:noFill/>
+          </a:ln>
+        </p:spPr>
+        <p:style>
+          <a:lnRef idx="2">
+            <a:schemeClr val="accent1">
+              <a:shade val="50000"/>
+            </a:schemeClr>
+          </a:lnRef>
+          <a:fillRef idx="1">
+            <a:schemeClr val="accent1"/>
+          </a:fillRef>
+          <a:effectRef idx="0">
+            <a:schemeClr val="accent1"/>
+          </a:effectRef>
+          <a:fontRef idx="minor">
+            <a:schemeClr val="lt1"/>
+          </a:fontRef>
+        </p:style>
+        <p:txBody>
+          <a:bodyPr rtlCol="0" anchor="ctr"/>
+          <a:lstStyle/>
+          <a:p>
+            <a:pPr algn="ctr"/>
+            <a:endParaRPr lang="en-US">
+              <a:solidFill>
+                <a:srgbClr val="7030A0"/>
+              </a:solidFill>
+            </a:endParaRPr>
+          </a:p>
+        </p:txBody>
+      </p:sp>
+      <p:sp>
+        <p:nvSpPr>
+          <p:cNvPr id="9" name="Ellips 8">
+            <a:extLst>
+              <a:ext uri="{FF2B5EF4-FFF2-40B4-BE49-F238E27FC236}">
+                <a16:creationId xmlns:a16="http://schemas.microsoft.com/office/drawing/2014/main" id="{E42204CF-7E14-5B4A-8F68-3131EE435880}"/>
+              </a:ext>
+            </a:extLst>
+          </p:cNvPr>
+          <p:cNvSpPr/>
+          <p:nvPr/>
+        </p:nvSpPr>
+        <p:spPr>
+          <a:xfrm>
+            <a:off x="10063688" y="2800240"/>
+            <a:ext cx="71021" cy="71021"/>
+          </a:xfrm>
+          <a:prstGeom prst="ellipse">
+            <a:avLst/>
+          </a:prstGeom>
+          <a:solidFill>
+            <a:srgbClr val="7030A0"/>
+          </a:solidFill>
+          <a:ln>
+            <a:noFill/>
+          </a:ln>
+        </p:spPr>
+        <p:style>
+          <a:lnRef idx="2">
+            <a:schemeClr val="accent1">
+              <a:shade val="50000"/>
+            </a:schemeClr>
+          </a:lnRef>
+          <a:fillRef idx="1">
+            <a:schemeClr val="accent1"/>
+          </a:fillRef>
+          <a:effectRef idx="0">
+            <a:schemeClr val="accent1"/>
+          </a:effectRef>
+          <a:fontRef idx="minor">
+            <a:schemeClr val="lt1"/>
+          </a:fontRef>
+        </p:style>
+        <p:txBody>
+          <a:bodyPr rtlCol="0" anchor="ctr"/>
+          <a:lstStyle/>
+          <a:p>
+            <a:pPr algn="ctr"/>
+            <a:endParaRPr lang="en-US">
+              <a:solidFill>
+                <a:srgbClr val="7030A0"/>
+              </a:solidFill>
+            </a:endParaRPr>
+          </a:p>
+        </p:txBody>
+      </p:sp>
+      <p:sp>
+        <p:nvSpPr>
+          <p:cNvPr id="13" name="Ellips 12">
+            <a:extLst>
+              <a:ext uri="{FF2B5EF4-FFF2-40B4-BE49-F238E27FC236}">
+                <a16:creationId xmlns:a16="http://schemas.microsoft.com/office/drawing/2014/main" id="{7137FCFF-31D1-4649-8E0E-CFF1CDF74254}"/>
+              </a:ext>
+            </a:extLst>
+          </p:cNvPr>
+          <p:cNvSpPr/>
+          <p:nvPr/>
+        </p:nvSpPr>
+        <p:spPr>
+          <a:xfrm>
+            <a:off x="10063688" y="2952640"/>
+            <a:ext cx="71021" cy="71021"/>
+          </a:xfrm>
+          <a:prstGeom prst="ellipse">
+            <a:avLst/>
+          </a:prstGeom>
+          <a:solidFill>
+            <a:srgbClr val="7030A0"/>
+          </a:solidFill>
+          <a:ln>
+            <a:noFill/>
+          </a:ln>
+        </p:spPr>
+        <p:style>
+          <a:lnRef idx="2">
+            <a:schemeClr val="accent1">
+              <a:shade val="50000"/>
+            </a:schemeClr>
+          </a:lnRef>
+          <a:fillRef idx="1">
+            <a:schemeClr val="accent1"/>
+          </a:fillRef>
+          <a:effectRef idx="0">
+            <a:schemeClr val="accent1"/>
+          </a:effectRef>
+          <a:fontRef idx="minor">
+            <a:schemeClr val="lt1"/>
+          </a:fontRef>
+        </p:style>
+        <p:txBody>
+          <a:bodyPr rtlCol="0" anchor="ctr"/>
+          <a:lstStyle/>
+          <a:p>
+            <a:pPr algn="ctr"/>
+            <a:endParaRPr lang="en-US">
+              <a:solidFill>
+                <a:srgbClr val="7030A0"/>
+              </a:solidFill>
+            </a:endParaRPr>
+          </a:p>
+        </p:txBody>
+      </p:sp>
+      <p:sp>
+        <p:nvSpPr>
+          <p:cNvPr id="15" name="Ellips 14">
+            <a:extLst>
+              <a:ext uri="{FF2B5EF4-FFF2-40B4-BE49-F238E27FC236}">
+                <a16:creationId xmlns:a16="http://schemas.microsoft.com/office/drawing/2014/main" id="{81E533F6-8E9B-904A-B1E4-990953B34C1C}"/>
+              </a:ext>
+            </a:extLst>
+          </p:cNvPr>
+          <p:cNvSpPr/>
+          <p:nvPr/>
+        </p:nvSpPr>
+        <p:spPr>
+          <a:xfrm>
+            <a:off x="10063688" y="3105040"/>
+            <a:ext cx="71021" cy="71021"/>
+          </a:xfrm>
+          <a:prstGeom prst="ellipse">
+            <a:avLst/>
+          </a:prstGeom>
+          <a:solidFill>
+            <a:srgbClr val="7030A0"/>
+          </a:solidFill>
+          <a:ln>
+            <a:noFill/>
+          </a:ln>
+        </p:spPr>
+        <p:style>
+          <a:lnRef idx="2">
+            <a:schemeClr val="accent1">
+              <a:shade val="50000"/>
+            </a:schemeClr>
+          </a:lnRef>
+          <a:fillRef idx="1">
+            <a:schemeClr val="accent1"/>
+          </a:fillRef>
+          <a:effectRef idx="0">
+            <a:schemeClr val="accent1"/>
+          </a:effectRef>
+          <a:fontRef idx="minor">
+            <a:schemeClr val="lt1"/>
+          </a:fontRef>
+        </p:style>
+        <p:txBody>
+          <a:bodyPr rtlCol="0" anchor="ctr"/>
+          <a:lstStyle/>
+          <a:p>
+            <a:pPr algn="ctr"/>
+            <a:endParaRPr lang="en-US">
+              <a:solidFill>
+                <a:srgbClr val="7030A0"/>
+              </a:solidFill>
+            </a:endParaRPr>
+          </a:p>
+        </p:txBody>
+      </p:sp>
+      <p:sp>
+        <p:nvSpPr>
+          <p:cNvPr id="37" name="textruta 36">
+            <a:extLst>
+              <a:ext uri="{FF2B5EF4-FFF2-40B4-BE49-F238E27FC236}">
+                <a16:creationId xmlns:a16="http://schemas.microsoft.com/office/drawing/2014/main" id="{A371BC9E-5A62-ED46-A54F-F549C75B277E}"/>
+              </a:ext>
+            </a:extLst>
+          </p:cNvPr>
+          <p:cNvSpPr txBox="1"/>
+          <p:nvPr/>
+        </p:nvSpPr>
+        <p:spPr>
+          <a:xfrm>
+            <a:off x="9895495" y="3176061"/>
+            <a:ext cx="1136850" cy="230832"/>
+          </a:xfrm>
+          <a:prstGeom prst="rect">
+            <a:avLst/>
+          </a:prstGeom>
+          <a:noFill/>
+        </p:spPr>
+        <p:txBody>
+          <a:bodyPr wrap="none" rtlCol="0">
+            <a:spAutoFit/>
+          </a:bodyPr>
+          <a:lstStyle/>
+          <a:p>
+            <a:r>
+              <a:rPr lang="en-US" sz="900" b="1" dirty="0" err="1"/>
+              <a:t>afterEndOfSegment</a:t>
+            </a:r>
+            <a:endParaRPr lang="en-US" sz="900" b="1" dirty="0"/>
+          </a:p>
+        </p:txBody>
+      </p:sp>
+      <p:sp>
+        <p:nvSpPr>
+          <p:cNvPr id="38" name="Rektangel 37">
+            <a:extLst>
+              <a:ext uri="{FF2B5EF4-FFF2-40B4-BE49-F238E27FC236}">
+                <a16:creationId xmlns:a16="http://schemas.microsoft.com/office/drawing/2014/main" id="{67D5E3C2-1F4B-C040-A55E-55161DCCC7CF}"/>
+              </a:ext>
+            </a:extLst>
+          </p:cNvPr>
+          <p:cNvSpPr/>
+          <p:nvPr/>
+        </p:nvSpPr>
+        <p:spPr>
+          <a:xfrm>
+            <a:off x="10081483" y="3022785"/>
+            <a:ext cx="1109599" cy="230832"/>
+          </a:xfrm>
+          <a:prstGeom prst="rect">
+            <a:avLst/>
+          </a:prstGeom>
+        </p:spPr>
+        <p:txBody>
+          <a:bodyPr wrap="none">
+            <a:spAutoFit/>
+          </a:bodyPr>
+          <a:lstStyle/>
+          <a:p>
+            <a:r>
+              <a:rPr lang="en-US" sz="900" dirty="0"/>
+              <a:t>segment ends here </a:t>
+            </a:r>
+          </a:p>
+        </p:txBody>
+      </p:sp>
+      <p:sp>
+        <p:nvSpPr>
+          <p:cNvPr id="41" name="Höger klammerparentes 40">
+            <a:extLst>
+              <a:ext uri="{FF2B5EF4-FFF2-40B4-BE49-F238E27FC236}">
+                <a16:creationId xmlns:a16="http://schemas.microsoft.com/office/drawing/2014/main" id="{15966A0A-58D1-F04D-93FA-94741DFF2E0F}"/>
+              </a:ext>
+            </a:extLst>
+          </p:cNvPr>
+          <p:cNvSpPr/>
+          <p:nvPr/>
+        </p:nvSpPr>
+        <p:spPr>
+          <a:xfrm>
+            <a:off x="11012376" y="2481586"/>
+            <a:ext cx="164868" cy="713138"/>
+          </a:xfrm>
+          <a:prstGeom prst="rightBrace">
+            <a:avLst/>
+          </a:prstGeom>
+        </p:spPr>
+        <p:style>
+          <a:lnRef idx="1">
+            <a:schemeClr val="accent1"/>
+          </a:lnRef>
+          <a:fillRef idx="0">
+            <a:schemeClr val="accent1"/>
+          </a:fillRef>
+          <a:effectRef idx="0">
+            <a:schemeClr val="accent1"/>
+          </a:effectRef>
+          <a:fontRef idx="minor">
+            <a:schemeClr val="tx1"/>
+          </a:fontRef>
+        </p:style>
+        <p:txBody>
+          <a:bodyPr rtlCol="0" anchor="ctr"/>
+          <a:lstStyle/>
+          <a:p>
+            <a:pPr algn="ctr"/>
+            <a:endParaRPr lang="en-US"/>
+          </a:p>
+        </p:txBody>
+      </p:sp>
+      <p:sp>
+        <p:nvSpPr>
+          <p:cNvPr id="42" name="textruta 41">
+            <a:extLst>
+              <a:ext uri="{FF2B5EF4-FFF2-40B4-BE49-F238E27FC236}">
+                <a16:creationId xmlns:a16="http://schemas.microsoft.com/office/drawing/2014/main" id="{CD3E1E61-C694-7546-A5E0-594DC0411208}"/>
+              </a:ext>
+            </a:extLst>
+          </p:cNvPr>
+          <p:cNvSpPr txBox="1"/>
+          <p:nvPr/>
+        </p:nvSpPr>
+        <p:spPr>
+          <a:xfrm>
+            <a:off x="11191082" y="2721808"/>
+            <a:ext cx="591829" cy="230832"/>
+          </a:xfrm>
+          <a:prstGeom prst="rect">
+            <a:avLst/>
+          </a:prstGeom>
+          <a:noFill/>
+        </p:spPr>
+        <p:txBody>
+          <a:bodyPr wrap="none" rtlCol="0">
+            <a:spAutoFit/>
+          </a:bodyPr>
+          <a:lstStyle/>
+          <a:p>
+            <a:r>
+              <a:rPr lang="en-US" sz="900" dirty="0"/>
+              <a:t>segment</a:t>
+            </a:r>
+          </a:p>
+        </p:txBody>
+      </p:sp>
+      <p:cxnSp>
+        <p:nvCxnSpPr>
+          <p:cNvPr id="44" name="Rak pil 43">
+            <a:extLst>
+              <a:ext uri="{FF2B5EF4-FFF2-40B4-BE49-F238E27FC236}">
+                <a16:creationId xmlns:a16="http://schemas.microsoft.com/office/drawing/2014/main" id="{C8FAE16C-C712-DC4A-B2AD-C0C7C7BE59FC}"/>
+              </a:ext>
+            </a:extLst>
+          </p:cNvPr>
+          <p:cNvCxnSpPr/>
+          <p:nvPr/>
+        </p:nvCxnSpPr>
+        <p:spPr>
+          <a:xfrm>
+            <a:off x="9528603" y="1612291"/>
+            <a:ext cx="0" cy="308781"/>
+          </a:xfrm>
+          <a:prstGeom prst="straightConnector1">
+            <a:avLst/>
+          </a:prstGeom>
+          <a:ln>
+            <a:tailEnd type="triangle"/>
+          </a:ln>
+        </p:spPr>
+        <p:style>
+          <a:lnRef idx="1">
+            <a:schemeClr val="accent1"/>
+          </a:lnRef>
+          <a:fillRef idx="0">
+            <a:schemeClr val="accent1"/>
+          </a:fillRef>
+          <a:effectRef idx="0">
+            <a:schemeClr val="accent1"/>
+          </a:effectRef>
+          <a:fontRef idx="minor">
+            <a:schemeClr val="tx1"/>
+          </a:fontRef>
+        </p:style>
+      </p:cxnSp>
+      <p:sp>
+        <p:nvSpPr>
+          <p:cNvPr id="45" name="textruta 44">
+            <a:extLst>
+              <a:ext uri="{FF2B5EF4-FFF2-40B4-BE49-F238E27FC236}">
+                <a16:creationId xmlns:a16="http://schemas.microsoft.com/office/drawing/2014/main" id="{DA0F3BE0-F5BF-E647-AD9B-CFA8D514DE7E}"/>
+              </a:ext>
+            </a:extLst>
+          </p:cNvPr>
+          <p:cNvSpPr txBox="1"/>
+          <p:nvPr/>
+        </p:nvSpPr>
+        <p:spPr>
+          <a:xfrm>
+            <a:off x="8265485" y="1632526"/>
+            <a:ext cx="1303562" cy="230832"/>
+          </a:xfrm>
+          <a:prstGeom prst="rect">
+            <a:avLst/>
+          </a:prstGeom>
+          <a:noFill/>
+        </p:spPr>
+        <p:txBody>
+          <a:bodyPr wrap="none" rtlCol="0">
+            <a:spAutoFit/>
+          </a:bodyPr>
+          <a:lstStyle/>
+          <a:p>
+            <a:r>
+              <a:rPr lang="en-US" sz="900" dirty="0"/>
+              <a:t>Loop direction (3 times)</a:t>
+            </a:r>
+          </a:p>
+        </p:txBody>
+      </p:sp>
+      <p:sp>
+        <p:nvSpPr>
+          <p:cNvPr id="46" name="textruta 45">
+            <a:extLst>
+              <a:ext uri="{FF2B5EF4-FFF2-40B4-BE49-F238E27FC236}">
+                <a16:creationId xmlns:a16="http://schemas.microsoft.com/office/drawing/2014/main" id="{433A5733-221F-D648-9133-14ACE4ACF277}"/>
+              </a:ext>
+            </a:extLst>
+          </p:cNvPr>
+          <p:cNvSpPr txBox="1"/>
+          <p:nvPr/>
+        </p:nvSpPr>
+        <p:spPr>
+          <a:xfrm>
+            <a:off x="9520602" y="1921072"/>
+            <a:ext cx="914033" cy="230832"/>
+          </a:xfrm>
+          <a:prstGeom prst="rect">
+            <a:avLst/>
+          </a:prstGeom>
+          <a:noFill/>
+        </p:spPr>
+        <p:txBody>
+          <a:bodyPr wrap="none" rtlCol="0">
+            <a:spAutoFit/>
+          </a:bodyPr>
+          <a:lstStyle/>
+          <a:p>
+            <a:r>
+              <a:rPr lang="en-US" sz="900" dirty="0"/>
+              <a:t>newer commits</a:t>
+            </a:r>
+          </a:p>
+        </p:txBody>
+      </p:sp>
+      <p:sp>
+        <p:nvSpPr>
+          <p:cNvPr id="47" name="textruta 46">
+            <a:extLst>
+              <a:ext uri="{FF2B5EF4-FFF2-40B4-BE49-F238E27FC236}">
+                <a16:creationId xmlns:a16="http://schemas.microsoft.com/office/drawing/2014/main" id="{C6011842-B23D-824E-84DD-7F02BAB62684}"/>
+              </a:ext>
+            </a:extLst>
+          </p:cNvPr>
+          <p:cNvSpPr txBox="1"/>
+          <p:nvPr/>
+        </p:nvSpPr>
+        <p:spPr>
+          <a:xfrm>
+            <a:off x="9526911" y="3792194"/>
+            <a:ext cx="862737" cy="230832"/>
+          </a:xfrm>
+          <a:prstGeom prst="rect">
+            <a:avLst/>
+          </a:prstGeom>
+          <a:noFill/>
+        </p:spPr>
+        <p:txBody>
+          <a:bodyPr wrap="none" rtlCol="0">
+            <a:spAutoFit/>
+          </a:bodyPr>
+          <a:lstStyle/>
+          <a:p>
+            <a:r>
+              <a:rPr lang="en-US" sz="900" dirty="0"/>
+              <a:t>older commits</a:t>
+            </a:r>
+          </a:p>
+        </p:txBody>
+      </p:sp>
+      <p:cxnSp>
+        <p:nvCxnSpPr>
+          <p:cNvPr id="48" name="Rak pil 47">
+            <a:extLst>
+              <a:ext uri="{FF2B5EF4-FFF2-40B4-BE49-F238E27FC236}">
+                <a16:creationId xmlns:a16="http://schemas.microsoft.com/office/drawing/2014/main" id="{2DE0BAF2-4144-D24F-8964-300231F285EB}"/>
+              </a:ext>
+            </a:extLst>
+          </p:cNvPr>
+          <p:cNvCxnSpPr>
+            <a:cxnSpLocks/>
+          </p:cNvCxnSpPr>
+          <p:nvPr/>
+        </p:nvCxnSpPr>
+        <p:spPr>
+          <a:xfrm>
+            <a:off x="9895495" y="4124522"/>
+            <a:ext cx="1295587" cy="0"/>
+          </a:xfrm>
+          <a:prstGeom prst="straightConnector1">
+            <a:avLst/>
+          </a:prstGeom>
+          <a:ln>
+            <a:tailEnd type="triangle"/>
+          </a:ln>
+        </p:spPr>
+        <p:style>
+          <a:lnRef idx="1">
+            <a:schemeClr val="accent1"/>
+          </a:lnRef>
+          <a:fillRef idx="0">
+            <a:schemeClr val="accent1"/>
+          </a:fillRef>
+          <a:effectRef idx="0">
+            <a:schemeClr val="accent1"/>
+          </a:effectRef>
+          <a:fontRef idx="minor">
+            <a:schemeClr val="tx1"/>
+          </a:fontRef>
+        </p:style>
+      </p:cxnSp>
+      <p:sp>
+        <p:nvSpPr>
+          <p:cNvPr id="50" name="textruta 49">
+            <a:extLst>
+              <a:ext uri="{FF2B5EF4-FFF2-40B4-BE49-F238E27FC236}">
+                <a16:creationId xmlns:a16="http://schemas.microsoft.com/office/drawing/2014/main" id="{3753642E-92FD-D241-9F5A-1D7D716B2B62}"/>
+              </a:ext>
+            </a:extLst>
+          </p:cNvPr>
+          <p:cNvSpPr txBox="1"/>
+          <p:nvPr/>
+        </p:nvSpPr>
+        <p:spPr>
+          <a:xfrm>
+            <a:off x="9969387" y="4094600"/>
+            <a:ext cx="1098378" cy="230832"/>
+          </a:xfrm>
+          <a:prstGeom prst="rect">
+            <a:avLst/>
+          </a:prstGeom>
+          <a:noFill/>
+        </p:spPr>
+        <p:txBody>
+          <a:bodyPr wrap="none" rtlCol="0">
+            <a:spAutoFit/>
+          </a:bodyPr>
+          <a:lstStyle/>
+          <a:p>
+            <a:r>
+              <a:rPr lang="en-US" sz="900" dirty="0"/>
+              <a:t>x-position (column)</a:t>
+            </a:r>
+          </a:p>
+        </p:txBody>
+      </p:sp>
+      <p:cxnSp>
+        <p:nvCxnSpPr>
+          <p:cNvPr id="52" name="Rak pil 51">
+            <a:extLst>
+              <a:ext uri="{FF2B5EF4-FFF2-40B4-BE49-F238E27FC236}">
+                <a16:creationId xmlns:a16="http://schemas.microsoft.com/office/drawing/2014/main" id="{313AF281-58C4-DE4C-A26C-F649B0005BE9}"/>
+              </a:ext>
+            </a:extLst>
+          </p:cNvPr>
+          <p:cNvCxnSpPr>
+            <a:cxnSpLocks/>
+            <a:stCxn id="55" idx="3"/>
+          </p:cNvCxnSpPr>
+          <p:nvPr/>
+        </p:nvCxnSpPr>
+        <p:spPr>
+          <a:xfrm>
+            <a:off x="8838466" y="2522847"/>
+            <a:ext cx="914678" cy="8720"/>
+          </a:xfrm>
+          <a:prstGeom prst="straightConnector1">
+            <a:avLst/>
+          </a:prstGeom>
+          <a:ln>
+            <a:solidFill>
+              <a:schemeClr val="accent2"/>
+            </a:solidFill>
+            <a:tailEnd type="triangle"/>
+          </a:ln>
+        </p:spPr>
+        <p:style>
+          <a:lnRef idx="1">
+            <a:schemeClr val="accent1"/>
+          </a:lnRef>
+          <a:fillRef idx="0">
+            <a:schemeClr val="accent1"/>
+          </a:fillRef>
+          <a:effectRef idx="0">
+            <a:schemeClr val="accent1"/>
+          </a:effectRef>
+          <a:fontRef idx="minor">
+            <a:schemeClr val="tx1"/>
+          </a:fontRef>
+        </p:style>
+      </p:cxnSp>
+      <p:cxnSp>
+        <p:nvCxnSpPr>
+          <p:cNvPr id="54" name="Rak pil 53">
+            <a:extLst>
+              <a:ext uri="{FF2B5EF4-FFF2-40B4-BE49-F238E27FC236}">
+                <a16:creationId xmlns:a16="http://schemas.microsoft.com/office/drawing/2014/main" id="{B0EEA64F-C575-F543-8DA6-60E04690D2B9}"/>
+              </a:ext>
+            </a:extLst>
+          </p:cNvPr>
+          <p:cNvCxnSpPr>
+            <a:cxnSpLocks/>
+          </p:cNvCxnSpPr>
+          <p:nvPr/>
+        </p:nvCxnSpPr>
+        <p:spPr>
+          <a:xfrm>
+            <a:off x="9426566" y="3301260"/>
+            <a:ext cx="347520" cy="617"/>
+          </a:xfrm>
+          <a:prstGeom prst="straightConnector1">
+            <a:avLst/>
+          </a:prstGeom>
+          <a:ln>
+            <a:solidFill>
+              <a:schemeClr val="accent2"/>
+            </a:solidFill>
+            <a:tailEnd type="triangle"/>
+          </a:ln>
+        </p:spPr>
+        <p:style>
+          <a:lnRef idx="1">
+            <a:schemeClr val="accent1"/>
+          </a:lnRef>
+          <a:fillRef idx="0">
+            <a:schemeClr val="accent1"/>
+          </a:fillRef>
+          <a:effectRef idx="0">
+            <a:schemeClr val="accent1"/>
+          </a:effectRef>
+          <a:fontRef idx="minor">
+            <a:schemeClr val="tx1"/>
+          </a:fontRef>
+        </p:style>
+      </p:cxnSp>
+      <p:sp>
+        <p:nvSpPr>
+          <p:cNvPr id="55" name="textruta 54">
+            <a:extLst>
+              <a:ext uri="{FF2B5EF4-FFF2-40B4-BE49-F238E27FC236}">
+                <a16:creationId xmlns:a16="http://schemas.microsoft.com/office/drawing/2014/main" id="{898DEC5A-7BF3-494E-BBD8-9CC1AE2E6E04}"/>
+              </a:ext>
+            </a:extLst>
+          </p:cNvPr>
+          <p:cNvSpPr txBox="1"/>
+          <p:nvPr/>
+        </p:nvSpPr>
+        <p:spPr>
+          <a:xfrm>
+            <a:off x="8246637" y="2407431"/>
+            <a:ext cx="591829" cy="230832"/>
+          </a:xfrm>
+          <a:prstGeom prst="rect">
+            <a:avLst/>
+          </a:prstGeom>
+          <a:noFill/>
+        </p:spPr>
+        <p:txBody>
+          <a:bodyPr wrap="none" rtlCol="0">
+            <a:spAutoFit/>
+          </a:bodyPr>
+          <a:lstStyle/>
+          <a:p>
+            <a:r>
+              <a:rPr lang="en-US" sz="900" dirty="0"/>
+              <a:t>a) row : </a:t>
+            </a:r>
+            <a:r>
+              <a:rPr lang="en-US" sz="900" dirty="0" err="1"/>
+              <a:t>i</a:t>
+            </a:r>
+            <a:endParaRPr lang="en-US" sz="900" dirty="0"/>
+          </a:p>
+        </p:txBody>
+      </p:sp>
+      <p:sp>
+        <p:nvSpPr>
+          <p:cNvPr id="56" name="textruta 55">
+            <a:extLst>
+              <a:ext uri="{FF2B5EF4-FFF2-40B4-BE49-F238E27FC236}">
+                <a16:creationId xmlns:a16="http://schemas.microsoft.com/office/drawing/2014/main" id="{932A7C84-F9E2-3B4C-82B2-6F59833CFDEA}"/>
+              </a:ext>
+            </a:extLst>
+          </p:cNvPr>
+          <p:cNvSpPr txBox="1"/>
+          <p:nvPr/>
+        </p:nvSpPr>
+        <p:spPr>
+          <a:xfrm>
+            <a:off x="8291109" y="3192895"/>
+            <a:ext cx="1292420" cy="369332"/>
+          </a:xfrm>
+          <a:prstGeom prst="rect">
+            <a:avLst/>
+          </a:prstGeom>
+          <a:noFill/>
+        </p:spPr>
+        <p:txBody>
+          <a:bodyPr wrap="square" rtlCol="0">
+            <a:spAutoFit/>
+          </a:bodyPr>
+          <a:lstStyle/>
+          <a:p>
+            <a:r>
+              <a:rPr lang="en-US" sz="900" dirty="0"/>
+              <a:t>b) next in this lane &gt; </a:t>
+            </a:r>
+            <a:r>
+              <a:rPr lang="en-US" sz="900" dirty="0" err="1"/>
+              <a:t>i</a:t>
+            </a:r>
+            <a:endParaRPr lang="en-US" sz="900" dirty="0"/>
+          </a:p>
+          <a:p>
+            <a:r>
+              <a:rPr lang="en-US" sz="900" dirty="0"/>
+              <a:t>Therefore occupied</a:t>
+            </a:r>
+          </a:p>
+        </p:txBody>
+      </p:sp>
+      <p:cxnSp>
+        <p:nvCxnSpPr>
+          <p:cNvPr id="58" name="Rak pil 57">
+            <a:extLst>
+              <a:ext uri="{FF2B5EF4-FFF2-40B4-BE49-F238E27FC236}">
+                <a16:creationId xmlns:a16="http://schemas.microsoft.com/office/drawing/2014/main" id="{16596D0B-E402-6748-B694-5D4FAF51220B}"/>
+              </a:ext>
+            </a:extLst>
+          </p:cNvPr>
+          <p:cNvCxnSpPr>
+            <a:cxnSpLocks/>
+          </p:cNvCxnSpPr>
+          <p:nvPr/>
+        </p:nvCxnSpPr>
+        <p:spPr>
+          <a:xfrm>
+            <a:off x="10092817" y="2321405"/>
+            <a:ext cx="7249" cy="181252"/>
+          </a:xfrm>
+          <a:prstGeom prst="straightConnector1">
+            <a:avLst/>
+          </a:prstGeom>
+          <a:ln>
+            <a:solidFill>
+              <a:schemeClr val="accent2"/>
+            </a:solidFill>
+            <a:tailEnd type="triangle"/>
+          </a:ln>
+        </p:spPr>
+        <p:style>
+          <a:lnRef idx="1">
+            <a:schemeClr val="accent1"/>
+          </a:lnRef>
+          <a:fillRef idx="0">
+            <a:schemeClr val="accent1"/>
+          </a:fillRef>
+          <a:effectRef idx="0">
+            <a:schemeClr val="accent1"/>
+          </a:effectRef>
+          <a:fontRef idx="minor">
+            <a:schemeClr val="tx1"/>
+          </a:fontRef>
+        </p:style>
+      </p:cxnSp>
+      <p:sp>
+        <p:nvSpPr>
+          <p:cNvPr id="63" name="textruta 62">
+            <a:extLst>
+              <a:ext uri="{FF2B5EF4-FFF2-40B4-BE49-F238E27FC236}">
+                <a16:creationId xmlns:a16="http://schemas.microsoft.com/office/drawing/2014/main" id="{AC800AF0-AAE7-AE4D-88B1-8EAD4556AF50}"/>
+              </a:ext>
+            </a:extLst>
+          </p:cNvPr>
+          <p:cNvSpPr txBox="1"/>
+          <p:nvPr/>
+        </p:nvSpPr>
+        <p:spPr>
+          <a:xfrm>
+            <a:off x="9989270" y="2144989"/>
+            <a:ext cx="1085554" cy="230832"/>
+          </a:xfrm>
+          <a:prstGeom prst="rect">
+            <a:avLst/>
+          </a:prstGeom>
+          <a:noFill/>
+        </p:spPr>
+        <p:txBody>
+          <a:bodyPr wrap="none" rtlCol="0">
+            <a:spAutoFit/>
+          </a:bodyPr>
+          <a:lstStyle/>
+          <a:p>
+            <a:r>
+              <a:rPr lang="en-US" sz="900" dirty="0"/>
+              <a:t>c) first free column</a:t>
+            </a:r>
+          </a:p>
+        </p:txBody>
+      </p:sp>
+      <p:sp>
+        <p:nvSpPr>
+          <p:cNvPr id="64" name="textruta 63">
+            <a:extLst>
+              <a:ext uri="{FF2B5EF4-FFF2-40B4-BE49-F238E27FC236}">
+                <a16:creationId xmlns:a16="http://schemas.microsoft.com/office/drawing/2014/main" id="{AEC8045E-0563-8848-935D-6C2A8B626CAA}"/>
+              </a:ext>
+            </a:extLst>
+          </p:cNvPr>
+          <p:cNvSpPr txBox="1"/>
+          <p:nvPr/>
+        </p:nvSpPr>
+        <p:spPr>
+          <a:xfrm>
+            <a:off x="8971466" y="1046376"/>
+            <a:ext cx="2224391" cy="461665"/>
+          </a:xfrm>
+          <a:prstGeom prst="rect">
+            <a:avLst/>
+          </a:prstGeom>
+          <a:noFill/>
+        </p:spPr>
+        <p:txBody>
+          <a:bodyPr wrap="none" rtlCol="0">
+            <a:spAutoFit/>
+          </a:bodyPr>
+          <a:lstStyle/>
+          <a:p>
+            <a:r>
+              <a:rPr lang="en-US" sz="2400" b="1" noProof="1"/>
+              <a:t>Layout principle</a:t>
+            </a:r>
+          </a:p>
+        </p:txBody>
+      </p:sp>
+      <p:cxnSp>
+        <p:nvCxnSpPr>
+          <p:cNvPr id="65" name="Rak pil 64">
+            <a:extLst>
+              <a:ext uri="{FF2B5EF4-FFF2-40B4-BE49-F238E27FC236}">
+                <a16:creationId xmlns:a16="http://schemas.microsoft.com/office/drawing/2014/main" id="{CBF98A73-0568-C649-8113-B148500B18E2}"/>
+              </a:ext>
+            </a:extLst>
+          </p:cNvPr>
+          <p:cNvCxnSpPr>
+            <a:cxnSpLocks/>
+          </p:cNvCxnSpPr>
+          <p:nvPr/>
+        </p:nvCxnSpPr>
+        <p:spPr>
+          <a:xfrm flipV="1">
+            <a:off x="9511182" y="2670619"/>
+            <a:ext cx="473650" cy="53070"/>
+          </a:xfrm>
+          <a:prstGeom prst="straightConnector1">
+            <a:avLst/>
+          </a:prstGeom>
+          <a:ln>
+            <a:solidFill>
+              <a:schemeClr val="accent2"/>
+            </a:solidFill>
+            <a:tailEnd type="triangle"/>
+          </a:ln>
+        </p:spPr>
+        <p:style>
+          <a:lnRef idx="1">
+            <a:schemeClr val="accent1"/>
+          </a:lnRef>
+          <a:fillRef idx="0">
+            <a:schemeClr val="accent1"/>
+          </a:fillRef>
+          <a:effectRef idx="0">
+            <a:schemeClr val="accent1"/>
+          </a:effectRef>
+          <a:fontRef idx="minor">
+            <a:schemeClr val="tx1"/>
+          </a:fontRef>
+        </p:style>
+      </p:cxnSp>
+      <p:sp>
+        <p:nvSpPr>
+          <p:cNvPr id="66" name="textruta 65">
+            <a:extLst>
+              <a:ext uri="{FF2B5EF4-FFF2-40B4-BE49-F238E27FC236}">
+                <a16:creationId xmlns:a16="http://schemas.microsoft.com/office/drawing/2014/main" id="{4CD990E2-898B-5E40-9112-C72C0E82929E}"/>
+              </a:ext>
+            </a:extLst>
+          </p:cNvPr>
+          <p:cNvSpPr txBox="1"/>
+          <p:nvPr/>
+        </p:nvSpPr>
+        <p:spPr>
+          <a:xfrm>
+            <a:off x="8480228" y="2625013"/>
+            <a:ext cx="1292420" cy="507831"/>
+          </a:xfrm>
+          <a:prstGeom prst="rect">
+            <a:avLst/>
+          </a:prstGeom>
+          <a:noFill/>
+        </p:spPr>
+        <p:txBody>
+          <a:bodyPr wrap="square" rtlCol="0">
+            <a:spAutoFit/>
+          </a:bodyPr>
+          <a:lstStyle/>
+          <a:p>
+            <a:r>
+              <a:rPr lang="en-US" sz="900" dirty="0"/>
+              <a:t>d) next in this lane</a:t>
+            </a:r>
+            <a:br>
+              <a:rPr lang="en-US" sz="900" dirty="0"/>
+            </a:br>
+            <a:r>
+              <a:rPr lang="en-US" sz="900" dirty="0"/>
+              <a:t>(marked occupied </a:t>
+            </a:r>
+            <a:br>
+              <a:rPr lang="en-US" sz="900" dirty="0"/>
+            </a:br>
+            <a:r>
+              <a:rPr lang="en-US" sz="900" dirty="0"/>
+              <a:t>until segment ends)</a:t>
+            </a:r>
+          </a:p>
+        </p:txBody>
+      </p:sp>
+      <p:sp>
+        <p:nvSpPr>
+          <p:cNvPr id="70" name="textruta 69">
+            <a:extLst>
+              <a:ext uri="{FF2B5EF4-FFF2-40B4-BE49-F238E27FC236}">
+                <a16:creationId xmlns:a16="http://schemas.microsoft.com/office/drawing/2014/main" id="{8786B07B-5E6D-5942-B821-992FF3BFB269}"/>
+              </a:ext>
+            </a:extLst>
+          </p:cNvPr>
+          <p:cNvSpPr txBox="1"/>
+          <p:nvPr/>
+        </p:nvSpPr>
+        <p:spPr>
+          <a:xfrm>
+            <a:off x="8622191" y="4493303"/>
+            <a:ext cx="3610242" cy="507831"/>
+          </a:xfrm>
+          <a:prstGeom prst="rect">
+            <a:avLst/>
+          </a:prstGeom>
+          <a:noFill/>
+        </p:spPr>
+        <p:txBody>
+          <a:bodyPr wrap="square" rtlCol="0">
+            <a:spAutoFit/>
+          </a:bodyPr>
+          <a:lstStyle/>
+          <a:p>
+            <a:r>
+              <a:rPr lang="en-US" sz="900" i="1" dirty="0"/>
+              <a:t>Figure : Example of looping the git-log,</a:t>
+            </a:r>
+          </a:p>
+          <a:p>
+            <a:r>
+              <a:rPr lang="en-US" sz="900" i="1" dirty="0"/>
+              <a:t>and on how new lane is assigned (</a:t>
+            </a:r>
+            <a:r>
+              <a:rPr lang="en-US" sz="900" i="1" dirty="0" err="1"/>
+              <a:t>b,c</a:t>
+            </a:r>
+            <a:r>
+              <a:rPr lang="en-US" sz="900" i="1" dirty="0"/>
+              <a:t>) </a:t>
+            </a:r>
+          </a:p>
+          <a:p>
+            <a:r>
+              <a:rPr lang="en-US" sz="900" i="1" dirty="0"/>
+              <a:t>and how parent rows are stored (d).</a:t>
+            </a:r>
           </a:p>
         </p:txBody>
       </p:sp>
@@ -9063,7 +10632,7 @@
         </p:nvSpPr>
         <p:spPr>
           <a:xfrm>
-            <a:off x="450135" y="631305"/>
+            <a:off x="416902" y="953256"/>
             <a:ext cx="5257530" cy="461665"/>
           </a:xfrm>
           <a:prstGeom prst="rect">
@@ -9098,7 +10667,7 @@
         </p:nvSpPr>
         <p:spPr>
           <a:xfrm>
-            <a:off x="450135" y="1150452"/>
+            <a:off x="416902" y="1472403"/>
             <a:ext cx="5396401" cy="4647426"/>
           </a:xfrm>
           <a:prstGeom prst="rect">
@@ -9472,7 +11041,7 @@
         </p:nvSpPr>
         <p:spPr>
           <a:xfrm>
-            <a:off x="450134" y="5871202"/>
+            <a:off x="416901" y="6193153"/>
             <a:ext cx="5396401" cy="584775"/>
           </a:xfrm>
           <a:prstGeom prst="rect">
@@ -9538,7 +11107,7 @@
         </p:nvSpPr>
         <p:spPr>
           <a:xfrm>
-            <a:off x="6390552" y="631304"/>
+            <a:off x="6357319" y="953255"/>
             <a:ext cx="4339971" cy="461665"/>
           </a:xfrm>
           <a:prstGeom prst="rect">
@@ -9573,7 +11142,7 @@
         </p:nvSpPr>
         <p:spPr>
           <a:xfrm>
-            <a:off x="6400800" y="1150452"/>
+            <a:off x="6367567" y="1472403"/>
             <a:ext cx="5396401" cy="4278094"/>
           </a:xfrm>
           <a:prstGeom prst="rect">
@@ -9924,7 +11493,7 @@
         <p:spPr>
           <a:xfrm>
             <a:off x="416902" y="122259"/>
-            <a:ext cx="2828723" cy="461665"/>
+            <a:ext cx="5469574" cy="830997"/>
           </a:xfrm>
           <a:prstGeom prst="rect">
             <a:avLst/>
@@ -9938,7 +11507,7 @@
           <a:lstStyle/>
           <a:p>
             <a:r>
-              <a:rPr lang="en-US" sz="2400" b="1" noProof="1">
+              <a:rPr lang="en-US" sz="4800" b="1" noProof="1">
                 <a:solidFill>
                   <a:schemeClr val="accent1"/>
                 </a:solidFill>
@@ -9992,7 +11561,7 @@
         </p:nvSpPr>
         <p:spPr>
           <a:xfrm>
-            <a:off x="497310" y="689373"/>
+            <a:off x="489993" y="887480"/>
             <a:ext cx="1099660" cy="461665"/>
           </a:xfrm>
           <a:prstGeom prst="rect">
@@ -10027,7 +11596,7 @@
         </p:nvSpPr>
         <p:spPr>
           <a:xfrm>
-            <a:off x="497310" y="1278837"/>
+            <a:off x="489993" y="1361519"/>
             <a:ext cx="3685232" cy="3293209"/>
           </a:xfrm>
           <a:prstGeom prst="rect">
@@ -10303,7 +11872,7 @@
         </p:nvSpPr>
         <p:spPr>
           <a:xfrm>
-            <a:off x="4324750" y="701747"/>
+            <a:off x="4317433" y="899854"/>
             <a:ext cx="1679434" cy="461665"/>
           </a:xfrm>
           <a:prstGeom prst="rect">
@@ -10338,7 +11907,7 @@
         </p:nvSpPr>
         <p:spPr>
           <a:xfrm>
-            <a:off x="4416807" y="1283011"/>
+            <a:off x="4409490" y="1365693"/>
             <a:ext cx="3372291" cy="1692771"/>
           </a:xfrm>
           <a:prstGeom prst="rect">
@@ -10467,7 +12036,7 @@
         </p:nvSpPr>
         <p:spPr>
           <a:xfrm>
-            <a:off x="4470633" y="3725182"/>
+            <a:off x="4463316" y="3807864"/>
             <a:ext cx="3372291" cy="2185214"/>
           </a:xfrm>
           <a:prstGeom prst="rect">
@@ -10652,7 +12221,7 @@
         </p:nvSpPr>
         <p:spPr>
           <a:xfrm>
-            <a:off x="4393846" y="3165698"/>
+            <a:off x="4421633" y="3375902"/>
             <a:ext cx="1204882" cy="461665"/>
           </a:xfrm>
           <a:prstGeom prst="rect">
@@ -10687,7 +12256,7 @@
         </p:nvSpPr>
         <p:spPr>
           <a:xfrm>
-            <a:off x="497310" y="4721811"/>
+            <a:off x="489993" y="4804493"/>
             <a:ext cx="1592103" cy="461665"/>
           </a:xfrm>
           <a:prstGeom prst="rect">
@@ -10722,7 +12291,7 @@
         </p:nvSpPr>
         <p:spPr>
           <a:xfrm>
-            <a:off x="497310" y="5161728"/>
+            <a:off x="489993" y="5244410"/>
             <a:ext cx="3685232" cy="2554545"/>
           </a:xfrm>
           <a:prstGeom prst="rect">
@@ -10940,7 +12509,7 @@
         </p:nvSpPr>
         <p:spPr>
           <a:xfrm>
-            <a:off x="4477944" y="6312656"/>
+            <a:off x="4470627" y="6395338"/>
             <a:ext cx="3364980" cy="2062103"/>
           </a:xfrm>
           <a:prstGeom prst="rect">
@@ -11117,7 +12686,7 @@
         </p:nvSpPr>
         <p:spPr>
           <a:xfrm>
-            <a:off x="4428950" y="5867966"/>
+            <a:off x="4421633" y="5950648"/>
             <a:ext cx="1704634" cy="461665"/>
           </a:xfrm>
           <a:prstGeom prst="rect">
@@ -11152,7 +12721,7 @@
         </p:nvSpPr>
         <p:spPr>
           <a:xfrm>
-            <a:off x="473213" y="8318189"/>
+            <a:off x="465896" y="8400871"/>
             <a:ext cx="3685232" cy="1200329"/>
           </a:xfrm>
           <a:prstGeom prst="rect">
@@ -11271,7 +12840,7 @@
         </p:nvSpPr>
         <p:spPr>
           <a:xfrm>
-            <a:off x="424219" y="7846457"/>
+            <a:off x="416902" y="7929139"/>
             <a:ext cx="885388" cy="461665"/>
           </a:xfrm>
           <a:prstGeom prst="rect">
@@ -11307,7 +12876,7 @@
         <p:spPr>
           <a:xfrm>
             <a:off x="416902" y="122259"/>
-            <a:ext cx="2198743" cy="461665"/>
+            <a:ext cx="4211089" cy="830997"/>
           </a:xfrm>
           <a:prstGeom prst="rect">
             <a:avLst/>
@@ -11321,7 +12890,7 @@
           <a:lstStyle/>
           <a:p>
             <a:r>
-              <a:rPr lang="en-US" sz="2400" b="1" noProof="1">
+              <a:rPr lang="en-US" sz="4800" b="1" noProof="1">
                 <a:solidFill>
                   <a:schemeClr val="accent1"/>
                 </a:solidFill>
@@ -11335,6 +12904,264 @@
     <p:extLst>
       <p:ext uri="{BB962C8B-B14F-4D97-AF65-F5344CB8AC3E}">
         <p14:creationId xmlns:p14="http://schemas.microsoft.com/office/powerpoint/2010/main" val="748310116"/>
+      </p:ext>
+    </p:extLst>
+  </p:cSld>
+  <p:clrMapOvr>
+    <a:masterClrMapping/>
+  </p:clrMapOvr>
+</p:sld>
+</file>
+
+<file path=ppt/slides/slide8.xml><?xml version="1.0" encoding="utf-8"?>
+<p:sld xmlns:a="http://schemas.openxmlformats.org/drawingml/2006/main" xmlns:r="http://schemas.openxmlformats.org/officeDocument/2006/relationships" xmlns:p="http://schemas.openxmlformats.org/presentationml/2006/main">
+  <p:cSld>
+    <p:spTree>
+      <p:nvGrpSpPr>
+        <p:cNvPr id="1" name=""/>
+        <p:cNvGrpSpPr/>
+        <p:nvPr/>
+      </p:nvGrpSpPr>
+      <p:grpSpPr>
+        <a:xfrm>
+          <a:off x="0" y="0"/>
+          <a:ext cx="0" cy="0"/>
+          <a:chOff x="0" y="0"/>
+          <a:chExt cx="0" cy="0"/>
+        </a:xfrm>
+      </p:grpSpPr>
+      <p:sp>
+        <p:nvSpPr>
+          <p:cNvPr id="4" name="textruta 3">
+            <a:extLst>
+              <a:ext uri="{FF2B5EF4-FFF2-40B4-BE49-F238E27FC236}">
+                <a16:creationId xmlns:a16="http://schemas.microsoft.com/office/drawing/2014/main" id="{83E1DA8D-DE72-7249-821E-88B0B328518E}"/>
+              </a:ext>
+            </a:extLst>
+          </p:cNvPr>
+          <p:cNvSpPr txBox="1"/>
+          <p:nvPr/>
+        </p:nvSpPr>
+        <p:spPr>
+          <a:xfrm>
+            <a:off x="416902" y="122259"/>
+            <a:ext cx="1170705" cy="830997"/>
+          </a:xfrm>
+          <a:prstGeom prst="rect">
+            <a:avLst/>
+          </a:prstGeom>
+          <a:noFill/>
+        </p:spPr>
+        <p:txBody>
+          <a:bodyPr wrap="none" rtlCol="0">
+            <a:spAutoFit/>
+          </a:bodyPr>
+          <a:lstStyle/>
+          <a:p>
+            <a:r>
+              <a:rPr lang="en-US" sz="4800" b="1" noProof="1">
+                <a:solidFill>
+                  <a:schemeClr val="accent1"/>
+                </a:solidFill>
+              </a:rPr>
+              <a:t>Dev</a:t>
+            </a:r>
+          </a:p>
+        </p:txBody>
+      </p:sp>
+      <p:sp>
+        <p:nvSpPr>
+          <p:cNvPr id="5" name="textruta 4">
+            <a:extLst>
+              <a:ext uri="{FF2B5EF4-FFF2-40B4-BE49-F238E27FC236}">
+                <a16:creationId xmlns:a16="http://schemas.microsoft.com/office/drawing/2014/main" id="{39AA015C-8BF8-B04E-A7BD-D1FFFF1FCC82}"/>
+              </a:ext>
+            </a:extLst>
+          </p:cNvPr>
+          <p:cNvSpPr txBox="1"/>
+          <p:nvPr/>
+        </p:nvSpPr>
+        <p:spPr>
+          <a:xfrm>
+            <a:off x="401904" y="1545040"/>
+            <a:ext cx="3274288" cy="2308324"/>
+          </a:xfrm>
+          <a:prstGeom prst="rect">
+            <a:avLst/>
+          </a:prstGeom>
+          <a:noFill/>
+          <a:ln>
+            <a:solidFill>
+              <a:schemeClr val="accent1"/>
+            </a:solidFill>
+          </a:ln>
+        </p:spPr>
+        <p:txBody>
+          <a:bodyPr wrap="square" rtlCol="0">
+            <a:spAutoFit/>
+          </a:bodyPr>
+          <a:lstStyle/>
+          <a:p>
+            <a:r>
+              <a:rPr lang="en-US" sz="800" b="1" noProof="1"/>
+              <a:t>Debug flags can be set from settings.json:</a:t>
+            </a:r>
+            <a:br>
+              <a:rPr lang="en-US" sz="800" b="1" noProof="1"/>
+            </a:br>
+            <a:endParaRPr lang="en-US" sz="800" b="1" noProof="1"/>
+          </a:p>
+          <a:p>
+            <a:pPr marL="171450" indent="-171450">
+              <a:buFont typeface="Courier New" panose="02070309020205020404" pitchFamily="49" charset="0"/>
+              <a:buChar char="o"/>
+            </a:pPr>
+            <a:r>
+              <a:rPr lang="en-US" sz="800" noProof="1"/>
+              <a:t>graph.debug = true</a:t>
+            </a:r>
+          </a:p>
+          <a:p>
+            <a:pPr marL="171450" indent="-171450">
+              <a:buFont typeface="Courier New" panose="02070309020205020404" pitchFamily="49" charset="0"/>
+              <a:buChar char="o"/>
+            </a:pPr>
+            <a:endParaRPr lang="en-US" sz="800" noProof="1"/>
+          </a:p>
+          <a:p>
+            <a:r>
+              <a:rPr lang="en-US" sz="800" b="1" noProof="1"/>
+              <a:t>Chrome debug, press F12</a:t>
+            </a:r>
+          </a:p>
+          <a:p>
+            <a:endParaRPr lang="en-US" sz="800" b="1" noProof="1"/>
+          </a:p>
+          <a:p>
+            <a:r>
+              <a:rPr lang="en-US" sz="800" b="1" noProof="1"/>
+              <a:t>Break debug on condition</a:t>
+            </a:r>
+          </a:p>
+          <a:p>
+            <a:pPr marL="171450" indent="-171450">
+              <a:buFont typeface="Courier New" panose="02070309020205020404" pitchFamily="49" charset="0"/>
+              <a:buChar char="o"/>
+            </a:pPr>
+            <a:r>
+              <a:rPr lang="en-US" sz="800" noProof="1"/>
+              <a:t>conditional break point : </a:t>
+            </a:r>
+            <a:br>
+              <a:rPr lang="en-US" sz="800" noProof="1"/>
+            </a:br>
+            <a:r>
+              <a:rPr lang="en-US" sz="800" noProof="1"/>
+              <a:t>make break point</a:t>
+            </a:r>
+            <a:br>
+              <a:rPr lang="en-US" sz="800" noProof="1"/>
+            </a:br>
+            <a:r>
+              <a:rPr lang="en-US" sz="800" noProof="1"/>
+              <a:t>right-click and make condition</a:t>
+            </a:r>
+          </a:p>
+          <a:p>
+            <a:pPr marL="171450" indent="-171450">
+              <a:buFont typeface="Courier New" panose="02070309020205020404" pitchFamily="49" charset="0"/>
+              <a:buChar char="o"/>
+            </a:pPr>
+            <a:r>
+              <a:rPr lang="en-US" sz="800" noProof="1"/>
+              <a:t>graph:  “stop(commit) “</a:t>
+            </a:r>
+            <a:br>
+              <a:rPr lang="en-US" sz="800" noProof="1"/>
+            </a:br>
+            <a:r>
+              <a:rPr lang="en-US" sz="800" noProof="1"/>
+              <a:t>stops on marked commit in graph window</a:t>
+            </a:r>
+          </a:p>
+          <a:p>
+            <a:pPr marL="171450" indent="-171450">
+              <a:buFont typeface="Courier New" panose="02070309020205020404" pitchFamily="49" charset="0"/>
+              <a:buChar char="o"/>
+            </a:pPr>
+            <a:endParaRPr lang="en-US" sz="800" noProof="1"/>
+          </a:p>
+          <a:p>
+            <a:r>
+              <a:rPr lang="en-US" sz="800" noProof="1"/>
+              <a:t>Reload window</a:t>
+            </a:r>
+            <a:endParaRPr lang="en-US" sz="800" b="1" noProof="1"/>
+          </a:p>
+          <a:p>
+            <a:pPr marL="171450" indent="-171450">
+              <a:buFont typeface="Courier New" panose="02070309020205020404" pitchFamily="49" charset="0"/>
+              <a:buChar char="o"/>
+            </a:pPr>
+            <a:r>
+              <a:rPr lang="en-US" sz="800" noProof="1"/>
+              <a:t>typically from debug console: injectIntoJs(document)</a:t>
+            </a:r>
+            <a:br>
+              <a:rPr lang="en-US" sz="800" noProof="1"/>
+            </a:br>
+            <a:r>
+              <a:rPr lang="en-US" sz="800" noProof="1"/>
+              <a:t>(or similar command, use function starting on load)</a:t>
+            </a:r>
+          </a:p>
+          <a:p>
+            <a:br>
+              <a:rPr lang="en-US" sz="800" noProof="1"/>
+            </a:br>
+            <a:endParaRPr lang="en-US" sz="800" noProof="1"/>
+          </a:p>
+        </p:txBody>
+      </p:sp>
+      <p:sp>
+        <p:nvSpPr>
+          <p:cNvPr id="6" name="textruta 5">
+            <a:extLst>
+              <a:ext uri="{FF2B5EF4-FFF2-40B4-BE49-F238E27FC236}">
+                <a16:creationId xmlns:a16="http://schemas.microsoft.com/office/drawing/2014/main" id="{EB22BA33-1BE2-9C4E-857E-F8FF1526BB6F}"/>
+              </a:ext>
+            </a:extLst>
+          </p:cNvPr>
+          <p:cNvSpPr txBox="1"/>
+          <p:nvPr/>
+        </p:nvSpPr>
+        <p:spPr>
+          <a:xfrm>
+            <a:off x="318798" y="953256"/>
+            <a:ext cx="1098378" cy="461665"/>
+          </a:xfrm>
+          <a:prstGeom prst="rect">
+            <a:avLst/>
+          </a:prstGeom>
+          <a:noFill/>
+        </p:spPr>
+        <p:txBody>
+          <a:bodyPr wrap="none" rtlCol="0">
+            <a:spAutoFit/>
+          </a:bodyPr>
+          <a:lstStyle/>
+          <a:p>
+            <a:r>
+              <a:rPr lang="en-US" sz="2400" b="1" noProof="1"/>
+              <a:t>DEBUG</a:t>
+            </a:r>
+          </a:p>
+        </p:txBody>
+      </p:sp>
+    </p:spTree>
+    <p:extLst>
+      <p:ext uri="{BB962C8B-B14F-4D97-AF65-F5344CB8AC3E}">
+        <p14:creationId xmlns:p14="http://schemas.microsoft.com/office/powerpoint/2010/main" val="2209084743"/>
       </p:ext>
     </p:extLst>
   </p:cSld>

</xml_diff>

<commit_message>
Graph rebuild First pass (where branch info is defined)
- setting hidden and unknown branchName is rebuilt
- nicer display in graph info popup
</commit_message>
<xml_diff>
--- a/docs/Tech-overview.pptx
+++ b/docs/Tech-overview.pptx
@@ -262,7 +262,7 @@
           <a:p>
             <a:fld id="{CA855E1B-8830-B64E-B102-DB2BBD0D9567}" type="datetimeFigureOut">
               <a:rPr lang="sv-SE" smtClean="0"/>
-              <a:t>2021-09-11</a:t>
+              <a:t>2021-09-21</a:t>
             </a:fld>
             <a:endParaRPr lang="sv-SE"/>
           </a:p>
@@ -432,7 +432,7 @@
           <a:p>
             <a:fld id="{CA855E1B-8830-B64E-B102-DB2BBD0D9567}" type="datetimeFigureOut">
               <a:rPr lang="sv-SE" smtClean="0"/>
-              <a:t>2021-09-11</a:t>
+              <a:t>2021-09-21</a:t>
             </a:fld>
             <a:endParaRPr lang="sv-SE"/>
           </a:p>
@@ -612,7 +612,7 @@
           <a:p>
             <a:fld id="{CA855E1B-8830-B64E-B102-DB2BBD0D9567}" type="datetimeFigureOut">
               <a:rPr lang="sv-SE" smtClean="0"/>
-              <a:t>2021-09-11</a:t>
+              <a:t>2021-09-21</a:t>
             </a:fld>
             <a:endParaRPr lang="sv-SE"/>
           </a:p>
@@ -782,7 +782,7 @@
           <a:p>
             <a:fld id="{CA855E1B-8830-B64E-B102-DB2BBD0D9567}" type="datetimeFigureOut">
               <a:rPr lang="sv-SE" smtClean="0"/>
-              <a:t>2021-09-11</a:t>
+              <a:t>2021-09-21</a:t>
             </a:fld>
             <a:endParaRPr lang="sv-SE"/>
           </a:p>
@@ -1026,7 +1026,7 @@
           <a:p>
             <a:fld id="{CA855E1B-8830-B64E-B102-DB2BBD0D9567}" type="datetimeFigureOut">
               <a:rPr lang="sv-SE" smtClean="0"/>
-              <a:t>2021-09-11</a:t>
+              <a:t>2021-09-21</a:t>
             </a:fld>
             <a:endParaRPr lang="sv-SE"/>
           </a:p>
@@ -1258,7 +1258,7 @@
           <a:p>
             <a:fld id="{CA855E1B-8830-B64E-B102-DB2BBD0D9567}" type="datetimeFigureOut">
               <a:rPr lang="sv-SE" smtClean="0"/>
-              <a:t>2021-09-11</a:t>
+              <a:t>2021-09-21</a:t>
             </a:fld>
             <a:endParaRPr lang="sv-SE"/>
           </a:p>
@@ -1625,7 +1625,7 @@
           <a:p>
             <a:fld id="{CA855E1B-8830-B64E-B102-DB2BBD0D9567}" type="datetimeFigureOut">
               <a:rPr lang="sv-SE" smtClean="0"/>
-              <a:t>2021-09-11</a:t>
+              <a:t>2021-09-21</a:t>
             </a:fld>
             <a:endParaRPr lang="sv-SE"/>
           </a:p>
@@ -1743,7 +1743,7 @@
           <a:p>
             <a:fld id="{CA855E1B-8830-B64E-B102-DB2BBD0D9567}" type="datetimeFigureOut">
               <a:rPr lang="sv-SE" smtClean="0"/>
-              <a:t>2021-09-11</a:t>
+              <a:t>2021-09-21</a:t>
             </a:fld>
             <a:endParaRPr lang="sv-SE"/>
           </a:p>
@@ -1838,7 +1838,7 @@
           <a:p>
             <a:fld id="{CA855E1B-8830-B64E-B102-DB2BBD0D9567}" type="datetimeFigureOut">
               <a:rPr lang="sv-SE" smtClean="0"/>
-              <a:t>2021-09-11</a:t>
+              <a:t>2021-09-21</a:t>
             </a:fld>
             <a:endParaRPr lang="sv-SE"/>
           </a:p>
@@ -2115,7 +2115,7 @@
           <a:p>
             <a:fld id="{CA855E1B-8830-B64E-B102-DB2BBD0D9567}" type="datetimeFigureOut">
               <a:rPr lang="sv-SE" smtClean="0"/>
-              <a:t>2021-09-11</a:t>
+              <a:t>2021-09-21</a:t>
             </a:fld>
             <a:endParaRPr lang="sv-SE"/>
           </a:p>
@@ -2372,7 +2372,7 @@
           <a:p>
             <a:fld id="{CA855E1B-8830-B64E-B102-DB2BBD0D9567}" type="datetimeFigureOut">
               <a:rPr lang="sv-SE" smtClean="0"/>
-              <a:t>2021-09-11</a:t>
+              <a:t>2021-09-21</a:t>
             </a:fld>
             <a:endParaRPr lang="sv-SE"/>
           </a:p>
@@ -2585,7 +2585,7 @@
           <a:p>
             <a:fld id="{CA855E1B-8830-B64E-B102-DB2BBD0D9567}" type="datetimeFigureOut">
               <a:rPr lang="sv-SE" smtClean="0"/>
-              <a:t>2021-09-11</a:t>
+              <a:t>2021-09-21</a:t>
             </a:fld>
             <a:endParaRPr lang="sv-SE"/>
           </a:p>
@@ -8923,7 +8923,7 @@
         <p:spPr>
           <a:xfrm>
             <a:off x="4258770" y="1555930"/>
-            <a:ext cx="3685232" cy="3170099"/>
+            <a:ext cx="3685232" cy="3785652"/>
           </a:xfrm>
           <a:prstGeom prst="rect">
             <a:avLst/>
@@ -9039,6 +9039,40 @@
             </a:pPr>
             <a:r>
               <a:rPr lang="en-US" sz="800" noProof="1"/>
+              <a:t>create maps: </a:t>
+            </a:r>
+            <a:br>
+              <a:rPr lang="en-US" sz="800" noProof="1"/>
+            </a:br>
+            <a:r>
+              <a:rPr lang="en-US" sz="800" noProof="1"/>
+              <a:t>- mapBranchToNewestCommit  (map branchName -&gt; newest commit)</a:t>
+            </a:r>
+            <a:br>
+              <a:rPr lang="en-US" sz="800" noProof="1"/>
+            </a:br>
+            <a:r>
+              <a:rPr lang="en-US" sz="800" noProof="1"/>
+              <a:t>- mapTopCommitToBranchName (map newest commit -&gt; branchName)</a:t>
+            </a:r>
+          </a:p>
+          <a:p>
+            <a:pPr marL="179388" indent="-85725">
+              <a:buFont typeface="Arial" panose="020B0604020202020204" pitchFamily="34" charset="0"/>
+              <a:buChar char="•"/>
+            </a:pPr>
+            <a:r>
+              <a:rPr lang="en-US" sz="800" noProof="1"/>
+              <a:t>    var firstCommitInEachSwimlane = [];  // Index is the swimlane (commit.x)</a:t>
+            </a:r>
+          </a:p>
+          <a:p>
+            <a:pPr marL="179388" indent="-85725">
+              <a:buFont typeface="Arial" panose="020B0604020202020204" pitchFamily="34" charset="0"/>
+              <a:buChar char="•"/>
+            </a:pPr>
+            <a:r>
+              <a:rPr lang="en-US" sz="800" noProof="1"/>
               <a:t>NUMBER_OF_KNOWN_BRANCHES = found branchNames</a:t>
             </a:r>
             <a:br>
@@ -9080,7 +9114,14 @@
             </a:br>
             <a:r>
               <a:rPr lang="en-US" sz="800" noProof="1"/>
-              <a:t>- copy branch name and x position from first child</a:t>
+              <a:t>- copy commit branch name and x position from first child</a:t>
+            </a:r>
+            <a:br>
+              <a:rPr lang="en-US" sz="800" noProof="1"/>
+            </a:br>
+            <a:r>
+              <a:rPr lang="en-US" sz="800" noProof="1"/>
+              <a:t>- copy commit hidden branch and unknown branch status from first child</a:t>
             </a:r>
             <a:br>
               <a:rPr lang="en-US" sz="800" noProof="1"/>

</xml_diff>

<commit_message>
Updated docs for creating releases
</commit_message>
<xml_diff>
--- a/docs/Tech-overview.pptx
+++ b/docs/Tech-overview.pptx
@@ -262,7 +262,7 @@
           <a:p>
             <a:fld id="{CA855E1B-8830-B64E-B102-DB2BBD0D9567}" type="datetimeFigureOut">
               <a:rPr lang="sv-SE" smtClean="0"/>
-              <a:t>2021-09-23</a:t>
+              <a:t>2021-10-03</a:t>
             </a:fld>
             <a:endParaRPr lang="sv-SE"/>
           </a:p>
@@ -432,7 +432,7 @@
           <a:p>
             <a:fld id="{CA855E1B-8830-B64E-B102-DB2BBD0D9567}" type="datetimeFigureOut">
               <a:rPr lang="sv-SE" smtClean="0"/>
-              <a:t>2021-09-23</a:t>
+              <a:t>2021-10-03</a:t>
             </a:fld>
             <a:endParaRPr lang="sv-SE"/>
           </a:p>
@@ -612,7 +612,7 @@
           <a:p>
             <a:fld id="{CA855E1B-8830-B64E-B102-DB2BBD0D9567}" type="datetimeFigureOut">
               <a:rPr lang="sv-SE" smtClean="0"/>
-              <a:t>2021-09-23</a:t>
+              <a:t>2021-10-03</a:t>
             </a:fld>
             <a:endParaRPr lang="sv-SE"/>
           </a:p>
@@ -782,7 +782,7 @@
           <a:p>
             <a:fld id="{CA855E1B-8830-B64E-B102-DB2BBD0D9567}" type="datetimeFigureOut">
               <a:rPr lang="sv-SE" smtClean="0"/>
-              <a:t>2021-09-23</a:t>
+              <a:t>2021-10-03</a:t>
             </a:fld>
             <a:endParaRPr lang="sv-SE"/>
           </a:p>
@@ -1026,7 +1026,7 @@
           <a:p>
             <a:fld id="{CA855E1B-8830-B64E-B102-DB2BBD0D9567}" type="datetimeFigureOut">
               <a:rPr lang="sv-SE" smtClean="0"/>
-              <a:t>2021-09-23</a:t>
+              <a:t>2021-10-03</a:t>
             </a:fld>
             <a:endParaRPr lang="sv-SE"/>
           </a:p>
@@ -1258,7 +1258,7 @@
           <a:p>
             <a:fld id="{CA855E1B-8830-B64E-B102-DB2BBD0D9567}" type="datetimeFigureOut">
               <a:rPr lang="sv-SE" smtClean="0"/>
-              <a:t>2021-09-23</a:t>
+              <a:t>2021-10-03</a:t>
             </a:fld>
             <a:endParaRPr lang="sv-SE"/>
           </a:p>
@@ -1625,7 +1625,7 @@
           <a:p>
             <a:fld id="{CA855E1B-8830-B64E-B102-DB2BBD0D9567}" type="datetimeFigureOut">
               <a:rPr lang="sv-SE" smtClean="0"/>
-              <a:t>2021-09-23</a:t>
+              <a:t>2021-10-03</a:t>
             </a:fld>
             <a:endParaRPr lang="sv-SE"/>
           </a:p>
@@ -1743,7 +1743,7 @@
           <a:p>
             <a:fld id="{CA855E1B-8830-B64E-B102-DB2BBD0D9567}" type="datetimeFigureOut">
               <a:rPr lang="sv-SE" smtClean="0"/>
-              <a:t>2021-09-23</a:t>
+              <a:t>2021-10-03</a:t>
             </a:fld>
             <a:endParaRPr lang="sv-SE"/>
           </a:p>
@@ -1838,7 +1838,7 @@
           <a:p>
             <a:fld id="{CA855E1B-8830-B64E-B102-DB2BBD0D9567}" type="datetimeFigureOut">
               <a:rPr lang="sv-SE" smtClean="0"/>
-              <a:t>2021-09-23</a:t>
+              <a:t>2021-10-03</a:t>
             </a:fld>
             <a:endParaRPr lang="sv-SE"/>
           </a:p>
@@ -2115,7 +2115,7 @@
           <a:p>
             <a:fld id="{CA855E1B-8830-B64E-B102-DB2BBD0D9567}" type="datetimeFigureOut">
               <a:rPr lang="sv-SE" smtClean="0"/>
-              <a:t>2021-09-23</a:t>
+              <a:t>2021-10-03</a:t>
             </a:fld>
             <a:endParaRPr lang="sv-SE"/>
           </a:p>
@@ -2372,7 +2372,7 @@
           <a:p>
             <a:fld id="{CA855E1B-8830-B64E-B102-DB2BBD0D9567}" type="datetimeFigureOut">
               <a:rPr lang="sv-SE" smtClean="0"/>
-              <a:t>2021-09-23</a:t>
+              <a:t>2021-10-03</a:t>
             </a:fld>
             <a:endParaRPr lang="sv-SE"/>
           </a:p>
@@ -2585,7 +2585,7 @@
           <a:p>
             <a:fld id="{CA855E1B-8830-B64E-B102-DB2BBD0D9567}" type="datetimeFigureOut">
               <a:rPr lang="sv-SE" smtClean="0"/>
-              <a:t>2021-09-23</a:t>
+              <a:t>2021-10-03</a:t>
             </a:fld>
             <a:endParaRPr lang="sv-SE"/>
           </a:p>
@@ -3044,7 +3044,7 @@
         <p:spPr>
           <a:xfrm>
             <a:off x="429032" y="1033821"/>
-            <a:ext cx="5114372" cy="2923877"/>
+            <a:ext cx="5114372" cy="3046988"/>
           </a:xfrm>
           <a:prstGeom prst="rect">
             <a:avLst/>
@@ -3173,6 +3173,16 @@
             <a:r>
               <a:rPr lang="en-US" sz="800" noProof="1"/>
               <a:t>commit with name (X,Y,Z)</a:t>
+            </a:r>
+          </a:p>
+          <a:p>
+            <a:pPr marL="324000" lvl="1" indent="-171450">
+              <a:buFont typeface="Arial" panose="020B0604020202020204" pitchFamily="34" charset="0"/>
+              <a:buChar char="•"/>
+            </a:pPr>
+            <a:r>
+              <a:rPr lang="en-US" sz="800" noProof="1"/>
+              <a:t>create tag with same name</a:t>
             </a:r>
             <a:br>
               <a:rPr lang="en-US" sz="800" noProof="1"/>

</xml_diff>

<commit_message>
Tech doc - update release instructions
</commit_message>
<xml_diff>
--- a/docs/Tech-overview.pptx
+++ b/docs/Tech-overview.pptx
@@ -262,7 +262,7 @@
           <a:p>
             <a:fld id="{CA855E1B-8830-B64E-B102-DB2BBD0D9567}" type="datetimeFigureOut">
               <a:rPr lang="sv-SE" smtClean="0"/>
-              <a:t>2021-10-08</a:t>
+              <a:t>2022-01-14</a:t>
             </a:fld>
             <a:endParaRPr lang="sv-SE"/>
           </a:p>
@@ -432,7 +432,7 @@
           <a:p>
             <a:fld id="{CA855E1B-8830-B64E-B102-DB2BBD0D9567}" type="datetimeFigureOut">
               <a:rPr lang="sv-SE" smtClean="0"/>
-              <a:t>2021-10-08</a:t>
+              <a:t>2022-01-14</a:t>
             </a:fld>
             <a:endParaRPr lang="sv-SE"/>
           </a:p>
@@ -612,7 +612,7 @@
           <a:p>
             <a:fld id="{CA855E1B-8830-B64E-B102-DB2BBD0D9567}" type="datetimeFigureOut">
               <a:rPr lang="sv-SE" smtClean="0"/>
-              <a:t>2021-10-08</a:t>
+              <a:t>2022-01-14</a:t>
             </a:fld>
             <a:endParaRPr lang="sv-SE"/>
           </a:p>
@@ -782,7 +782,7 @@
           <a:p>
             <a:fld id="{CA855E1B-8830-B64E-B102-DB2BBD0D9567}" type="datetimeFigureOut">
               <a:rPr lang="sv-SE" smtClean="0"/>
-              <a:t>2021-10-08</a:t>
+              <a:t>2022-01-14</a:t>
             </a:fld>
             <a:endParaRPr lang="sv-SE"/>
           </a:p>
@@ -1026,7 +1026,7 @@
           <a:p>
             <a:fld id="{CA855E1B-8830-B64E-B102-DB2BBD0D9567}" type="datetimeFigureOut">
               <a:rPr lang="sv-SE" smtClean="0"/>
-              <a:t>2021-10-08</a:t>
+              <a:t>2022-01-14</a:t>
             </a:fld>
             <a:endParaRPr lang="sv-SE"/>
           </a:p>
@@ -1258,7 +1258,7 @@
           <a:p>
             <a:fld id="{CA855E1B-8830-B64E-B102-DB2BBD0D9567}" type="datetimeFigureOut">
               <a:rPr lang="sv-SE" smtClean="0"/>
-              <a:t>2021-10-08</a:t>
+              <a:t>2022-01-14</a:t>
             </a:fld>
             <a:endParaRPr lang="sv-SE"/>
           </a:p>
@@ -1625,7 +1625,7 @@
           <a:p>
             <a:fld id="{CA855E1B-8830-B64E-B102-DB2BBD0D9567}" type="datetimeFigureOut">
               <a:rPr lang="sv-SE" smtClean="0"/>
-              <a:t>2021-10-08</a:t>
+              <a:t>2022-01-14</a:t>
             </a:fld>
             <a:endParaRPr lang="sv-SE"/>
           </a:p>
@@ -1743,7 +1743,7 @@
           <a:p>
             <a:fld id="{CA855E1B-8830-B64E-B102-DB2BBD0D9567}" type="datetimeFigureOut">
               <a:rPr lang="sv-SE" smtClean="0"/>
-              <a:t>2021-10-08</a:t>
+              <a:t>2022-01-14</a:t>
             </a:fld>
             <a:endParaRPr lang="sv-SE"/>
           </a:p>
@@ -1838,7 +1838,7 @@
           <a:p>
             <a:fld id="{CA855E1B-8830-B64E-B102-DB2BBD0D9567}" type="datetimeFigureOut">
               <a:rPr lang="sv-SE" smtClean="0"/>
-              <a:t>2021-10-08</a:t>
+              <a:t>2022-01-14</a:t>
             </a:fld>
             <a:endParaRPr lang="sv-SE"/>
           </a:p>
@@ -2115,7 +2115,7 @@
           <a:p>
             <a:fld id="{CA855E1B-8830-B64E-B102-DB2BBD0D9567}" type="datetimeFigureOut">
               <a:rPr lang="sv-SE" smtClean="0"/>
-              <a:t>2021-10-08</a:t>
+              <a:t>2022-01-14</a:t>
             </a:fld>
             <a:endParaRPr lang="sv-SE"/>
           </a:p>
@@ -2372,7 +2372,7 @@
           <a:p>
             <a:fld id="{CA855E1B-8830-B64E-B102-DB2BBD0D9567}" type="datetimeFigureOut">
               <a:rPr lang="sv-SE" smtClean="0"/>
-              <a:t>2021-10-08</a:t>
+              <a:t>2022-01-14</a:t>
             </a:fld>
             <a:endParaRPr lang="sv-SE"/>
           </a:p>
@@ -2585,7 +2585,7 @@
           <a:p>
             <a:fld id="{CA855E1B-8830-B64E-B102-DB2BBD0D9567}" type="datetimeFigureOut">
               <a:rPr lang="sv-SE" smtClean="0"/>
-              <a:t>2021-10-08</a:t>
+              <a:t>2022-01-14</a:t>
             </a:fld>
             <a:endParaRPr lang="sv-SE"/>
           </a:p>
@@ -3044,7 +3044,7 @@
         <p:spPr>
           <a:xfrm>
             <a:off x="429032" y="1033821"/>
-            <a:ext cx="5114372" cy="3046988"/>
+            <a:ext cx="5114372" cy="3293209"/>
           </a:xfrm>
           <a:prstGeom prst="rect">
             <a:avLst/>
@@ -3172,8 +3172,12 @@
             </a:pPr>
             <a:r>
               <a:rPr lang="en-US" sz="800" noProof="1"/>
-              <a:t>commit with name (X,Y,Z)</a:t>
-            </a:r>
+              <a:t>run /Users/jan/Documents/Projects/Pragma-git/Pragma-git/make_binaries/build</a:t>
+            </a:r>
+          </a:p>
+          <a:p>
+            <a:pPr marL="152550" lvl="1"/>
+            <a:endParaRPr lang="en-US" sz="800" noProof="1"/>
           </a:p>
           <a:p>
             <a:pPr marL="324000" lvl="1" indent="-171450">
@@ -3182,7 +3186,17 @@
             </a:pPr>
             <a:r>
               <a:rPr lang="en-US" sz="800" noProof="1"/>
-              <a:t>create tag with name </a:t>
+              <a:t>commit with name X.Y.Z</a:t>
+            </a:r>
+          </a:p>
+          <a:p>
+            <a:pPr marL="324000" lvl="1" indent="-171450">
+              <a:buFont typeface="Arial" panose="020B0604020202020204" pitchFamily="34" charset="0"/>
+              <a:buChar char="•"/>
+            </a:pPr>
+            <a:r>
+              <a:rPr lang="en-US" sz="800" noProof="1"/>
+              <a:t>create tag with same name X.Y.Z</a:t>
             </a:r>
             <a:br>
               <a:rPr lang="en-US" sz="800" noProof="1"/>
@@ -3214,15 +3228,8 @@
             </a:pPr>
             <a:r>
               <a:rPr lang="en-US" sz="800" noProof="1"/>
-              <a:t>run /Users/jan/Documents/Projects/Pragma-git/Pragma-git/make_binaries/build</a:t>
-            </a:r>
-          </a:p>
-          <a:p>
-            <a:pPr marL="171450" indent="-171450">
-              <a:buFont typeface="Courier New" panose="02070309020205020404" pitchFamily="49" charset="0"/>
-              <a:buChar char="o"/>
-            </a:pPr>
-            <a:endParaRPr lang="en-US" sz="800" noProof="1"/>
+              <a:t>cd /Users/jan/Documents/Projects/Pragma-git/Pragma-git/make_binaries/release_to_github.command</a:t>
+            </a:r>
           </a:p>
           <a:p>
             <a:pPr marL="324000" lvl="1" indent="-171450">
@@ -3231,7 +3238,7 @@
             </a:pPr>
             <a:r>
               <a:rPr lang="en-US" sz="800" noProof="1"/>
-              <a:t>run /Users/jan/Documents/Projects/Pragma-git/Pragma-git/make_binaries/release_to_github.command</a:t>
+              <a:t>./release_to_github.command</a:t>
             </a:r>
             <a:br>
               <a:rPr lang="en-US" sz="800" noProof="1"/>

</xml_diff>

<commit_message>
Document pragmaLog, and auto-logging of Git commands
</commit_message>
<xml_diff>
--- a/docs/Tech-overview.pptx
+++ b/docs/Tech-overview.pptx
@@ -262,7 +262,7 @@
           <a:p>
             <a:fld id="{CA855E1B-8830-B64E-B102-DB2BBD0D9567}" type="datetimeFigureOut">
               <a:rPr lang="sv-SE" smtClean="0"/>
-              <a:t>2022-01-14</a:t>
+              <a:t>2022-02-03</a:t>
             </a:fld>
             <a:endParaRPr lang="sv-SE"/>
           </a:p>
@@ -432,7 +432,7 @@
           <a:p>
             <a:fld id="{CA855E1B-8830-B64E-B102-DB2BBD0D9567}" type="datetimeFigureOut">
               <a:rPr lang="sv-SE" smtClean="0"/>
-              <a:t>2022-01-14</a:t>
+              <a:t>2022-02-03</a:t>
             </a:fld>
             <a:endParaRPr lang="sv-SE"/>
           </a:p>
@@ -612,7 +612,7 @@
           <a:p>
             <a:fld id="{CA855E1B-8830-B64E-B102-DB2BBD0D9567}" type="datetimeFigureOut">
               <a:rPr lang="sv-SE" smtClean="0"/>
-              <a:t>2022-01-14</a:t>
+              <a:t>2022-02-03</a:t>
             </a:fld>
             <a:endParaRPr lang="sv-SE"/>
           </a:p>
@@ -782,7 +782,7 @@
           <a:p>
             <a:fld id="{CA855E1B-8830-B64E-B102-DB2BBD0D9567}" type="datetimeFigureOut">
               <a:rPr lang="sv-SE" smtClean="0"/>
-              <a:t>2022-01-14</a:t>
+              <a:t>2022-02-03</a:t>
             </a:fld>
             <a:endParaRPr lang="sv-SE"/>
           </a:p>
@@ -1026,7 +1026,7 @@
           <a:p>
             <a:fld id="{CA855E1B-8830-B64E-B102-DB2BBD0D9567}" type="datetimeFigureOut">
               <a:rPr lang="sv-SE" smtClean="0"/>
-              <a:t>2022-01-14</a:t>
+              <a:t>2022-02-03</a:t>
             </a:fld>
             <a:endParaRPr lang="sv-SE"/>
           </a:p>
@@ -1258,7 +1258,7 @@
           <a:p>
             <a:fld id="{CA855E1B-8830-B64E-B102-DB2BBD0D9567}" type="datetimeFigureOut">
               <a:rPr lang="sv-SE" smtClean="0"/>
-              <a:t>2022-01-14</a:t>
+              <a:t>2022-02-03</a:t>
             </a:fld>
             <a:endParaRPr lang="sv-SE"/>
           </a:p>
@@ -1625,7 +1625,7 @@
           <a:p>
             <a:fld id="{CA855E1B-8830-B64E-B102-DB2BBD0D9567}" type="datetimeFigureOut">
               <a:rPr lang="sv-SE" smtClean="0"/>
-              <a:t>2022-01-14</a:t>
+              <a:t>2022-02-03</a:t>
             </a:fld>
             <a:endParaRPr lang="sv-SE"/>
           </a:p>
@@ -1743,7 +1743,7 @@
           <a:p>
             <a:fld id="{CA855E1B-8830-B64E-B102-DB2BBD0D9567}" type="datetimeFigureOut">
               <a:rPr lang="sv-SE" smtClean="0"/>
-              <a:t>2022-01-14</a:t>
+              <a:t>2022-02-03</a:t>
             </a:fld>
             <a:endParaRPr lang="sv-SE"/>
           </a:p>
@@ -1838,7 +1838,7 @@
           <a:p>
             <a:fld id="{CA855E1B-8830-B64E-B102-DB2BBD0D9567}" type="datetimeFigureOut">
               <a:rPr lang="sv-SE" smtClean="0"/>
-              <a:t>2022-01-14</a:t>
+              <a:t>2022-02-03</a:t>
             </a:fld>
             <a:endParaRPr lang="sv-SE"/>
           </a:p>
@@ -2115,7 +2115,7 @@
           <a:p>
             <a:fld id="{CA855E1B-8830-B64E-B102-DB2BBD0D9567}" type="datetimeFigureOut">
               <a:rPr lang="sv-SE" smtClean="0"/>
-              <a:t>2022-01-14</a:t>
+              <a:t>2022-02-03</a:t>
             </a:fld>
             <a:endParaRPr lang="sv-SE"/>
           </a:p>
@@ -2372,7 +2372,7 @@
           <a:p>
             <a:fld id="{CA855E1B-8830-B64E-B102-DB2BBD0D9567}" type="datetimeFigureOut">
               <a:rPr lang="sv-SE" smtClean="0"/>
-              <a:t>2022-01-14</a:t>
+              <a:t>2022-02-03</a:t>
             </a:fld>
             <a:endParaRPr lang="sv-SE"/>
           </a:p>
@@ -2585,7 +2585,7 @@
           <a:p>
             <a:fld id="{CA855E1B-8830-B64E-B102-DB2BBD0D9567}" type="datetimeFigureOut">
               <a:rPr lang="sv-SE" smtClean="0"/>
-              <a:t>2022-01-14</a:t>
+              <a:t>2022-02-03</a:t>
             </a:fld>
             <a:endParaRPr lang="sv-SE"/>
           </a:p>
@@ -13583,6 +13583,205 @@
           </a:p>
         </p:txBody>
       </p:sp>
+      <p:sp>
+        <p:nvSpPr>
+          <p:cNvPr id="7" name="textruta 6">
+            <a:extLst>
+              <a:ext uri="{FF2B5EF4-FFF2-40B4-BE49-F238E27FC236}">
+                <a16:creationId xmlns:a16="http://schemas.microsoft.com/office/drawing/2014/main" id="{3904C800-EE25-4742-BFE5-CD6F10B48921}"/>
+              </a:ext>
+            </a:extLst>
+          </p:cNvPr>
+          <p:cNvSpPr txBox="1"/>
+          <p:nvPr/>
+        </p:nvSpPr>
+        <p:spPr>
+          <a:xfrm>
+            <a:off x="4192240" y="1545040"/>
+            <a:ext cx="3274288" cy="2554545"/>
+          </a:xfrm>
+          <a:prstGeom prst="rect">
+            <a:avLst/>
+          </a:prstGeom>
+          <a:noFill/>
+          <a:ln>
+            <a:solidFill>
+              <a:schemeClr val="accent1"/>
+            </a:solidFill>
+          </a:ln>
+        </p:spPr>
+        <p:txBody>
+          <a:bodyPr wrap="square" rtlCol="0">
+            <a:spAutoFit/>
+          </a:bodyPr>
+          <a:lstStyle/>
+          <a:p>
+            <a:r>
+              <a:rPr lang="en-US" sz="800" b="1" noProof="1"/>
+              <a:t>Logging to file  ‘.Pragma-git/.tmp/pragma-git-log.txt’</a:t>
+            </a:r>
+          </a:p>
+          <a:p>
+            <a:endParaRPr lang="en-US" sz="800" b="1" noProof="1"/>
+          </a:p>
+          <a:p>
+            <a:r>
+              <a:rPr lang="en-US" sz="800" b="1" noProof="1"/>
+              <a:t>Logging messages :</a:t>
+            </a:r>
+          </a:p>
+          <a:p>
+            <a:pPr marL="171450" indent="-171450">
+              <a:buFont typeface="Courier New" panose="02070309020205020404" pitchFamily="49" charset="0"/>
+              <a:buChar char="o"/>
+            </a:pPr>
+            <a:r>
+              <a:rPr lang="en-US" sz="800" noProof="1"/>
+              <a:t>‘pragmaLog(message)’ command writes directly to file</a:t>
+            </a:r>
+            <a:br>
+              <a:rPr lang="en-US" sz="800" b="1" noProof="1"/>
+            </a:br>
+            <a:r>
+              <a:rPr lang="en-US" sz="800" noProof="1"/>
+              <a:t>auto-removes credentials in URL</a:t>
+            </a:r>
+            <a:br>
+              <a:rPr lang="en-US" sz="800" noProof="1"/>
+            </a:br>
+            <a:r>
+              <a:rPr lang="en-US" sz="800" noProof="1"/>
+              <a:t>adds time stamp</a:t>
+            </a:r>
+            <a:br>
+              <a:rPr lang="en-US" sz="800" noProof="1"/>
+            </a:br>
+            <a:endParaRPr lang="en-US" sz="800" noProof="1"/>
+          </a:p>
+          <a:p>
+            <a:r>
+              <a:rPr lang="en-US" sz="800" b="1" noProof="1"/>
+              <a:t>Logging of Git commands and outputs</a:t>
+            </a:r>
+          </a:p>
+          <a:p>
+            <a:pPr marL="171450" indent="-171450">
+              <a:buFont typeface="Courier New" panose="02070309020205020404" pitchFamily="49" charset="0"/>
+              <a:buChar char="o"/>
+            </a:pPr>
+            <a:r>
+              <a:rPr lang="en-US" sz="800" noProof="1"/>
+              <a:t>‘sendGitOutputToFile’ catches stdout and stderr</a:t>
+            </a:r>
+            <a:br>
+              <a:rPr lang="en-US" sz="800" noProof="1"/>
+            </a:br>
+            <a:r>
+              <a:rPr lang="en-US" sz="800" noProof="1"/>
+              <a:t>writes out the git command</a:t>
+            </a:r>
+            <a:br>
+              <a:rPr lang="en-US" sz="800" noProof="1"/>
+            </a:br>
+            <a:r>
+              <a:rPr lang="en-US" sz="800" noProof="1"/>
+              <a:t>uses pragmaLog internally</a:t>
+            </a:r>
+          </a:p>
+          <a:p>
+            <a:endParaRPr lang="en-US" sz="800" b="1" noProof="1"/>
+          </a:p>
+          <a:p>
+            <a:r>
+              <a:rPr lang="en-US" sz="800" b="1" noProof="1"/>
+              <a:t>simpleGitLog(pwd) </a:t>
+            </a:r>
+          </a:p>
+          <a:p>
+            <a:pPr marL="171450" indent="-171450">
+              <a:buFont typeface="Courier New" panose="02070309020205020404" pitchFamily="49" charset="0"/>
+              <a:buChar char="o"/>
+            </a:pPr>
+            <a:r>
+              <a:rPr lang="en-US" sz="800" noProof="1"/>
+              <a:t>dropin replacement for simpleGit</a:t>
+            </a:r>
+            <a:br>
+              <a:rPr lang="en-US" sz="800" b="1" noProof="1"/>
+            </a:br>
+            <a:r>
+              <a:rPr lang="en-US" sz="800" noProof="1"/>
+              <a:t>takes one argument (I always populate it as the path to the git repo)</a:t>
+            </a:r>
+          </a:p>
+          <a:p>
+            <a:pPr marL="171450" indent="-171450">
+              <a:buFont typeface="Courier New" panose="02070309020205020404" pitchFamily="49" charset="0"/>
+              <a:buChar char="o"/>
+            </a:pPr>
+            <a:endParaRPr lang="en-US" sz="800" b="1" noProof="1"/>
+          </a:p>
+          <a:p>
+            <a:pPr marL="171450" indent="-171450">
+              <a:buFont typeface="Courier New" panose="02070309020205020404" pitchFamily="49" charset="0"/>
+              <a:buChar char="o"/>
+            </a:pPr>
+            <a:r>
+              <a:rPr lang="en-US" sz="800" noProof="1"/>
+              <a:t>All logging commands are defined in app.js. </a:t>
+            </a:r>
+          </a:p>
+          <a:p>
+            <a:pPr marL="171450" indent="-171450">
+              <a:buFont typeface="Courier New" panose="02070309020205020404" pitchFamily="49" charset="0"/>
+              <a:buChar char="o"/>
+            </a:pPr>
+            <a:r>
+              <a:rPr lang="en-US" sz="800" noProof="1"/>
+              <a:t>Can be called from children to app.js by using ‘opener.pragmaLog’ or  ‘opener. simpleGitLog’</a:t>
+            </a:r>
+            <a:br>
+              <a:rPr lang="en-US" sz="800" noProof="1"/>
+            </a:br>
+            <a:endParaRPr lang="en-US" sz="800" noProof="1"/>
+          </a:p>
+        </p:txBody>
+      </p:sp>
+      <p:sp>
+        <p:nvSpPr>
+          <p:cNvPr id="8" name="textruta 7">
+            <a:extLst>
+              <a:ext uri="{FF2B5EF4-FFF2-40B4-BE49-F238E27FC236}">
+                <a16:creationId xmlns:a16="http://schemas.microsoft.com/office/drawing/2014/main" id="{7CCC12FE-9487-E148-A422-EE7A0D65A7FC}"/>
+              </a:ext>
+            </a:extLst>
+          </p:cNvPr>
+          <p:cNvSpPr txBox="1"/>
+          <p:nvPr/>
+        </p:nvSpPr>
+        <p:spPr>
+          <a:xfrm>
+            <a:off x="4109134" y="953256"/>
+            <a:ext cx="1160254" cy="461665"/>
+          </a:xfrm>
+          <a:prstGeom prst="rect">
+            <a:avLst/>
+          </a:prstGeom>
+          <a:noFill/>
+        </p:spPr>
+        <p:txBody>
+          <a:bodyPr wrap="none" rtlCol="0">
+            <a:spAutoFit/>
+          </a:bodyPr>
+          <a:lstStyle/>
+          <a:p>
+            <a:r>
+              <a:rPr lang="en-US" sz="2400" b="1" noProof="1"/>
+              <a:t>Logging</a:t>
+            </a:r>
+          </a:p>
+        </p:txBody>
+      </p:sp>
     </p:spTree>
     <p:extLst>
       <p:ext uri="{BB962C8B-B14F-4D97-AF65-F5344CB8AC3E}">

</xml_diff>

<commit_message>
Pre-release in github => Default : inhibit pre-release update. Allow update manually
Allow by modifying settings.json :
  allowPrerelease = true
</commit_message>
<xml_diff>
--- a/docs/Tech-overview.pptx
+++ b/docs/Tech-overview.pptx
@@ -262,7 +262,7 @@
           <a:p>
             <a:fld id="{CA855E1B-8830-B64E-B102-DB2BBD0D9567}" type="datetimeFigureOut">
               <a:rPr lang="sv-SE" smtClean="0"/>
-              <a:t>2022-02-15</a:t>
+              <a:t>2022-03-23</a:t>
             </a:fld>
             <a:endParaRPr lang="sv-SE"/>
           </a:p>
@@ -432,7 +432,7 @@
           <a:p>
             <a:fld id="{CA855E1B-8830-B64E-B102-DB2BBD0D9567}" type="datetimeFigureOut">
               <a:rPr lang="sv-SE" smtClean="0"/>
-              <a:t>2022-02-15</a:t>
+              <a:t>2022-03-23</a:t>
             </a:fld>
             <a:endParaRPr lang="sv-SE"/>
           </a:p>
@@ -612,7 +612,7 @@
           <a:p>
             <a:fld id="{CA855E1B-8830-B64E-B102-DB2BBD0D9567}" type="datetimeFigureOut">
               <a:rPr lang="sv-SE" smtClean="0"/>
-              <a:t>2022-02-15</a:t>
+              <a:t>2022-03-23</a:t>
             </a:fld>
             <a:endParaRPr lang="sv-SE"/>
           </a:p>
@@ -782,7 +782,7 @@
           <a:p>
             <a:fld id="{CA855E1B-8830-B64E-B102-DB2BBD0D9567}" type="datetimeFigureOut">
               <a:rPr lang="sv-SE" smtClean="0"/>
-              <a:t>2022-02-15</a:t>
+              <a:t>2022-03-23</a:t>
             </a:fld>
             <a:endParaRPr lang="sv-SE"/>
           </a:p>
@@ -1026,7 +1026,7 @@
           <a:p>
             <a:fld id="{CA855E1B-8830-B64E-B102-DB2BBD0D9567}" type="datetimeFigureOut">
               <a:rPr lang="sv-SE" smtClean="0"/>
-              <a:t>2022-02-15</a:t>
+              <a:t>2022-03-23</a:t>
             </a:fld>
             <a:endParaRPr lang="sv-SE"/>
           </a:p>
@@ -1258,7 +1258,7 @@
           <a:p>
             <a:fld id="{CA855E1B-8830-B64E-B102-DB2BBD0D9567}" type="datetimeFigureOut">
               <a:rPr lang="sv-SE" smtClean="0"/>
-              <a:t>2022-02-15</a:t>
+              <a:t>2022-03-23</a:t>
             </a:fld>
             <a:endParaRPr lang="sv-SE"/>
           </a:p>
@@ -1625,7 +1625,7 @@
           <a:p>
             <a:fld id="{CA855E1B-8830-B64E-B102-DB2BBD0D9567}" type="datetimeFigureOut">
               <a:rPr lang="sv-SE" smtClean="0"/>
-              <a:t>2022-02-15</a:t>
+              <a:t>2022-03-23</a:t>
             </a:fld>
             <a:endParaRPr lang="sv-SE"/>
           </a:p>
@@ -1743,7 +1743,7 @@
           <a:p>
             <a:fld id="{CA855E1B-8830-B64E-B102-DB2BBD0D9567}" type="datetimeFigureOut">
               <a:rPr lang="sv-SE" smtClean="0"/>
-              <a:t>2022-02-15</a:t>
+              <a:t>2022-03-23</a:t>
             </a:fld>
             <a:endParaRPr lang="sv-SE"/>
           </a:p>
@@ -1838,7 +1838,7 @@
           <a:p>
             <a:fld id="{CA855E1B-8830-B64E-B102-DB2BBD0D9567}" type="datetimeFigureOut">
               <a:rPr lang="sv-SE" smtClean="0"/>
-              <a:t>2022-02-15</a:t>
+              <a:t>2022-03-23</a:t>
             </a:fld>
             <a:endParaRPr lang="sv-SE"/>
           </a:p>
@@ -2115,7 +2115,7 @@
           <a:p>
             <a:fld id="{CA855E1B-8830-B64E-B102-DB2BBD0D9567}" type="datetimeFigureOut">
               <a:rPr lang="sv-SE" smtClean="0"/>
-              <a:t>2022-02-15</a:t>
+              <a:t>2022-03-23</a:t>
             </a:fld>
             <a:endParaRPr lang="sv-SE"/>
           </a:p>
@@ -2372,7 +2372,7 @@
           <a:p>
             <a:fld id="{CA855E1B-8830-B64E-B102-DB2BBD0D9567}" type="datetimeFigureOut">
               <a:rPr lang="sv-SE" smtClean="0"/>
-              <a:t>2022-02-15</a:t>
+              <a:t>2022-03-23</a:t>
             </a:fld>
             <a:endParaRPr lang="sv-SE"/>
           </a:p>
@@ -2585,7 +2585,7 @@
           <a:p>
             <a:fld id="{CA855E1B-8830-B64E-B102-DB2BBD0D9567}" type="datetimeFigureOut">
               <a:rPr lang="sv-SE" smtClean="0"/>
-              <a:t>2022-02-15</a:t>
+              <a:t>2022-03-23</a:t>
             </a:fld>
             <a:endParaRPr lang="sv-SE"/>
           </a:p>
@@ -3044,7 +3044,7 @@
         <p:spPr>
           <a:xfrm>
             <a:off x="429032" y="1033821"/>
-            <a:ext cx="5114372" cy="3416320"/>
+            <a:ext cx="5114372" cy="3539430"/>
           </a:xfrm>
           <a:prstGeom prst="rect">
             <a:avLst/>
@@ -3097,7 +3097,7 @@
             </a:pPr>
             <a:r>
               <a:rPr lang="en-US" sz="800" noProof="1"/>
-              <a:t>develop into master</a:t>
+              <a:t>develop into main</a:t>
             </a:r>
             <a:br>
               <a:rPr lang="en-US" sz="800" noProof="1">
@@ -3243,6 +3243,20 @@
             <a:r>
               <a:rPr lang="en-US" sz="800" noProof="1"/>
               <a:t>./release_to_github.command</a:t>
+            </a:r>
+            <a:br>
+              <a:rPr lang="en-US" sz="800" noProof="1"/>
+            </a:br>
+            <a:endParaRPr lang="en-US" sz="800" noProof="1"/>
+          </a:p>
+          <a:p>
+            <a:pPr marL="324000" lvl="1" indent="-171450">
+              <a:buFont typeface="Arial" panose="020B0604020202020204" pitchFamily="34" charset="0"/>
+              <a:buChar char="•"/>
+            </a:pPr>
+            <a:r>
+              <a:rPr lang="en-US" sz="800" noProof="1"/>
+              <a:t>I can mark this as prerelease =&gt; will only be updated if settings.json allowPrerelease = true</a:t>
             </a:r>
             <a:br>
               <a:rPr lang="en-US" sz="800" noProof="1"/>
@@ -13786,6 +13800,251 @@
           </a:p>
         </p:txBody>
       </p:sp>
+      <p:sp>
+        <p:nvSpPr>
+          <p:cNvPr id="11" name="textruta 10">
+            <a:extLst>
+              <a:ext uri="{FF2B5EF4-FFF2-40B4-BE49-F238E27FC236}">
+                <a16:creationId xmlns:a16="http://schemas.microsoft.com/office/drawing/2014/main" id="{9B6E5385-1392-2740-82C6-EEFAE9D008B9}"/>
+              </a:ext>
+            </a:extLst>
+          </p:cNvPr>
+          <p:cNvSpPr txBox="1"/>
+          <p:nvPr/>
+        </p:nvSpPr>
+        <p:spPr>
+          <a:xfrm>
+            <a:off x="422126" y="7212463"/>
+            <a:ext cx="3274288" cy="1200329"/>
+          </a:xfrm>
+          <a:prstGeom prst="rect">
+            <a:avLst/>
+          </a:prstGeom>
+          <a:noFill/>
+          <a:ln>
+            <a:solidFill>
+              <a:schemeClr val="accent1"/>
+            </a:solidFill>
+          </a:ln>
+        </p:spPr>
+        <p:txBody>
+          <a:bodyPr wrap="square" rtlCol="0">
+            <a:spAutoFit/>
+          </a:bodyPr>
+          <a:lstStyle/>
+          <a:p>
+            <a:r>
+              <a:rPr lang="en-US" sz="800" b="1" noProof="1"/>
+              <a:t>Windows debug to console</a:t>
+            </a:r>
+            <a:br>
+              <a:rPr lang="en-US" sz="800" b="1" noProof="1"/>
+            </a:br>
+            <a:endParaRPr lang="en-US" sz="800" b="1" noProof="1"/>
+          </a:p>
+          <a:p>
+            <a:pPr marL="171450" indent="-171450">
+              <a:buFont typeface="Courier New" panose="02070309020205020404" pitchFamily="49" charset="0"/>
+              <a:buChar char="o"/>
+            </a:pPr>
+            <a:r>
+              <a:rPr lang="en-US" sz="800" noProof="1">
+                <a:hlinkClick r:id="rId2"/>
+              </a:rPr>
+              <a:t>https://github.com/nwutils/nwdc</a:t>
+            </a:r>
+            <a:endParaRPr lang="en-US" sz="800" noProof="1"/>
+          </a:p>
+          <a:p>
+            <a:pPr marL="171450" indent="-171450">
+              <a:buFont typeface="Courier New" panose="02070309020205020404" pitchFamily="49" charset="0"/>
+              <a:buChar char="o"/>
+            </a:pPr>
+            <a:endParaRPr lang="en-US" sz="800" noProof="1"/>
+          </a:p>
+          <a:p>
+            <a:pPr marL="171450" indent="-171450">
+              <a:buFont typeface="Courier New" panose="02070309020205020404" pitchFamily="49" charset="0"/>
+              <a:buChar char="o"/>
+            </a:pPr>
+            <a:r>
+              <a:rPr lang="en-US" sz="800" noProof="1"/>
+              <a:t>Use flag when running nw.exe :   --remote-debugging-port=9222</a:t>
+            </a:r>
+            <a:br>
+              <a:rPr lang="en-US" sz="800" noProof="1"/>
+            </a:br>
+            <a:r>
+              <a:rPr lang="en-US" sz="800" noProof="1"/>
+              <a:t>can then open with Chrome browser localhost:9222</a:t>
+            </a:r>
+          </a:p>
+          <a:p>
+            <a:endParaRPr lang="en-US" sz="800" noProof="1"/>
+          </a:p>
+          <a:p>
+            <a:br>
+              <a:rPr lang="en-US" sz="800" noProof="1"/>
+            </a:br>
+            <a:endParaRPr lang="en-US" sz="800" noProof="1"/>
+          </a:p>
+        </p:txBody>
+      </p:sp>
+      <p:sp>
+        <p:nvSpPr>
+          <p:cNvPr id="12" name="textruta 11">
+            <a:extLst>
+              <a:ext uri="{FF2B5EF4-FFF2-40B4-BE49-F238E27FC236}">
+                <a16:creationId xmlns:a16="http://schemas.microsoft.com/office/drawing/2014/main" id="{0768BF3C-2934-9848-8D68-0FE5F5153E26}"/>
+              </a:ext>
+            </a:extLst>
+          </p:cNvPr>
+          <p:cNvSpPr txBox="1"/>
+          <p:nvPr/>
+        </p:nvSpPr>
+        <p:spPr>
+          <a:xfrm>
+            <a:off x="401904" y="6566132"/>
+            <a:ext cx="2658805" cy="461665"/>
+          </a:xfrm>
+          <a:prstGeom prst="rect">
+            <a:avLst/>
+          </a:prstGeom>
+          <a:noFill/>
+        </p:spPr>
+        <p:txBody>
+          <a:bodyPr wrap="none" rtlCol="0">
+            <a:spAutoFit/>
+          </a:bodyPr>
+          <a:lstStyle/>
+          <a:p>
+            <a:r>
+              <a:rPr lang="en-US" sz="2400" b="1" noProof="1"/>
+              <a:t>Windows 10 Debug</a:t>
+            </a:r>
+          </a:p>
+        </p:txBody>
+      </p:sp>
+      <p:sp>
+        <p:nvSpPr>
+          <p:cNvPr id="13" name="textruta 12">
+            <a:extLst>
+              <a:ext uri="{FF2B5EF4-FFF2-40B4-BE49-F238E27FC236}">
+                <a16:creationId xmlns:a16="http://schemas.microsoft.com/office/drawing/2014/main" id="{2B268A20-6D98-4442-89B2-9093279232D8}"/>
+              </a:ext>
+            </a:extLst>
+          </p:cNvPr>
+          <p:cNvSpPr txBox="1"/>
+          <p:nvPr/>
+        </p:nvSpPr>
+        <p:spPr>
+          <a:xfrm>
+            <a:off x="4376199" y="7157916"/>
+            <a:ext cx="3274288" cy="954107"/>
+          </a:xfrm>
+          <a:prstGeom prst="rect">
+            <a:avLst/>
+          </a:prstGeom>
+          <a:noFill/>
+          <a:ln>
+            <a:solidFill>
+              <a:schemeClr val="accent1"/>
+            </a:solidFill>
+          </a:ln>
+        </p:spPr>
+        <p:txBody>
+          <a:bodyPr wrap="square" rtlCol="0">
+            <a:spAutoFit/>
+          </a:bodyPr>
+          <a:lstStyle/>
+          <a:p>
+            <a:r>
+              <a:rPr lang="en-US" sz="800" b="1" noProof="1"/>
+              <a:t>Allow download of pre-releases</a:t>
+            </a:r>
+          </a:p>
+          <a:p>
+            <a:pPr marL="171450" indent="-171450">
+              <a:buFont typeface="Courier New" panose="02070309020205020404" pitchFamily="49" charset="0"/>
+              <a:buChar char="o"/>
+            </a:pPr>
+            <a:r>
+              <a:rPr lang="en-US" sz="800" noProof="1"/>
+              <a:t>If release is marked as prerelease in github </a:t>
+            </a:r>
+            <a:br>
+              <a:rPr lang="en-US" sz="800" noProof="1"/>
+            </a:br>
+            <a:r>
+              <a:rPr lang="en-US" sz="800" noProof="1"/>
+              <a:t>=&gt; </a:t>
+            </a:r>
+          </a:p>
+          <a:p>
+            <a:pPr marL="171450" indent="-171450">
+              <a:buFont typeface="Courier New" panose="02070309020205020404" pitchFamily="49" charset="0"/>
+              <a:buChar char="o"/>
+            </a:pPr>
+            <a:r>
+              <a:rPr lang="en-US" sz="800" noProof="1"/>
+              <a:t>will only be updated if :</a:t>
+            </a:r>
+            <a:br>
+              <a:rPr lang="en-US" sz="800" noProof="1"/>
+            </a:br>
+            <a:r>
+              <a:rPr lang="en-US" sz="800" noProof="1"/>
+              <a:t>settings.json </a:t>
+            </a:r>
+            <a:br>
+              <a:rPr lang="en-US" sz="800" noProof="1"/>
+            </a:br>
+            <a:r>
+              <a:rPr lang="en-US" sz="800" noProof="1"/>
+              <a:t>	allowPrerelease = true</a:t>
+            </a:r>
+            <a:br>
+              <a:rPr lang="en-US" sz="800" noProof="1"/>
+            </a:br>
+            <a:endParaRPr lang="en-US" sz="800" noProof="1"/>
+          </a:p>
+        </p:txBody>
+      </p:sp>
+      <p:sp>
+        <p:nvSpPr>
+          <p:cNvPr id="14" name="textruta 13">
+            <a:extLst>
+              <a:ext uri="{FF2B5EF4-FFF2-40B4-BE49-F238E27FC236}">
+                <a16:creationId xmlns:a16="http://schemas.microsoft.com/office/drawing/2014/main" id="{F2A811B7-0B91-3340-BDFF-F8E112007E01}"/>
+              </a:ext>
+            </a:extLst>
+          </p:cNvPr>
+          <p:cNvSpPr txBox="1"/>
+          <p:nvPr/>
+        </p:nvSpPr>
+        <p:spPr>
+          <a:xfrm>
+            <a:off x="4293093" y="6566132"/>
+            <a:ext cx="1626856" cy="461665"/>
+          </a:xfrm>
+          <a:prstGeom prst="rect">
+            <a:avLst/>
+          </a:prstGeom>
+          <a:noFill/>
+        </p:spPr>
+        <p:txBody>
+          <a:bodyPr wrap="none" rtlCol="0">
+            <a:spAutoFit/>
+          </a:bodyPr>
+          <a:lstStyle/>
+          <a:p>
+            <a:r>
+              <a:rPr lang="en-US" sz="2400" b="1" noProof="1"/>
+              <a:t>Pre-release</a:t>
+            </a:r>
+          </a:p>
+        </p:txBody>
+      </p:sp>
     </p:spTree>
     <p:extLst>
       <p:ext uri="{BB962C8B-B14F-4D97-AF65-F5344CB8AC3E}">

</xml_diff>

<commit_message>
Update release_to_github, and instructions
</commit_message>
<xml_diff>
--- a/docs/Tech-overview.pptx
+++ b/docs/Tech-overview.pptx
@@ -262,7 +262,7 @@
           <a:p>
             <a:fld id="{CA855E1B-8830-B64E-B102-DB2BBD0D9567}" type="datetimeFigureOut">
               <a:rPr lang="sv-SE" smtClean="0"/>
-              <a:t>2022-03-23</a:t>
+              <a:t>2022-04-25</a:t>
             </a:fld>
             <a:endParaRPr lang="sv-SE"/>
           </a:p>
@@ -432,7 +432,7 @@
           <a:p>
             <a:fld id="{CA855E1B-8830-B64E-B102-DB2BBD0D9567}" type="datetimeFigureOut">
               <a:rPr lang="sv-SE" smtClean="0"/>
-              <a:t>2022-03-23</a:t>
+              <a:t>2022-04-25</a:t>
             </a:fld>
             <a:endParaRPr lang="sv-SE"/>
           </a:p>
@@ -612,7 +612,7 @@
           <a:p>
             <a:fld id="{CA855E1B-8830-B64E-B102-DB2BBD0D9567}" type="datetimeFigureOut">
               <a:rPr lang="sv-SE" smtClean="0"/>
-              <a:t>2022-03-23</a:t>
+              <a:t>2022-04-25</a:t>
             </a:fld>
             <a:endParaRPr lang="sv-SE"/>
           </a:p>
@@ -782,7 +782,7 @@
           <a:p>
             <a:fld id="{CA855E1B-8830-B64E-B102-DB2BBD0D9567}" type="datetimeFigureOut">
               <a:rPr lang="sv-SE" smtClean="0"/>
-              <a:t>2022-03-23</a:t>
+              <a:t>2022-04-25</a:t>
             </a:fld>
             <a:endParaRPr lang="sv-SE"/>
           </a:p>
@@ -1026,7 +1026,7 @@
           <a:p>
             <a:fld id="{CA855E1B-8830-B64E-B102-DB2BBD0D9567}" type="datetimeFigureOut">
               <a:rPr lang="sv-SE" smtClean="0"/>
-              <a:t>2022-03-23</a:t>
+              <a:t>2022-04-25</a:t>
             </a:fld>
             <a:endParaRPr lang="sv-SE"/>
           </a:p>
@@ -1258,7 +1258,7 @@
           <a:p>
             <a:fld id="{CA855E1B-8830-B64E-B102-DB2BBD0D9567}" type="datetimeFigureOut">
               <a:rPr lang="sv-SE" smtClean="0"/>
-              <a:t>2022-03-23</a:t>
+              <a:t>2022-04-25</a:t>
             </a:fld>
             <a:endParaRPr lang="sv-SE"/>
           </a:p>
@@ -1625,7 +1625,7 @@
           <a:p>
             <a:fld id="{CA855E1B-8830-B64E-B102-DB2BBD0D9567}" type="datetimeFigureOut">
               <a:rPr lang="sv-SE" smtClean="0"/>
-              <a:t>2022-03-23</a:t>
+              <a:t>2022-04-25</a:t>
             </a:fld>
             <a:endParaRPr lang="sv-SE"/>
           </a:p>
@@ -1743,7 +1743,7 @@
           <a:p>
             <a:fld id="{CA855E1B-8830-B64E-B102-DB2BBD0D9567}" type="datetimeFigureOut">
               <a:rPr lang="sv-SE" smtClean="0"/>
-              <a:t>2022-03-23</a:t>
+              <a:t>2022-04-25</a:t>
             </a:fld>
             <a:endParaRPr lang="sv-SE"/>
           </a:p>
@@ -1838,7 +1838,7 @@
           <a:p>
             <a:fld id="{CA855E1B-8830-B64E-B102-DB2BBD0D9567}" type="datetimeFigureOut">
               <a:rPr lang="sv-SE" smtClean="0"/>
-              <a:t>2022-03-23</a:t>
+              <a:t>2022-04-25</a:t>
             </a:fld>
             <a:endParaRPr lang="sv-SE"/>
           </a:p>
@@ -2115,7 +2115,7 @@
           <a:p>
             <a:fld id="{CA855E1B-8830-B64E-B102-DB2BBD0D9567}" type="datetimeFigureOut">
               <a:rPr lang="sv-SE" smtClean="0"/>
-              <a:t>2022-03-23</a:t>
+              <a:t>2022-04-25</a:t>
             </a:fld>
             <a:endParaRPr lang="sv-SE"/>
           </a:p>
@@ -2372,7 +2372,7 @@
           <a:p>
             <a:fld id="{CA855E1B-8830-B64E-B102-DB2BBD0D9567}" type="datetimeFigureOut">
               <a:rPr lang="sv-SE" smtClean="0"/>
-              <a:t>2022-03-23</a:t>
+              <a:t>2022-04-25</a:t>
             </a:fld>
             <a:endParaRPr lang="sv-SE"/>
           </a:p>
@@ -2585,7 +2585,7 @@
           <a:p>
             <a:fld id="{CA855E1B-8830-B64E-B102-DB2BBD0D9567}" type="datetimeFigureOut">
               <a:rPr lang="sv-SE" smtClean="0"/>
-              <a:t>2022-03-23</a:t>
+              <a:t>2022-04-25</a:t>
             </a:fld>
             <a:endParaRPr lang="sv-SE"/>
           </a:p>
@@ -3151,14 +3151,14 @@
             </a:pPr>
             <a:r>
               <a:rPr lang="en-US" sz="800" noProof="1"/>
-              <a:t>Modify 2) – 3) in this file :</a:t>
+              <a:t>Modify  3) in this file :</a:t>
             </a:r>
             <a:br>
               <a:rPr lang="en-US" sz="800" noProof="1"/>
             </a:br>
             <a:r>
               <a:rPr lang="en-US" sz="800" noProof="1"/>
-              <a:t>/Users/jan/Documents/Projects/Pragma-git/Pragma-git/make_binaries/release_to_github.command </a:t>
+              <a:t>/Users/jan/Documents/Projects/Pragma-git/Pragma-git/make_binaries/release_to_github</a:t>
             </a:r>
             <a:br>
               <a:rPr lang="en-US" sz="800" noProof="1"/>
@@ -3242,22 +3242,11 @@
             </a:br>
             <a:r>
               <a:rPr lang="en-US" sz="800" noProof="1"/>
-              <a:t>./release_to_github.command</a:t>
+              <a:t>./release_to_github</a:t>
             </a:r>
             <a:br>
               <a:rPr lang="en-US" sz="800" noProof="1"/>
             </a:br>
-            <a:endParaRPr lang="en-US" sz="800" noProof="1"/>
-          </a:p>
-          <a:p>
-            <a:pPr marL="324000" lvl="1" indent="-171450">
-              <a:buFont typeface="Arial" panose="020B0604020202020204" pitchFamily="34" charset="0"/>
-              <a:buChar char="•"/>
-            </a:pPr>
-            <a:r>
-              <a:rPr lang="en-US" sz="800" noProof="1"/>
-              <a:t>I can mark this as prerelease =&gt; will only be updated if settings.json allowPrerelease = true</a:t>
-            </a:r>
             <a:br>
               <a:rPr lang="en-US" sz="800" noProof="1"/>
             </a:br>
@@ -3290,11 +3279,21 @@
               <a:rPr lang="en-US" sz="800" noProof="1">
                 <a:hlinkClick r:id="rId2"/>
               </a:rPr>
-              <a:t>https://github.com/JanAxelsson/Pragma-git/releases</a:t>
+              <a:t>https://github.com/Pragma-git/Pragma-git/releases</a:t>
             </a:r>
             <a:r>
               <a:rPr lang="en-US" sz="800" noProof="1"/>
               <a:t> , verify and Save</a:t>
+            </a:r>
+          </a:p>
+          <a:p>
+            <a:pPr marL="324000" lvl="1" indent="-171450">
+              <a:buFont typeface="Arial" panose="020B0604020202020204" pitchFamily="34" charset="0"/>
+              <a:buChar char="•"/>
+            </a:pPr>
+            <a:r>
+              <a:rPr lang="en-US" sz="800" noProof="1"/>
+              <a:t>I can mark this as prerelease =&gt; will only be updated if settings.json allowPrerelease = true</a:t>
             </a:r>
           </a:p>
           <a:p>

</xml_diff>

<commit_message>
Pragma-merge : New file => show simpler one-pane merge-window (like an editor)
</commit_message>
<xml_diff>
--- a/docs/Tech-overview.pptx
+++ b/docs/Tech-overview.pptx
@@ -262,7 +262,7 @@
           <a:p>
             <a:fld id="{CA855E1B-8830-B64E-B102-DB2BBD0D9567}" type="datetimeFigureOut">
               <a:rPr lang="sv-SE" smtClean="0"/>
-              <a:t>2022-04-25</a:t>
+              <a:t>2022-06-05</a:t>
             </a:fld>
             <a:endParaRPr lang="sv-SE"/>
           </a:p>
@@ -432,7 +432,7 @@
           <a:p>
             <a:fld id="{CA855E1B-8830-B64E-B102-DB2BBD0D9567}" type="datetimeFigureOut">
               <a:rPr lang="sv-SE" smtClean="0"/>
-              <a:t>2022-04-25</a:t>
+              <a:t>2022-06-05</a:t>
             </a:fld>
             <a:endParaRPr lang="sv-SE"/>
           </a:p>
@@ -612,7 +612,7 @@
           <a:p>
             <a:fld id="{CA855E1B-8830-B64E-B102-DB2BBD0D9567}" type="datetimeFigureOut">
               <a:rPr lang="sv-SE" smtClean="0"/>
-              <a:t>2022-04-25</a:t>
+              <a:t>2022-06-05</a:t>
             </a:fld>
             <a:endParaRPr lang="sv-SE"/>
           </a:p>
@@ -782,7 +782,7 @@
           <a:p>
             <a:fld id="{CA855E1B-8830-B64E-B102-DB2BBD0D9567}" type="datetimeFigureOut">
               <a:rPr lang="sv-SE" smtClean="0"/>
-              <a:t>2022-04-25</a:t>
+              <a:t>2022-06-05</a:t>
             </a:fld>
             <a:endParaRPr lang="sv-SE"/>
           </a:p>
@@ -1026,7 +1026,7 @@
           <a:p>
             <a:fld id="{CA855E1B-8830-B64E-B102-DB2BBD0D9567}" type="datetimeFigureOut">
               <a:rPr lang="sv-SE" smtClean="0"/>
-              <a:t>2022-04-25</a:t>
+              <a:t>2022-06-05</a:t>
             </a:fld>
             <a:endParaRPr lang="sv-SE"/>
           </a:p>
@@ -1258,7 +1258,7 @@
           <a:p>
             <a:fld id="{CA855E1B-8830-B64E-B102-DB2BBD0D9567}" type="datetimeFigureOut">
               <a:rPr lang="sv-SE" smtClean="0"/>
-              <a:t>2022-04-25</a:t>
+              <a:t>2022-06-05</a:t>
             </a:fld>
             <a:endParaRPr lang="sv-SE"/>
           </a:p>
@@ -1625,7 +1625,7 @@
           <a:p>
             <a:fld id="{CA855E1B-8830-B64E-B102-DB2BBD0D9567}" type="datetimeFigureOut">
               <a:rPr lang="sv-SE" smtClean="0"/>
-              <a:t>2022-04-25</a:t>
+              <a:t>2022-06-05</a:t>
             </a:fld>
             <a:endParaRPr lang="sv-SE"/>
           </a:p>
@@ -1743,7 +1743,7 @@
           <a:p>
             <a:fld id="{CA855E1B-8830-B64E-B102-DB2BBD0D9567}" type="datetimeFigureOut">
               <a:rPr lang="sv-SE" smtClean="0"/>
-              <a:t>2022-04-25</a:t>
+              <a:t>2022-06-05</a:t>
             </a:fld>
             <a:endParaRPr lang="sv-SE"/>
           </a:p>
@@ -1838,7 +1838,7 @@
           <a:p>
             <a:fld id="{CA855E1B-8830-B64E-B102-DB2BBD0D9567}" type="datetimeFigureOut">
               <a:rPr lang="sv-SE" smtClean="0"/>
-              <a:t>2022-04-25</a:t>
+              <a:t>2022-06-05</a:t>
             </a:fld>
             <a:endParaRPr lang="sv-SE"/>
           </a:p>
@@ -2115,7 +2115,7 @@
           <a:p>
             <a:fld id="{CA855E1B-8830-B64E-B102-DB2BBD0D9567}" type="datetimeFigureOut">
               <a:rPr lang="sv-SE" smtClean="0"/>
-              <a:t>2022-04-25</a:t>
+              <a:t>2022-06-05</a:t>
             </a:fld>
             <a:endParaRPr lang="sv-SE"/>
           </a:p>
@@ -2372,7 +2372,7 @@
           <a:p>
             <a:fld id="{CA855E1B-8830-B64E-B102-DB2BBD0D9567}" type="datetimeFigureOut">
               <a:rPr lang="sv-SE" smtClean="0"/>
-              <a:t>2022-04-25</a:t>
+              <a:t>2022-06-05</a:t>
             </a:fld>
             <a:endParaRPr lang="sv-SE"/>
           </a:p>
@@ -2585,7 +2585,7 @@
           <a:p>
             <a:fld id="{CA855E1B-8830-B64E-B102-DB2BBD0D9567}" type="datetimeFigureOut">
               <a:rPr lang="sv-SE" smtClean="0"/>
-              <a:t>2022-04-25</a:t>
+              <a:t>2022-06-05</a:t>
             </a:fld>
             <a:endParaRPr lang="sv-SE"/>
           </a:p>
@@ -11110,7 +11110,7 @@
         <p:spPr>
           <a:xfrm>
             <a:off x="416902" y="1472403"/>
-            <a:ext cx="5396401" cy="4647426"/>
+            <a:ext cx="5396401" cy="5755422"/>
           </a:xfrm>
           <a:prstGeom prst="rect">
             <a:avLst/>
@@ -11302,7 +11302,7 @@
             </a:pPr>
             <a:r>
               <a:rPr lang="en-US" sz="800" noProof="1"/>
-              <a:t>first, second, third, fourth</a:t>
+              <a:t>first, second, third, fourth (*)</a:t>
             </a:r>
           </a:p>
           <a:p>
@@ -11333,6 +11333,91 @@
             <a:r>
               <a:rPr lang="en-US" sz="800" noProof="1"/>
               <a:t>pragma-merge-running # Flag to start pragma-merge.js. Polled by script ‘pragma-merge’ to know when finished</a:t>
+            </a:r>
+            <a:br>
+              <a:rPr lang="en-US" sz="800" noProof="1"/>
+            </a:br>
+            <a:endParaRPr lang="en-US" sz="800" noProof="1"/>
+          </a:p>
+          <a:p>
+            <a:pPr marL="171450" indent="-171450">
+              <a:buFont typeface="Courier New" panose="02070309020205020404" pitchFamily="49" charset="0"/>
+              <a:buChar char="o"/>
+            </a:pPr>
+            <a:r>
+              <a:rPr lang="en-US" sz="800" noProof="1">
+                <a:solidFill>
+                  <a:schemeClr val="accent1"/>
+                </a:solidFill>
+              </a:rPr>
+              <a:t>Special case is editor-mode, when a new file (so there is nothing to “diff”).  Then instead </a:t>
+            </a:r>
+            <a:r>
+              <a:rPr lang="en-US" sz="800" u="sng" noProof="1">
+                <a:solidFill>
+                  <a:schemeClr val="accent1"/>
+                </a:solidFill>
+              </a:rPr>
+              <a:t>git is not </a:t>
+            </a:r>
+            <a:r>
+              <a:rPr lang="en-US" sz="800" noProof="1">
+                <a:solidFill>
+                  <a:schemeClr val="accent1"/>
+                </a:solidFill>
+              </a:rPr>
+              <a:t>used but directly calling same bash script : </a:t>
+            </a:r>
+            <a:r>
+              <a:rPr lang="en-US" sz="800" noProof="1"/>
+              <a:t>pragma-merge filename –edit  WIRTEMODE , populating parameters :</a:t>
+            </a:r>
+          </a:p>
+          <a:p>
+            <a:pPr marL="324000" lvl="1" indent="-171450">
+              <a:buFont typeface="Arial" panose="020B0604020202020204" pitchFamily="34" charset="0"/>
+              <a:buChar char="•"/>
+            </a:pPr>
+            <a:r>
+              <a:rPr lang="en-US" sz="800" noProof="1"/>
+              <a:t>first = filename (for historical commits, a temporary file is shown, taken out from git)</a:t>
+            </a:r>
+          </a:p>
+          <a:p>
+            <a:pPr marL="324000" lvl="1" indent="-171450">
+              <a:buFont typeface="Arial" panose="020B0604020202020204" pitchFamily="34" charset="0"/>
+              <a:buChar char="•"/>
+            </a:pPr>
+            <a:r>
+              <a:rPr lang="en-US" sz="800" noProof="1"/>
+              <a:t>second = ‘—edit’</a:t>
+            </a:r>
+          </a:p>
+          <a:p>
+            <a:pPr marL="324000" lvl="1" indent="-171450">
+              <a:buFont typeface="Arial" panose="020B0604020202020204" pitchFamily="34" charset="0"/>
+              <a:buChar char="•"/>
+            </a:pPr>
+            <a:r>
+              <a:rPr lang="en-US" sz="800" noProof="1"/>
+              <a:t>third = WIRTEMODE  ‘--rw’ or  ‘ --ro’  or ‘—show- (rw for new uncommited, show for historical, ro unused so far)</a:t>
+            </a:r>
+          </a:p>
+          <a:p>
+            <a:pPr marL="324000" lvl="1" indent="-171450">
+              <a:buFont typeface="Arial" panose="020B0604020202020204" pitchFamily="34" charset="0"/>
+              <a:buChar char="•"/>
+            </a:pPr>
+            <a:r>
+              <a:rPr lang="en-US" sz="800" noProof="1"/>
+              <a:t>fourth = empty</a:t>
+            </a:r>
+          </a:p>
+          <a:p>
+            <a:pPr marL="152550" lvl="1"/>
+            <a:r>
+              <a:rPr lang="en-US" sz="800" noProof="1"/>
+              <a:t>pragma-merge is then modifying its functionality and layout by hiding diff panes, and checkboxes that are not used for editor</a:t>
             </a:r>
           </a:p>
           <a:p>
@@ -11483,7 +11568,7 @@
         </p:nvSpPr>
         <p:spPr>
           <a:xfrm>
-            <a:off x="416901" y="6193153"/>
+            <a:off x="416901" y="7263108"/>
             <a:ext cx="5396401" cy="584775"/>
           </a:xfrm>
           <a:prstGeom prst="rect">

</xml_diff>

<commit_message>
Fix error in documentation
</commit_message>
<xml_diff>
--- a/docs/Tech-overview.pptx
+++ b/docs/Tech-overview.pptx
@@ -262,7 +262,7 @@
           <a:p>
             <a:fld id="{CA855E1B-8830-B64E-B102-DB2BBD0D9567}" type="datetimeFigureOut">
               <a:rPr lang="sv-SE" smtClean="0"/>
-              <a:t>2022-06-05</a:t>
+              <a:t>2023-02-06</a:t>
             </a:fld>
             <a:endParaRPr lang="sv-SE"/>
           </a:p>
@@ -432,7 +432,7 @@
           <a:p>
             <a:fld id="{CA855E1B-8830-B64E-B102-DB2BBD0D9567}" type="datetimeFigureOut">
               <a:rPr lang="sv-SE" smtClean="0"/>
-              <a:t>2022-06-05</a:t>
+              <a:t>2023-02-06</a:t>
             </a:fld>
             <a:endParaRPr lang="sv-SE"/>
           </a:p>
@@ -612,7 +612,7 @@
           <a:p>
             <a:fld id="{CA855E1B-8830-B64E-B102-DB2BBD0D9567}" type="datetimeFigureOut">
               <a:rPr lang="sv-SE" smtClean="0"/>
-              <a:t>2022-06-05</a:t>
+              <a:t>2023-02-06</a:t>
             </a:fld>
             <a:endParaRPr lang="sv-SE"/>
           </a:p>
@@ -782,7 +782,7 @@
           <a:p>
             <a:fld id="{CA855E1B-8830-B64E-B102-DB2BBD0D9567}" type="datetimeFigureOut">
               <a:rPr lang="sv-SE" smtClean="0"/>
-              <a:t>2022-06-05</a:t>
+              <a:t>2023-02-06</a:t>
             </a:fld>
             <a:endParaRPr lang="sv-SE"/>
           </a:p>
@@ -1026,7 +1026,7 @@
           <a:p>
             <a:fld id="{CA855E1B-8830-B64E-B102-DB2BBD0D9567}" type="datetimeFigureOut">
               <a:rPr lang="sv-SE" smtClean="0"/>
-              <a:t>2022-06-05</a:t>
+              <a:t>2023-02-06</a:t>
             </a:fld>
             <a:endParaRPr lang="sv-SE"/>
           </a:p>
@@ -1258,7 +1258,7 @@
           <a:p>
             <a:fld id="{CA855E1B-8830-B64E-B102-DB2BBD0D9567}" type="datetimeFigureOut">
               <a:rPr lang="sv-SE" smtClean="0"/>
-              <a:t>2022-06-05</a:t>
+              <a:t>2023-02-06</a:t>
             </a:fld>
             <a:endParaRPr lang="sv-SE"/>
           </a:p>
@@ -1625,7 +1625,7 @@
           <a:p>
             <a:fld id="{CA855E1B-8830-B64E-B102-DB2BBD0D9567}" type="datetimeFigureOut">
               <a:rPr lang="sv-SE" smtClean="0"/>
-              <a:t>2022-06-05</a:t>
+              <a:t>2023-02-06</a:t>
             </a:fld>
             <a:endParaRPr lang="sv-SE"/>
           </a:p>
@@ -1743,7 +1743,7 @@
           <a:p>
             <a:fld id="{CA855E1B-8830-B64E-B102-DB2BBD0D9567}" type="datetimeFigureOut">
               <a:rPr lang="sv-SE" smtClean="0"/>
-              <a:t>2022-06-05</a:t>
+              <a:t>2023-02-06</a:t>
             </a:fld>
             <a:endParaRPr lang="sv-SE"/>
           </a:p>
@@ -1838,7 +1838,7 @@
           <a:p>
             <a:fld id="{CA855E1B-8830-B64E-B102-DB2BBD0D9567}" type="datetimeFigureOut">
               <a:rPr lang="sv-SE" smtClean="0"/>
-              <a:t>2022-06-05</a:t>
+              <a:t>2023-02-06</a:t>
             </a:fld>
             <a:endParaRPr lang="sv-SE"/>
           </a:p>
@@ -2115,7 +2115,7 @@
           <a:p>
             <a:fld id="{CA855E1B-8830-B64E-B102-DB2BBD0D9567}" type="datetimeFigureOut">
               <a:rPr lang="sv-SE" smtClean="0"/>
-              <a:t>2022-06-05</a:t>
+              <a:t>2023-02-06</a:t>
             </a:fld>
             <a:endParaRPr lang="sv-SE"/>
           </a:p>
@@ -2372,7 +2372,7 @@
           <a:p>
             <a:fld id="{CA855E1B-8830-B64E-B102-DB2BBD0D9567}" type="datetimeFigureOut">
               <a:rPr lang="sv-SE" smtClean="0"/>
-              <a:t>2022-06-05</a:t>
+              <a:t>2023-02-06</a:t>
             </a:fld>
             <a:endParaRPr lang="sv-SE"/>
           </a:p>
@@ -2585,7 +2585,7 @@
           <a:p>
             <a:fld id="{CA855E1B-8830-B64E-B102-DB2BBD0D9567}" type="datetimeFigureOut">
               <a:rPr lang="sv-SE" smtClean="0"/>
-              <a:t>2022-06-05</a:t>
+              <a:t>2023-02-06</a:t>
             </a:fld>
             <a:endParaRPr lang="sv-SE"/>
           </a:p>
@@ -11909,7 +11909,7 @@
                   <a:schemeClr val="accent1"/>
                 </a:solidFill>
               </a:rPr>
-              <a:t>Pragma-git listens to creation of file ‘pragma-merge-running’</a:t>
+              <a:t>Pragma-git listens to creation of file ‘pragma-askpass-running’</a:t>
             </a:r>
             <a:endParaRPr lang="en-US" sz="800" noProof="1"/>
           </a:p>

</xml_diff>

<commit_message>
Allow debug for git in main
state.debug = true / false, in settings.json
</commit_message>
<xml_diff>
--- a/docs/Tech-overview.pptx
+++ b/docs/Tech-overview.pptx
@@ -262,7 +262,7 @@
           <a:p>
             <a:fld id="{CA855E1B-8830-B64E-B102-DB2BBD0D9567}" type="datetimeFigureOut">
               <a:rPr lang="sv-SE" smtClean="0"/>
-              <a:t>2023-02-06</a:t>
+              <a:t>2023-02-22</a:t>
             </a:fld>
             <a:endParaRPr lang="sv-SE"/>
           </a:p>
@@ -432,7 +432,7 @@
           <a:p>
             <a:fld id="{CA855E1B-8830-B64E-B102-DB2BBD0D9567}" type="datetimeFigureOut">
               <a:rPr lang="sv-SE" smtClean="0"/>
-              <a:t>2023-02-06</a:t>
+              <a:t>2023-02-22</a:t>
             </a:fld>
             <a:endParaRPr lang="sv-SE"/>
           </a:p>
@@ -612,7 +612,7 @@
           <a:p>
             <a:fld id="{CA855E1B-8830-B64E-B102-DB2BBD0D9567}" type="datetimeFigureOut">
               <a:rPr lang="sv-SE" smtClean="0"/>
-              <a:t>2023-02-06</a:t>
+              <a:t>2023-02-22</a:t>
             </a:fld>
             <a:endParaRPr lang="sv-SE"/>
           </a:p>
@@ -782,7 +782,7 @@
           <a:p>
             <a:fld id="{CA855E1B-8830-B64E-B102-DB2BBD0D9567}" type="datetimeFigureOut">
               <a:rPr lang="sv-SE" smtClean="0"/>
-              <a:t>2023-02-06</a:t>
+              <a:t>2023-02-22</a:t>
             </a:fld>
             <a:endParaRPr lang="sv-SE"/>
           </a:p>
@@ -1026,7 +1026,7 @@
           <a:p>
             <a:fld id="{CA855E1B-8830-B64E-B102-DB2BBD0D9567}" type="datetimeFigureOut">
               <a:rPr lang="sv-SE" smtClean="0"/>
-              <a:t>2023-02-06</a:t>
+              <a:t>2023-02-22</a:t>
             </a:fld>
             <a:endParaRPr lang="sv-SE"/>
           </a:p>
@@ -1258,7 +1258,7 @@
           <a:p>
             <a:fld id="{CA855E1B-8830-B64E-B102-DB2BBD0D9567}" type="datetimeFigureOut">
               <a:rPr lang="sv-SE" smtClean="0"/>
-              <a:t>2023-02-06</a:t>
+              <a:t>2023-02-22</a:t>
             </a:fld>
             <a:endParaRPr lang="sv-SE"/>
           </a:p>
@@ -1625,7 +1625,7 @@
           <a:p>
             <a:fld id="{CA855E1B-8830-B64E-B102-DB2BBD0D9567}" type="datetimeFigureOut">
               <a:rPr lang="sv-SE" smtClean="0"/>
-              <a:t>2023-02-06</a:t>
+              <a:t>2023-02-22</a:t>
             </a:fld>
             <a:endParaRPr lang="sv-SE"/>
           </a:p>
@@ -1743,7 +1743,7 @@
           <a:p>
             <a:fld id="{CA855E1B-8830-B64E-B102-DB2BBD0D9567}" type="datetimeFigureOut">
               <a:rPr lang="sv-SE" smtClean="0"/>
-              <a:t>2023-02-06</a:t>
+              <a:t>2023-02-22</a:t>
             </a:fld>
             <a:endParaRPr lang="sv-SE"/>
           </a:p>
@@ -1838,7 +1838,7 @@
           <a:p>
             <a:fld id="{CA855E1B-8830-B64E-B102-DB2BBD0D9567}" type="datetimeFigureOut">
               <a:rPr lang="sv-SE" smtClean="0"/>
-              <a:t>2023-02-06</a:t>
+              <a:t>2023-02-22</a:t>
             </a:fld>
             <a:endParaRPr lang="sv-SE"/>
           </a:p>
@@ -2115,7 +2115,7 @@
           <a:p>
             <a:fld id="{CA855E1B-8830-B64E-B102-DB2BBD0D9567}" type="datetimeFigureOut">
               <a:rPr lang="sv-SE" smtClean="0"/>
-              <a:t>2023-02-06</a:t>
+              <a:t>2023-02-22</a:t>
             </a:fld>
             <a:endParaRPr lang="sv-SE"/>
           </a:p>
@@ -2372,7 +2372,7 @@
           <a:p>
             <a:fld id="{CA855E1B-8830-B64E-B102-DB2BBD0D9567}" type="datetimeFigureOut">
               <a:rPr lang="sv-SE" smtClean="0"/>
-              <a:t>2023-02-06</a:t>
+              <a:t>2023-02-22</a:t>
             </a:fld>
             <a:endParaRPr lang="sv-SE"/>
           </a:p>
@@ -2585,7 +2585,7 @@
           <a:p>
             <a:fld id="{CA855E1B-8830-B64E-B102-DB2BBD0D9567}" type="datetimeFigureOut">
               <a:rPr lang="sv-SE" smtClean="0"/>
-              <a:t>2023-02-06</a:t>
+              <a:t>2023-02-22</a:t>
             </a:fld>
             <a:endParaRPr lang="sv-SE"/>
           </a:p>
@@ -12564,7 +12564,7 @@
         <p:spPr>
           <a:xfrm>
             <a:off x="4463316" y="3807864"/>
-            <a:ext cx="3372291" cy="2185214"/>
+            <a:ext cx="3372291" cy="2431435"/>
           </a:xfrm>
           <a:prstGeom prst="rect">
             <a:avLst/>
@@ -12684,7 +12684,34 @@
             </a:pPr>
             <a:r>
               <a:rPr lang="en-US" sz="800" noProof="1"/>
-              <a:t>debug flag from state.graph.debug is read-only. Change directly in settings.json</a:t>
+              <a:t>debug flags :  </a:t>
+            </a:r>
+          </a:p>
+          <a:p>
+            <a:pPr marL="324000" lvl="1" indent="-171450">
+              <a:buFont typeface="Arial" panose="020B0604020202020204" pitchFamily="34" charset="0"/>
+              <a:buChar char="•"/>
+            </a:pPr>
+            <a:r>
+              <a:rPr lang="en-US" sz="800" noProof="1"/>
+              <a:t>state.debug (main, enable git debug flags)</a:t>
+            </a:r>
+          </a:p>
+          <a:p>
+            <a:pPr marL="324000" lvl="1" indent="-171450">
+              <a:buFont typeface="Arial" panose="020B0604020202020204" pitchFamily="34" charset="0"/>
+              <a:buChar char="•"/>
+            </a:pPr>
+            <a:r>
+              <a:rPr lang="en-US" sz="800" noProof="1"/>
+              <a:t>state.graph.debug</a:t>
+            </a:r>
+            <a:br>
+              <a:rPr lang="en-US" sz="800" noProof="1"/>
+            </a:br>
+            <a:r>
+              <a:rPr lang="en-US" sz="800" noProof="1"/>
+              <a:t>are both read-only. Change directly in settings.json</a:t>
             </a:r>
           </a:p>
           <a:p>
@@ -13036,7 +13063,7 @@
         </p:nvSpPr>
         <p:spPr>
           <a:xfrm>
-            <a:off x="4470627" y="6395338"/>
+            <a:off x="4470627" y="6898087"/>
             <a:ext cx="3364980" cy="2062103"/>
           </a:xfrm>
           <a:prstGeom prst="rect">
@@ -13213,7 +13240,7 @@
         </p:nvSpPr>
         <p:spPr>
           <a:xfrm>
-            <a:off x="4421633" y="5950648"/>
+            <a:off x="4421633" y="6453397"/>
             <a:ext cx="1704634" cy="461665"/>
           </a:xfrm>
           <a:prstGeom prst="rect">
@@ -13511,7 +13538,7 @@
         <p:spPr>
           <a:xfrm>
             <a:off x="401904" y="1545040"/>
-            <a:ext cx="3274288" cy="2308324"/>
+            <a:ext cx="3274288" cy="2431435"/>
           </a:xfrm>
           <a:prstGeom prst="rect">
             <a:avLst/>
@@ -13545,7 +13572,14 @@
             </a:pPr>
             <a:r>
               <a:rPr lang="en-US" sz="800" noProof="1"/>
-              <a:t>graph.debug = true</a:t>
+              <a:t>debug = true (git debug env variables in main)</a:t>
+            </a:r>
+            <a:br>
+              <a:rPr lang="en-US" sz="800" noProof="1"/>
+            </a:br>
+            <a:r>
+              <a:rPr lang="en-US" sz="800" noProof="1"/>
+              <a:t>graph.debug = true (graph layout debug info)</a:t>
             </a:r>
           </a:p>
           <a:p>

</xml_diff>

<commit_message>
Dev docs updated with dialog window info
</commit_message>
<xml_diff>
--- a/docs/Tech-overview.pptx
+++ b/docs/Tech-overview.pptx
@@ -262,7 +262,7 @@
           <a:p>
             <a:fld id="{CA855E1B-8830-B64E-B102-DB2BBD0D9567}" type="datetimeFigureOut">
               <a:rPr lang="sv-SE" smtClean="0"/>
-              <a:t>2023-02-22</a:t>
+              <a:t>2024-05-01</a:t>
             </a:fld>
             <a:endParaRPr lang="sv-SE"/>
           </a:p>
@@ -432,7 +432,7 @@
           <a:p>
             <a:fld id="{CA855E1B-8830-B64E-B102-DB2BBD0D9567}" type="datetimeFigureOut">
               <a:rPr lang="sv-SE" smtClean="0"/>
-              <a:t>2023-02-22</a:t>
+              <a:t>2024-05-01</a:t>
             </a:fld>
             <a:endParaRPr lang="sv-SE"/>
           </a:p>
@@ -612,7 +612,7 @@
           <a:p>
             <a:fld id="{CA855E1B-8830-B64E-B102-DB2BBD0D9567}" type="datetimeFigureOut">
               <a:rPr lang="sv-SE" smtClean="0"/>
-              <a:t>2023-02-22</a:t>
+              <a:t>2024-05-01</a:t>
             </a:fld>
             <a:endParaRPr lang="sv-SE"/>
           </a:p>
@@ -782,7 +782,7 @@
           <a:p>
             <a:fld id="{CA855E1B-8830-B64E-B102-DB2BBD0D9567}" type="datetimeFigureOut">
               <a:rPr lang="sv-SE" smtClean="0"/>
-              <a:t>2023-02-22</a:t>
+              <a:t>2024-05-01</a:t>
             </a:fld>
             <a:endParaRPr lang="sv-SE"/>
           </a:p>
@@ -1026,7 +1026,7 @@
           <a:p>
             <a:fld id="{CA855E1B-8830-B64E-B102-DB2BBD0D9567}" type="datetimeFigureOut">
               <a:rPr lang="sv-SE" smtClean="0"/>
-              <a:t>2023-02-22</a:t>
+              <a:t>2024-05-01</a:t>
             </a:fld>
             <a:endParaRPr lang="sv-SE"/>
           </a:p>
@@ -1258,7 +1258,7 @@
           <a:p>
             <a:fld id="{CA855E1B-8830-B64E-B102-DB2BBD0D9567}" type="datetimeFigureOut">
               <a:rPr lang="sv-SE" smtClean="0"/>
-              <a:t>2023-02-22</a:t>
+              <a:t>2024-05-01</a:t>
             </a:fld>
             <a:endParaRPr lang="sv-SE"/>
           </a:p>
@@ -1625,7 +1625,7 @@
           <a:p>
             <a:fld id="{CA855E1B-8830-B64E-B102-DB2BBD0D9567}" type="datetimeFigureOut">
               <a:rPr lang="sv-SE" smtClean="0"/>
-              <a:t>2023-02-22</a:t>
+              <a:t>2024-05-01</a:t>
             </a:fld>
             <a:endParaRPr lang="sv-SE"/>
           </a:p>
@@ -1743,7 +1743,7 @@
           <a:p>
             <a:fld id="{CA855E1B-8830-B64E-B102-DB2BBD0D9567}" type="datetimeFigureOut">
               <a:rPr lang="sv-SE" smtClean="0"/>
-              <a:t>2023-02-22</a:t>
+              <a:t>2024-05-01</a:t>
             </a:fld>
             <a:endParaRPr lang="sv-SE"/>
           </a:p>
@@ -1838,7 +1838,7 @@
           <a:p>
             <a:fld id="{CA855E1B-8830-B64E-B102-DB2BBD0D9567}" type="datetimeFigureOut">
               <a:rPr lang="sv-SE" smtClean="0"/>
-              <a:t>2023-02-22</a:t>
+              <a:t>2024-05-01</a:t>
             </a:fld>
             <a:endParaRPr lang="sv-SE"/>
           </a:p>
@@ -2115,7 +2115,7 @@
           <a:p>
             <a:fld id="{CA855E1B-8830-B64E-B102-DB2BBD0D9567}" type="datetimeFigureOut">
               <a:rPr lang="sv-SE" smtClean="0"/>
-              <a:t>2023-02-22</a:t>
+              <a:t>2024-05-01</a:t>
             </a:fld>
             <a:endParaRPr lang="sv-SE"/>
           </a:p>
@@ -2372,7 +2372,7 @@
           <a:p>
             <a:fld id="{CA855E1B-8830-B64E-B102-DB2BBD0D9567}" type="datetimeFigureOut">
               <a:rPr lang="sv-SE" smtClean="0"/>
-              <a:t>2023-02-22</a:t>
+              <a:t>2024-05-01</a:t>
             </a:fld>
             <a:endParaRPr lang="sv-SE"/>
           </a:p>
@@ -2585,7 +2585,7 @@
           <a:p>
             <a:fld id="{CA855E1B-8830-B64E-B102-DB2BBD0D9567}" type="datetimeFigureOut">
               <a:rPr lang="sv-SE" smtClean="0"/>
-              <a:t>2023-02-22</a:t>
+              <a:t>2024-05-01</a:t>
             </a:fld>
             <a:endParaRPr lang="sv-SE"/>
           </a:p>
@@ -7950,6 +7950,170 @@
           </a:p>
         </p:txBody>
       </p:sp>
+      <p:sp>
+        <p:nvSpPr>
+          <p:cNvPr id="2" name="textruta 1">
+            <a:extLst>
+              <a:ext uri="{FF2B5EF4-FFF2-40B4-BE49-F238E27FC236}">
+                <a16:creationId xmlns:a16="http://schemas.microsoft.com/office/drawing/2014/main" id="{B3D41706-AFF5-3FE1-7700-C30936245AAB}"/>
+              </a:ext>
+            </a:extLst>
+          </p:cNvPr>
+          <p:cNvSpPr txBox="1"/>
+          <p:nvPr/>
+        </p:nvSpPr>
+        <p:spPr>
+          <a:xfrm>
+            <a:off x="220263" y="4547929"/>
+            <a:ext cx="2126672" cy="461665"/>
+          </a:xfrm>
+          <a:prstGeom prst="rect">
+            <a:avLst/>
+          </a:prstGeom>
+          <a:noFill/>
+        </p:spPr>
+        <p:txBody>
+          <a:bodyPr wrap="none" rtlCol="0">
+            <a:spAutoFit/>
+          </a:bodyPr>
+          <a:lstStyle/>
+          <a:p>
+            <a:r>
+              <a:rPr lang="en-US" sz="2400" b="1" noProof="1"/>
+              <a:t>Git status_data</a:t>
+            </a:r>
+          </a:p>
+        </p:txBody>
+      </p:sp>
+      <p:sp>
+        <p:nvSpPr>
+          <p:cNvPr id="3" name="Rektangel 2">
+            <a:extLst>
+              <a:ext uri="{FF2B5EF4-FFF2-40B4-BE49-F238E27FC236}">
+                <a16:creationId xmlns:a16="http://schemas.microsoft.com/office/drawing/2014/main" id="{A6CAFC24-DC56-91B6-0869-19AA93CE56A5}"/>
+              </a:ext>
+            </a:extLst>
+          </p:cNvPr>
+          <p:cNvSpPr/>
+          <p:nvPr/>
+        </p:nvSpPr>
+        <p:spPr>
+          <a:xfrm>
+            <a:off x="312320" y="5013768"/>
+            <a:ext cx="3372291" cy="1692771"/>
+          </a:xfrm>
+          <a:prstGeom prst="rect">
+            <a:avLst/>
+          </a:prstGeom>
+          <a:solidFill>
+            <a:schemeClr val="bg1"/>
+          </a:solidFill>
+          <a:ln>
+            <a:solidFill>
+              <a:schemeClr val="accent1"/>
+            </a:solidFill>
+          </a:ln>
+        </p:spPr>
+        <p:txBody>
+          <a:bodyPr wrap="square">
+            <a:spAutoFit/>
+          </a:bodyPr>
+          <a:lstStyle/>
+          <a:p>
+            <a:r>
+              <a:rPr lang="en-US" sz="800" b="1" noProof="1"/>
+              <a:t>status_data from Simple-git</a:t>
+            </a:r>
+          </a:p>
+          <a:p>
+            <a:endParaRPr lang="en-US" sz="800" noProof="1">
+              <a:solidFill>
+                <a:schemeClr val="accent1"/>
+              </a:solidFill>
+            </a:endParaRPr>
+          </a:p>
+          <a:p>
+            <a:r>
+              <a:rPr lang="en-US" sz="800" noProof="1">
+                <a:solidFill>
+                  <a:schemeClr val="accent1"/>
+                </a:solidFill>
+              </a:rPr>
+              <a:t>Standard fields from  gitStatus</a:t>
+            </a:r>
+            <a:endParaRPr lang="en-US" sz="800" noProof="1"/>
+          </a:p>
+          <a:p>
+            <a:pPr marL="171450" indent="-171450">
+              <a:buFont typeface="Courier New" panose="02070309020205020404" pitchFamily="49" charset="0"/>
+              <a:buChar char="o"/>
+            </a:pPr>
+            <a:r>
+              <a:rPr lang="en-US" sz="800" noProof="1"/>
+              <a:t>showing change, add, delete, rename etc </a:t>
+            </a:r>
+          </a:p>
+          <a:p>
+            <a:endParaRPr lang="en-US" sz="800" noProof="1">
+              <a:solidFill>
+                <a:schemeClr val="accent1"/>
+              </a:solidFill>
+            </a:endParaRPr>
+          </a:p>
+          <a:p>
+            <a:r>
+              <a:rPr lang="en-US" sz="800" noProof="1">
+                <a:solidFill>
+                  <a:schemeClr val="accent1"/>
+                </a:solidFill>
+              </a:rPr>
+              <a:t>Some fields are emulated gitShowHistorical</a:t>
+            </a:r>
+            <a:endParaRPr lang="en-US" sz="800" noProof="1"/>
+          </a:p>
+          <a:p>
+            <a:pPr marL="171450" indent="-171450">
+              <a:buFont typeface="Courier New" panose="02070309020205020404" pitchFamily="49" charset="0"/>
+              <a:buChar char="o"/>
+            </a:pPr>
+            <a:r>
+              <a:rPr lang="en-US" sz="800" noProof="1"/>
+              <a:t>additionally, the order of the commmits may be reversed when pinnedCommit is compared to current commit. This is stored in status_data. :</a:t>
+            </a:r>
+          </a:p>
+          <a:p>
+            <a:pPr marL="324000" lvl="1" indent="-171450">
+              <a:buFont typeface="Arial" panose="020B0604020202020204" pitchFamily="34" charset="0"/>
+              <a:buChar char="•"/>
+            </a:pPr>
+            <a:r>
+              <a:rPr lang="en-US" sz="800" noProof="1"/>
+              <a:t>.reversedOrder  = false;   if commit1 is earlier than commit2</a:t>
+            </a:r>
+          </a:p>
+          <a:p>
+            <a:pPr marL="324000" lvl="1" indent="-171450">
+              <a:buFont typeface="Arial" panose="020B0604020202020204" pitchFamily="34" charset="0"/>
+              <a:buChar char="•"/>
+            </a:pPr>
+            <a:r>
+              <a:rPr lang="en-US" sz="800" noProof="1"/>
+              <a:t>.reversedOrder  = true;   if commit1 is later than commit2</a:t>
+            </a:r>
+          </a:p>
+          <a:p>
+            <a:pPr marL="152550" lvl="1"/>
+            <a:endParaRPr lang="en-US" sz="800" noProof="1"/>
+          </a:p>
+          <a:p>
+            <a:pPr marL="324000" lvl="1" indent="-171450">
+              <a:buFont typeface="Arial" panose="020B0604020202020204" pitchFamily="34" charset="0"/>
+              <a:buChar char="•"/>
+            </a:pPr>
+            <a:endParaRPr lang="en-US" sz="800" noProof="1"/>
+          </a:p>
+        </p:txBody>
+      </p:sp>
     </p:spTree>
     <p:extLst>
       <p:ext uri="{BB962C8B-B14F-4D97-AF65-F5344CB8AC3E}">
@@ -12387,45 +12551,10 @@
       </p:sp>
       <p:sp>
         <p:nvSpPr>
-          <p:cNvPr id="6" name="textruta 5">
+          <p:cNvPr id="14" name="Rektangel 13">
             <a:extLst>
               <a:ext uri="{FF2B5EF4-FFF2-40B4-BE49-F238E27FC236}">
-                <a16:creationId xmlns:a16="http://schemas.microsoft.com/office/drawing/2014/main" id="{CB0A7310-007B-034F-888B-3E729DF011D6}"/>
-              </a:ext>
-            </a:extLst>
-          </p:cNvPr>
-          <p:cNvSpPr txBox="1"/>
-          <p:nvPr/>
-        </p:nvSpPr>
-        <p:spPr>
-          <a:xfrm>
-            <a:off x="4317433" y="899854"/>
-            <a:ext cx="1679434" cy="461665"/>
-          </a:xfrm>
-          <a:prstGeom prst="rect">
-            <a:avLst/>
-          </a:prstGeom>
-          <a:noFill/>
-        </p:spPr>
-        <p:txBody>
-          <a:bodyPr wrap="none" rtlCol="0">
-            <a:spAutoFit/>
-          </a:bodyPr>
-          <a:lstStyle/>
-          <a:p>
-            <a:r>
-              <a:rPr lang="en-US" sz="2400" b="1" noProof="1"/>
-              <a:t>status_data</a:t>
-            </a:r>
-          </a:p>
-        </p:txBody>
-      </p:sp>
-      <p:sp>
-        <p:nvSpPr>
-          <p:cNvPr id="7" name="Rektangel 6">
-            <a:extLst>
-              <a:ext uri="{FF2B5EF4-FFF2-40B4-BE49-F238E27FC236}">
-                <a16:creationId xmlns:a16="http://schemas.microsoft.com/office/drawing/2014/main" id="{3244EB7A-6EC2-884B-A6CA-58A938EBF5D3}"/>
+                <a16:creationId xmlns:a16="http://schemas.microsoft.com/office/drawing/2014/main" id="{C15FF9A1-43E2-7348-9382-D2ADB3B355C8}"/>
               </a:ext>
             </a:extLst>
           </p:cNvPr>
@@ -12434,8 +12563,8 @@
         </p:nvSpPr>
         <p:spPr>
           <a:xfrm>
-            <a:off x="4409490" y="1365693"/>
-            <a:ext cx="3372291" cy="1692771"/>
+            <a:off x="4489123" y="3848849"/>
+            <a:ext cx="3372291" cy="2431435"/>
           </a:xfrm>
           <a:prstGeom prst="rect">
             <a:avLst/>
@@ -12457,7 +12586,7 @@
           <a:p>
             <a:r>
               <a:rPr lang="en-US" sz="800" b="1" noProof="1"/>
-              <a:t>status_data from Simple-git</a:t>
+              <a:t>Settings are loaded at Pragma-git start, and updated from Settings window</a:t>
             </a:r>
           </a:p>
           <a:p>
@@ -12474,7 +12603,7 @@
                   <a:schemeClr val="accent1"/>
                 </a:solidFill>
               </a:rPr>
-              <a:t>Standard fields from  gitStatus</a:t>
+              <a:t>Handling of settings in app.js</a:t>
             </a:r>
             <a:endParaRPr lang="en-US" sz="800" noProof="1"/>
           </a:p>
@@ -12485,7 +12614,104 @@
             </a:pPr>
             <a:r>
               <a:rPr lang="en-US" sz="800" noProof="1"/>
-              <a:t>showing change, add, delete, rename etc </a:t>
+              <a:t>loadSettings is called on Pragma-git start</a:t>
+            </a:r>
+          </a:p>
+          <a:p>
+            <a:pPr marL="324000" lvl="1" indent="-171450">
+              <a:buFont typeface="Arial" panose="020B0604020202020204" pitchFamily="34" charset="0"/>
+              <a:buChar char="•"/>
+            </a:pPr>
+            <a:r>
+              <a:rPr lang="en-US" sz="800" noProof="1"/>
+              <a:t>reads settings from settings.json</a:t>
+            </a:r>
+          </a:p>
+          <a:p>
+            <a:pPr marL="324000" lvl="1" indent="-171450">
+              <a:buFont typeface="Arial" panose="020B0604020202020204" pitchFamily="34" charset="0"/>
+              <a:buChar char="•"/>
+            </a:pPr>
+            <a:r>
+              <a:rPr lang="en-US" sz="800" noProof="1"/>
+              <a:t>stores settings in global.state in predefined order</a:t>
+            </a:r>
+          </a:p>
+          <a:p>
+            <a:pPr marL="171450" indent="-171450">
+              <a:buFont typeface="Courier New" panose="02070309020205020404" pitchFamily="49" charset="0"/>
+              <a:buChar char="o"/>
+            </a:pPr>
+            <a:r>
+              <a:rPr lang="en-US" sz="800" noProof="1"/>
+              <a:t>updateWithNewSettings is called :</a:t>
+            </a:r>
+          </a:p>
+          <a:p>
+            <a:pPr marL="324000" lvl="1" indent="-171450">
+              <a:buFont typeface="Arial" panose="020B0604020202020204" pitchFamily="34" charset="0"/>
+              <a:buChar char="•"/>
+            </a:pPr>
+            <a:r>
+              <a:rPr lang="en-US" sz="800" noProof="1"/>
+              <a:t>from loadSettings</a:t>
+            </a:r>
+          </a:p>
+          <a:p>
+            <a:pPr marL="324000" lvl="1" indent="-171450">
+              <a:buFont typeface="Arial" panose="020B0604020202020204" pitchFamily="34" charset="0"/>
+              <a:buChar char="•"/>
+            </a:pPr>
+            <a:r>
+              <a:rPr lang="en-US" sz="800" noProof="1"/>
+              <a:t>when leaving Settings window</a:t>
+            </a:r>
+          </a:p>
+          <a:p>
+            <a:pPr marL="171450" indent="-171450">
+              <a:buFont typeface="Courier New" panose="02070309020205020404" pitchFamily="49" charset="0"/>
+              <a:buChar char="o"/>
+            </a:pPr>
+            <a:r>
+              <a:rPr lang="en-US" sz="800" noProof="1"/>
+              <a:t>settings are saved when closing Pragma-git</a:t>
+            </a:r>
+          </a:p>
+          <a:p>
+            <a:pPr marL="171450" indent="-171450">
+              <a:buFont typeface="Courier New" panose="02070309020205020404" pitchFamily="49" charset="0"/>
+              <a:buChar char="o"/>
+            </a:pPr>
+            <a:r>
+              <a:rPr lang="en-US" sz="800" noProof="1"/>
+              <a:t>debug flags :  </a:t>
+            </a:r>
+          </a:p>
+          <a:p>
+            <a:pPr marL="324000" lvl="1" indent="-171450">
+              <a:buFont typeface="Arial" panose="020B0604020202020204" pitchFamily="34" charset="0"/>
+              <a:buChar char="•"/>
+            </a:pPr>
+            <a:r>
+              <a:rPr lang="en-US" sz="800" noProof="1"/>
+              <a:t>state.debug (main, enable git debug flags)</a:t>
+            </a:r>
+          </a:p>
+          <a:p>
+            <a:pPr marL="324000" lvl="1" indent="-171450">
+              <a:buFont typeface="Arial" panose="020B0604020202020204" pitchFamily="34" charset="0"/>
+              <a:buChar char="•"/>
+            </a:pPr>
+            <a:r>
+              <a:rPr lang="en-US" sz="800" noProof="1"/>
+              <a:t>state.graph.debug</a:t>
+            </a:r>
+            <a:br>
+              <a:rPr lang="en-US" sz="800" noProof="1"/>
+            </a:br>
+            <a:r>
+              <a:rPr lang="en-US" sz="800" noProof="1"/>
+              <a:t>are both read-only. Change directly in settings.json</a:t>
             </a:r>
           </a:p>
           <a:p>
@@ -12502,7 +12728,7 @@
                   <a:schemeClr val="accent1"/>
                 </a:solidFill>
               </a:rPr>
-              <a:t>Some fields are emulated gitShowHistorical</a:t>
+              <a:t>Settings window  settings.html :</a:t>
             </a:r>
             <a:endParaRPr lang="en-US" sz="800" noProof="1"/>
           </a:p>
@@ -12513,48 +12739,104 @@
             </a:pPr>
             <a:r>
               <a:rPr lang="en-US" sz="800" noProof="1"/>
-              <a:t>additionally, the order of the commmits may be reversed when pinnedCommit is compared to current commit. This is stored in status_data. :</a:t>
-            </a:r>
-          </a:p>
-          <a:p>
-            <a:pPr marL="324000" lvl="1" indent="-171450">
-              <a:buFont typeface="Arial" panose="020B0604020202020204" pitchFamily="34" charset="0"/>
-              <a:buChar char="•"/>
-            </a:pPr>
-            <a:r>
-              <a:rPr lang="en-US" sz="800" noProof="1"/>
-              <a:t>.reversedOrder  = false;   if commit1 is earlier than commit2</a:t>
-            </a:r>
-          </a:p>
-          <a:p>
-            <a:pPr marL="324000" lvl="1" indent="-171450">
-              <a:buFont typeface="Arial" panose="020B0604020202020204" pitchFamily="34" charset="0"/>
-              <a:buChar char="•"/>
-            </a:pPr>
-            <a:r>
-              <a:rPr lang="en-US" sz="800" noProof="1"/>
-              <a:t>.reversedOrder  = true;   if commit1 is later than commit2</a:t>
-            </a:r>
-          </a:p>
-          <a:p>
-            <a:pPr marL="152550" lvl="1"/>
-            <a:endParaRPr lang="en-US" sz="800" noProof="1"/>
-          </a:p>
-          <a:p>
-            <a:pPr marL="324000" lvl="1" indent="-171450">
-              <a:buFont typeface="Arial" panose="020B0604020202020204" pitchFamily="34" charset="0"/>
-              <a:buChar char="•"/>
-            </a:pPr>
-            <a:endParaRPr lang="en-US" sz="800" noProof="1"/>
-          </a:p>
-        </p:txBody>
-      </p:sp>
-      <p:sp>
-        <p:nvSpPr>
-          <p:cNvPr id="14" name="Rektangel 13">
+              <a:t>is populated from global.state </a:t>
+            </a:r>
+            <a:br>
+              <a:rPr lang="en-US" sz="800" noProof="1"/>
+            </a:br>
+            <a:r>
+              <a:rPr lang="en-US" sz="800" noProof="1"/>
+              <a:t>when   settings.js/injectIntoSettingsJs is called from settings.html</a:t>
+            </a:r>
+          </a:p>
+          <a:p>
+            <a:pPr marL="171450" indent="-171450">
+              <a:buFont typeface="Courier New" panose="02070309020205020404" pitchFamily="49" charset="0"/>
+              <a:buChar char="o"/>
+            </a:pPr>
+            <a:r>
+              <a:rPr lang="en-US" sz="800" noProof="1"/>
+              <a:t>closeWindow stores data in global.state before closing</a:t>
+            </a:r>
+          </a:p>
+        </p:txBody>
+      </p:sp>
+      <p:sp>
+        <p:nvSpPr>
+          <p:cNvPr id="15" name="textruta 14">
             <a:extLst>
               <a:ext uri="{FF2B5EF4-FFF2-40B4-BE49-F238E27FC236}">
-                <a16:creationId xmlns:a16="http://schemas.microsoft.com/office/drawing/2014/main" id="{C15FF9A1-43E2-7348-9382-D2ADB3B355C8}"/>
+                <a16:creationId xmlns:a16="http://schemas.microsoft.com/office/drawing/2014/main" id="{9D47FF24-DA49-8046-9CB0-28C71CB63318}"/>
+              </a:ext>
+            </a:extLst>
+          </p:cNvPr>
+          <p:cNvSpPr txBox="1"/>
+          <p:nvPr/>
+        </p:nvSpPr>
+        <p:spPr>
+          <a:xfrm>
+            <a:off x="4447440" y="3416887"/>
+            <a:ext cx="1204882" cy="461665"/>
+          </a:xfrm>
+          <a:prstGeom prst="rect">
+            <a:avLst/>
+          </a:prstGeom>
+          <a:noFill/>
+        </p:spPr>
+        <p:txBody>
+          <a:bodyPr wrap="none" rtlCol="0">
+            <a:spAutoFit/>
+          </a:bodyPr>
+          <a:lstStyle/>
+          <a:p>
+            <a:r>
+              <a:rPr lang="en-US" sz="2400" b="1" noProof="1"/>
+              <a:t>Settings</a:t>
+            </a:r>
+          </a:p>
+        </p:txBody>
+      </p:sp>
+      <p:sp>
+        <p:nvSpPr>
+          <p:cNvPr id="16" name="textruta 15">
+            <a:extLst>
+              <a:ext uri="{FF2B5EF4-FFF2-40B4-BE49-F238E27FC236}">
+                <a16:creationId xmlns:a16="http://schemas.microsoft.com/office/drawing/2014/main" id="{9192722C-8F33-C74E-A8DA-E92B802175F0}"/>
+              </a:ext>
+            </a:extLst>
+          </p:cNvPr>
+          <p:cNvSpPr txBox="1"/>
+          <p:nvPr/>
+        </p:nvSpPr>
+        <p:spPr>
+          <a:xfrm>
+            <a:off x="489993" y="4804493"/>
+            <a:ext cx="1592103" cy="461665"/>
+          </a:xfrm>
+          <a:prstGeom prst="rect">
+            <a:avLst/>
+          </a:prstGeom>
+          <a:noFill/>
+        </p:spPr>
+        <p:txBody>
+          <a:bodyPr wrap="none" rtlCol="0">
+            <a:spAutoFit/>
+          </a:bodyPr>
+          <a:lstStyle/>
+          <a:p>
+            <a:r>
+              <a:rPr lang="en-US" sz="2400" b="1" noProof="1"/>
+              <a:t>Dark mode</a:t>
+            </a:r>
+          </a:p>
+        </p:txBody>
+      </p:sp>
+      <p:sp>
+        <p:nvSpPr>
+          <p:cNvPr id="17" name="Rektangel 16">
+            <a:extLst>
+              <a:ext uri="{FF2B5EF4-FFF2-40B4-BE49-F238E27FC236}">
+                <a16:creationId xmlns:a16="http://schemas.microsoft.com/office/drawing/2014/main" id="{0C6FE680-6AF2-4545-AE31-D52F0731E861}"/>
               </a:ext>
             </a:extLst>
           </p:cNvPr>
@@ -12563,8 +12845,8 @@
         </p:nvSpPr>
         <p:spPr>
           <a:xfrm>
-            <a:off x="4463316" y="3807864"/>
-            <a:ext cx="3372291" cy="2431435"/>
+            <a:off x="489993" y="5244410"/>
+            <a:ext cx="3685232" cy="2554545"/>
           </a:xfrm>
           <a:prstGeom prst="rect">
             <a:avLst/>
@@ -12586,7 +12868,7 @@
           <a:p>
             <a:r>
               <a:rPr lang="en-US" sz="800" b="1" noProof="1"/>
-              <a:t>Settings are loaded at Pragma-git start, and updated from Settings window</a:t>
+              <a:t>Dark / light mode is defined from color_styles.css using css variables</a:t>
             </a:r>
           </a:p>
           <a:p>
@@ -12603,7 +12885,7 @@
                   <a:schemeClr val="accent1"/>
                 </a:solidFill>
               </a:rPr>
-              <a:t>Handling of settings in app.js</a:t>
+              <a:t>The mechanism</a:t>
             </a:r>
             <a:endParaRPr lang="en-US" sz="800" noProof="1"/>
           </a:p>
@@ -12614,27 +12896,7 @@
             </a:pPr>
             <a:r>
               <a:rPr lang="en-US" sz="800" noProof="1"/>
-              <a:t>loadSettings is called on Pragma-git start</a:t>
-            </a:r>
-          </a:p>
-          <a:p>
-            <a:pPr marL="324000" lvl="1" indent="-171450">
-              <a:buFont typeface="Arial" panose="020B0604020202020204" pitchFamily="34" charset="0"/>
-              <a:buChar char="•"/>
-            </a:pPr>
-            <a:r>
-              <a:rPr lang="en-US" sz="800" noProof="1"/>
-              <a:t>reads settings from settings.json</a:t>
-            </a:r>
-          </a:p>
-          <a:p>
-            <a:pPr marL="324000" lvl="1" indent="-171450">
-              <a:buFont typeface="Arial" panose="020B0604020202020204" pitchFamily="34" charset="0"/>
-              <a:buChar char="•"/>
-            </a:pPr>
-            <a:r>
-              <a:rPr lang="en-US" sz="800" noProof="1"/>
-              <a:t>stores settings in global.state in predefined order</a:t>
+              <a:t>&lt;body&gt; of each document is predefined with class=“light”</a:t>
             </a:r>
           </a:p>
           <a:p>
@@ -12644,27 +12906,7 @@
             </a:pPr>
             <a:r>
               <a:rPr lang="en-US" sz="800" noProof="1"/>
-              <a:t>updateWithNewSettings is called :</a:t>
-            </a:r>
-          </a:p>
-          <a:p>
-            <a:pPr marL="324000" lvl="1" indent="-171450">
-              <a:buFont typeface="Arial" panose="020B0604020202020204" pitchFamily="34" charset="0"/>
-              <a:buChar char="•"/>
-            </a:pPr>
-            <a:r>
-              <a:rPr lang="en-US" sz="800" noProof="1"/>
-              <a:t>from loadSettings</a:t>
-            </a:r>
-          </a:p>
-          <a:p>
-            <a:pPr marL="324000" lvl="1" indent="-171450">
-              <a:buFont typeface="Arial" panose="020B0604020202020204" pitchFamily="34" charset="0"/>
-              <a:buChar char="•"/>
-            </a:pPr>
-            <a:r>
-              <a:rPr lang="en-US" sz="800" noProof="1"/>
-              <a:t>when leaving Settings window</a:t>
+              <a:t>script after &lt;body&gt;  adds a class=”dark” if dark mode</a:t>
             </a:r>
           </a:p>
           <a:p>
@@ -12674,7 +12916,7 @@
             </a:pPr>
             <a:r>
               <a:rPr lang="en-US" sz="800" noProof="1"/>
-              <a:t>settings are saved when closing Pragma-git</a:t>
+              <a:t>darkmode is defined by localState.dark (true if darkmode, false if light)</a:t>
             </a:r>
           </a:p>
           <a:p>
@@ -12684,42 +12926,15 @@
             </a:pPr>
             <a:r>
               <a:rPr lang="en-US" sz="800" noProof="1"/>
-              <a:t>debug flags :  </a:t>
-            </a:r>
-          </a:p>
-          <a:p>
-            <a:pPr marL="324000" lvl="1" indent="-171450">
-              <a:buFont typeface="Arial" panose="020B0604020202020204" pitchFamily="34" charset="0"/>
-              <a:buChar char="•"/>
-            </a:pPr>
-            <a:r>
-              <a:rPr lang="en-US" sz="800" noProof="1"/>
-              <a:t>state.debug (main, enable git debug flags)</a:t>
-            </a:r>
-          </a:p>
-          <a:p>
-            <a:pPr marL="324000" lvl="1" indent="-171450">
-              <a:buFont typeface="Arial" panose="020B0604020202020204" pitchFamily="34" charset="0"/>
-              <a:buChar char="•"/>
-            </a:pPr>
-            <a:r>
-              <a:rPr lang="en-US" sz="800" noProof="1"/>
-              <a:t>state.graph.debug</a:t>
-            </a:r>
-            <a:br>
-              <a:rPr lang="en-US" sz="800" noProof="1"/>
-            </a:br>
-            <a:r>
-              <a:rPr lang="en-US" sz="800" noProof="1"/>
-              <a:t>are both read-only. Change directly in settings.json</a:t>
-            </a:r>
-          </a:p>
-          <a:p>
-            <a:endParaRPr lang="en-US" sz="800" noProof="1">
-              <a:solidFill>
-                <a:schemeClr val="accent1"/>
-              </a:solidFill>
-            </a:endParaRPr>
+              <a:t> localState.dark is set from value of state.darkmode setting</a:t>
+            </a:r>
+          </a:p>
+          <a:p>
+            <a:pPr marL="171450" indent="-171450">
+              <a:buFont typeface="Courier New" panose="02070309020205020404" pitchFamily="49" charset="0"/>
+              <a:buChar char="o"/>
+            </a:pPr>
+            <a:endParaRPr lang="en-US" sz="800" noProof="1"/>
           </a:p>
           <a:p>
             <a:r>
@@ -12728,7 +12943,7 @@
                   <a:schemeClr val="accent1"/>
                 </a:solidFill>
               </a:rPr>
-              <a:t>Settings window  settings.html :</a:t>
+              <a:t>Main app :</a:t>
             </a:r>
             <a:endParaRPr lang="en-US" sz="800" noProof="1"/>
           </a:p>
@@ -12739,15 +12954,23 @@
             </a:pPr>
             <a:r>
               <a:rPr lang="en-US" sz="800" noProof="1"/>
-              <a:t>is populated from global.state </a:t>
+              <a:t>Main. window is mostly constant (except for text-fields and input texts)</a:t>
             </a:r>
             <a:br>
               <a:rPr lang="en-US" sz="800" noProof="1"/>
             </a:br>
-            <a:r>
-              <a:rPr lang="en-US" sz="800" noProof="1"/>
-              <a:t>when   settings.js/injectIntoSettingsJs is called from settings.html</a:t>
-            </a:r>
+            <a:endParaRPr lang="en-US" sz="800" noProof="1"/>
+          </a:p>
+          <a:p>
+            <a:r>
+              <a:rPr lang="en-US" sz="800" noProof="1">
+                <a:solidFill>
+                  <a:schemeClr val="accent1"/>
+                </a:solidFill>
+              </a:rPr>
+              <a:t>Other windows behaves differently :</a:t>
+            </a:r>
+            <a:endParaRPr lang="en-US" sz="800" noProof="1"/>
           </a:p>
           <a:p>
             <a:pPr marL="171450" indent="-171450">
@@ -12756,87 +12979,82 @@
             </a:pPr>
             <a:r>
               <a:rPr lang="en-US" sz="800" noProof="1"/>
-              <a:t>closeWindow stores data in global.state before closing</a:t>
-            </a:r>
-          </a:p>
-        </p:txBody>
-      </p:sp>
-      <p:sp>
-        <p:nvSpPr>
-          <p:cNvPr id="15" name="textruta 14">
+              <a:t>Have styles reading css variables from color_styles.css</a:t>
+            </a:r>
+          </a:p>
+          <a:p>
+            <a:pPr marL="171450" indent="-171450">
+              <a:buFont typeface="Courier New" panose="02070309020205020404" pitchFamily="49" charset="0"/>
+              <a:buChar char="o"/>
+            </a:pPr>
+            <a:r>
+              <a:rPr lang="en-US" sz="800" noProof="1"/>
+              <a:t>A general img invert filter is applied which transforms black icons to white </a:t>
+            </a:r>
+            <a:br>
+              <a:rPr lang="en-US" sz="800" noProof="1"/>
+            </a:br>
+            <a:r>
+              <a:rPr lang="en-US" sz="800" noProof="1"/>
+              <a:t>(exceptions for color icons are defined in each document’s style section)</a:t>
+            </a:r>
+          </a:p>
+          <a:p>
+            <a:pPr marL="171450" indent="-171450">
+              <a:buFont typeface="Courier New" panose="02070309020205020404" pitchFamily="49" charset="0"/>
+              <a:buChar char="o"/>
+            </a:pPr>
+            <a:endParaRPr lang="en-US" sz="800" noProof="1"/>
+          </a:p>
+          <a:p>
+            <a:r>
+              <a:rPr lang="en-US" sz="800" noProof="1">
+                <a:solidFill>
+                  <a:schemeClr val="accent1"/>
+                </a:solidFill>
+              </a:rPr>
+              <a:t>Merge and Notes windows :</a:t>
+            </a:r>
+            <a:endParaRPr lang="en-US" sz="800" noProof="1"/>
+          </a:p>
+          <a:p>
+            <a:pPr marL="171450" indent="-171450">
+              <a:buFont typeface="Courier New" panose="02070309020205020404" pitchFamily="49" charset="0"/>
+              <a:buChar char="o"/>
+            </a:pPr>
+            <a:r>
+              <a:rPr lang="en-US" sz="800" noProof="1"/>
+              <a:t>Merge: hacked the CodeMirror css in pragma-merge.html</a:t>
+            </a:r>
+          </a:p>
+          <a:p>
+            <a:pPr marL="171450" indent="-171450">
+              <a:buFont typeface="Courier New" panose="02070309020205020404" pitchFamily="49" charset="0"/>
+              <a:buChar char="o"/>
+            </a:pPr>
+            <a:r>
+              <a:rPr lang="en-US" sz="800" noProof="1"/>
+              <a:t>Notes: hacked ToastUI editor css in notes.html</a:t>
+            </a:r>
+          </a:p>
+          <a:p>
+            <a:pPr marL="171450" indent="-171450">
+              <a:buFont typeface="Courier New" panose="02070309020205020404" pitchFamily="49" charset="0"/>
+              <a:buChar char="o"/>
+            </a:pPr>
+            <a:r>
+              <a:rPr lang="en-US" sz="800" noProof="1"/>
+              <a:t>Both have special css for icons and text-based buttons</a:t>
+            </a:r>
+          </a:p>
+        </p:txBody>
+      </p:sp>
+      <p:sp>
+        <p:nvSpPr>
+          <p:cNvPr id="18" name="Rektangel 17">
             <a:extLst>
               <a:ext uri="{FF2B5EF4-FFF2-40B4-BE49-F238E27FC236}">
-                <a16:creationId xmlns:a16="http://schemas.microsoft.com/office/drawing/2014/main" id="{9D47FF24-DA49-8046-9CB0-28C71CB63318}"/>
-              </a:ext>
-            </a:extLst>
-          </p:cNvPr>
-          <p:cNvSpPr txBox="1"/>
-          <p:nvPr/>
-        </p:nvSpPr>
-        <p:spPr>
-          <a:xfrm>
-            <a:off x="4421633" y="3375902"/>
-            <a:ext cx="1204882" cy="461665"/>
-          </a:xfrm>
-          <a:prstGeom prst="rect">
-            <a:avLst/>
-          </a:prstGeom>
-          <a:noFill/>
-        </p:spPr>
-        <p:txBody>
-          <a:bodyPr wrap="none" rtlCol="0">
-            <a:spAutoFit/>
-          </a:bodyPr>
-          <a:lstStyle/>
-          <a:p>
-            <a:r>
-              <a:rPr lang="en-US" sz="2400" b="1" noProof="1"/>
-              <a:t>Settings</a:t>
-            </a:r>
-          </a:p>
-        </p:txBody>
-      </p:sp>
-      <p:sp>
-        <p:nvSpPr>
-          <p:cNvPr id="16" name="textruta 15">
-            <a:extLst>
-              <a:ext uri="{FF2B5EF4-FFF2-40B4-BE49-F238E27FC236}">
-                <a16:creationId xmlns:a16="http://schemas.microsoft.com/office/drawing/2014/main" id="{9192722C-8F33-C74E-A8DA-E92B802175F0}"/>
-              </a:ext>
-            </a:extLst>
-          </p:cNvPr>
-          <p:cNvSpPr txBox="1"/>
-          <p:nvPr/>
-        </p:nvSpPr>
-        <p:spPr>
-          <a:xfrm>
-            <a:off x="489993" y="4804493"/>
-            <a:ext cx="1592103" cy="461665"/>
-          </a:xfrm>
-          <a:prstGeom prst="rect">
-            <a:avLst/>
-          </a:prstGeom>
-          <a:noFill/>
-        </p:spPr>
-        <p:txBody>
-          <a:bodyPr wrap="none" rtlCol="0">
-            <a:spAutoFit/>
-          </a:bodyPr>
-          <a:lstStyle/>
-          <a:p>
-            <a:r>
-              <a:rPr lang="en-US" sz="2400" b="1" noProof="1"/>
-              <a:t>Dark mode</a:t>
-            </a:r>
-          </a:p>
-        </p:txBody>
-      </p:sp>
-      <p:sp>
-        <p:nvSpPr>
-          <p:cNvPr id="17" name="Rektangel 16">
-            <a:extLst>
-              <a:ext uri="{FF2B5EF4-FFF2-40B4-BE49-F238E27FC236}">
-                <a16:creationId xmlns:a16="http://schemas.microsoft.com/office/drawing/2014/main" id="{0C6FE680-6AF2-4545-AE31-D52F0731E861}"/>
+                <a16:creationId xmlns:a16="http://schemas.microsoft.com/office/drawing/2014/main" id="{1DB0E46F-C9CA-A948-A22C-D89EEA13217F}"/>
               </a:ext>
             </a:extLst>
           </p:cNvPr>
@@ -12845,8 +13063,8 @@
         </p:nvSpPr>
         <p:spPr>
           <a:xfrm>
-            <a:off x="489993" y="5244410"/>
-            <a:ext cx="3685232" cy="2554545"/>
+            <a:off x="4496434" y="6939072"/>
+            <a:ext cx="3364980" cy="2062103"/>
           </a:xfrm>
           <a:prstGeom prst="rect">
             <a:avLst/>
@@ -12866,27 +13084,82 @@
           </a:bodyPr>
           <a:lstStyle/>
           <a:p>
-            <a:r>
-              <a:rPr lang="en-US" sz="800" b="1" noProof="1"/>
-              <a:t>Dark / light mode is defined from color_styles.css using css variables</a:t>
-            </a:r>
-          </a:p>
-          <a:p>
-            <a:endParaRPr lang="en-US" sz="800" noProof="1">
-              <a:solidFill>
-                <a:schemeClr val="accent1"/>
-              </a:solidFill>
-            </a:endParaRPr>
-          </a:p>
-          <a:p>
+            <a:pPr marL="171450" indent="-171450">
+              <a:buFont typeface="Courier New" panose="02070309020205020404" pitchFamily="49" charset="0"/>
+              <a:buChar char="o"/>
+            </a:pPr>
             <a:r>
               <a:rPr lang="en-US" sz="800" noProof="1">
                 <a:solidFill>
                   <a:schemeClr val="accent1"/>
                 </a:solidFill>
               </a:rPr>
-              <a:t>The mechanism</a:t>
-            </a:r>
+              <a:t>Notes, Graph window, Pragma-merge </a:t>
+            </a:r>
+          </a:p>
+          <a:p>
+            <a:pPr marL="324000" lvl="1" indent="-171450">
+              <a:buFont typeface="Arial" panose="020B0604020202020204" pitchFamily="34" charset="0"/>
+              <a:buChar char="•"/>
+            </a:pPr>
+            <a:r>
+              <a:rPr lang="en-US" sz="800" noProof="1"/>
+              <a:t>Based on npm find-in-nw</a:t>
+            </a:r>
+          </a:p>
+          <a:p>
+            <a:pPr marL="324000" lvl="1" indent="-171450">
+              <a:buFont typeface="Arial" panose="020B0604020202020204" pitchFamily="34" charset="0"/>
+              <a:buChar char="•"/>
+            </a:pPr>
+            <a:r>
+              <a:rPr lang="en-US" sz="800" noProof="1"/>
+              <a:t>Extend npm find-in-nw on the fly, with “extend_find-in-nw.js”</a:t>
+            </a:r>
+            <a:br>
+              <a:rPr lang="en-US" sz="800" noProof="1"/>
+            </a:br>
+            <a:r>
+              <a:rPr lang="en-US" sz="800" noProof="1"/>
+              <a:t>- make search case insensitive, add navigation CTRL-G, ↑,↓</a:t>
+            </a:r>
+            <a:br>
+              <a:rPr lang="en-US" sz="800" noProof="1"/>
+            </a:br>
+            <a:r>
+              <a:rPr lang="en-US" sz="800" noProof="1"/>
+              <a:t>- in Graph : searches document.body</a:t>
+            </a:r>
+            <a:br>
+              <a:rPr lang="en-US" sz="800" noProof="1"/>
+            </a:br>
+            <a:r>
+              <a:rPr lang="en-US" sz="800" noProof="1"/>
+              <a:t>- in Notes : search depends on wysiwyg / markdown modes</a:t>
+            </a:r>
+            <a:br>
+              <a:rPr lang="en-US" sz="800" noProof="1"/>
+            </a:br>
+            <a:r>
+              <a:rPr lang="en-US" sz="800" noProof="1"/>
+              <a:t>- in Pragma-merge : editor id in pragmaMergeSearchInEditorId</a:t>
+            </a:r>
+          </a:p>
+          <a:p>
+            <a:pPr marL="324000" lvl="1" indent="-171450">
+              <a:buFont typeface="Arial" panose="020B0604020202020204" pitchFamily="34" charset="0"/>
+              <a:buChar char="•"/>
+            </a:pPr>
+            <a:r>
+              <a:rPr lang="en-US" sz="800" noProof="1"/>
+              <a:t>Code added at end of Notes.html, graph.html, pragma-merge.html</a:t>
+            </a:r>
+          </a:p>
+          <a:p>
+            <a:pPr marL="324000" lvl="1" indent="-171450">
+              <a:buFont typeface="Arial" panose="020B0604020202020204" pitchFamily="34" charset="0"/>
+              <a:buChar char="•"/>
+            </a:pPr>
             <a:endParaRPr lang="en-US" sz="800" noProof="1"/>
           </a:p>
           <a:p>
@@ -12894,167 +13167,106 @@
               <a:buFont typeface="Courier New" panose="02070309020205020404" pitchFamily="49" charset="0"/>
               <a:buChar char="o"/>
             </a:pPr>
-            <a:r>
-              <a:rPr lang="en-US" sz="800" noProof="1"/>
-              <a:t>&lt;body&gt; of each document is predefined with class=“light”</a:t>
-            </a:r>
-          </a:p>
-          <a:p>
-            <a:pPr marL="171450" indent="-171450">
-              <a:buFont typeface="Courier New" panose="02070309020205020404" pitchFamily="49" charset="0"/>
-              <a:buChar char="o"/>
-            </a:pPr>
-            <a:r>
-              <a:rPr lang="en-US" sz="800" noProof="1"/>
-              <a:t>script after &lt;body&gt;  adds a class=”dark” if dark mode</a:t>
-            </a:r>
-          </a:p>
-          <a:p>
-            <a:pPr marL="171450" indent="-171450">
-              <a:buFont typeface="Courier New" panose="02070309020205020404" pitchFamily="49" charset="0"/>
-              <a:buChar char="o"/>
-            </a:pPr>
-            <a:r>
-              <a:rPr lang="en-US" sz="800" noProof="1"/>
-              <a:t>darkmode is defined by localState.dark (true if darkmode, false if light)</a:t>
-            </a:r>
-          </a:p>
-          <a:p>
-            <a:pPr marL="171450" indent="-171450">
-              <a:buFont typeface="Courier New" panose="02070309020205020404" pitchFamily="49" charset="0"/>
-              <a:buChar char="o"/>
-            </a:pPr>
-            <a:r>
-              <a:rPr lang="en-US" sz="800" noProof="1"/>
-              <a:t> localState.dark is set from value of state.darkmode setting</a:t>
-            </a:r>
-          </a:p>
-          <a:p>
-            <a:pPr marL="171450" indent="-171450">
-              <a:buFont typeface="Courier New" panose="02070309020205020404" pitchFamily="49" charset="0"/>
-              <a:buChar char="o"/>
-            </a:pPr>
-            <a:endParaRPr lang="en-US" sz="800" noProof="1"/>
-          </a:p>
-          <a:p>
             <a:r>
               <a:rPr lang="en-US" sz="800" noProof="1">
                 <a:solidFill>
                   <a:schemeClr val="accent1"/>
                 </a:solidFill>
               </a:rPr>
-              <a:t>Main app :</a:t>
-            </a:r>
+              <a:t>Notes window extra</a:t>
+            </a:r>
+          </a:p>
+          <a:p>
+            <a:pPr marL="324000" lvl="1" indent="-171450">
+              <a:buFont typeface="Arial" panose="020B0604020202020204" pitchFamily="34" charset="0"/>
+              <a:buChar char="•"/>
+            </a:pPr>
+            <a:r>
+              <a:rPr lang="en-US" sz="800" noProof="1"/>
+              <a:t>“Notes.html” : Listen to mouseover on markdown/wysiwyg switches</a:t>
+            </a:r>
+            <a:br>
+              <a:rPr lang="en-US" sz="800" noProof="1"/>
+            </a:br>
+            <a:r>
+              <a:rPr lang="en-US" sz="800" noProof="1"/>
+              <a:t>and clear marked finds (“tokens”), before switching.</a:t>
+            </a:r>
+            <a:br>
+              <a:rPr lang="en-US" sz="800" noProof="1"/>
+            </a:br>
+            <a:r>
+              <a:rPr lang="en-US" sz="800" noProof="1"/>
+              <a:t>Then close search box.</a:t>
+            </a:r>
+          </a:p>
+          <a:p>
+            <a:pPr marL="324000" lvl="1" indent="-171450">
+              <a:buFont typeface="Arial" panose="020B0604020202020204" pitchFamily="34" charset="0"/>
+              <a:buChar char="•"/>
+            </a:pPr>
+            <a:r>
+              <a:rPr lang="en-US" sz="800" noProof="1"/>
+              <a:t>“Notes.js” : Stop save from happening if find is active</a:t>
+            </a:r>
+          </a:p>
+          <a:p>
+            <a:pPr marL="324000" lvl="1" indent="-171450">
+              <a:buFont typeface="Arial" panose="020B0604020202020204" pitchFamily="34" charset="0"/>
+              <a:buChar char="•"/>
+            </a:pPr>
             <a:endParaRPr lang="en-US" sz="800" noProof="1"/>
           </a:p>
           <a:p>
-            <a:pPr marL="171450" indent="-171450">
-              <a:buFont typeface="Courier New" panose="02070309020205020404" pitchFamily="49" charset="0"/>
-              <a:buChar char="o"/>
-            </a:pPr>
-            <a:r>
-              <a:rPr lang="en-US" sz="800" noProof="1"/>
-              <a:t>Main. window is mostly constant (except for text-fields and input texts)</a:t>
-            </a:r>
-            <a:br>
-              <a:rPr lang="en-US" sz="800" noProof="1"/>
-            </a:br>
+            <a:pPr marL="324000" lvl="1" indent="-171450">
+              <a:buFont typeface="Arial" panose="020B0604020202020204" pitchFamily="34" charset="0"/>
+              <a:buChar char="•"/>
+            </a:pPr>
             <a:endParaRPr lang="en-US" sz="800" noProof="1"/>
           </a:p>
-          <a:p>
-            <a:r>
-              <a:rPr lang="en-US" sz="800" noProof="1">
-                <a:solidFill>
-                  <a:schemeClr val="accent1"/>
-                </a:solidFill>
-              </a:rPr>
-              <a:t>Other windows behaves differently :</a:t>
-            </a:r>
-            <a:endParaRPr lang="en-US" sz="800" noProof="1"/>
-          </a:p>
-          <a:p>
-            <a:pPr marL="171450" indent="-171450">
-              <a:buFont typeface="Courier New" panose="02070309020205020404" pitchFamily="49" charset="0"/>
-              <a:buChar char="o"/>
-            </a:pPr>
-            <a:r>
-              <a:rPr lang="en-US" sz="800" noProof="1"/>
-              <a:t>Have styles reading css variables from color_styles.css</a:t>
-            </a:r>
-          </a:p>
-          <a:p>
-            <a:pPr marL="171450" indent="-171450">
-              <a:buFont typeface="Courier New" panose="02070309020205020404" pitchFamily="49" charset="0"/>
-              <a:buChar char="o"/>
-            </a:pPr>
-            <a:r>
-              <a:rPr lang="en-US" sz="800" noProof="1"/>
-              <a:t>A general img invert filter is applied which transforms black icons to white </a:t>
-            </a:r>
-            <a:br>
-              <a:rPr lang="en-US" sz="800" noProof="1"/>
-            </a:br>
-            <a:r>
-              <a:rPr lang="en-US" sz="800" noProof="1"/>
-              <a:t>(exceptions for color icons are defined in each document’s style section)</a:t>
-            </a:r>
-          </a:p>
-          <a:p>
-            <a:pPr marL="171450" indent="-171450">
-              <a:buFont typeface="Courier New" panose="02070309020205020404" pitchFamily="49" charset="0"/>
-              <a:buChar char="o"/>
-            </a:pPr>
-            <a:endParaRPr lang="en-US" sz="800" noProof="1"/>
-          </a:p>
-          <a:p>
-            <a:r>
-              <a:rPr lang="en-US" sz="800" noProof="1">
-                <a:solidFill>
-                  <a:schemeClr val="accent1"/>
-                </a:solidFill>
-              </a:rPr>
-              <a:t>Merge and Notes windows :</a:t>
-            </a:r>
-            <a:endParaRPr lang="en-US" sz="800" noProof="1"/>
-          </a:p>
-          <a:p>
-            <a:pPr marL="171450" indent="-171450">
-              <a:buFont typeface="Courier New" panose="02070309020205020404" pitchFamily="49" charset="0"/>
-              <a:buChar char="o"/>
-            </a:pPr>
-            <a:r>
-              <a:rPr lang="en-US" sz="800" noProof="1"/>
-              <a:t>Merge: hacked the CodeMirror css in pragma-merge.html</a:t>
-            </a:r>
-          </a:p>
-          <a:p>
-            <a:pPr marL="171450" indent="-171450">
-              <a:buFont typeface="Courier New" panose="02070309020205020404" pitchFamily="49" charset="0"/>
-              <a:buChar char="o"/>
-            </a:pPr>
-            <a:r>
-              <a:rPr lang="en-US" sz="800" noProof="1"/>
-              <a:t>Notes: hacked ToastUI editor css in notes.html</a:t>
-            </a:r>
-          </a:p>
-          <a:p>
-            <a:pPr marL="171450" indent="-171450">
-              <a:buFont typeface="Courier New" panose="02070309020205020404" pitchFamily="49" charset="0"/>
-              <a:buChar char="o"/>
-            </a:pPr>
-            <a:r>
-              <a:rPr lang="en-US" sz="800" noProof="1"/>
-              <a:t>Both have special css for icons and text-based buttons</a:t>
-            </a:r>
-          </a:p>
-        </p:txBody>
-      </p:sp>
-      <p:sp>
-        <p:nvSpPr>
-          <p:cNvPr id="18" name="Rektangel 17">
+        </p:txBody>
+      </p:sp>
+      <p:sp>
+        <p:nvSpPr>
+          <p:cNvPr id="19" name="textruta 18">
             <a:extLst>
               <a:ext uri="{FF2B5EF4-FFF2-40B4-BE49-F238E27FC236}">
-                <a16:creationId xmlns:a16="http://schemas.microsoft.com/office/drawing/2014/main" id="{1DB0E46F-C9CA-A948-A22C-D89EEA13217F}"/>
+                <a16:creationId xmlns:a16="http://schemas.microsoft.com/office/drawing/2014/main" id="{A7C2C043-D2F7-C944-B558-2BA54F5E7D29}"/>
+              </a:ext>
+            </a:extLst>
+          </p:cNvPr>
+          <p:cNvSpPr txBox="1"/>
+          <p:nvPr/>
+        </p:nvSpPr>
+        <p:spPr>
+          <a:xfrm>
+            <a:off x="4447440" y="6494382"/>
+            <a:ext cx="1704634" cy="461665"/>
+          </a:xfrm>
+          <a:prstGeom prst="rect">
+            <a:avLst/>
+          </a:prstGeom>
+          <a:noFill/>
+        </p:spPr>
+        <p:txBody>
+          <a:bodyPr wrap="none" rtlCol="0">
+            <a:spAutoFit/>
+          </a:bodyPr>
+          <a:lstStyle/>
+          <a:p>
+            <a:r>
+              <a:rPr lang="en-US" sz="2400" b="1" noProof="1"/>
+              <a:t>Find in html</a:t>
+            </a:r>
+          </a:p>
+        </p:txBody>
+      </p:sp>
+      <p:sp>
+        <p:nvSpPr>
+          <p:cNvPr id="20" name="Rektangel 19">
+            <a:extLst>
+              <a:ext uri="{FF2B5EF4-FFF2-40B4-BE49-F238E27FC236}">
+                <a16:creationId xmlns:a16="http://schemas.microsoft.com/office/drawing/2014/main" id="{116B39BA-29B4-7748-8FA3-5994271F75AA}"/>
               </a:ext>
             </a:extLst>
           </p:cNvPr>
@@ -13063,8 +13275,8 @@
         </p:nvSpPr>
         <p:spPr>
           <a:xfrm>
-            <a:off x="4470627" y="6898087"/>
-            <a:ext cx="3364980" cy="2062103"/>
+            <a:off x="465896" y="8400871"/>
+            <a:ext cx="3685232" cy="1200329"/>
           </a:xfrm>
           <a:prstGeom prst="rect">
             <a:avLst/>
@@ -13084,218 +13296,6 @@
           </a:bodyPr>
           <a:lstStyle/>
           <a:p>
-            <a:pPr marL="171450" indent="-171450">
-              <a:buFont typeface="Courier New" panose="02070309020205020404" pitchFamily="49" charset="0"/>
-              <a:buChar char="o"/>
-            </a:pPr>
-            <a:r>
-              <a:rPr lang="en-US" sz="800" noProof="1">
-                <a:solidFill>
-                  <a:schemeClr val="accent1"/>
-                </a:solidFill>
-              </a:rPr>
-              <a:t>Notes, Graph window, Pragma-merge </a:t>
-            </a:r>
-          </a:p>
-          <a:p>
-            <a:pPr marL="324000" lvl="1" indent="-171450">
-              <a:buFont typeface="Arial" panose="020B0604020202020204" pitchFamily="34" charset="0"/>
-              <a:buChar char="•"/>
-            </a:pPr>
-            <a:r>
-              <a:rPr lang="en-US" sz="800" noProof="1"/>
-              <a:t>Based on npm find-in-nw</a:t>
-            </a:r>
-          </a:p>
-          <a:p>
-            <a:pPr marL="324000" lvl="1" indent="-171450">
-              <a:buFont typeface="Arial" panose="020B0604020202020204" pitchFamily="34" charset="0"/>
-              <a:buChar char="•"/>
-            </a:pPr>
-            <a:r>
-              <a:rPr lang="en-US" sz="800" noProof="1"/>
-              <a:t>Extend npm find-in-nw on the fly, with “extend_find-in-nw.js”</a:t>
-            </a:r>
-            <a:br>
-              <a:rPr lang="en-US" sz="800" noProof="1"/>
-            </a:br>
-            <a:r>
-              <a:rPr lang="en-US" sz="800" noProof="1"/>
-              <a:t>- make search case insensitive, add navigation CTRL-G, ↑,↓</a:t>
-            </a:r>
-            <a:br>
-              <a:rPr lang="en-US" sz="800" noProof="1"/>
-            </a:br>
-            <a:r>
-              <a:rPr lang="en-US" sz="800" noProof="1"/>
-              <a:t>- in Graph : searches document.body</a:t>
-            </a:r>
-            <a:br>
-              <a:rPr lang="en-US" sz="800" noProof="1"/>
-            </a:br>
-            <a:r>
-              <a:rPr lang="en-US" sz="800" noProof="1"/>
-              <a:t>- in Notes : search depends on wysiwyg / markdown modes</a:t>
-            </a:r>
-            <a:br>
-              <a:rPr lang="en-US" sz="800" noProof="1"/>
-            </a:br>
-            <a:r>
-              <a:rPr lang="en-US" sz="800" noProof="1"/>
-              <a:t>- in Pragma-merge : editor id in pragmaMergeSearchInEditorId</a:t>
-            </a:r>
-          </a:p>
-          <a:p>
-            <a:pPr marL="324000" lvl="1" indent="-171450">
-              <a:buFont typeface="Arial" panose="020B0604020202020204" pitchFamily="34" charset="0"/>
-              <a:buChar char="•"/>
-            </a:pPr>
-            <a:r>
-              <a:rPr lang="en-US" sz="800" noProof="1"/>
-              <a:t>Code added at end of Notes.html, graph.html, pragma-merge.html</a:t>
-            </a:r>
-          </a:p>
-          <a:p>
-            <a:pPr marL="324000" lvl="1" indent="-171450">
-              <a:buFont typeface="Arial" panose="020B0604020202020204" pitchFamily="34" charset="0"/>
-              <a:buChar char="•"/>
-            </a:pPr>
-            <a:endParaRPr lang="en-US" sz="800" noProof="1"/>
-          </a:p>
-          <a:p>
-            <a:pPr marL="171450" indent="-171450">
-              <a:buFont typeface="Courier New" panose="02070309020205020404" pitchFamily="49" charset="0"/>
-              <a:buChar char="o"/>
-            </a:pPr>
-            <a:r>
-              <a:rPr lang="en-US" sz="800" noProof="1">
-                <a:solidFill>
-                  <a:schemeClr val="accent1"/>
-                </a:solidFill>
-              </a:rPr>
-              <a:t>Notes window extra</a:t>
-            </a:r>
-          </a:p>
-          <a:p>
-            <a:pPr marL="324000" lvl="1" indent="-171450">
-              <a:buFont typeface="Arial" panose="020B0604020202020204" pitchFamily="34" charset="0"/>
-              <a:buChar char="•"/>
-            </a:pPr>
-            <a:r>
-              <a:rPr lang="en-US" sz="800" noProof="1"/>
-              <a:t>“Notes.html” : Listen to mouseover on markdown/wysiwyg switches</a:t>
-            </a:r>
-            <a:br>
-              <a:rPr lang="en-US" sz="800" noProof="1"/>
-            </a:br>
-            <a:r>
-              <a:rPr lang="en-US" sz="800" noProof="1"/>
-              <a:t>and clear marked finds (“tokens”), before switching.</a:t>
-            </a:r>
-            <a:br>
-              <a:rPr lang="en-US" sz="800" noProof="1"/>
-            </a:br>
-            <a:r>
-              <a:rPr lang="en-US" sz="800" noProof="1"/>
-              <a:t>Then close search box.</a:t>
-            </a:r>
-          </a:p>
-          <a:p>
-            <a:pPr marL="324000" lvl="1" indent="-171450">
-              <a:buFont typeface="Arial" panose="020B0604020202020204" pitchFamily="34" charset="0"/>
-              <a:buChar char="•"/>
-            </a:pPr>
-            <a:r>
-              <a:rPr lang="en-US" sz="800" noProof="1"/>
-              <a:t>“Notes.js” : Stop save from happening if find is active</a:t>
-            </a:r>
-          </a:p>
-          <a:p>
-            <a:pPr marL="324000" lvl="1" indent="-171450">
-              <a:buFont typeface="Arial" panose="020B0604020202020204" pitchFamily="34" charset="0"/>
-              <a:buChar char="•"/>
-            </a:pPr>
-            <a:endParaRPr lang="en-US" sz="800" noProof="1"/>
-          </a:p>
-          <a:p>
-            <a:pPr marL="324000" lvl="1" indent="-171450">
-              <a:buFont typeface="Arial" panose="020B0604020202020204" pitchFamily="34" charset="0"/>
-              <a:buChar char="•"/>
-            </a:pPr>
-            <a:endParaRPr lang="en-US" sz="800" noProof="1"/>
-          </a:p>
-        </p:txBody>
-      </p:sp>
-      <p:sp>
-        <p:nvSpPr>
-          <p:cNvPr id="19" name="textruta 18">
-            <a:extLst>
-              <a:ext uri="{FF2B5EF4-FFF2-40B4-BE49-F238E27FC236}">
-                <a16:creationId xmlns:a16="http://schemas.microsoft.com/office/drawing/2014/main" id="{A7C2C043-D2F7-C944-B558-2BA54F5E7D29}"/>
-              </a:ext>
-            </a:extLst>
-          </p:cNvPr>
-          <p:cNvSpPr txBox="1"/>
-          <p:nvPr/>
-        </p:nvSpPr>
-        <p:spPr>
-          <a:xfrm>
-            <a:off x="4421633" y="6453397"/>
-            <a:ext cx="1704634" cy="461665"/>
-          </a:xfrm>
-          <a:prstGeom prst="rect">
-            <a:avLst/>
-          </a:prstGeom>
-          <a:noFill/>
-        </p:spPr>
-        <p:txBody>
-          <a:bodyPr wrap="none" rtlCol="0">
-            <a:spAutoFit/>
-          </a:bodyPr>
-          <a:lstStyle/>
-          <a:p>
-            <a:r>
-              <a:rPr lang="en-US" sz="2400" b="1" noProof="1"/>
-              <a:t>Find in html</a:t>
-            </a:r>
-          </a:p>
-        </p:txBody>
-      </p:sp>
-      <p:sp>
-        <p:nvSpPr>
-          <p:cNvPr id="20" name="Rektangel 19">
-            <a:extLst>
-              <a:ext uri="{FF2B5EF4-FFF2-40B4-BE49-F238E27FC236}">
-                <a16:creationId xmlns:a16="http://schemas.microsoft.com/office/drawing/2014/main" id="{116B39BA-29B4-7748-8FA3-5994271F75AA}"/>
-              </a:ext>
-            </a:extLst>
-          </p:cNvPr>
-          <p:cNvSpPr/>
-          <p:nvPr/>
-        </p:nvSpPr>
-        <p:spPr>
-          <a:xfrm>
-            <a:off x="465896" y="8400871"/>
-            <a:ext cx="3685232" cy="1200329"/>
-          </a:xfrm>
-          <a:prstGeom prst="rect">
-            <a:avLst/>
-          </a:prstGeom>
-          <a:solidFill>
-            <a:schemeClr val="bg1"/>
-          </a:solidFill>
-          <a:ln>
-            <a:solidFill>
-              <a:schemeClr val="accent1"/>
-            </a:solidFill>
-          </a:ln>
-        </p:spPr>
-        <p:txBody>
-          <a:bodyPr wrap="square">
-            <a:spAutoFit/>
-          </a:bodyPr>
-          <a:lstStyle/>
-          <a:p>
             <a:r>
               <a:rPr lang="en-US" sz="800" noProof="1">
                 <a:solidFill>
@@ -13410,7 +13410,7 @@
           <a:p>
             <a:r>
               <a:rPr lang="en-US" sz="2400" b="1" noProof="1"/>
-              <a:t>help</a:t>
+              <a:t>Help</a:t>
             </a:r>
           </a:p>
         </p:txBody>
@@ -13450,6 +13450,188 @@
                 </a:solidFill>
               </a:rPr>
               <a:t>Other Windows</a:t>
+            </a:r>
+          </a:p>
+        </p:txBody>
+      </p:sp>
+      <p:sp>
+        <p:nvSpPr>
+          <p:cNvPr id="2" name="textruta 1">
+            <a:extLst>
+              <a:ext uri="{FF2B5EF4-FFF2-40B4-BE49-F238E27FC236}">
+                <a16:creationId xmlns:a16="http://schemas.microsoft.com/office/drawing/2014/main" id="{9851A2CD-4B90-C07F-1152-611E6755CCD9}"/>
+              </a:ext>
+            </a:extLst>
+          </p:cNvPr>
+          <p:cNvSpPr txBox="1"/>
+          <p:nvPr/>
+        </p:nvSpPr>
+        <p:spPr>
+          <a:xfrm>
+            <a:off x="4489123" y="1381925"/>
+            <a:ext cx="3274288" cy="1938992"/>
+          </a:xfrm>
+          <a:prstGeom prst="rect">
+            <a:avLst/>
+          </a:prstGeom>
+          <a:noFill/>
+          <a:ln>
+            <a:solidFill>
+              <a:schemeClr val="accent1"/>
+            </a:solidFill>
+          </a:ln>
+        </p:spPr>
+        <p:txBody>
+          <a:bodyPr wrap="square" rtlCol="0">
+            <a:spAutoFit/>
+          </a:bodyPr>
+          <a:lstStyle/>
+          <a:p>
+            <a:r>
+              <a:rPr lang="en-US" sz="800" b="1" noProof="1"/>
+              <a:t>Explicitly defined in .html file</a:t>
+            </a:r>
+          </a:p>
+          <a:p>
+            <a:pPr marL="171450" indent="-171450">
+              <a:buFont typeface="Courier New" panose="02070309020205020404" pitchFamily="49" charset="0"/>
+              <a:buChar char="o"/>
+            </a:pPr>
+            <a:r>
+              <a:rPr lang="en-US" sz="800" noProof="1"/>
+              <a:t>This is for dialogs with predefined content</a:t>
+            </a:r>
+          </a:p>
+          <a:p>
+            <a:pPr marL="171450" indent="-171450">
+              <a:buFont typeface="Courier New" panose="02070309020205020404" pitchFamily="49" charset="0"/>
+              <a:buChar char="o"/>
+            </a:pPr>
+            <a:r>
+              <a:rPr lang="en-US" sz="800" noProof="1"/>
+              <a:t>Shows as html-dialog , inside main app.js window</a:t>
+            </a:r>
+            <a:endParaRPr lang="en-US" sz="800" b="1" noProof="1"/>
+          </a:p>
+          <a:p>
+            <a:endParaRPr lang="en-US" sz="800" noProof="1"/>
+          </a:p>
+          <a:p>
+            <a:r>
+              <a:rPr lang="en-US" sz="800" b="1" noProof="1"/>
+              <a:t>Template-dialog in.html file</a:t>
+            </a:r>
+          </a:p>
+          <a:p>
+            <a:pPr marL="171450" indent="-171450">
+              <a:buFont typeface="Courier New" panose="02070309020205020404" pitchFamily="49" charset="0"/>
+              <a:buChar char="o"/>
+            </a:pPr>
+            <a:r>
+              <a:rPr lang="en-US" sz="800" noProof="1"/>
+              <a:t>Local to app.html, and settings.html</a:t>
+            </a:r>
+          </a:p>
+          <a:p>
+            <a:pPr marL="171450" indent="-171450">
+              <a:buFont typeface="Courier New" panose="02070309020205020404" pitchFamily="49" charset="0"/>
+              <a:buChar char="o"/>
+            </a:pPr>
+            <a:r>
+              <a:rPr lang="en-US" sz="800" noProof="1"/>
+              <a:t>displayAlert(title, message)</a:t>
+            </a:r>
+          </a:p>
+          <a:p>
+            <a:pPr marL="171450" indent="-171450">
+              <a:buFont typeface="Courier New" panose="02070309020205020404" pitchFamily="49" charset="0"/>
+              <a:buChar char="o"/>
+            </a:pPr>
+            <a:r>
+              <a:rPr lang="en-US" sz="800" noProof="1"/>
+              <a:t>Shows as html-dialog , inside main window</a:t>
+            </a:r>
+          </a:p>
+          <a:p>
+            <a:pPr marL="171450" indent="-171450">
+              <a:buFont typeface="Courier New" panose="02070309020205020404" pitchFamily="49" charset="0"/>
+              <a:buChar char="o"/>
+            </a:pPr>
+            <a:endParaRPr lang="en-US" sz="800" b="1" noProof="1"/>
+          </a:p>
+          <a:p>
+            <a:r>
+              <a:rPr lang="en-US" sz="800" b="1" noProof="1"/>
+              <a:t>exernalDialog.html (sizing performed in app.html)</a:t>
+            </a:r>
+          </a:p>
+          <a:p>
+            <a:pPr marL="171450" indent="-171450">
+              <a:buFont typeface="Courier New" panose="02070309020205020404" pitchFamily="49" charset="0"/>
+              <a:buChar char="o"/>
+            </a:pPr>
+            <a:r>
+              <a:rPr lang="en-US" sz="800" noProof="1"/>
+              <a:t>displayLongAlert(title, message, type)</a:t>
+            </a:r>
+            <a:br>
+              <a:rPr lang="en-US" sz="800" noProof="1"/>
+            </a:br>
+            <a:r>
+              <a:rPr lang="en-US" sz="800" noProof="1"/>
+              <a:t>defined in app.js</a:t>
+            </a:r>
+          </a:p>
+          <a:p>
+            <a:pPr marL="171450" indent="-171450">
+              <a:buFont typeface="Courier New" panose="02070309020205020404" pitchFamily="49" charset="0"/>
+              <a:buChar char="o"/>
+            </a:pPr>
+            <a:r>
+              <a:rPr lang="en-US" sz="800" noProof="1"/>
+              <a:t>Shows as external window, on top of main  app.js window</a:t>
+            </a:r>
+            <a:br>
+              <a:rPr lang="en-US" sz="800" noProof="1"/>
+            </a:br>
+            <a:br>
+              <a:rPr lang="en-US" sz="800" noProof="1"/>
+            </a:br>
+            <a:endParaRPr lang="en-US" sz="800" noProof="1"/>
+          </a:p>
+        </p:txBody>
+      </p:sp>
+      <p:sp>
+        <p:nvSpPr>
+          <p:cNvPr id="3" name="textruta 2">
+            <a:extLst>
+              <a:ext uri="{FF2B5EF4-FFF2-40B4-BE49-F238E27FC236}">
+                <a16:creationId xmlns:a16="http://schemas.microsoft.com/office/drawing/2014/main" id="{06DEBF44-050B-2220-C4D8-56D460476702}"/>
+              </a:ext>
+            </a:extLst>
+          </p:cNvPr>
+          <p:cNvSpPr txBox="1"/>
+          <p:nvPr/>
+        </p:nvSpPr>
+        <p:spPr>
+          <a:xfrm>
+            <a:off x="4489123" y="841210"/>
+            <a:ext cx="1116011" cy="461665"/>
+          </a:xfrm>
+          <a:prstGeom prst="rect">
+            <a:avLst/>
+          </a:prstGeom>
+          <a:noFill/>
+        </p:spPr>
+        <p:txBody>
+          <a:bodyPr wrap="none" rtlCol="0">
+            <a:spAutoFit/>
+          </a:bodyPr>
+          <a:lstStyle/>
+          <a:p>
+            <a:r>
+              <a:rPr lang="en-US" sz="2400" b="1" noProof="1"/>
+              <a:t>Dialogs</a:t>
             </a:r>
           </a:p>
         </p:txBody>

</xml_diff>

<commit_message>
Handle multiple workspaces correctly
open new window in current work space (before it moved to first workspace)
</commit_message>
<xml_diff>
--- a/docs/Tech-overview.pptx
+++ b/docs/Tech-overview.pptx
@@ -262,7 +262,7 @@
           <a:p>
             <a:fld id="{CA855E1B-8830-B64E-B102-DB2BBD0D9567}" type="datetimeFigureOut">
               <a:rPr lang="sv-SE" smtClean="0"/>
-              <a:t>2024-05-01</a:t>
+              <a:t>2024-07-23</a:t>
             </a:fld>
             <a:endParaRPr lang="sv-SE"/>
           </a:p>
@@ -432,7 +432,7 @@
           <a:p>
             <a:fld id="{CA855E1B-8830-B64E-B102-DB2BBD0D9567}" type="datetimeFigureOut">
               <a:rPr lang="sv-SE" smtClean="0"/>
-              <a:t>2024-05-01</a:t>
+              <a:t>2024-07-23</a:t>
             </a:fld>
             <a:endParaRPr lang="sv-SE"/>
           </a:p>
@@ -612,7 +612,7 @@
           <a:p>
             <a:fld id="{CA855E1B-8830-B64E-B102-DB2BBD0D9567}" type="datetimeFigureOut">
               <a:rPr lang="sv-SE" smtClean="0"/>
-              <a:t>2024-05-01</a:t>
+              <a:t>2024-07-23</a:t>
             </a:fld>
             <a:endParaRPr lang="sv-SE"/>
           </a:p>
@@ -782,7 +782,7 @@
           <a:p>
             <a:fld id="{CA855E1B-8830-B64E-B102-DB2BBD0D9567}" type="datetimeFigureOut">
               <a:rPr lang="sv-SE" smtClean="0"/>
-              <a:t>2024-05-01</a:t>
+              <a:t>2024-07-23</a:t>
             </a:fld>
             <a:endParaRPr lang="sv-SE"/>
           </a:p>
@@ -1026,7 +1026,7 @@
           <a:p>
             <a:fld id="{CA855E1B-8830-B64E-B102-DB2BBD0D9567}" type="datetimeFigureOut">
               <a:rPr lang="sv-SE" smtClean="0"/>
-              <a:t>2024-05-01</a:t>
+              <a:t>2024-07-23</a:t>
             </a:fld>
             <a:endParaRPr lang="sv-SE"/>
           </a:p>
@@ -1258,7 +1258,7 @@
           <a:p>
             <a:fld id="{CA855E1B-8830-B64E-B102-DB2BBD0D9567}" type="datetimeFigureOut">
               <a:rPr lang="sv-SE" smtClean="0"/>
-              <a:t>2024-05-01</a:t>
+              <a:t>2024-07-23</a:t>
             </a:fld>
             <a:endParaRPr lang="sv-SE"/>
           </a:p>
@@ -1625,7 +1625,7 @@
           <a:p>
             <a:fld id="{CA855E1B-8830-B64E-B102-DB2BBD0D9567}" type="datetimeFigureOut">
               <a:rPr lang="sv-SE" smtClean="0"/>
-              <a:t>2024-05-01</a:t>
+              <a:t>2024-07-23</a:t>
             </a:fld>
             <a:endParaRPr lang="sv-SE"/>
           </a:p>
@@ -1743,7 +1743,7 @@
           <a:p>
             <a:fld id="{CA855E1B-8830-B64E-B102-DB2BBD0D9567}" type="datetimeFigureOut">
               <a:rPr lang="sv-SE" smtClean="0"/>
-              <a:t>2024-05-01</a:t>
+              <a:t>2024-07-23</a:t>
             </a:fld>
             <a:endParaRPr lang="sv-SE"/>
           </a:p>
@@ -1838,7 +1838,7 @@
           <a:p>
             <a:fld id="{CA855E1B-8830-B64E-B102-DB2BBD0D9567}" type="datetimeFigureOut">
               <a:rPr lang="sv-SE" smtClean="0"/>
-              <a:t>2024-05-01</a:t>
+              <a:t>2024-07-23</a:t>
             </a:fld>
             <a:endParaRPr lang="sv-SE"/>
           </a:p>
@@ -2115,7 +2115,7 @@
           <a:p>
             <a:fld id="{CA855E1B-8830-B64E-B102-DB2BBD0D9567}" type="datetimeFigureOut">
               <a:rPr lang="sv-SE" smtClean="0"/>
-              <a:t>2024-05-01</a:t>
+              <a:t>2024-07-23</a:t>
             </a:fld>
             <a:endParaRPr lang="sv-SE"/>
           </a:p>
@@ -2372,7 +2372,7 @@
           <a:p>
             <a:fld id="{CA855E1B-8830-B64E-B102-DB2BBD0D9567}" type="datetimeFigureOut">
               <a:rPr lang="sv-SE" smtClean="0"/>
-              <a:t>2024-05-01</a:t>
+              <a:t>2024-07-23</a:t>
             </a:fld>
             <a:endParaRPr lang="sv-SE"/>
           </a:p>
@@ -2585,7 +2585,7 @@
           <a:p>
             <a:fld id="{CA855E1B-8830-B64E-B102-DB2BBD0D9567}" type="datetimeFigureOut">
               <a:rPr lang="sv-SE" smtClean="0"/>
-              <a:t>2024-05-01</a:t>
+              <a:t>2024-07-23</a:t>
             </a:fld>
             <a:endParaRPr lang="sv-SE"/>
           </a:p>
@@ -14115,7 +14115,7 @@
         <p:spPr>
           <a:xfrm>
             <a:off x="422126" y="7212463"/>
-            <a:ext cx="3274288" cy="1200329"/>
+            <a:ext cx="3274288" cy="1323439"/>
           </a:xfrm>
           <a:prstGeom prst="rect">
             <a:avLst/>
@@ -14176,10 +14176,21 @@
             </a:br>
             <a:r>
               <a:rPr lang="en-US" sz="800" noProof="1"/>
-              <a:t>can then open with Chrome browser localhost:9222</a:t>
-            </a:r>
-          </a:p>
-          <a:p>
+              <a:t>can then open with Chrome browser:</a:t>
+            </a:r>
+            <a:br>
+              <a:rPr lang="en-US" sz="800" noProof="1"/>
+            </a:br>
+            <a:br>
+              <a:rPr lang="en-US" sz="800" noProof="1"/>
+            </a:br>
+            <a:r>
+              <a:rPr lang="en-US" sz="800" noProof="1">
+                <a:latin typeface="Courier New" panose="02070309020205020404" pitchFamily="49" charset="0"/>
+                <a:cs typeface="Courier New" panose="02070309020205020404" pitchFamily="49" charset="0"/>
+              </a:rPr>
+              <a:t>chrome://inspect</a:t>
+            </a:r>
             <a:endParaRPr lang="en-US" sz="800" noProof="1"/>
           </a:p>
           <a:p>

</xml_diff>

<commit_message>
Fix multiple workspaces for more windows. Remove MacOS menu 'close', 'minimize'
Windows: Gitignore, Github, Help
</commit_message>
<xml_diff>
--- a/docs/Tech-overview.pptx
+++ b/docs/Tech-overview.pptx
@@ -262,7 +262,7 @@
           <a:p>
             <a:fld id="{CA855E1B-8830-B64E-B102-DB2BBD0D9567}" type="datetimeFigureOut">
               <a:rPr lang="sv-SE" smtClean="0"/>
-              <a:t>2024-07-23</a:t>
+              <a:t>2024-07-28</a:t>
             </a:fld>
             <a:endParaRPr lang="sv-SE"/>
           </a:p>
@@ -432,7 +432,7 @@
           <a:p>
             <a:fld id="{CA855E1B-8830-B64E-B102-DB2BBD0D9567}" type="datetimeFigureOut">
               <a:rPr lang="sv-SE" smtClean="0"/>
-              <a:t>2024-07-23</a:t>
+              <a:t>2024-07-28</a:t>
             </a:fld>
             <a:endParaRPr lang="sv-SE"/>
           </a:p>
@@ -612,7 +612,7 @@
           <a:p>
             <a:fld id="{CA855E1B-8830-B64E-B102-DB2BBD0D9567}" type="datetimeFigureOut">
               <a:rPr lang="sv-SE" smtClean="0"/>
-              <a:t>2024-07-23</a:t>
+              <a:t>2024-07-28</a:t>
             </a:fld>
             <a:endParaRPr lang="sv-SE"/>
           </a:p>
@@ -782,7 +782,7 @@
           <a:p>
             <a:fld id="{CA855E1B-8830-B64E-B102-DB2BBD0D9567}" type="datetimeFigureOut">
               <a:rPr lang="sv-SE" smtClean="0"/>
-              <a:t>2024-07-23</a:t>
+              <a:t>2024-07-28</a:t>
             </a:fld>
             <a:endParaRPr lang="sv-SE"/>
           </a:p>
@@ -1026,7 +1026,7 @@
           <a:p>
             <a:fld id="{CA855E1B-8830-B64E-B102-DB2BBD0D9567}" type="datetimeFigureOut">
               <a:rPr lang="sv-SE" smtClean="0"/>
-              <a:t>2024-07-23</a:t>
+              <a:t>2024-07-28</a:t>
             </a:fld>
             <a:endParaRPr lang="sv-SE"/>
           </a:p>
@@ -1258,7 +1258,7 @@
           <a:p>
             <a:fld id="{CA855E1B-8830-B64E-B102-DB2BBD0D9567}" type="datetimeFigureOut">
               <a:rPr lang="sv-SE" smtClean="0"/>
-              <a:t>2024-07-23</a:t>
+              <a:t>2024-07-28</a:t>
             </a:fld>
             <a:endParaRPr lang="sv-SE"/>
           </a:p>
@@ -1625,7 +1625,7 @@
           <a:p>
             <a:fld id="{CA855E1B-8830-B64E-B102-DB2BBD0D9567}" type="datetimeFigureOut">
               <a:rPr lang="sv-SE" smtClean="0"/>
-              <a:t>2024-07-23</a:t>
+              <a:t>2024-07-28</a:t>
             </a:fld>
             <a:endParaRPr lang="sv-SE"/>
           </a:p>
@@ -1743,7 +1743,7 @@
           <a:p>
             <a:fld id="{CA855E1B-8830-B64E-B102-DB2BBD0D9567}" type="datetimeFigureOut">
               <a:rPr lang="sv-SE" smtClean="0"/>
-              <a:t>2024-07-23</a:t>
+              <a:t>2024-07-28</a:t>
             </a:fld>
             <a:endParaRPr lang="sv-SE"/>
           </a:p>
@@ -1838,7 +1838,7 @@
           <a:p>
             <a:fld id="{CA855E1B-8830-B64E-B102-DB2BBD0D9567}" type="datetimeFigureOut">
               <a:rPr lang="sv-SE" smtClean="0"/>
-              <a:t>2024-07-23</a:t>
+              <a:t>2024-07-28</a:t>
             </a:fld>
             <a:endParaRPr lang="sv-SE"/>
           </a:p>
@@ -2115,7 +2115,7 @@
           <a:p>
             <a:fld id="{CA855E1B-8830-B64E-B102-DB2BBD0D9567}" type="datetimeFigureOut">
               <a:rPr lang="sv-SE" smtClean="0"/>
-              <a:t>2024-07-23</a:t>
+              <a:t>2024-07-28</a:t>
             </a:fld>
             <a:endParaRPr lang="sv-SE"/>
           </a:p>
@@ -2372,7 +2372,7 @@
           <a:p>
             <a:fld id="{CA855E1B-8830-B64E-B102-DB2BBD0D9567}" type="datetimeFigureOut">
               <a:rPr lang="sv-SE" smtClean="0"/>
-              <a:t>2024-07-23</a:t>
+              <a:t>2024-07-28</a:t>
             </a:fld>
             <a:endParaRPr lang="sv-SE"/>
           </a:p>
@@ -2585,7 +2585,7 @@
           <a:p>
             <a:fld id="{CA855E1B-8830-B64E-B102-DB2BBD0D9567}" type="datetimeFigureOut">
               <a:rPr lang="sv-SE" smtClean="0"/>
-              <a:t>2024-07-23</a:t>
+              <a:t>2024-07-28</a:t>
             </a:fld>
             <a:endParaRPr lang="sv-SE"/>
           </a:p>
@@ -7216,7 +7216,7 @@
         <p:spPr>
           <a:xfrm>
             <a:off x="312320" y="1456437"/>
-            <a:ext cx="3274288" cy="2800767"/>
+            <a:ext cx="3274288" cy="3046988"/>
           </a:xfrm>
           <a:prstGeom prst="rect">
             <a:avLst/>
@@ -7439,6 +7439,23 @@
             <a:r>
               <a:rPr lang="en-US" sz="800" noProof="1"/>
               <a:t>.dark (true if dark mode, false if light mode)</a:t>
+            </a:r>
+          </a:p>
+          <a:p>
+            <a:pPr marL="324000" lvl="1" indent="-171450">
+              <a:buFont typeface="Arial" panose="020B0604020202020204" pitchFamily="34" charset="0"/>
+              <a:buChar char="•"/>
+            </a:pPr>
+            <a:r>
+              <a:rPr lang="en-US" sz="800" noProof="1"/>
+              <a:t>. helpWindow, .settings, . fileListWindow, … </a:t>
+            </a:r>
+            <a:br>
+              <a:rPr lang="en-US" sz="800" noProof="1"/>
+            </a:br>
+            <a:r>
+              <a:rPr lang="en-US" sz="800" noProof="1"/>
+              <a:t>(true if open, false if closed – used to avoid duplicate windows)</a:t>
             </a:r>
           </a:p>
         </p:txBody>
@@ -8508,169 +8525,6 @@
             <a:r>
               <a:rPr lang="en-US" sz="2400" b="1" noProof="1"/>
               <a:t>GUI update mechanism</a:t>
-            </a:r>
-          </a:p>
-        </p:txBody>
-      </p:sp>
-      <p:sp>
-        <p:nvSpPr>
-          <p:cNvPr id="7" name="textruta 6">
-            <a:extLst>
-              <a:ext uri="{FF2B5EF4-FFF2-40B4-BE49-F238E27FC236}">
-                <a16:creationId xmlns:a16="http://schemas.microsoft.com/office/drawing/2014/main" id="{BEC0FE79-3F6D-FF49-8DC3-8F9F0A9E1D2B}"/>
-              </a:ext>
-            </a:extLst>
-          </p:cNvPr>
-          <p:cNvSpPr txBox="1"/>
-          <p:nvPr/>
-        </p:nvSpPr>
-        <p:spPr>
-          <a:xfrm>
-            <a:off x="4081166" y="1545040"/>
-            <a:ext cx="3274288" cy="2062103"/>
-          </a:xfrm>
-          <a:prstGeom prst="rect">
-            <a:avLst/>
-          </a:prstGeom>
-          <a:noFill/>
-          <a:ln>
-            <a:solidFill>
-              <a:schemeClr val="accent1"/>
-            </a:solidFill>
-          </a:ln>
-        </p:spPr>
-        <p:txBody>
-          <a:bodyPr wrap="square" rtlCol="0">
-            <a:spAutoFit/>
-          </a:bodyPr>
-          <a:lstStyle/>
-          <a:p>
-            <a:r>
-              <a:rPr lang="en-US" sz="800" b="1" noProof="1"/>
-              <a:t>Windows menu (MacOS only):</a:t>
-            </a:r>
-            <a:br>
-              <a:rPr lang="en-US" sz="800" b="1" noProof="1"/>
-            </a:br>
-            <a:endParaRPr lang="en-US" sz="800" b="1" noProof="1"/>
-          </a:p>
-          <a:p>
-            <a:pPr marL="171450" indent="-171450">
-              <a:buFont typeface="Courier New" panose="02070309020205020404" pitchFamily="49" charset="0"/>
-              <a:buChar char="o"/>
-            </a:pPr>
-            <a:r>
-              <a:rPr lang="en-US" sz="800" noProof="1">
-                <a:solidFill>
-                  <a:schemeClr val="accent1"/>
-                </a:solidFill>
-              </a:rPr>
-              <a:t>initializeWindowMenu</a:t>
-            </a:r>
-            <a:r>
-              <a:rPr lang="en-US" sz="800" noProof="1"/>
-              <a:t>: creates default MacOs menu in native language. Windows menu is recreated</a:t>
-            </a:r>
-            <a:br>
-              <a:rPr lang="en-US" sz="800" noProof="1"/>
-            </a:br>
-            <a:endParaRPr lang="en-US" sz="800" noProof="1"/>
-          </a:p>
-          <a:p>
-            <a:pPr marL="171450" indent="-171450">
-              <a:buFont typeface="Courier New" panose="02070309020205020404" pitchFamily="49" charset="0"/>
-              <a:buChar char="o"/>
-            </a:pPr>
-            <a:r>
-              <a:rPr lang="en-US" sz="800" noProof="1">
-                <a:solidFill>
-                  <a:schemeClr val="accent1"/>
-                </a:solidFill>
-              </a:rPr>
-              <a:t>addWindowMenu</a:t>
-            </a:r>
-            <a:r>
-              <a:rPr lang="en-US" sz="800" noProof="1"/>
-              <a:t> : stores the submenu handle with the title as key window_menu_handles_mapping[title]</a:t>
-            </a:r>
-            <a:br>
-              <a:rPr lang="en-US" sz="800" noProof="1"/>
-            </a:br>
-            <a:endParaRPr lang="en-US" sz="800" noProof="1"/>
-          </a:p>
-          <a:p>
-            <a:pPr marL="171450" indent="-171450">
-              <a:buFont typeface="Courier New" panose="02070309020205020404" pitchFamily="49" charset="0"/>
-              <a:buChar char="o"/>
-            </a:pPr>
-            <a:r>
-              <a:rPr lang="en-US" sz="800" noProof="1">
-                <a:solidFill>
-                  <a:schemeClr val="accent1"/>
-                </a:solidFill>
-              </a:rPr>
-              <a:t>deleteWindowMenu </a:t>
-            </a:r>
-            <a:r>
-              <a:rPr lang="en-US" sz="800" noProof="1"/>
-              <a:t>: close using window title to find submenu handle.  </a:t>
-            </a:r>
-            <a:br>
-              <a:rPr lang="en-US" sz="800" noProof="1"/>
-            </a:br>
-            <a:endParaRPr lang="en-US" sz="800" noProof="1"/>
-          </a:p>
-          <a:p>
-            <a:pPr marL="171450" indent="-171450">
-              <a:buFont typeface="Courier New" panose="02070309020205020404" pitchFamily="49" charset="0"/>
-              <a:buChar char="o"/>
-            </a:pPr>
-            <a:r>
-              <a:rPr lang="en-US" sz="800" noProof="1">
-                <a:solidFill>
-                  <a:schemeClr val="accent1"/>
-                </a:solidFill>
-              </a:rPr>
-              <a:t>gui.Window.getAll</a:t>
-            </a:r>
-            <a:r>
-              <a:rPr lang="en-US" sz="800" noProof="1"/>
-              <a:t> is used several places to find open windows (and child windows that are not supposed to be in the windows menu).  A function is called that iterates each found window, and performs the action.  See ‘minimizeWindow’, ‘closeAllWindows’, ‘hideAllWindows’,’ showAllWindows’</a:t>
-            </a:r>
-          </a:p>
-        </p:txBody>
-      </p:sp>
-      <p:sp>
-        <p:nvSpPr>
-          <p:cNvPr id="8" name="textruta 7">
-            <a:extLst>
-              <a:ext uri="{FF2B5EF4-FFF2-40B4-BE49-F238E27FC236}">
-                <a16:creationId xmlns:a16="http://schemas.microsoft.com/office/drawing/2014/main" id="{8BD32A55-702C-7840-9BFF-A54EF5044CE8}"/>
-              </a:ext>
-            </a:extLst>
-          </p:cNvPr>
-          <p:cNvSpPr txBox="1"/>
-          <p:nvPr/>
-        </p:nvSpPr>
-        <p:spPr>
-          <a:xfrm>
-            <a:off x="3998060" y="953256"/>
-            <a:ext cx="3974871" cy="461665"/>
-          </a:xfrm>
-          <a:prstGeom prst="rect">
-            <a:avLst/>
-          </a:prstGeom>
-          <a:noFill/>
-        </p:spPr>
-        <p:txBody>
-          <a:bodyPr wrap="none" rtlCol="0">
-            <a:spAutoFit/>
-          </a:bodyPr>
-          <a:lstStyle/>
-          <a:p>
-            <a:r>
-              <a:rPr lang="en-US" sz="2400" b="1" noProof="1"/>
-              <a:t>Windows menu (MacOS only)</a:t>
             </a:r>
           </a:p>
         </p:txBody>
@@ -13636,6 +13490,407 @@
           </a:p>
         </p:txBody>
       </p:sp>
+      <p:sp>
+        <p:nvSpPr>
+          <p:cNvPr id="6" name="textruta 5">
+            <a:extLst>
+              <a:ext uri="{FF2B5EF4-FFF2-40B4-BE49-F238E27FC236}">
+                <a16:creationId xmlns:a16="http://schemas.microsoft.com/office/drawing/2014/main" id="{A188559A-F5E8-46DD-F138-41217EC70A89}"/>
+              </a:ext>
+            </a:extLst>
+          </p:cNvPr>
+          <p:cNvSpPr txBox="1"/>
+          <p:nvPr/>
+        </p:nvSpPr>
+        <p:spPr>
+          <a:xfrm>
+            <a:off x="8256717" y="4608845"/>
+            <a:ext cx="3274288" cy="2554545"/>
+          </a:xfrm>
+          <a:prstGeom prst="rect">
+            <a:avLst/>
+          </a:prstGeom>
+          <a:noFill/>
+          <a:ln>
+            <a:solidFill>
+              <a:schemeClr val="accent1"/>
+            </a:solidFill>
+          </a:ln>
+        </p:spPr>
+        <p:txBody>
+          <a:bodyPr wrap="square" rtlCol="0">
+            <a:spAutoFit/>
+          </a:bodyPr>
+          <a:lstStyle/>
+          <a:p>
+            <a:r>
+              <a:rPr lang="en-US" sz="800" b="1" noProof="1"/>
+              <a:t>Windows menu (MacOS only):</a:t>
+            </a:r>
+            <a:br>
+              <a:rPr lang="en-US" sz="800" b="1" noProof="1"/>
+            </a:br>
+            <a:endParaRPr lang="en-US" sz="800" b="1" noProof="1"/>
+          </a:p>
+          <a:p>
+            <a:pPr marL="171450" indent="-171450">
+              <a:buFont typeface="Courier New" panose="02070309020205020404" pitchFamily="49" charset="0"/>
+              <a:buChar char="o"/>
+            </a:pPr>
+            <a:r>
+              <a:rPr lang="en-US" sz="800" noProof="1">
+                <a:solidFill>
+                  <a:schemeClr val="accent1"/>
+                </a:solidFill>
+              </a:rPr>
+              <a:t>initializeWindowMenu</a:t>
+            </a:r>
+            <a:r>
+              <a:rPr lang="en-US" sz="800" noProof="1"/>
+              <a:t>: creates default MacOs menu in native language. Windows menu is recreated</a:t>
+            </a:r>
+            <a:br>
+              <a:rPr lang="en-US" sz="800" noProof="1"/>
+            </a:br>
+            <a:endParaRPr lang="en-US" sz="800" noProof="1"/>
+          </a:p>
+          <a:p>
+            <a:pPr marL="171450" indent="-171450">
+              <a:buFont typeface="Courier New" panose="02070309020205020404" pitchFamily="49" charset="0"/>
+              <a:buChar char="o"/>
+            </a:pPr>
+            <a:r>
+              <a:rPr lang="en-US" sz="800" noProof="1">
+                <a:solidFill>
+                  <a:schemeClr val="accent1"/>
+                </a:solidFill>
+              </a:rPr>
+              <a:t>addWindowMenu</a:t>
+            </a:r>
+            <a:r>
+              <a:rPr lang="en-US" sz="800" noProof="1"/>
+              <a:t> : stores the submenu handle with the title as key window_menu_handles_mapping[title]</a:t>
+            </a:r>
+            <a:br>
+              <a:rPr lang="en-US" sz="800" noProof="1"/>
+            </a:br>
+            <a:endParaRPr lang="en-US" sz="800" noProof="1"/>
+          </a:p>
+          <a:p>
+            <a:pPr marL="171450" indent="-171450">
+              <a:buFont typeface="Courier New" panose="02070309020205020404" pitchFamily="49" charset="0"/>
+              <a:buChar char="o"/>
+            </a:pPr>
+            <a:r>
+              <a:rPr lang="en-US" sz="800" noProof="1">
+                <a:solidFill>
+                  <a:schemeClr val="accent1"/>
+                </a:solidFill>
+              </a:rPr>
+              <a:t>deleteWindowMenu </a:t>
+            </a:r>
+            <a:r>
+              <a:rPr lang="en-US" sz="800" noProof="1"/>
+              <a:t>: close using window title to find submenu handle.  </a:t>
+            </a:r>
+            <a:br>
+              <a:rPr lang="en-US" sz="800" noProof="1"/>
+            </a:br>
+            <a:endParaRPr lang="en-US" sz="800" noProof="1"/>
+          </a:p>
+          <a:p>
+            <a:pPr marL="171450" indent="-171450">
+              <a:buFont typeface="Courier New" panose="02070309020205020404" pitchFamily="49" charset="0"/>
+              <a:buChar char="o"/>
+            </a:pPr>
+            <a:r>
+              <a:rPr lang="en-US" sz="800" noProof="1">
+                <a:solidFill>
+                  <a:schemeClr val="accent1"/>
+                </a:solidFill>
+              </a:rPr>
+              <a:t>recreateAllWindowsMenu </a:t>
+            </a:r>
+            <a:r>
+              <a:rPr lang="en-US" sz="800" noProof="1"/>
+              <a:t>: generates a populated MacOS window menu from scratch (used by Main when restarting after Settings scale change) </a:t>
+            </a:r>
+          </a:p>
+          <a:p>
+            <a:pPr marL="171450" indent="-171450">
+              <a:buFont typeface="Courier New" panose="02070309020205020404" pitchFamily="49" charset="0"/>
+              <a:buChar char="o"/>
+            </a:pPr>
+            <a:endParaRPr lang="en-US" sz="800" noProof="1"/>
+          </a:p>
+          <a:p>
+            <a:pPr marL="171450" indent="-171450">
+              <a:buFont typeface="Courier New" panose="02070309020205020404" pitchFamily="49" charset="0"/>
+              <a:buChar char="o"/>
+            </a:pPr>
+            <a:r>
+              <a:rPr lang="en-US" sz="800" noProof="1">
+                <a:solidFill>
+                  <a:schemeClr val="accent1"/>
+                </a:solidFill>
+              </a:rPr>
+              <a:t>gui.Window.getAll</a:t>
+            </a:r>
+            <a:r>
+              <a:rPr lang="en-US" sz="800" noProof="1"/>
+              <a:t> is used several places to find open windows (and child windows that are not supposed to be in the windows menu).  A function is called that iterates each found window, and performs the action.  See ‘minimizeWindow’, ‘closeAllWindows’, ‘hideAllWindows’,’ showAllWindows’</a:t>
+            </a:r>
+          </a:p>
+        </p:txBody>
+      </p:sp>
+      <p:sp>
+        <p:nvSpPr>
+          <p:cNvPr id="7" name="textruta 6">
+            <a:extLst>
+              <a:ext uri="{FF2B5EF4-FFF2-40B4-BE49-F238E27FC236}">
+                <a16:creationId xmlns:a16="http://schemas.microsoft.com/office/drawing/2014/main" id="{4108F045-DC67-5945-2D67-046A62557881}"/>
+              </a:ext>
+            </a:extLst>
+          </p:cNvPr>
+          <p:cNvSpPr txBox="1"/>
+          <p:nvPr/>
+        </p:nvSpPr>
+        <p:spPr>
+          <a:xfrm>
+            <a:off x="8173611" y="4017061"/>
+            <a:ext cx="3974871" cy="461665"/>
+          </a:xfrm>
+          <a:prstGeom prst="rect">
+            <a:avLst/>
+          </a:prstGeom>
+          <a:noFill/>
+        </p:spPr>
+        <p:txBody>
+          <a:bodyPr wrap="none" rtlCol="0">
+            <a:spAutoFit/>
+          </a:bodyPr>
+          <a:lstStyle/>
+          <a:p>
+            <a:r>
+              <a:rPr lang="en-US" sz="2400" b="1" noProof="1"/>
+              <a:t>Windows menu (MacOS only)</a:t>
+            </a:r>
+          </a:p>
+        </p:txBody>
+      </p:sp>
+      <p:sp>
+        <p:nvSpPr>
+          <p:cNvPr id="8" name="textruta 7">
+            <a:extLst>
+              <a:ext uri="{FF2B5EF4-FFF2-40B4-BE49-F238E27FC236}">
+                <a16:creationId xmlns:a16="http://schemas.microsoft.com/office/drawing/2014/main" id="{C2961014-07D4-C6A9-2F8B-DEB31EC6254D}"/>
+              </a:ext>
+            </a:extLst>
+          </p:cNvPr>
+          <p:cNvSpPr txBox="1"/>
+          <p:nvPr/>
+        </p:nvSpPr>
+        <p:spPr>
+          <a:xfrm>
+            <a:off x="8256717" y="1376136"/>
+            <a:ext cx="3274288" cy="2431435"/>
+          </a:xfrm>
+          <a:prstGeom prst="rect">
+            <a:avLst/>
+          </a:prstGeom>
+          <a:noFill/>
+          <a:ln>
+            <a:solidFill>
+              <a:schemeClr val="accent1"/>
+            </a:solidFill>
+          </a:ln>
+        </p:spPr>
+        <p:txBody>
+          <a:bodyPr wrap="square" rtlCol="0">
+            <a:spAutoFit/>
+          </a:bodyPr>
+          <a:lstStyle/>
+          <a:p>
+            <a:r>
+              <a:rPr lang="en-US" sz="800" b="1" noProof="1"/>
+              <a:t>Windows opened from Main, Settings</a:t>
+            </a:r>
+            <a:br>
+              <a:rPr lang="en-US" sz="800" b="1" noProof="1"/>
+            </a:br>
+            <a:endParaRPr lang="en-US" sz="800" b="1" noProof="1"/>
+          </a:p>
+          <a:p>
+            <a:pPr marL="171450" indent="-171450">
+              <a:buFont typeface="Courier New" panose="02070309020205020404" pitchFamily="49" charset="0"/>
+              <a:buChar char="o"/>
+            </a:pPr>
+            <a:r>
+              <a:rPr lang="en-US" sz="800" noProof="1"/>
+              <a:t>.</a:t>
+            </a:r>
+            <a:r>
+              <a:rPr lang="en-US" sz="800" noProof="1">
+                <a:solidFill>
+                  <a:schemeClr val="accent1"/>
+                </a:solidFill>
+              </a:rPr>
+              <a:t> localState </a:t>
+            </a:r>
+            <a:r>
+              <a:rPr lang="en-US" sz="800" noProof="1"/>
+              <a:t>(transient info) :</a:t>
+            </a:r>
+            <a:br>
+              <a:rPr lang="en-US" sz="800" noProof="1"/>
+            </a:br>
+            <a:r>
+              <a:rPr lang="en-US" sz="800" noProof="1"/>
+              <a:t> helpWindow, .settings, . fileListWindow, …</a:t>
+            </a:r>
+            <a:br>
+              <a:rPr lang="en-US" sz="800" noProof="1"/>
+            </a:br>
+            <a:r>
+              <a:rPr lang="en-US" sz="800" noProof="1"/>
+              <a:t>(true if window is open, false if closed)</a:t>
+            </a:r>
+            <a:br>
+              <a:rPr lang="en-US" sz="800" noProof="1"/>
+            </a:br>
+            <a:endParaRPr lang="en-US" sz="800" noProof="1"/>
+          </a:p>
+          <a:p>
+            <a:pPr marL="171450" indent="-171450">
+              <a:buFont typeface="Courier New" panose="02070309020205020404" pitchFamily="49" charset="0"/>
+              <a:buChar char="o"/>
+            </a:pPr>
+            <a:r>
+              <a:rPr lang="en-US" sz="800" noProof="1"/>
+              <a:t>External windows are opened hidden, with option ’show: false’</a:t>
+            </a:r>
+            <a:br>
+              <a:rPr lang="en-US" sz="800" noProof="1"/>
+            </a:br>
+            <a:r>
+              <a:rPr lang="en-US" sz="800" noProof="1"/>
+              <a:t>(to work around buggy multiple workspaces).  </a:t>
+            </a:r>
+            <a:br>
+              <a:rPr lang="en-US" sz="800" noProof="1"/>
+            </a:br>
+            <a:endParaRPr lang="en-US" sz="800" noProof="1"/>
+          </a:p>
+          <a:p>
+            <a:pPr marL="171450" indent="-171450">
+              <a:buFont typeface="Courier New" panose="02070309020205020404" pitchFamily="49" charset="0"/>
+              <a:buChar char="o"/>
+            </a:pPr>
+            <a:r>
+              <a:rPr lang="en-US" sz="800" noProof="1">
+                <a:solidFill>
+                  <a:schemeClr val="accent1"/>
+                </a:solidFill>
+              </a:rPr>
+              <a:t>showWindow(win) </a:t>
+            </a:r>
+            <a:r>
+              <a:rPr lang="en-US" sz="800" noProof="1"/>
+              <a:t>is used to show hidden window.   </a:t>
+            </a:r>
+          </a:p>
+          <a:p>
+            <a:pPr marL="355600" lvl="1" indent="-177800">
+              <a:buFont typeface="Arial" panose="020B0604020202020204" pitchFamily="34" charset="0"/>
+              <a:buChar char="•"/>
+            </a:pPr>
+            <a:r>
+              <a:rPr lang="en-US" sz="800" noProof="1"/>
+              <a:t>Called from 'loaded’ event, when opening new window using ‘nw.Window.open’.   </a:t>
+            </a:r>
+          </a:p>
+          <a:p>
+            <a:pPr marL="355600" lvl="1" indent="-177800">
+              <a:buFont typeface="Arial" panose="020B0604020202020204" pitchFamily="34" charset="0"/>
+              <a:buChar char="•"/>
+            </a:pPr>
+            <a:r>
+              <a:rPr lang="en-US" sz="800" noProof="1"/>
+              <a:t>See two versions in ‘app.js’:</a:t>
+            </a:r>
+            <a:br>
+              <a:rPr lang="en-US" sz="800" noProof="1"/>
+            </a:br>
+            <a:r>
+              <a:rPr lang="en-US" sz="800" noProof="1"/>
+              <a:t>- callback’, case statement 'clicked-notes’</a:t>
+            </a:r>
+            <a:br>
+              <a:rPr lang="en-US" sz="800" noProof="1"/>
+            </a:br>
+            <a:r>
+              <a:rPr lang="en-US" sz="800" noProof="1"/>
+              <a:t>or</a:t>
+            </a:r>
+            <a:br>
+              <a:rPr lang="en-US" sz="800" noProof="1"/>
+            </a:br>
+            <a:r>
+              <a:rPr lang="en-US" sz="800" noProof="1"/>
+              <a:t>- ‘showAbout’ function</a:t>
+            </a:r>
+          </a:p>
+          <a:p>
+            <a:pPr marL="355600" lvl="1" indent="-177800">
+              <a:buFont typeface="Arial" panose="020B0604020202020204" pitchFamily="34" charset="0"/>
+              <a:buChar char="•"/>
+            </a:pPr>
+            <a:r>
+              <a:rPr lang="en-US" sz="800" noProof="1"/>
+              <a:t>Two ways to handle multiple windows (MacOS and Linux behaves differently)</a:t>
+            </a:r>
+            <a:br>
+              <a:rPr lang="en-US" sz="800" noProof="1"/>
+            </a:br>
+            <a:endParaRPr lang="en-US" sz="800" noProof="1"/>
+          </a:p>
+        </p:txBody>
+      </p:sp>
+      <p:sp>
+        <p:nvSpPr>
+          <p:cNvPr id="9" name="textruta 8">
+            <a:extLst>
+              <a:ext uri="{FF2B5EF4-FFF2-40B4-BE49-F238E27FC236}">
+                <a16:creationId xmlns:a16="http://schemas.microsoft.com/office/drawing/2014/main" id="{279F5223-2ED1-3322-DF84-D0ED0C8FE18E}"/>
+              </a:ext>
+            </a:extLst>
+          </p:cNvPr>
+          <p:cNvSpPr txBox="1"/>
+          <p:nvPr/>
+        </p:nvSpPr>
+        <p:spPr>
+          <a:xfrm>
+            <a:off x="8173611" y="784352"/>
+            <a:ext cx="3523400" cy="461665"/>
+          </a:xfrm>
+          <a:prstGeom prst="rect">
+            <a:avLst/>
+          </a:prstGeom>
+          <a:noFill/>
+        </p:spPr>
+        <p:txBody>
+          <a:bodyPr wrap="none" rtlCol="0">
+            <a:spAutoFit/>
+          </a:bodyPr>
+          <a:lstStyle/>
+          <a:p>
+            <a:r>
+              <a:rPr lang="en-US" sz="2400" b="1" noProof="1"/>
+              <a:t>External Windows general</a:t>
+            </a:r>
+          </a:p>
+        </p:txBody>
+      </p:sp>
     </p:spTree>
     <p:extLst>
       <p:ext uri="{BB962C8B-B14F-4D97-AF65-F5344CB8AC3E}">
@@ -13720,7 +13975,7 @@
         <p:spPr>
           <a:xfrm>
             <a:off x="401904" y="1545040"/>
-            <a:ext cx="3274288" cy="2431435"/>
+            <a:ext cx="3274288" cy="3539430"/>
           </a:xfrm>
           <a:prstGeom prst="rect">
             <a:avLst/>
@@ -13753,15 +14008,29 @@
               <a:buChar char="o"/>
             </a:pPr>
             <a:r>
-              <a:rPr lang="en-US" sz="800" noProof="1"/>
-              <a:t>debug = true (git debug env variables in main)</a:t>
+              <a:rPr lang="en-US" sz="800" noProof="1">
+                <a:latin typeface="Courier New" panose="02070309020205020404" pitchFamily="49" charset="0"/>
+                <a:cs typeface="Courier New" panose="02070309020205020404" pitchFamily="49" charset="0"/>
+              </a:rPr>
+              <a:t>debug = true </a:t>
+            </a:r>
+            <a:r>
+              <a:rPr lang="en-US" sz="800" noProof="1"/>
+              <a:t>(git debug env variables in main)</a:t>
             </a:r>
             <a:br>
               <a:rPr lang="en-US" sz="800" noProof="1"/>
             </a:br>
             <a:r>
-              <a:rPr lang="en-US" sz="800" noProof="1"/>
-              <a:t>graph.debug = true (graph layout debug info)</a:t>
+              <a:rPr lang="en-US" sz="800" noProof="1">
+                <a:latin typeface="Courier New" panose="02070309020205020404" pitchFamily="49" charset="0"/>
+                <a:cs typeface="Courier New" panose="02070309020205020404" pitchFamily="49" charset="0"/>
+              </a:rPr>
+              <a:t>graph.debug = true </a:t>
+            </a:r>
+            <a:r>
+              <a:rPr lang="en-US" sz="800" noProof="1"/>
+              <a:t>(graph layout debug info)</a:t>
             </a:r>
           </a:p>
           <a:p>
@@ -13774,7 +14043,7 @@
           <a:p>
             <a:r>
               <a:rPr lang="en-US" sz="800" b="1" noProof="1"/>
-              <a:t>Chrome debug, press F12</a:t>
+              <a:t>Debug console, press F12 (if nwjs SDK version)</a:t>
             </a:r>
           </a:p>
           <a:p>
@@ -13783,7 +14052,7 @@
           <a:p>
             <a:r>
               <a:rPr lang="en-US" sz="800" b="1" noProof="1"/>
-              <a:t>Break debug on condition</a:t>
+              <a:t>Chrome  remote debug (useful if gui doesn’t open)</a:t>
             </a:r>
           </a:p>
           <a:p>
@@ -13793,21 +14062,20 @@
             </a:pPr>
             <a:r>
               <a:rPr lang="en-US" sz="800" noProof="1"/>
-              <a:t>conditional break point : </a:t>
+              <a:t>Start with flag:</a:t>
             </a:r>
             <a:br>
-              <a:rPr lang="en-US" sz="800" noProof="1"/>
+              <a:rPr lang="en-US" sz="800" noProof="1">
+                <a:latin typeface="Courier New" panose="02070309020205020404" pitchFamily="49" charset="0"/>
+                <a:cs typeface="Courier New" panose="02070309020205020404" pitchFamily="49" charset="0"/>
+              </a:rPr>
             </a:br>
             <a:r>
-              <a:rPr lang="en-US" sz="800" noProof="1"/>
-              <a:t>make break point</a:t>
-            </a:r>
-            <a:br>
-              <a:rPr lang="en-US" sz="800" noProof="1"/>
-            </a:br>
-            <a:r>
-              <a:rPr lang="en-US" sz="800" noProof="1"/>
-              <a:t>right-click and make condition</a:t>
+              <a:rPr lang="en-US" sz="800" noProof="1">
+                <a:latin typeface="Courier New" panose="02070309020205020404" pitchFamily="49" charset="0"/>
+                <a:cs typeface="Courier New" panose="02070309020205020404" pitchFamily="49" charset="0"/>
+              </a:rPr>
+              <a:t>/Applications/nwjs.app/Contents/MacOS/nwjs  --remote-debugging-port=9222 .</a:t>
             </a:r>
           </a:p>
           <a:p>
@@ -13817,14 +14085,20 @@
             </a:pPr>
             <a:r>
               <a:rPr lang="en-US" sz="800" noProof="1"/>
-              <a:t>graph:  “stop(commit) “</a:t>
+              <a:t>Or start from folder containing ‘package.json’:</a:t>
             </a:r>
             <a:br>
-              <a:rPr lang="en-US" sz="800" noProof="1"/>
+              <a:rPr lang="en-US" sz="800" noProof="1">
+                <a:latin typeface="Courier New" panose="02070309020205020404" pitchFamily="49" charset="0"/>
+                <a:cs typeface="Courier New" panose="02070309020205020404" pitchFamily="49" charset="0"/>
+              </a:rPr>
             </a:br>
             <a:r>
-              <a:rPr lang="en-US" sz="800" noProof="1"/>
-              <a:t>stops on marked commit in graph window</a:t>
+              <a:rPr lang="en-US" sz="800" noProof="1">
+                <a:latin typeface="Courier New" panose="02070309020205020404" pitchFamily="49" charset="0"/>
+                <a:cs typeface="Courier New" panose="02070309020205020404" pitchFamily="49" charset="0"/>
+              </a:rPr>
+              <a:t>npm start</a:t>
             </a:r>
           </a:p>
           <a:p>
@@ -13832,23 +14106,111 @@
               <a:buFont typeface="Courier New" panose="02070309020205020404" pitchFamily="49" charset="0"/>
               <a:buChar char="o"/>
             </a:pPr>
+            <a:r>
+              <a:rPr lang="en-US" sz="800" noProof="1"/>
+              <a:t>Chrome browser:</a:t>
+            </a:r>
+            <a:br>
+              <a:rPr lang="en-US" sz="800" noProof="1"/>
+            </a:br>
+            <a:r>
+              <a:rPr lang="en-US" sz="800" noProof="1">
+                <a:latin typeface="Courier New" panose="02070309020205020404" pitchFamily="49" charset="0"/>
+                <a:cs typeface="Courier New" panose="02070309020205020404" pitchFamily="49" charset="0"/>
+              </a:rPr>
+              <a:t>chrome://inspect</a:t>
+            </a:r>
             <a:endParaRPr lang="en-US" sz="800" noProof="1"/>
-          </a:p>
-          <a:p>
-            <a:r>
-              <a:rPr lang="en-US" sz="800" noProof="1"/>
-              <a:t>Reload window</a:t>
-            </a:r>
-            <a:endParaRPr lang="en-US" sz="800" b="1" noProof="1"/>
           </a:p>
           <a:p>
             <a:pPr marL="171450" indent="-171450">
               <a:buFont typeface="Courier New" panose="02070309020205020404" pitchFamily="49" charset="0"/>
               <a:buChar char="o"/>
             </a:pPr>
-            <a:r>
-              <a:rPr lang="en-US" sz="800" noProof="1"/>
-              <a:t>typically from debug console: injectIntoJs(document)</a:t>
+            <a:endParaRPr lang="en-US" sz="800" b="1" noProof="1"/>
+          </a:p>
+          <a:p>
+            <a:r>
+              <a:rPr lang="en-US" sz="800" b="1" noProof="1"/>
+              <a:t>Break debug on condition</a:t>
+            </a:r>
+          </a:p>
+          <a:p>
+            <a:pPr marL="171450" indent="-171450">
+              <a:buFont typeface="Courier New" panose="02070309020205020404" pitchFamily="49" charset="0"/>
+              <a:buChar char="o"/>
+            </a:pPr>
+            <a:r>
+              <a:rPr lang="en-US" sz="800" noProof="1"/>
+              <a:t>Conditional break point : </a:t>
+            </a:r>
+            <a:br>
+              <a:rPr lang="en-US" sz="800" noProof="1"/>
+            </a:br>
+            <a:r>
+              <a:rPr lang="en-US" sz="800" noProof="1"/>
+              <a:t>make break point</a:t>
+            </a:r>
+            <a:br>
+              <a:rPr lang="en-US" sz="800" noProof="1"/>
+            </a:br>
+            <a:r>
+              <a:rPr lang="en-US" sz="800" noProof="1"/>
+              <a:t>right-click and make condition</a:t>
+            </a:r>
+          </a:p>
+          <a:p>
+            <a:pPr marL="171450" indent="-171450">
+              <a:buFont typeface="Courier New" panose="02070309020205020404" pitchFamily="49" charset="0"/>
+              <a:buChar char="o"/>
+            </a:pPr>
+            <a:r>
+              <a:rPr lang="en-US" sz="800" noProof="1"/>
+              <a:t>For graph, conditional break point:  </a:t>
+            </a:r>
+            <a:r>
+              <a:rPr lang="en-US" sz="800" noProof="1">
+                <a:latin typeface="Courier New" panose="02070309020205020404" pitchFamily="49" charset="0"/>
+                <a:cs typeface="Courier New" panose="02070309020205020404" pitchFamily="49" charset="0"/>
+              </a:rPr>
+              <a:t>stop(commit)</a:t>
+            </a:r>
+            <a:br>
+              <a:rPr lang="en-US" sz="800" noProof="1"/>
+            </a:br>
+            <a:r>
+              <a:rPr lang="en-US" sz="800" noProof="1"/>
+              <a:t>stops on marked commit in graph window</a:t>
+            </a:r>
+          </a:p>
+          <a:p>
+            <a:pPr marL="171450" indent="-171450">
+              <a:buFont typeface="Courier New" panose="02070309020205020404" pitchFamily="49" charset="0"/>
+              <a:buChar char="o"/>
+            </a:pPr>
+            <a:endParaRPr lang="en-US" sz="800" noProof="1"/>
+          </a:p>
+          <a:p>
+            <a:r>
+              <a:rPr lang="en-US" sz="800" b="1" noProof="1"/>
+              <a:t>Reload window</a:t>
+            </a:r>
+          </a:p>
+          <a:p>
+            <a:pPr marL="171450" indent="-171450">
+              <a:buFont typeface="Courier New" panose="02070309020205020404" pitchFamily="49" charset="0"/>
+              <a:buChar char="o"/>
+            </a:pPr>
+            <a:r>
+              <a:rPr lang="en-US" sz="800" noProof="1"/>
+              <a:t>typically from debug console: </a:t>
+            </a:r>
+            <a:r>
+              <a:rPr lang="en-US" sz="800" noProof="1">
+                <a:latin typeface="Courier New" panose="02070309020205020404" pitchFamily="49" charset="0"/>
+                <a:cs typeface="Courier New" panose="02070309020205020404" pitchFamily="49" charset="0"/>
+              </a:rPr>
+              <a:t>injectIntoJs(document)</a:t>
             </a:r>
             <a:br>
               <a:rPr lang="en-US" sz="800" noProof="1"/>
@@ -13916,7 +14278,7 @@
         <p:spPr>
           <a:xfrm>
             <a:off x="4192240" y="1545040"/>
-            <a:ext cx="3274288" cy="2554545"/>
+            <a:ext cx="3274288" cy="2185214"/>
           </a:xfrm>
           <a:prstGeom prst="rect">
             <a:avLst/>
@@ -13974,12 +14336,12 @@
             <a:br>
               <a:rPr lang="en-US" sz="800" noProof="1"/>
             </a:br>
-            <a:endParaRPr lang="en-US" sz="800" noProof="1"/>
+            <a:endParaRPr lang="en-US" sz="800" b="1" noProof="1"/>
           </a:p>
           <a:p>
             <a:r>
               <a:rPr lang="en-US" sz="800" b="1" noProof="1"/>
-              <a:t>Logging of Git commands and outputs</a:t>
+              <a:t>simpleGitLog(pwd) </a:t>
             </a:r>
           </a:p>
           <a:p>
@@ -13989,30 +14351,14 @@
             </a:pPr>
             <a:r>
               <a:rPr lang="en-US" sz="800" noProof="1"/>
-              <a:t>‘sendGitOutputToFile’ catches stdout and stderr</a:t>
+              <a:t>Drop-in replacement for simpleGit</a:t>
             </a:r>
             <a:br>
-              <a:rPr lang="en-US" sz="800" noProof="1"/>
+              <a:rPr lang="en-US" sz="800" b="1" noProof="1"/>
             </a:br>
             <a:r>
               <a:rPr lang="en-US" sz="800" noProof="1"/>
-              <a:t>writes out the git command</a:t>
-            </a:r>
-            <a:br>
-              <a:rPr lang="en-US" sz="800" noProof="1"/>
-            </a:br>
-            <a:r>
-              <a:rPr lang="en-US" sz="800" noProof="1"/>
-              <a:t>uses pragmaLog internally</a:t>
-            </a:r>
-          </a:p>
-          <a:p>
-            <a:endParaRPr lang="en-US" sz="800" b="1" noProof="1"/>
-          </a:p>
-          <a:p>
-            <a:r>
-              <a:rPr lang="en-US" sz="800" b="1" noProof="1"/>
-              <a:t>simpleGitLog(pwd) </a:t>
+              <a:t>takes one argument (I always populate it as the path to the git repo)</a:t>
             </a:r>
           </a:p>
           <a:p>
@@ -14022,14 +14368,7 @@
             </a:pPr>
             <a:r>
               <a:rPr lang="en-US" sz="800" noProof="1"/>
-              <a:t>dropin replacement for simpleGit</a:t>
-            </a:r>
-            <a:br>
-              <a:rPr lang="en-US" sz="800" b="1" noProof="1"/>
-            </a:br>
-            <a:r>
-              <a:rPr lang="en-US" sz="800" noProof="1"/>
-              <a:t>takes one argument (I always populate it as the path to the git repo)</a:t>
+              <a:t>Uses function ‘sendGitOutputToFile’ to write git command, stdout, stderr. Function pragmaLog is used to print to log file</a:t>
             </a:r>
           </a:p>
           <a:p>
@@ -14169,18 +14508,25 @@
             </a:pPr>
             <a:r>
               <a:rPr lang="en-US" sz="800" noProof="1"/>
-              <a:t>Use flag when running nw.exe :   --remote-debugging-port=9222</a:t>
+              <a:t>Use flag when running </a:t>
             </a:r>
             <a:br>
               <a:rPr lang="en-US" sz="800" noProof="1"/>
             </a:br>
             <a:r>
+              <a:rPr lang="en-US" sz="800" noProof="1">
+                <a:latin typeface="Courier New" panose="02070309020205020404" pitchFamily="49" charset="0"/>
+                <a:cs typeface="Courier New" panose="02070309020205020404" pitchFamily="49" charset="0"/>
+              </a:rPr>
+              <a:t>nw.exe :   --remote-debugging-port=9222</a:t>
+            </a:r>
+            <a:br>
+              <a:rPr lang="en-US" sz="800" noProof="1"/>
+            </a:br>
+            <a:r>
               <a:rPr lang="en-US" sz="800" noProof="1"/>
               <a:t>can then open with Chrome browser:</a:t>
             </a:r>
-            <a:br>
-              <a:rPr lang="en-US" sz="800" noProof="1"/>
-            </a:br>
             <a:br>
               <a:rPr lang="en-US" sz="800" noProof="1"/>
             </a:br>
@@ -14305,14 +14651,21 @@
             </a:br>
             <a:r>
               <a:rPr lang="en-US" sz="800" noProof="1"/>
-              <a:t>settings.json </a:t>
+              <a:t>‘settings.json’ contains  </a:t>
             </a:r>
             <a:br>
               <a:rPr lang="en-US" sz="800" noProof="1"/>
             </a:br>
             <a:r>
               <a:rPr lang="en-US" sz="800" noProof="1"/>
-              <a:t>	allowPrerelease = true</a:t>
+              <a:t>	</a:t>
+            </a:r>
+            <a:r>
+              <a:rPr lang="en-US" sz="800" noProof="1">
+                <a:latin typeface="Courier New" panose="02070309020205020404" pitchFamily="49" charset="0"/>
+                <a:cs typeface="Courier New" panose="02070309020205020404" pitchFamily="49" charset="0"/>
+              </a:rPr>
+              <a:t>allowPrerelease = true</a:t>
             </a:r>
             <a:br>
               <a:rPr lang="en-US" sz="800" noProof="1"/>

</xml_diff>

<commit_message>
Make 'multiPlatformExecSync' mode with timeout, and getCredential function
</commit_message>
<xml_diff>
--- a/docs/Tech-overview.pptx
+++ b/docs/Tech-overview.pptx
@@ -262,7 +262,7 @@
           <a:p>
             <a:fld id="{CA855E1B-8830-B64E-B102-DB2BBD0D9567}" type="datetimeFigureOut">
               <a:rPr lang="sv-SE" smtClean="0"/>
-              <a:t>2024-07-28</a:t>
+              <a:t>2024-09-28</a:t>
             </a:fld>
             <a:endParaRPr lang="sv-SE"/>
           </a:p>
@@ -432,7 +432,7 @@
           <a:p>
             <a:fld id="{CA855E1B-8830-B64E-B102-DB2BBD0D9567}" type="datetimeFigureOut">
               <a:rPr lang="sv-SE" smtClean="0"/>
-              <a:t>2024-07-28</a:t>
+              <a:t>2024-09-28</a:t>
             </a:fld>
             <a:endParaRPr lang="sv-SE"/>
           </a:p>
@@ -612,7 +612,7 @@
           <a:p>
             <a:fld id="{CA855E1B-8830-B64E-B102-DB2BBD0D9567}" type="datetimeFigureOut">
               <a:rPr lang="sv-SE" smtClean="0"/>
-              <a:t>2024-07-28</a:t>
+              <a:t>2024-09-28</a:t>
             </a:fld>
             <a:endParaRPr lang="sv-SE"/>
           </a:p>
@@ -782,7 +782,7 @@
           <a:p>
             <a:fld id="{CA855E1B-8830-B64E-B102-DB2BBD0D9567}" type="datetimeFigureOut">
               <a:rPr lang="sv-SE" smtClean="0"/>
-              <a:t>2024-07-28</a:t>
+              <a:t>2024-09-28</a:t>
             </a:fld>
             <a:endParaRPr lang="sv-SE"/>
           </a:p>
@@ -1026,7 +1026,7 @@
           <a:p>
             <a:fld id="{CA855E1B-8830-B64E-B102-DB2BBD0D9567}" type="datetimeFigureOut">
               <a:rPr lang="sv-SE" smtClean="0"/>
-              <a:t>2024-07-28</a:t>
+              <a:t>2024-09-28</a:t>
             </a:fld>
             <a:endParaRPr lang="sv-SE"/>
           </a:p>
@@ -1258,7 +1258,7 @@
           <a:p>
             <a:fld id="{CA855E1B-8830-B64E-B102-DB2BBD0D9567}" type="datetimeFigureOut">
               <a:rPr lang="sv-SE" smtClean="0"/>
-              <a:t>2024-07-28</a:t>
+              <a:t>2024-09-28</a:t>
             </a:fld>
             <a:endParaRPr lang="sv-SE"/>
           </a:p>
@@ -1625,7 +1625,7 @@
           <a:p>
             <a:fld id="{CA855E1B-8830-B64E-B102-DB2BBD0D9567}" type="datetimeFigureOut">
               <a:rPr lang="sv-SE" smtClean="0"/>
-              <a:t>2024-07-28</a:t>
+              <a:t>2024-09-28</a:t>
             </a:fld>
             <a:endParaRPr lang="sv-SE"/>
           </a:p>
@@ -1743,7 +1743,7 @@
           <a:p>
             <a:fld id="{CA855E1B-8830-B64E-B102-DB2BBD0D9567}" type="datetimeFigureOut">
               <a:rPr lang="sv-SE" smtClean="0"/>
-              <a:t>2024-07-28</a:t>
+              <a:t>2024-09-28</a:t>
             </a:fld>
             <a:endParaRPr lang="sv-SE"/>
           </a:p>
@@ -1838,7 +1838,7 @@
           <a:p>
             <a:fld id="{CA855E1B-8830-B64E-B102-DB2BBD0D9567}" type="datetimeFigureOut">
               <a:rPr lang="sv-SE" smtClean="0"/>
-              <a:t>2024-07-28</a:t>
+              <a:t>2024-09-28</a:t>
             </a:fld>
             <a:endParaRPr lang="sv-SE"/>
           </a:p>
@@ -2115,7 +2115,7 @@
           <a:p>
             <a:fld id="{CA855E1B-8830-B64E-B102-DB2BBD0D9567}" type="datetimeFigureOut">
               <a:rPr lang="sv-SE" smtClean="0"/>
-              <a:t>2024-07-28</a:t>
+              <a:t>2024-09-28</a:t>
             </a:fld>
             <a:endParaRPr lang="sv-SE"/>
           </a:p>
@@ -2372,7 +2372,7 @@
           <a:p>
             <a:fld id="{CA855E1B-8830-B64E-B102-DB2BBD0D9567}" type="datetimeFigureOut">
               <a:rPr lang="sv-SE" smtClean="0"/>
-              <a:t>2024-07-28</a:t>
+              <a:t>2024-09-28</a:t>
             </a:fld>
             <a:endParaRPr lang="sv-SE"/>
           </a:p>
@@ -2585,7 +2585,7 @@
           <a:p>
             <a:fld id="{CA855E1B-8830-B64E-B102-DB2BBD0D9567}" type="datetimeFigureOut">
               <a:rPr lang="sv-SE" smtClean="0"/>
-              <a:t>2024-07-28</a:t>
+              <a:t>2024-09-28</a:t>
             </a:fld>
             <a:endParaRPr lang="sv-SE"/>
           </a:p>
@@ -11688,7 +11688,7 @@
         <p:spPr>
           <a:xfrm>
             <a:off x="6367567" y="1472403"/>
-            <a:ext cx="5396401" cy="4278094"/>
+            <a:ext cx="5396401" cy="4154984"/>
           </a:xfrm>
           <a:prstGeom prst="rect">
             <a:avLst/>
@@ -12011,10 +12011,6 @@
             </a:r>
           </a:p>
           <a:p>
-            <a:pPr marL="171450" indent="-171450">
-              <a:buFont typeface="Courier New" panose="02070309020205020404" pitchFamily="49" charset="0"/>
-              <a:buChar char="o"/>
-            </a:pPr>
             <a:endParaRPr lang="en-US" sz="800" noProof="1">
               <a:solidFill>
                 <a:schemeClr val="accent1"/>
@@ -12058,6 +12054,110 @@
                 </a:solidFill>
               </a:rPr>
               <a:t>Git-related Windows</a:t>
+            </a:r>
+          </a:p>
+        </p:txBody>
+      </p:sp>
+      <p:sp>
+        <p:nvSpPr>
+          <p:cNvPr id="2" name="Rektangel 1">
+            <a:extLst>
+              <a:ext uri="{FF2B5EF4-FFF2-40B4-BE49-F238E27FC236}">
+                <a16:creationId xmlns:a16="http://schemas.microsoft.com/office/drawing/2014/main" id="{3576E538-76CB-5AFE-74BB-1DFB53C8F813}"/>
+              </a:ext>
+            </a:extLst>
+          </p:cNvPr>
+          <p:cNvSpPr/>
+          <p:nvPr/>
+        </p:nvSpPr>
+        <p:spPr>
+          <a:xfrm>
+            <a:off x="6357319" y="5684870"/>
+            <a:ext cx="5396401" cy="1200329"/>
+          </a:xfrm>
+          <a:prstGeom prst="rect">
+            <a:avLst/>
+          </a:prstGeom>
+          <a:solidFill>
+            <a:schemeClr val="bg1"/>
+          </a:solidFill>
+          <a:ln>
+            <a:solidFill>
+              <a:schemeClr val="accent1"/>
+            </a:solidFill>
+          </a:ln>
+        </p:spPr>
+        <p:txBody>
+          <a:bodyPr wrap="square">
+            <a:spAutoFit/>
+          </a:bodyPr>
+          <a:lstStyle/>
+          <a:p>
+            <a:r>
+              <a:rPr lang="en-US" sz="800" b="1" noProof="1"/>
+              <a:t>Note -- Setting and removing credentials CLI:</a:t>
+            </a:r>
+          </a:p>
+          <a:p>
+            <a:endParaRPr lang="en-US" sz="800" b="1" noProof="1"/>
+          </a:p>
+          <a:p>
+            <a:pPr indent="179388"/>
+            <a:r>
+              <a:rPr lang="en-US" sz="800" noProof="1"/>
+              <a:t>url=https://github.com/JanAxelsson/imlook4d.git</a:t>
+            </a:r>
+          </a:p>
+          <a:p>
+            <a:pPr indent="179388"/>
+            <a:endParaRPr lang="en-US" sz="800" noProof="1"/>
+          </a:p>
+          <a:p>
+            <a:pPr indent="179388"/>
+            <a:r>
+              <a:rPr lang="en-US" sz="800" b="1" noProof="1"/>
+              <a:t>Mac specific (</a:t>
+            </a:r>
+            <a:r>
+              <a:rPr lang="en-US" sz="800" noProof="1"/>
+              <a:t> get / store / erase)</a:t>
+            </a:r>
+            <a:r>
+              <a:rPr lang="en-US" sz="800" b="1" noProof="1"/>
+              <a:t> :</a:t>
+            </a:r>
+          </a:p>
+          <a:p>
+            <a:pPr indent="179388"/>
+            <a:r>
+              <a:rPr lang="en-US" sz="800" noProof="1"/>
+              <a:t>echo "url=${url}" | git credential-osxkeychain get</a:t>
+            </a:r>
+          </a:p>
+          <a:p>
+            <a:pPr indent="179388"/>
+            <a:endParaRPr lang="en-US" sz="800" noProof="1"/>
+          </a:p>
+          <a:p>
+            <a:pPr indent="179388"/>
+            <a:r>
+              <a:rPr lang="en-US" sz="800" b="1" noProof="1"/>
+              <a:t>Git general way  (</a:t>
+            </a:r>
+            <a:r>
+              <a:rPr lang="en-US" sz="800" noProof="1"/>
+              <a:t>fill / approve / reject) </a:t>
+            </a:r>
+            <a:r>
+              <a:rPr lang="en-US" sz="800" b="1" noProof="1"/>
+              <a:t> :</a:t>
+            </a:r>
+          </a:p>
+          <a:p>
+            <a:pPr indent="179388"/>
+            <a:r>
+              <a:rPr lang="en-US" sz="800" noProof="1"/>
+              <a:t>echo "url=${url}" | git credential fill </a:t>
             </a:r>
           </a:p>
         </p:txBody>

</xml_diff>

<commit_message>
node_modules only in pragma-git folder (no separate npm install in ask-pass and merge)
</commit_message>
<xml_diff>
--- a/docs/Tech-overview.pptx
+++ b/docs/Tech-overview.pptx
@@ -262,7 +262,7 @@
           <a:p>
             <a:fld id="{CA855E1B-8830-B64E-B102-DB2BBD0D9567}" type="datetimeFigureOut">
               <a:rPr lang="sv-SE" smtClean="0"/>
-              <a:t>2024-09-28</a:t>
+              <a:t>2024-12-03</a:t>
             </a:fld>
             <a:endParaRPr lang="sv-SE"/>
           </a:p>
@@ -432,7 +432,7 @@
           <a:p>
             <a:fld id="{CA855E1B-8830-B64E-B102-DB2BBD0D9567}" type="datetimeFigureOut">
               <a:rPr lang="sv-SE" smtClean="0"/>
-              <a:t>2024-09-28</a:t>
+              <a:t>2024-12-03</a:t>
             </a:fld>
             <a:endParaRPr lang="sv-SE"/>
           </a:p>
@@ -612,7 +612,7 @@
           <a:p>
             <a:fld id="{CA855E1B-8830-B64E-B102-DB2BBD0D9567}" type="datetimeFigureOut">
               <a:rPr lang="sv-SE" smtClean="0"/>
-              <a:t>2024-09-28</a:t>
+              <a:t>2024-12-03</a:t>
             </a:fld>
             <a:endParaRPr lang="sv-SE"/>
           </a:p>
@@ -782,7 +782,7 @@
           <a:p>
             <a:fld id="{CA855E1B-8830-B64E-B102-DB2BBD0D9567}" type="datetimeFigureOut">
               <a:rPr lang="sv-SE" smtClean="0"/>
-              <a:t>2024-09-28</a:t>
+              <a:t>2024-12-03</a:t>
             </a:fld>
             <a:endParaRPr lang="sv-SE"/>
           </a:p>
@@ -1026,7 +1026,7 @@
           <a:p>
             <a:fld id="{CA855E1B-8830-B64E-B102-DB2BBD0D9567}" type="datetimeFigureOut">
               <a:rPr lang="sv-SE" smtClean="0"/>
-              <a:t>2024-09-28</a:t>
+              <a:t>2024-12-03</a:t>
             </a:fld>
             <a:endParaRPr lang="sv-SE"/>
           </a:p>
@@ -1258,7 +1258,7 @@
           <a:p>
             <a:fld id="{CA855E1B-8830-B64E-B102-DB2BBD0D9567}" type="datetimeFigureOut">
               <a:rPr lang="sv-SE" smtClean="0"/>
-              <a:t>2024-09-28</a:t>
+              <a:t>2024-12-03</a:t>
             </a:fld>
             <a:endParaRPr lang="sv-SE"/>
           </a:p>
@@ -1625,7 +1625,7 @@
           <a:p>
             <a:fld id="{CA855E1B-8830-B64E-B102-DB2BBD0D9567}" type="datetimeFigureOut">
               <a:rPr lang="sv-SE" smtClean="0"/>
-              <a:t>2024-09-28</a:t>
+              <a:t>2024-12-03</a:t>
             </a:fld>
             <a:endParaRPr lang="sv-SE"/>
           </a:p>
@@ -1743,7 +1743,7 @@
           <a:p>
             <a:fld id="{CA855E1B-8830-B64E-B102-DB2BBD0D9567}" type="datetimeFigureOut">
               <a:rPr lang="sv-SE" smtClean="0"/>
-              <a:t>2024-09-28</a:t>
+              <a:t>2024-12-03</a:t>
             </a:fld>
             <a:endParaRPr lang="sv-SE"/>
           </a:p>
@@ -1838,7 +1838,7 @@
           <a:p>
             <a:fld id="{CA855E1B-8830-B64E-B102-DB2BBD0D9567}" type="datetimeFigureOut">
               <a:rPr lang="sv-SE" smtClean="0"/>
-              <a:t>2024-09-28</a:t>
+              <a:t>2024-12-03</a:t>
             </a:fld>
             <a:endParaRPr lang="sv-SE"/>
           </a:p>
@@ -2115,7 +2115,7 @@
           <a:p>
             <a:fld id="{CA855E1B-8830-B64E-B102-DB2BBD0D9567}" type="datetimeFigureOut">
               <a:rPr lang="sv-SE" smtClean="0"/>
-              <a:t>2024-09-28</a:t>
+              <a:t>2024-12-03</a:t>
             </a:fld>
             <a:endParaRPr lang="sv-SE"/>
           </a:p>
@@ -2372,7 +2372,7 @@
           <a:p>
             <a:fld id="{CA855E1B-8830-B64E-B102-DB2BBD0D9567}" type="datetimeFigureOut">
               <a:rPr lang="sv-SE" smtClean="0"/>
-              <a:t>2024-09-28</a:t>
+              <a:t>2024-12-03</a:t>
             </a:fld>
             <a:endParaRPr lang="sv-SE"/>
           </a:p>
@@ -2585,7 +2585,7 @@
           <a:p>
             <a:fld id="{CA855E1B-8830-B64E-B102-DB2BBD0D9567}" type="datetimeFigureOut">
               <a:rPr lang="sv-SE" smtClean="0"/>
-              <a:t>2024-09-28</a:t>
+              <a:t>2024-12-03</a:t>
             </a:fld>
             <a:endParaRPr lang="sv-SE"/>
           </a:p>
@@ -11616,25 +11616,32 @@
             <a:endParaRPr lang="en-US" sz="800" b="1" noProof="1"/>
           </a:p>
           <a:p>
+            <a:pPr marL="171450" indent="-171450">
+              <a:buFont typeface="Arial" panose="020B0604020202020204" pitchFamily="34" charset="0"/>
+              <a:buChar char="•"/>
+            </a:pPr>
+            <a:r>
+              <a:rPr lang="en-US" sz="800" noProof="1"/>
+              <a:t>merge folder and askpass folders have their own package.json</a:t>
+            </a:r>
+          </a:p>
+          <a:p>
+            <a:pPr marL="171450" indent="-171450">
+              <a:buFont typeface="Arial" panose="020B0604020202020204" pitchFamily="34" charset="0"/>
+              <a:buChar char="•"/>
+            </a:pPr>
             <a:r>
               <a:rPr lang="en-US" sz="800" b="1" noProof="1"/>
-              <a:t>merge folder has its own package.json :</a:t>
-            </a:r>
-          </a:p>
-          <a:p>
-            <a:pPr marL="171450" indent="-171450">
-              <a:buFontTx/>
-              <a:buChar char="-"/>
-            </a:pPr>
-            <a:r>
-              <a:rPr lang="en-US" sz="800" noProof="1"/>
-              <a:t>npm install has to be performed in “merge” folder as well as in Pragma-git</a:t>
-            </a:r>
-            <a:endParaRPr lang="en-US" sz="800" noProof="1">
-              <a:solidFill>
-                <a:schemeClr val="accent1"/>
-              </a:solidFill>
-            </a:endParaRPr>
+              <a:t>Do not npm install </a:t>
+            </a:r>
+            <a:r>
+              <a:rPr lang="en-US" sz="800" noProof="1"/>
+              <a:t>in these, but in folder above</a:t>
+            </a:r>
+            <a:r>
+              <a:rPr lang="en-US" sz="800" b="1" noProof="1"/>
+              <a:t>.</a:t>
+            </a:r>
           </a:p>
         </p:txBody>
       </p:sp>

</xml_diff>